<commit_message>
Conceitos de Containers e Imagens
</commit_message>
<xml_diff>
--- a/docs/docker-resumo.pptx
+++ b/docs/docker-resumo.pptx
@@ -11,15 +11,16 @@
     <p:sldId id="288" r:id="rId5"/>
     <p:sldId id="289" r:id="rId6"/>
     <p:sldId id="290" r:id="rId7"/>
-    <p:sldId id="291" r:id="rId8"/>
-    <p:sldId id="278" r:id="rId9"/>
-    <p:sldId id="281" r:id="rId10"/>
-    <p:sldId id="280" r:id="rId11"/>
-    <p:sldId id="279" r:id="rId12"/>
-    <p:sldId id="282" r:id="rId13"/>
-    <p:sldId id="283" r:id="rId14"/>
-    <p:sldId id="284" r:id="rId15"/>
-    <p:sldId id="285" r:id="rId16"/>
+    <p:sldId id="292" r:id="rId8"/>
+    <p:sldId id="291" r:id="rId9"/>
+    <p:sldId id="278" r:id="rId10"/>
+    <p:sldId id="281" r:id="rId11"/>
+    <p:sldId id="280" r:id="rId12"/>
+    <p:sldId id="279" r:id="rId13"/>
+    <p:sldId id="282" r:id="rId14"/>
+    <p:sldId id="283" r:id="rId15"/>
+    <p:sldId id="284" r:id="rId16"/>
+    <p:sldId id="285" r:id="rId17"/>
   </p:sldIdLst>
   <p:sldSz cx="12192000" cy="6858000"/>
   <p:notesSz cx="6858000" cy="9144000"/>
@@ -255,7 +256,7 @@
           <a:p>
             <a:fld id="{CC58B075-67F8-4A8D-AE1C-3D3E4193EBCA}" type="datetimeFigureOut">
               <a:rPr lang="pt-BR" smtClean="0"/>
-              <a:t>06/09/2019</a:t>
+              <a:t>10/09/2019</a:t>
             </a:fld>
             <a:endParaRPr lang="pt-BR"/>
           </a:p>
@@ -423,7 +424,7 @@
           <a:p>
             <a:fld id="{CC58B075-67F8-4A8D-AE1C-3D3E4193EBCA}" type="datetimeFigureOut">
               <a:rPr lang="pt-BR" smtClean="0"/>
-              <a:t>06/09/2019</a:t>
+              <a:t>10/09/2019</a:t>
             </a:fld>
             <a:endParaRPr lang="pt-BR"/>
           </a:p>
@@ -601,7 +602,7 @@
           <a:p>
             <a:fld id="{CC58B075-67F8-4A8D-AE1C-3D3E4193EBCA}" type="datetimeFigureOut">
               <a:rPr lang="pt-BR" smtClean="0"/>
-              <a:t>06/09/2019</a:t>
+              <a:t>10/09/2019</a:t>
             </a:fld>
             <a:endParaRPr lang="pt-BR"/>
           </a:p>
@@ -769,7 +770,7 @@
           <a:p>
             <a:fld id="{CC58B075-67F8-4A8D-AE1C-3D3E4193EBCA}" type="datetimeFigureOut">
               <a:rPr lang="pt-BR" smtClean="0"/>
-              <a:t>06/09/2019</a:t>
+              <a:t>10/09/2019</a:t>
             </a:fld>
             <a:endParaRPr lang="pt-BR"/>
           </a:p>
@@ -1014,7 +1015,7 @@
           <a:p>
             <a:fld id="{CC58B075-67F8-4A8D-AE1C-3D3E4193EBCA}" type="datetimeFigureOut">
               <a:rPr lang="pt-BR" smtClean="0"/>
-              <a:t>06/09/2019</a:t>
+              <a:t>10/09/2019</a:t>
             </a:fld>
             <a:endParaRPr lang="pt-BR"/>
           </a:p>
@@ -1243,7 +1244,7 @@
           <a:p>
             <a:fld id="{CC58B075-67F8-4A8D-AE1C-3D3E4193EBCA}" type="datetimeFigureOut">
               <a:rPr lang="pt-BR" smtClean="0"/>
-              <a:t>06/09/2019</a:t>
+              <a:t>10/09/2019</a:t>
             </a:fld>
             <a:endParaRPr lang="pt-BR"/>
           </a:p>
@@ -1607,7 +1608,7 @@
           <a:p>
             <a:fld id="{CC58B075-67F8-4A8D-AE1C-3D3E4193EBCA}" type="datetimeFigureOut">
               <a:rPr lang="pt-BR" smtClean="0"/>
-              <a:t>06/09/2019</a:t>
+              <a:t>10/09/2019</a:t>
             </a:fld>
             <a:endParaRPr lang="pt-BR"/>
           </a:p>
@@ -1724,7 +1725,7 @@
           <a:p>
             <a:fld id="{CC58B075-67F8-4A8D-AE1C-3D3E4193EBCA}" type="datetimeFigureOut">
               <a:rPr lang="pt-BR" smtClean="0"/>
-              <a:t>06/09/2019</a:t>
+              <a:t>10/09/2019</a:t>
             </a:fld>
             <a:endParaRPr lang="pt-BR"/>
           </a:p>
@@ -1819,7 +1820,7 @@
           <a:p>
             <a:fld id="{CC58B075-67F8-4A8D-AE1C-3D3E4193EBCA}" type="datetimeFigureOut">
               <a:rPr lang="pt-BR" smtClean="0"/>
-              <a:t>06/09/2019</a:t>
+              <a:t>10/09/2019</a:t>
             </a:fld>
             <a:endParaRPr lang="pt-BR"/>
           </a:p>
@@ -2094,7 +2095,7 @@
           <a:p>
             <a:fld id="{CC58B075-67F8-4A8D-AE1C-3D3E4193EBCA}" type="datetimeFigureOut">
               <a:rPr lang="pt-BR" smtClean="0"/>
-              <a:t>06/09/2019</a:t>
+              <a:t>10/09/2019</a:t>
             </a:fld>
             <a:endParaRPr lang="pt-BR"/>
           </a:p>
@@ -2346,7 +2347,7 @@
           <a:p>
             <a:fld id="{CC58B075-67F8-4A8D-AE1C-3D3E4193EBCA}" type="datetimeFigureOut">
               <a:rPr lang="pt-BR" smtClean="0"/>
-              <a:t>06/09/2019</a:t>
+              <a:t>10/09/2019</a:t>
             </a:fld>
             <a:endParaRPr lang="pt-BR"/>
           </a:p>
@@ -2557,7 +2558,7 @@
           <a:p>
             <a:fld id="{CC58B075-67F8-4A8D-AE1C-3D3E4193EBCA}" type="datetimeFigureOut">
               <a:rPr lang="pt-BR" smtClean="0"/>
-              <a:t>06/09/2019</a:t>
+              <a:t>10/09/2019</a:t>
             </a:fld>
             <a:endParaRPr lang="pt-BR"/>
           </a:p>
@@ -3058,7 +3059,7 @@
     </p:spTree>
     <p:extLst>
       <p:ext uri="{BB962C8B-B14F-4D97-AF65-F5344CB8AC3E}">
-        <p14:creationId xmlns:p14="http://schemas.microsoft.com/office/powerpoint/2010/main" val="2333415383"/>
+        <p14:creationId xmlns:p14="http://schemas.microsoft.com/office/powerpoint/2010/main" val="517489975"/>
       </p:ext>
     </p:extLst>
   </p:cSld>
@@ -3126,7 +3127,7 @@
     </p:spTree>
     <p:extLst>
       <p:ext uri="{BB962C8B-B14F-4D97-AF65-F5344CB8AC3E}">
-        <p14:creationId xmlns:p14="http://schemas.microsoft.com/office/powerpoint/2010/main" val="1812516573"/>
+        <p14:creationId xmlns:p14="http://schemas.microsoft.com/office/powerpoint/2010/main" val="2333415383"/>
       </p:ext>
     </p:extLst>
   </p:cSld>
@@ -3194,7 +3195,7 @@
     </p:spTree>
     <p:extLst>
       <p:ext uri="{BB962C8B-B14F-4D97-AF65-F5344CB8AC3E}">
-        <p14:creationId xmlns:p14="http://schemas.microsoft.com/office/powerpoint/2010/main" val="3688525284"/>
+        <p14:creationId xmlns:p14="http://schemas.microsoft.com/office/powerpoint/2010/main" val="1812516573"/>
       </p:ext>
     </p:extLst>
   </p:cSld>
@@ -3262,7 +3263,7 @@
     </p:spTree>
     <p:extLst>
       <p:ext uri="{BB962C8B-B14F-4D97-AF65-F5344CB8AC3E}">
-        <p14:creationId xmlns:p14="http://schemas.microsoft.com/office/powerpoint/2010/main" val="1462747175"/>
+        <p14:creationId xmlns:p14="http://schemas.microsoft.com/office/powerpoint/2010/main" val="3688525284"/>
       </p:ext>
     </p:extLst>
   </p:cSld>
@@ -3330,6 +3331,74 @@
     </p:spTree>
     <p:extLst>
       <p:ext uri="{BB962C8B-B14F-4D97-AF65-F5344CB8AC3E}">
+        <p14:creationId xmlns:p14="http://schemas.microsoft.com/office/powerpoint/2010/main" val="1462747175"/>
+      </p:ext>
+    </p:extLst>
+  </p:cSld>
+  <p:clrMapOvr>
+    <a:masterClrMapping/>
+  </p:clrMapOvr>
+</p:sld>
+</file>
+
+<file path=ppt/slides/slide15.xml><?xml version="1.0" encoding="utf-8"?>
+<p:sld xmlns:a="http://schemas.openxmlformats.org/drawingml/2006/main" xmlns:r="http://schemas.openxmlformats.org/officeDocument/2006/relationships" xmlns:p="http://schemas.openxmlformats.org/presentationml/2006/main">
+  <p:cSld>
+    <p:spTree>
+      <p:nvGrpSpPr>
+        <p:cNvPr id="1" name=""/>
+        <p:cNvGrpSpPr/>
+        <p:nvPr/>
+      </p:nvGrpSpPr>
+      <p:grpSpPr>
+        <a:xfrm>
+          <a:off x="0" y="0"/>
+          <a:ext cx="0" cy="0"/>
+          <a:chOff x="0" y="0"/>
+          <a:chExt cx="0" cy="0"/>
+        </a:xfrm>
+      </p:grpSpPr>
+      <p:sp>
+        <p:nvSpPr>
+          <p:cNvPr id="2" name="Título 1"/>
+          <p:cNvSpPr>
+            <a:spLocks noGrp="1"/>
+          </p:cNvSpPr>
+          <p:nvPr>
+            <p:ph type="title"/>
+          </p:nvPr>
+        </p:nvSpPr>
+        <p:spPr/>
+        <p:txBody>
+          <a:bodyPr/>
+          <a:lstStyle/>
+          <a:p>
+            <a:endParaRPr lang="pt-BR"/>
+          </a:p>
+        </p:txBody>
+      </p:sp>
+      <p:sp>
+        <p:nvSpPr>
+          <p:cNvPr id="3" name="Espaço Reservado para Conteúdo 2"/>
+          <p:cNvSpPr>
+            <a:spLocks noGrp="1"/>
+          </p:cNvSpPr>
+          <p:nvPr>
+            <p:ph idx="1"/>
+          </p:nvPr>
+        </p:nvSpPr>
+        <p:spPr/>
+        <p:txBody>
+          <a:bodyPr/>
+          <a:lstStyle/>
+          <a:p>
+            <a:endParaRPr lang="pt-BR"/>
+          </a:p>
+        </p:txBody>
+      </p:sp>
+    </p:spTree>
+    <p:extLst>
+      <p:ext uri="{BB962C8B-B14F-4D97-AF65-F5344CB8AC3E}">
         <p14:creationId xmlns:p14="http://schemas.microsoft.com/office/powerpoint/2010/main" val="3094957484"/>
       </p:ext>
     </p:extLst>
@@ -3340,7 +3409,7 @@
 </p:sld>
 </file>
 
-<file path=ppt/slides/slide15.xml><?xml version="1.0" encoding="utf-8"?>
+<file path=ppt/slides/slide16.xml><?xml version="1.0" encoding="utf-8"?>
 <p:sld xmlns:a="http://schemas.openxmlformats.org/drawingml/2006/main" xmlns:r="http://schemas.openxmlformats.org/officeDocument/2006/relationships" xmlns:p="http://schemas.openxmlformats.org/presentationml/2006/main">
   <p:cSld>
     <p:spTree>
@@ -4760,8 +4829,8 @@
         </p:nvSpPr>
         <p:spPr>
           <a:xfrm>
-            <a:off x="1469248" y="2750032"/>
-            <a:ext cx="7820297" cy="2616101"/>
+            <a:off x="2207301" y="4547993"/>
+            <a:ext cx="6518688" cy="2000548"/>
           </a:xfrm>
           <a:prstGeom prst="rect">
             <a:avLst/>
@@ -4773,6 +4842,7 @@
           </a:bodyPr>
           <a:lstStyle/>
           <a:p>
+            <a:pPr algn="ctr"/>
             <a:endParaRPr lang="pt-BR" sz="2000" b="1" i="1" u="sng" dirty="0">
               <a:effectLst>
                 <a:outerShdw blurRad="38100" dist="38100" dir="2700000" algn="tl">
@@ -4823,6 +4893,7 @@
             </a:r>
           </a:p>
           <a:p>
+            <a:pPr algn="ctr"/>
             <a:endParaRPr lang="pt-BR" sz="2000" b="1" i="1" u="sng" dirty="0" smtClean="0">
               <a:effectLst>
                 <a:outerShdw blurRad="38100" dist="38100" dir="2700000" algn="tl">
@@ -4834,6 +4905,7 @@
             </a:endParaRPr>
           </a:p>
           <a:p>
+            <a:pPr algn="ctr"/>
             <a:endParaRPr lang="pt-BR" sz="2000" b="1" i="1" u="sng" dirty="0">
               <a:effectLst>
                 <a:outerShdw blurRad="38100" dist="38100" dir="2700000" algn="tl">
@@ -4845,6 +4917,7 @@
             </a:endParaRPr>
           </a:p>
           <a:p>
+            <a:pPr algn="ctr"/>
             <a:r>
               <a:rPr lang="pt-BR" sz="2000" b="1" i="1" u="sng" dirty="0">
                 <a:effectLst>
@@ -4871,17 +4944,6 @@
               </a:rPr>
               <a:t>/</a:t>
             </a:r>
-            <a:endParaRPr lang="pt-BR" sz="2000" b="1" i="1" u="sng" dirty="0" smtClean="0">
-              <a:effectLst>
-                <a:outerShdw blurRad="38100" dist="38100" dir="2700000" algn="tl">
-                  <a:srgbClr val="000000">
-                    <a:alpha val="43137"/>
-                  </a:srgbClr>
-                </a:outerShdw>
-              </a:effectLst>
-            </a:endParaRPr>
-          </a:p>
-          <a:p>
             <a:endParaRPr lang="pt-BR" sz="2000" b="1" i="1" u="sng" dirty="0">
               <a:effectLst>
                 <a:outerShdw blurRad="38100" dist="38100" dir="2700000" algn="tl">
@@ -4893,17 +4955,7 @@
             </a:endParaRPr>
           </a:p>
           <a:p>
-            <a:endParaRPr lang="pt-BR" sz="2000" b="1" i="1" u="sng" dirty="0">
-              <a:effectLst>
-                <a:outerShdw blurRad="38100" dist="38100" dir="2700000" algn="tl">
-                  <a:srgbClr val="000000">
-                    <a:alpha val="43137"/>
-                  </a:srgbClr>
-                </a:outerShdw>
-              </a:effectLst>
-            </a:endParaRPr>
-          </a:p>
-          <a:p>
+            <a:pPr algn="ctr"/>
             <a:endParaRPr lang="pt-BR" sz="2000" b="1" i="1" u="sng" dirty="0">
               <a:effectLst>
                 <a:outerShdw blurRad="38100" dist="38100" dir="2700000" algn="tl">
@@ -5657,7 +5709,7 @@
             <a:pPr algn="ctr"/>
             <a:r>
               <a:rPr lang="pt-BR" sz="2800" b="1" dirty="0" smtClean="0"/>
-              <a:t>XXXX</a:t>
+              <a:t>Diferença entre Imagens e Containers</a:t>
             </a:r>
             <a:endParaRPr lang="pt-BR" sz="2800" b="1" dirty="0"/>
           </a:p>
@@ -6046,10 +6098,309 @@
           </a:p>
         </p:txBody>
       </p:sp>
+      <p:sp>
+        <p:nvSpPr>
+          <p:cNvPr id="3" name="CaixaDeTexto 2"/>
+          <p:cNvSpPr txBox="1"/>
+          <p:nvPr/>
+        </p:nvSpPr>
+        <p:spPr>
+          <a:xfrm>
+            <a:off x="653084" y="2150243"/>
+            <a:ext cx="11396959" cy="2554545"/>
+          </a:xfrm>
+          <a:prstGeom prst="rect">
+            <a:avLst/>
+          </a:prstGeom>
+          <a:noFill/>
+        </p:spPr>
+        <p:txBody>
+          <a:bodyPr wrap="square" rtlCol="0">
+            <a:spAutoFit/>
+          </a:bodyPr>
+          <a:lstStyle/>
+          <a:p>
+            <a:r>
+              <a:rPr lang="pt-BR" sz="1600" dirty="0"/>
+              <a:t>A </a:t>
+            </a:r>
+            <a:r>
+              <a:rPr lang="pt-BR" sz="1600" b="1" dirty="0"/>
+              <a:t>imagem</a:t>
+            </a:r>
+            <a:r>
+              <a:rPr lang="pt-BR" sz="1600" dirty="0"/>
+              <a:t> é como se fosse uma receita de bolo, uma série de instruções que o </a:t>
+            </a:r>
+            <a:r>
+              <a:rPr lang="pt-BR" sz="1600" dirty="0" err="1"/>
+              <a:t>Docker</a:t>
+            </a:r>
+            <a:r>
+              <a:rPr lang="pt-BR" sz="1600" dirty="0"/>
+              <a:t> seguirá para criar um </a:t>
+            </a:r>
+            <a:r>
+              <a:rPr lang="pt-BR" sz="1600" b="1" i="1" dirty="0"/>
+              <a:t>container</a:t>
+            </a:r>
+            <a:r>
+              <a:rPr lang="pt-BR" sz="1600" dirty="0"/>
+              <a:t>, que irá conter as instruções da </a:t>
+            </a:r>
+            <a:r>
+              <a:rPr lang="pt-BR" sz="1600" dirty="0" smtClean="0"/>
+              <a:t>imagem.</a:t>
+            </a:r>
+          </a:p>
+          <a:p>
+            <a:endParaRPr lang="pt-BR" sz="1600" dirty="0"/>
+          </a:p>
+          <a:p>
+            <a:pPr marL="285750" indent="-285750">
+              <a:buFont typeface="Wingdings" panose="05000000000000000000" pitchFamily="2" charset="2"/>
+              <a:buChar char="Ø"/>
+            </a:pPr>
+            <a:r>
+              <a:rPr lang="pt-BR" sz="1600" dirty="0" err="1" smtClean="0"/>
+              <a:t>docker</a:t>
+            </a:r>
+            <a:r>
+              <a:rPr lang="pt-BR" sz="1600" dirty="0" smtClean="0"/>
+              <a:t> </a:t>
+            </a:r>
+            <a:r>
+              <a:rPr lang="pt-BR" sz="1600" dirty="0" err="1" smtClean="0"/>
+              <a:t>ps</a:t>
+            </a:r>
+            <a:r>
+              <a:rPr lang="pt-BR" sz="1600" dirty="0" smtClean="0"/>
+              <a:t> –a</a:t>
+            </a:r>
+          </a:p>
+          <a:p>
+            <a:endParaRPr lang="pt-BR" sz="1600" dirty="0" smtClean="0"/>
+          </a:p>
+          <a:p>
+            <a:r>
+              <a:rPr lang="pt-BR" sz="1600" dirty="0"/>
+              <a:t>CONTAINER ID    IMAGE         COMMAND       CREATED         STATUS                     </a:t>
+            </a:r>
+            <a:r>
+              <a:rPr lang="pt-BR" sz="1600" dirty="0" smtClean="0"/>
+              <a:t>		PORTS     </a:t>
+            </a:r>
+            <a:r>
+              <a:rPr lang="pt-BR" sz="1600" dirty="0"/>
+              <a:t>NAMES</a:t>
+            </a:r>
+          </a:p>
+          <a:p>
+            <a:r>
+              <a:rPr lang="pt-BR" sz="1600" dirty="0"/>
+              <a:t>4139842e283a    </a:t>
+            </a:r>
+            <a:r>
+              <a:rPr lang="pt-BR" sz="1600" dirty="0" err="1"/>
+              <a:t>ubuntu</a:t>
+            </a:r>
+            <a:r>
+              <a:rPr lang="pt-BR" sz="1600" dirty="0"/>
+              <a:t>        "/bin/</a:t>
+            </a:r>
+            <a:r>
+              <a:rPr lang="pt-BR" sz="1600" dirty="0" err="1"/>
+              <a:t>bash</a:t>
+            </a:r>
+            <a:r>
+              <a:rPr lang="pt-BR" sz="1600" dirty="0"/>
+              <a:t>"   3 minutes </a:t>
+            </a:r>
+            <a:r>
+              <a:rPr lang="pt-BR" sz="1600" dirty="0" err="1"/>
+              <a:t>ago</a:t>
+            </a:r>
+            <a:r>
+              <a:rPr lang="pt-BR" sz="1600" dirty="0"/>
+              <a:t>   </a:t>
+            </a:r>
+            <a:r>
+              <a:rPr lang="pt-BR" sz="1600" dirty="0" smtClean="0"/>
+              <a:t> </a:t>
+            </a:r>
+            <a:r>
+              <a:rPr lang="pt-BR" sz="1600" dirty="0" err="1" smtClean="0"/>
+              <a:t>Exited</a:t>
+            </a:r>
+            <a:r>
+              <a:rPr lang="pt-BR" sz="1600" dirty="0" smtClean="0"/>
+              <a:t> </a:t>
+            </a:r>
+            <a:r>
+              <a:rPr lang="pt-BR" sz="1600" dirty="0"/>
+              <a:t>(0) 3 minutes </a:t>
+            </a:r>
+            <a:r>
+              <a:rPr lang="pt-BR" sz="1600" dirty="0" err="1"/>
+              <a:t>ago</a:t>
+            </a:r>
+            <a:r>
+              <a:rPr lang="pt-BR" sz="1600" dirty="0"/>
+              <a:t>          </a:t>
+            </a:r>
+            <a:r>
+              <a:rPr lang="pt-BR" sz="1600" dirty="0" smtClean="0"/>
+              <a:t>		</a:t>
+            </a:r>
+            <a:r>
+              <a:rPr lang="pt-BR" sz="1600" dirty="0" err="1" smtClean="0"/>
+              <a:t>elastic_albattani</a:t>
+            </a:r>
+            <a:endParaRPr lang="pt-BR" sz="1600" dirty="0"/>
+          </a:p>
+          <a:p>
+            <a:r>
+              <a:rPr lang="pt-BR" sz="1600" dirty="0"/>
+              <a:t>c1a155091114    </a:t>
+            </a:r>
+            <a:r>
+              <a:rPr lang="pt-BR" sz="1600" dirty="0" err="1"/>
+              <a:t>hello</a:t>
+            </a:r>
+            <a:r>
+              <a:rPr lang="pt-BR" sz="1600" dirty="0"/>
+              <a:t>-world   "/</a:t>
+            </a:r>
+            <a:r>
+              <a:rPr lang="pt-BR" sz="1600" dirty="0" err="1"/>
+              <a:t>hello</a:t>
+            </a:r>
+            <a:r>
+              <a:rPr lang="pt-BR" sz="1600" dirty="0"/>
+              <a:t>"      </a:t>
+            </a:r>
+            <a:r>
+              <a:rPr lang="pt-BR" sz="1600" dirty="0" smtClean="0"/>
+              <a:t>  4 </a:t>
+            </a:r>
+            <a:r>
+              <a:rPr lang="pt-BR" sz="1600" dirty="0" err="1"/>
+              <a:t>days</a:t>
+            </a:r>
+            <a:r>
+              <a:rPr lang="pt-BR" sz="1600" dirty="0"/>
+              <a:t> </a:t>
+            </a:r>
+            <a:r>
+              <a:rPr lang="pt-BR" sz="1600" dirty="0" err="1"/>
+              <a:t>ago</a:t>
+            </a:r>
+            <a:r>
+              <a:rPr lang="pt-BR" sz="1600" dirty="0"/>
+              <a:t>      </a:t>
+            </a:r>
+            <a:r>
+              <a:rPr lang="pt-BR" sz="1600" dirty="0" smtClean="0"/>
+              <a:t>    </a:t>
+            </a:r>
+            <a:r>
+              <a:rPr lang="pt-BR" sz="1600" dirty="0" err="1" smtClean="0"/>
+              <a:t>Exited</a:t>
+            </a:r>
+            <a:r>
+              <a:rPr lang="pt-BR" sz="1600" dirty="0" smtClean="0"/>
+              <a:t> </a:t>
+            </a:r>
+            <a:r>
+              <a:rPr lang="pt-BR" sz="1600" dirty="0"/>
+              <a:t>(0) 4 </a:t>
+            </a:r>
+            <a:r>
+              <a:rPr lang="pt-BR" sz="1600" dirty="0" err="1"/>
+              <a:t>days</a:t>
+            </a:r>
+            <a:r>
+              <a:rPr lang="pt-BR" sz="1600" dirty="0"/>
+              <a:t> </a:t>
+            </a:r>
+            <a:r>
+              <a:rPr lang="pt-BR" sz="1600" dirty="0" err="1"/>
+              <a:t>ago</a:t>
+            </a:r>
+            <a:r>
+              <a:rPr lang="pt-BR" sz="1600" dirty="0"/>
+              <a:t>                </a:t>
+            </a:r>
+            <a:r>
+              <a:rPr lang="pt-BR" sz="1600" dirty="0" smtClean="0"/>
+              <a:t>		</a:t>
+            </a:r>
+            <a:r>
+              <a:rPr lang="pt-BR" sz="1600" dirty="0" err="1" smtClean="0"/>
+              <a:t>nifty_mcclintock</a:t>
+            </a:r>
+            <a:endParaRPr lang="pt-BR" sz="1600" dirty="0" smtClean="0"/>
+          </a:p>
+          <a:p>
+            <a:endParaRPr lang="pt-BR" sz="1600" dirty="0" smtClean="0"/>
+          </a:p>
+          <a:p>
+            <a:endParaRPr lang="pt-BR" sz="1600" dirty="0"/>
+          </a:p>
+        </p:txBody>
+      </p:sp>
+      <p:pic>
+        <p:nvPicPr>
+          <p:cNvPr id="2" name="Imagem 1"/>
+          <p:cNvPicPr>
+            <a:picLocks noChangeAspect="1"/>
+          </p:cNvPicPr>
+          <p:nvPr/>
+        </p:nvPicPr>
+        <p:blipFill>
+          <a:blip r:embed="rId2"/>
+          <a:stretch>
+            <a:fillRect/>
+          </a:stretch>
+        </p:blipFill>
+        <p:spPr>
+          <a:xfrm>
+            <a:off x="3940168" y="637340"/>
+            <a:ext cx="3257442" cy="1499520"/>
+          </a:xfrm>
+          <a:prstGeom prst="rect">
+            <a:avLst/>
+          </a:prstGeom>
+        </p:spPr>
+      </p:pic>
+      <p:pic>
+        <p:nvPicPr>
+          <p:cNvPr id="7" name="Imagem 6"/>
+          <p:cNvPicPr>
+            <a:picLocks noChangeAspect="1"/>
+          </p:cNvPicPr>
+          <p:nvPr/>
+        </p:nvPicPr>
+        <p:blipFill>
+          <a:blip r:embed="rId3"/>
+          <a:stretch>
+            <a:fillRect/>
+          </a:stretch>
+        </p:blipFill>
+        <p:spPr>
+          <a:xfrm>
+            <a:off x="3040761" y="4509054"/>
+            <a:ext cx="5695950" cy="1428750"/>
+          </a:xfrm>
+          <a:prstGeom prst="rect">
+            <a:avLst/>
+          </a:prstGeom>
+        </p:spPr>
+      </p:pic>
     </p:spTree>
     <p:extLst>
       <p:ext uri="{BB962C8B-B14F-4D97-AF65-F5344CB8AC3E}">
-        <p14:creationId xmlns:p14="http://schemas.microsoft.com/office/powerpoint/2010/main" val="743545617"/>
+        <p14:creationId xmlns:p14="http://schemas.microsoft.com/office/powerpoint/2010/main" val="665658361"/>
       </p:ext>
     </p:extLst>
   </p:cSld>
@@ -6078,46 +6429,704 @@
       </p:grpSpPr>
       <p:sp>
         <p:nvSpPr>
-          <p:cNvPr id="2" name="Título 1"/>
-          <p:cNvSpPr>
-            <a:spLocks noGrp="1"/>
-          </p:cNvSpPr>
-          <p:nvPr>
-            <p:ph type="title"/>
-          </p:nvPr>
-        </p:nvSpPr>
-        <p:spPr/>
-        <p:txBody>
-          <a:bodyPr/>
-          <a:lstStyle/>
-          <a:p>
-            <a:endParaRPr lang="pt-BR"/>
-          </a:p>
-        </p:txBody>
-      </p:sp>
-      <p:sp>
-        <p:nvSpPr>
-          <p:cNvPr id="3" name="Espaço Reservado para Conteúdo 2"/>
-          <p:cNvSpPr>
-            <a:spLocks noGrp="1"/>
-          </p:cNvSpPr>
-          <p:nvPr>
-            <p:ph idx="1"/>
-          </p:nvPr>
-        </p:nvSpPr>
-        <p:spPr/>
-        <p:txBody>
-          <a:bodyPr/>
-          <a:lstStyle/>
-          <a:p>
-            <a:endParaRPr lang="pt-BR"/>
+          <p:cNvPr id="4" name="Título 1"/>
+          <p:cNvSpPr txBox="1">
+            <a:spLocks/>
+          </p:cNvSpPr>
+          <p:nvPr/>
+        </p:nvSpPr>
+        <p:spPr>
+          <a:xfrm>
+            <a:off x="125627" y="115678"/>
+            <a:ext cx="11800761" cy="549275"/>
+          </a:xfrm>
+          <a:prstGeom prst="rect">
+            <a:avLst/>
+          </a:prstGeom>
+        </p:spPr>
+        <p:txBody>
+          <a:bodyPr vert="horz" lIns="91440" tIns="45720" rIns="91440" bIns="45720" rtlCol="0" anchor="ctr">
+            <a:normAutofit/>
+          </a:bodyPr>
+          <a:lstStyle>
+            <a:lvl1pPr algn="l" defTabSz="914400" rtl="0" eaLnBrk="1" latinLnBrk="0" hangingPunct="1">
+              <a:lnSpc>
+                <a:spcPct val="90000"/>
+              </a:lnSpc>
+              <a:spcBef>
+                <a:spcPct val="0"/>
+              </a:spcBef>
+              <a:buNone/>
+              <a:defRPr sz="4400" kern="1200">
+                <a:solidFill>
+                  <a:schemeClr val="tx1"/>
+                </a:solidFill>
+                <a:latin typeface="+mj-lt"/>
+                <a:ea typeface="+mj-ea"/>
+                <a:cs typeface="+mj-cs"/>
+              </a:defRPr>
+            </a:lvl1pPr>
+          </a:lstStyle>
+          <a:p>
+            <a:pPr algn="ctr"/>
+            <a:r>
+              <a:rPr lang="pt-BR" sz="2800" b="1" dirty="0" smtClean="0"/>
+              <a:t>Diferença entre Imagens e Containers</a:t>
+            </a:r>
+            <a:endParaRPr lang="pt-BR" sz="2800" b="1" dirty="0"/>
+          </a:p>
+        </p:txBody>
+      </p:sp>
+      <p:sp>
+        <p:nvSpPr>
+          <p:cNvPr id="5" name="Espaço Reservado para Conteúdo 5"/>
+          <p:cNvSpPr txBox="1">
+            <a:spLocks/>
+          </p:cNvSpPr>
+          <p:nvPr/>
+        </p:nvSpPr>
+        <p:spPr>
+          <a:xfrm>
+            <a:off x="504450" y="1084496"/>
+            <a:ext cx="11421938" cy="3317687"/>
+          </a:xfrm>
+          <a:prstGeom prst="rect">
+            <a:avLst/>
+          </a:prstGeom>
+        </p:spPr>
+        <p:txBody>
+          <a:bodyPr vert="horz" lIns="91440" tIns="45720" rIns="91440" bIns="45720" rtlCol="0">
+            <a:normAutofit/>
+          </a:bodyPr>
+          <a:lstStyle>
+            <a:lvl1pPr marL="228600" indent="-228600" algn="l" defTabSz="914400" rtl="0" eaLnBrk="1" latinLnBrk="0" hangingPunct="1">
+              <a:lnSpc>
+                <a:spcPct val="90000"/>
+              </a:lnSpc>
+              <a:spcBef>
+                <a:spcPts val="1000"/>
+              </a:spcBef>
+              <a:buFont typeface="Arial" panose="020B0604020202020204" pitchFamily="34" charset="0"/>
+              <a:buChar char="•"/>
+              <a:defRPr sz="2800" kern="1200">
+                <a:solidFill>
+                  <a:schemeClr val="tx1"/>
+                </a:solidFill>
+                <a:latin typeface="+mn-lt"/>
+                <a:ea typeface="+mn-ea"/>
+                <a:cs typeface="+mn-cs"/>
+              </a:defRPr>
+            </a:lvl1pPr>
+            <a:lvl2pPr marL="685800" indent="-228600" algn="l" defTabSz="914400" rtl="0" eaLnBrk="1" latinLnBrk="0" hangingPunct="1">
+              <a:lnSpc>
+                <a:spcPct val="90000"/>
+              </a:lnSpc>
+              <a:spcBef>
+                <a:spcPts val="500"/>
+              </a:spcBef>
+              <a:buFont typeface="Arial" panose="020B0604020202020204" pitchFamily="34" charset="0"/>
+              <a:buChar char="•"/>
+              <a:defRPr sz="2400" kern="1200">
+                <a:solidFill>
+                  <a:schemeClr val="tx1"/>
+                </a:solidFill>
+                <a:latin typeface="+mn-lt"/>
+                <a:ea typeface="+mn-ea"/>
+                <a:cs typeface="+mn-cs"/>
+              </a:defRPr>
+            </a:lvl2pPr>
+            <a:lvl3pPr marL="1143000" indent="-228600" algn="l" defTabSz="914400" rtl="0" eaLnBrk="1" latinLnBrk="0" hangingPunct="1">
+              <a:lnSpc>
+                <a:spcPct val="90000"/>
+              </a:lnSpc>
+              <a:spcBef>
+                <a:spcPts val="500"/>
+              </a:spcBef>
+              <a:buFont typeface="Arial" panose="020B0604020202020204" pitchFamily="34" charset="0"/>
+              <a:buChar char="•"/>
+              <a:defRPr sz="2000" kern="1200">
+                <a:solidFill>
+                  <a:schemeClr val="tx1"/>
+                </a:solidFill>
+                <a:latin typeface="+mn-lt"/>
+                <a:ea typeface="+mn-ea"/>
+                <a:cs typeface="+mn-cs"/>
+              </a:defRPr>
+            </a:lvl3pPr>
+            <a:lvl4pPr marL="1600200" indent="-228600" algn="l" defTabSz="914400" rtl="0" eaLnBrk="1" latinLnBrk="0" hangingPunct="1">
+              <a:lnSpc>
+                <a:spcPct val="90000"/>
+              </a:lnSpc>
+              <a:spcBef>
+                <a:spcPts val="500"/>
+              </a:spcBef>
+              <a:buFont typeface="Arial" panose="020B0604020202020204" pitchFamily="34" charset="0"/>
+              <a:buChar char="•"/>
+              <a:defRPr sz="1800" kern="1200">
+                <a:solidFill>
+                  <a:schemeClr val="tx1"/>
+                </a:solidFill>
+                <a:latin typeface="+mn-lt"/>
+                <a:ea typeface="+mn-ea"/>
+                <a:cs typeface="+mn-cs"/>
+              </a:defRPr>
+            </a:lvl4pPr>
+            <a:lvl5pPr marL="2057400" indent="-228600" algn="l" defTabSz="914400" rtl="0" eaLnBrk="1" latinLnBrk="0" hangingPunct="1">
+              <a:lnSpc>
+                <a:spcPct val="90000"/>
+              </a:lnSpc>
+              <a:spcBef>
+                <a:spcPts val="500"/>
+              </a:spcBef>
+              <a:buFont typeface="Arial" panose="020B0604020202020204" pitchFamily="34" charset="0"/>
+              <a:buChar char="•"/>
+              <a:defRPr sz="1800" kern="1200">
+                <a:solidFill>
+                  <a:schemeClr val="tx1"/>
+                </a:solidFill>
+                <a:latin typeface="+mn-lt"/>
+                <a:ea typeface="+mn-ea"/>
+                <a:cs typeface="+mn-cs"/>
+              </a:defRPr>
+            </a:lvl5pPr>
+            <a:lvl6pPr marL="2514600" indent="-228600" algn="l" defTabSz="914400" rtl="0" eaLnBrk="1" latinLnBrk="0" hangingPunct="1">
+              <a:lnSpc>
+                <a:spcPct val="90000"/>
+              </a:lnSpc>
+              <a:spcBef>
+                <a:spcPts val="500"/>
+              </a:spcBef>
+              <a:buFont typeface="Arial" panose="020B0604020202020204" pitchFamily="34" charset="0"/>
+              <a:buChar char="•"/>
+              <a:defRPr sz="1800" kern="1200">
+                <a:solidFill>
+                  <a:schemeClr val="tx1"/>
+                </a:solidFill>
+                <a:latin typeface="+mn-lt"/>
+                <a:ea typeface="+mn-ea"/>
+                <a:cs typeface="+mn-cs"/>
+              </a:defRPr>
+            </a:lvl6pPr>
+            <a:lvl7pPr marL="2971800" indent="-228600" algn="l" defTabSz="914400" rtl="0" eaLnBrk="1" latinLnBrk="0" hangingPunct="1">
+              <a:lnSpc>
+                <a:spcPct val="90000"/>
+              </a:lnSpc>
+              <a:spcBef>
+                <a:spcPts val="500"/>
+              </a:spcBef>
+              <a:buFont typeface="Arial" panose="020B0604020202020204" pitchFamily="34" charset="0"/>
+              <a:buChar char="•"/>
+              <a:defRPr sz="1800" kern="1200">
+                <a:solidFill>
+                  <a:schemeClr val="tx1"/>
+                </a:solidFill>
+                <a:latin typeface="+mn-lt"/>
+                <a:ea typeface="+mn-ea"/>
+                <a:cs typeface="+mn-cs"/>
+              </a:defRPr>
+            </a:lvl7pPr>
+            <a:lvl8pPr marL="3429000" indent="-228600" algn="l" defTabSz="914400" rtl="0" eaLnBrk="1" latinLnBrk="0" hangingPunct="1">
+              <a:lnSpc>
+                <a:spcPct val="90000"/>
+              </a:lnSpc>
+              <a:spcBef>
+                <a:spcPts val="500"/>
+              </a:spcBef>
+              <a:buFont typeface="Arial" panose="020B0604020202020204" pitchFamily="34" charset="0"/>
+              <a:buChar char="•"/>
+              <a:defRPr sz="1800" kern="1200">
+                <a:solidFill>
+                  <a:schemeClr val="tx1"/>
+                </a:solidFill>
+                <a:latin typeface="+mn-lt"/>
+                <a:ea typeface="+mn-ea"/>
+                <a:cs typeface="+mn-cs"/>
+              </a:defRPr>
+            </a:lvl8pPr>
+            <a:lvl9pPr marL="3886200" indent="-228600" algn="l" defTabSz="914400" rtl="0" eaLnBrk="1" latinLnBrk="0" hangingPunct="1">
+              <a:lnSpc>
+                <a:spcPct val="90000"/>
+              </a:lnSpc>
+              <a:spcBef>
+                <a:spcPts val="500"/>
+              </a:spcBef>
+              <a:buFont typeface="Arial" panose="020B0604020202020204" pitchFamily="34" charset="0"/>
+              <a:buChar char="•"/>
+              <a:defRPr sz="1800" kern="1200">
+                <a:solidFill>
+                  <a:schemeClr val="tx1"/>
+                </a:solidFill>
+                <a:latin typeface="+mn-lt"/>
+                <a:ea typeface="+mn-ea"/>
+                <a:cs typeface="+mn-cs"/>
+              </a:defRPr>
+            </a:lvl9pPr>
+          </a:lstStyle>
+          <a:p>
+            <a:pPr marL="0" indent="0">
+              <a:buNone/>
+            </a:pPr>
+            <a:endParaRPr lang="pt-BR" sz="2000" dirty="0"/>
+          </a:p>
+        </p:txBody>
+      </p:sp>
+      <p:sp>
+        <p:nvSpPr>
+          <p:cNvPr id="8" name="Espaço Reservado para Conteúdo 5"/>
+          <p:cNvSpPr txBox="1">
+            <a:spLocks/>
+          </p:cNvSpPr>
+          <p:nvPr/>
+        </p:nvSpPr>
+        <p:spPr>
+          <a:xfrm>
+            <a:off x="504450" y="4729033"/>
+            <a:ext cx="11134556" cy="1671768"/>
+          </a:xfrm>
+          <a:prstGeom prst="rect">
+            <a:avLst/>
+          </a:prstGeom>
+        </p:spPr>
+        <p:txBody>
+          <a:bodyPr vert="horz" lIns="91440" tIns="45720" rIns="91440" bIns="45720" rtlCol="0">
+            <a:normAutofit/>
+          </a:bodyPr>
+          <a:lstStyle>
+            <a:lvl1pPr marL="228600" indent="-228600" algn="l" defTabSz="914400" rtl="0" eaLnBrk="1" latinLnBrk="0" hangingPunct="1">
+              <a:lnSpc>
+                <a:spcPct val="90000"/>
+              </a:lnSpc>
+              <a:spcBef>
+                <a:spcPts val="1000"/>
+              </a:spcBef>
+              <a:buFont typeface="Arial" panose="020B0604020202020204" pitchFamily="34" charset="0"/>
+              <a:buChar char="•"/>
+              <a:defRPr sz="2800" kern="1200">
+                <a:solidFill>
+                  <a:schemeClr val="tx1"/>
+                </a:solidFill>
+                <a:latin typeface="+mn-lt"/>
+                <a:ea typeface="+mn-ea"/>
+                <a:cs typeface="+mn-cs"/>
+              </a:defRPr>
+            </a:lvl1pPr>
+            <a:lvl2pPr marL="685800" indent="-228600" algn="l" defTabSz="914400" rtl="0" eaLnBrk="1" latinLnBrk="0" hangingPunct="1">
+              <a:lnSpc>
+                <a:spcPct val="90000"/>
+              </a:lnSpc>
+              <a:spcBef>
+                <a:spcPts val="500"/>
+              </a:spcBef>
+              <a:buFont typeface="Arial" panose="020B0604020202020204" pitchFamily="34" charset="0"/>
+              <a:buChar char="•"/>
+              <a:defRPr sz="2400" kern="1200">
+                <a:solidFill>
+                  <a:schemeClr val="tx1"/>
+                </a:solidFill>
+                <a:latin typeface="+mn-lt"/>
+                <a:ea typeface="+mn-ea"/>
+                <a:cs typeface="+mn-cs"/>
+              </a:defRPr>
+            </a:lvl2pPr>
+            <a:lvl3pPr marL="1143000" indent="-228600" algn="l" defTabSz="914400" rtl="0" eaLnBrk="1" latinLnBrk="0" hangingPunct="1">
+              <a:lnSpc>
+                <a:spcPct val="90000"/>
+              </a:lnSpc>
+              <a:spcBef>
+                <a:spcPts val="500"/>
+              </a:spcBef>
+              <a:buFont typeface="Arial" panose="020B0604020202020204" pitchFamily="34" charset="0"/>
+              <a:buChar char="•"/>
+              <a:defRPr sz="2000" kern="1200">
+                <a:solidFill>
+                  <a:schemeClr val="tx1"/>
+                </a:solidFill>
+                <a:latin typeface="+mn-lt"/>
+                <a:ea typeface="+mn-ea"/>
+                <a:cs typeface="+mn-cs"/>
+              </a:defRPr>
+            </a:lvl3pPr>
+            <a:lvl4pPr marL="1600200" indent="-228600" algn="l" defTabSz="914400" rtl="0" eaLnBrk="1" latinLnBrk="0" hangingPunct="1">
+              <a:lnSpc>
+                <a:spcPct val="90000"/>
+              </a:lnSpc>
+              <a:spcBef>
+                <a:spcPts val="500"/>
+              </a:spcBef>
+              <a:buFont typeface="Arial" panose="020B0604020202020204" pitchFamily="34" charset="0"/>
+              <a:buChar char="•"/>
+              <a:defRPr sz="1800" kern="1200">
+                <a:solidFill>
+                  <a:schemeClr val="tx1"/>
+                </a:solidFill>
+                <a:latin typeface="+mn-lt"/>
+                <a:ea typeface="+mn-ea"/>
+                <a:cs typeface="+mn-cs"/>
+              </a:defRPr>
+            </a:lvl4pPr>
+            <a:lvl5pPr marL="2057400" indent="-228600" algn="l" defTabSz="914400" rtl="0" eaLnBrk="1" latinLnBrk="0" hangingPunct="1">
+              <a:lnSpc>
+                <a:spcPct val="90000"/>
+              </a:lnSpc>
+              <a:spcBef>
+                <a:spcPts val="500"/>
+              </a:spcBef>
+              <a:buFont typeface="Arial" panose="020B0604020202020204" pitchFamily="34" charset="0"/>
+              <a:buChar char="•"/>
+              <a:defRPr sz="1800" kern="1200">
+                <a:solidFill>
+                  <a:schemeClr val="tx1"/>
+                </a:solidFill>
+                <a:latin typeface="+mn-lt"/>
+                <a:ea typeface="+mn-ea"/>
+                <a:cs typeface="+mn-cs"/>
+              </a:defRPr>
+            </a:lvl5pPr>
+            <a:lvl6pPr marL="2514600" indent="-228600" algn="l" defTabSz="914400" rtl="0" eaLnBrk="1" latinLnBrk="0" hangingPunct="1">
+              <a:lnSpc>
+                <a:spcPct val="90000"/>
+              </a:lnSpc>
+              <a:spcBef>
+                <a:spcPts val="500"/>
+              </a:spcBef>
+              <a:buFont typeface="Arial" panose="020B0604020202020204" pitchFamily="34" charset="0"/>
+              <a:buChar char="•"/>
+              <a:defRPr sz="1800" kern="1200">
+                <a:solidFill>
+                  <a:schemeClr val="tx1"/>
+                </a:solidFill>
+                <a:latin typeface="+mn-lt"/>
+                <a:ea typeface="+mn-ea"/>
+                <a:cs typeface="+mn-cs"/>
+              </a:defRPr>
+            </a:lvl6pPr>
+            <a:lvl7pPr marL="2971800" indent="-228600" algn="l" defTabSz="914400" rtl="0" eaLnBrk="1" latinLnBrk="0" hangingPunct="1">
+              <a:lnSpc>
+                <a:spcPct val="90000"/>
+              </a:lnSpc>
+              <a:spcBef>
+                <a:spcPts val="500"/>
+              </a:spcBef>
+              <a:buFont typeface="Arial" panose="020B0604020202020204" pitchFamily="34" charset="0"/>
+              <a:buChar char="•"/>
+              <a:defRPr sz="1800" kern="1200">
+                <a:solidFill>
+                  <a:schemeClr val="tx1"/>
+                </a:solidFill>
+                <a:latin typeface="+mn-lt"/>
+                <a:ea typeface="+mn-ea"/>
+                <a:cs typeface="+mn-cs"/>
+              </a:defRPr>
+            </a:lvl7pPr>
+            <a:lvl8pPr marL="3429000" indent="-228600" algn="l" defTabSz="914400" rtl="0" eaLnBrk="1" latinLnBrk="0" hangingPunct="1">
+              <a:lnSpc>
+                <a:spcPct val="90000"/>
+              </a:lnSpc>
+              <a:spcBef>
+                <a:spcPts val="500"/>
+              </a:spcBef>
+              <a:buFont typeface="Arial" panose="020B0604020202020204" pitchFamily="34" charset="0"/>
+              <a:buChar char="•"/>
+              <a:defRPr sz="1800" kern="1200">
+                <a:solidFill>
+                  <a:schemeClr val="tx1"/>
+                </a:solidFill>
+                <a:latin typeface="+mn-lt"/>
+                <a:ea typeface="+mn-ea"/>
+                <a:cs typeface="+mn-cs"/>
+              </a:defRPr>
+            </a:lvl8pPr>
+            <a:lvl9pPr marL="3886200" indent="-228600" algn="l" defTabSz="914400" rtl="0" eaLnBrk="1" latinLnBrk="0" hangingPunct="1">
+              <a:lnSpc>
+                <a:spcPct val="90000"/>
+              </a:lnSpc>
+              <a:spcBef>
+                <a:spcPts val="500"/>
+              </a:spcBef>
+              <a:buFont typeface="Arial" panose="020B0604020202020204" pitchFamily="34" charset="0"/>
+              <a:buChar char="•"/>
+              <a:defRPr sz="1800" kern="1200">
+                <a:solidFill>
+                  <a:schemeClr val="tx1"/>
+                </a:solidFill>
+                <a:latin typeface="+mn-lt"/>
+                <a:ea typeface="+mn-ea"/>
+                <a:cs typeface="+mn-cs"/>
+              </a:defRPr>
+            </a:lvl9pPr>
+          </a:lstStyle>
+          <a:p>
+            <a:endParaRPr lang="pt-BR" sz="2000" dirty="0"/>
+          </a:p>
+        </p:txBody>
+      </p:sp>
+      <p:sp>
+        <p:nvSpPr>
+          <p:cNvPr id="3" name="CaixaDeTexto 2"/>
+          <p:cNvSpPr txBox="1"/>
+          <p:nvPr/>
+        </p:nvSpPr>
+        <p:spPr>
+          <a:xfrm>
+            <a:off x="529429" y="1181988"/>
+            <a:ext cx="11396959" cy="4031873"/>
+          </a:xfrm>
+          <a:prstGeom prst="rect">
+            <a:avLst/>
+          </a:prstGeom>
+          <a:noFill/>
+        </p:spPr>
+        <p:txBody>
+          <a:bodyPr wrap="square" rtlCol="0">
+            <a:spAutoFit/>
+          </a:bodyPr>
+          <a:lstStyle/>
+          <a:p>
+            <a:endParaRPr lang="pt-BR" sz="1600" dirty="0" smtClean="0"/>
+          </a:p>
+          <a:p>
+            <a:pPr marL="285750" indent="-285750">
+              <a:buFont typeface="Wingdings" panose="05000000000000000000" pitchFamily="2" charset="2"/>
+              <a:buChar char="Ø"/>
+            </a:pPr>
+            <a:r>
+              <a:rPr lang="pt-BR" sz="1600" dirty="0" err="1" smtClean="0"/>
+              <a:t>docker</a:t>
+            </a:r>
+            <a:r>
+              <a:rPr lang="pt-BR" sz="1600" dirty="0" smtClean="0"/>
+              <a:t> </a:t>
+            </a:r>
+            <a:r>
+              <a:rPr lang="pt-BR" sz="1600" dirty="0" err="1" smtClean="0"/>
+              <a:t>run</a:t>
+            </a:r>
+            <a:r>
+              <a:rPr lang="pt-BR" sz="1600" dirty="0" smtClean="0"/>
+              <a:t> </a:t>
+            </a:r>
+            <a:r>
+              <a:rPr lang="pt-BR" sz="1600" dirty="0" err="1" smtClean="0"/>
+              <a:t>ubuntu</a:t>
+            </a:r>
+            <a:r>
+              <a:rPr lang="pt-BR" sz="1600" dirty="0" smtClean="0"/>
+              <a:t> </a:t>
+            </a:r>
+            <a:r>
+              <a:rPr lang="pt-BR" sz="1600" dirty="0" err="1" smtClean="0"/>
+              <a:t>echo</a:t>
+            </a:r>
+            <a:r>
+              <a:rPr lang="pt-BR" sz="1600" dirty="0" smtClean="0"/>
+              <a:t> “ Olá Mundo!”</a:t>
+            </a:r>
+          </a:p>
+          <a:p>
+            <a:pPr marL="285750" indent="-285750">
+              <a:buFont typeface="Wingdings" panose="05000000000000000000" pitchFamily="2" charset="2"/>
+              <a:buChar char="Ø"/>
+            </a:pPr>
+            <a:endParaRPr lang="pt-BR" sz="1600" dirty="0"/>
+          </a:p>
+          <a:p>
+            <a:pPr marL="285750" indent="-285750">
+              <a:buFont typeface="Wingdings" panose="05000000000000000000" pitchFamily="2" charset="2"/>
+              <a:buChar char="Ø"/>
+            </a:pPr>
+            <a:r>
+              <a:rPr lang="pt-BR" sz="1600" dirty="0" err="1"/>
+              <a:t>docker</a:t>
+            </a:r>
+            <a:r>
+              <a:rPr lang="pt-BR" sz="1600" dirty="0"/>
+              <a:t> </a:t>
+            </a:r>
+            <a:r>
+              <a:rPr lang="pt-BR" sz="1600" dirty="0" err="1"/>
+              <a:t>run</a:t>
+            </a:r>
+            <a:r>
+              <a:rPr lang="pt-BR" sz="1600" dirty="0"/>
+              <a:t> -it </a:t>
+            </a:r>
+            <a:r>
+              <a:rPr lang="pt-BR" sz="1600" dirty="0" err="1" smtClean="0"/>
+              <a:t>ubuntu</a:t>
+            </a:r>
+            <a:r>
+              <a:rPr lang="pt-BR" sz="1600" dirty="0" smtClean="0"/>
+              <a:t>  - </a:t>
+            </a:r>
+            <a:r>
+              <a:rPr lang="pt-BR" sz="1600" b="1" dirty="0" smtClean="0"/>
+              <a:t>Trabalhar dentro do Container</a:t>
+            </a:r>
+          </a:p>
+          <a:p>
+            <a:pPr marL="285750" indent="-285750">
+              <a:buFont typeface="Wingdings" panose="05000000000000000000" pitchFamily="2" charset="2"/>
+              <a:buChar char="Ø"/>
+            </a:pPr>
+            <a:endParaRPr lang="pt-BR" sz="1600" dirty="0"/>
+          </a:p>
+          <a:p>
+            <a:pPr marL="285750" indent="-285750">
+              <a:buFont typeface="Wingdings" panose="05000000000000000000" pitchFamily="2" charset="2"/>
+              <a:buChar char="Ø"/>
+            </a:pPr>
+            <a:r>
+              <a:rPr lang="pt-BR" sz="1600" dirty="0" err="1" smtClean="0"/>
+              <a:t>docker</a:t>
+            </a:r>
+            <a:r>
+              <a:rPr lang="pt-BR" sz="1600" dirty="0" smtClean="0"/>
+              <a:t> </a:t>
+            </a:r>
+            <a:r>
+              <a:rPr lang="pt-BR" sz="1600" dirty="0"/>
+              <a:t>start –help - </a:t>
+            </a:r>
+            <a:r>
+              <a:rPr lang="pt-BR" sz="1600" b="1" dirty="0"/>
+              <a:t>Ajuda sobre comandos</a:t>
+            </a:r>
+          </a:p>
+          <a:p>
+            <a:endParaRPr lang="pt-BR" sz="1600" dirty="0" smtClean="0"/>
+          </a:p>
+          <a:p>
+            <a:pPr marL="285750" indent="-285750">
+              <a:buFont typeface="Wingdings" panose="05000000000000000000" pitchFamily="2" charset="2"/>
+              <a:buChar char="Ø"/>
+            </a:pPr>
+            <a:r>
+              <a:rPr lang="pt-BR" sz="1600" dirty="0" err="1" smtClean="0"/>
+              <a:t>docker</a:t>
+            </a:r>
+            <a:r>
+              <a:rPr lang="pt-BR" sz="1600" dirty="0" smtClean="0"/>
+              <a:t> </a:t>
+            </a:r>
+            <a:r>
+              <a:rPr lang="pt-BR" sz="1600" dirty="0"/>
+              <a:t>start </a:t>
+            </a:r>
+            <a:r>
+              <a:rPr lang="pt-BR" sz="1600" dirty="0" smtClean="0"/>
+              <a:t>4139842e283a – </a:t>
+            </a:r>
+            <a:r>
+              <a:rPr lang="pt-BR" sz="1600" b="1" dirty="0" smtClean="0"/>
+              <a:t>Iniciar um container</a:t>
+            </a:r>
+            <a:endParaRPr lang="pt-BR" sz="1600" b="1" dirty="0"/>
+          </a:p>
+          <a:p>
+            <a:endParaRPr lang="pt-BR" sz="1600" dirty="0" smtClean="0"/>
+          </a:p>
+          <a:p>
+            <a:pPr marL="285750" indent="-285750">
+              <a:buFont typeface="Wingdings" panose="05000000000000000000" pitchFamily="2" charset="2"/>
+              <a:buChar char="Ø"/>
+            </a:pPr>
+            <a:r>
+              <a:rPr lang="pt-BR" sz="1600" dirty="0" err="1" smtClean="0"/>
+              <a:t>docker</a:t>
+            </a:r>
+            <a:r>
+              <a:rPr lang="pt-BR" sz="1600" dirty="0" smtClean="0"/>
+              <a:t> </a:t>
+            </a:r>
+            <a:r>
+              <a:rPr lang="pt-BR" sz="1600" dirty="0"/>
+              <a:t>stop </a:t>
+            </a:r>
+            <a:r>
+              <a:rPr lang="pt-BR" sz="1600" dirty="0" smtClean="0"/>
+              <a:t>4139842e283a – </a:t>
+            </a:r>
+            <a:r>
+              <a:rPr lang="pt-BR" sz="1600" b="1" dirty="0" smtClean="0"/>
+              <a:t>Parar um container</a:t>
+            </a:r>
+            <a:endParaRPr lang="pt-BR" sz="1600" b="1" dirty="0"/>
+          </a:p>
+          <a:p>
+            <a:endParaRPr lang="pt-BR" sz="1600" dirty="0" smtClean="0"/>
+          </a:p>
+          <a:p>
+            <a:pPr marL="285750" indent="-285750">
+              <a:buFont typeface="Wingdings" panose="05000000000000000000" pitchFamily="2" charset="2"/>
+              <a:buChar char="Ø"/>
+            </a:pPr>
+            <a:r>
+              <a:rPr lang="pt-BR" sz="1600" dirty="0" err="1" smtClean="0"/>
+              <a:t>docker</a:t>
+            </a:r>
+            <a:r>
+              <a:rPr lang="pt-BR" sz="1600" dirty="0" smtClean="0"/>
+              <a:t> </a:t>
+            </a:r>
+            <a:r>
+              <a:rPr lang="pt-BR" sz="1600" dirty="0"/>
+              <a:t>start –a –i </a:t>
+            </a:r>
+            <a:r>
+              <a:rPr lang="pt-BR" sz="1600" dirty="0" smtClean="0"/>
+              <a:t>4139842e283a – </a:t>
+            </a:r>
+            <a:r>
+              <a:rPr lang="pt-BR" sz="1600" b="1" dirty="0" smtClean="0"/>
+              <a:t>Iniciar um container e já acessá-lo ( -a </a:t>
+            </a:r>
+            <a:r>
+              <a:rPr lang="pt-BR" sz="1600" b="1" dirty="0" err="1" smtClean="0"/>
+              <a:t>attach</a:t>
+            </a:r>
+            <a:r>
+              <a:rPr lang="pt-BR" sz="1600" b="1" dirty="0" smtClean="0"/>
+              <a:t> / -i </a:t>
+            </a:r>
+            <a:r>
+              <a:rPr lang="pt-BR" sz="1600" b="1" dirty="0" err="1" smtClean="0"/>
+              <a:t>interactive</a:t>
+            </a:r>
+            <a:r>
+              <a:rPr lang="pt-BR" sz="1600" b="1" dirty="0" smtClean="0"/>
+              <a:t> )</a:t>
+            </a:r>
+          </a:p>
+          <a:p>
+            <a:pPr marL="742950" lvl="1" indent="-285750">
+              <a:buFont typeface="Wingdings" panose="05000000000000000000" pitchFamily="2" charset="2"/>
+              <a:buChar char="Ø"/>
+            </a:pPr>
+            <a:r>
+              <a:rPr lang="pt-BR" sz="1600" dirty="0" smtClean="0"/>
+              <a:t>root@4139842e283a</a:t>
+            </a:r>
+            <a:endParaRPr lang="pt-BR" sz="1600" b="1" dirty="0"/>
+          </a:p>
+          <a:p>
+            <a:endParaRPr lang="pt-BR" sz="1600" dirty="0"/>
+          </a:p>
+          <a:p>
+            <a:pPr marL="285750" indent="-285750">
+              <a:buFont typeface="Wingdings" panose="05000000000000000000" pitchFamily="2" charset="2"/>
+              <a:buChar char="Ø"/>
+            </a:pPr>
+            <a:endParaRPr lang="pt-BR" sz="1600" dirty="0" smtClean="0"/>
+          </a:p>
+          <a:p>
+            <a:endParaRPr lang="pt-BR" sz="1600" dirty="0"/>
           </a:p>
         </p:txBody>
       </p:sp>
     </p:spTree>
     <p:extLst>
       <p:ext uri="{BB962C8B-B14F-4D97-AF65-F5344CB8AC3E}">
-        <p14:creationId xmlns:p14="http://schemas.microsoft.com/office/powerpoint/2010/main" val="1965684712"/>
+        <p14:creationId xmlns:p14="http://schemas.microsoft.com/office/powerpoint/2010/main" val="743545617"/>
       </p:ext>
     </p:extLst>
   </p:cSld>
@@ -6185,7 +7194,7 @@
     </p:spTree>
     <p:extLst>
       <p:ext uri="{BB962C8B-B14F-4D97-AF65-F5344CB8AC3E}">
-        <p14:creationId xmlns:p14="http://schemas.microsoft.com/office/powerpoint/2010/main" val="517489975"/>
+        <p14:creationId xmlns:p14="http://schemas.microsoft.com/office/powerpoint/2010/main" val="1965684712"/>
       </p:ext>
     </p:extLst>
   </p:cSld>

</xml_diff>

<commit_message>
Inciando conceitos de Volumes
</commit_message>
<xml_diff>
--- a/docs/docker-resumo.pptx
+++ b/docs/docker-resumo.pptx
@@ -19,11 +19,12 @@
     <p:sldId id="293" r:id="rId13"/>
     <p:sldId id="298" r:id="rId14"/>
     <p:sldId id="299" r:id="rId15"/>
-    <p:sldId id="294" r:id="rId16"/>
-    <p:sldId id="281" r:id="rId17"/>
-    <p:sldId id="280" r:id="rId18"/>
-    <p:sldId id="284" r:id="rId19"/>
-    <p:sldId id="285" r:id="rId20"/>
+    <p:sldId id="300" r:id="rId16"/>
+    <p:sldId id="294" r:id="rId17"/>
+    <p:sldId id="281" r:id="rId18"/>
+    <p:sldId id="280" r:id="rId19"/>
+    <p:sldId id="284" r:id="rId20"/>
+    <p:sldId id="285" r:id="rId21"/>
   </p:sldIdLst>
   <p:sldSz cx="12192000" cy="6858000"/>
   <p:notesSz cx="6858000" cy="9144000"/>
@@ -259,7 +260,7 @@
           <a:p>
             <a:fld id="{CC58B075-67F8-4A8D-AE1C-3D3E4193EBCA}" type="datetimeFigureOut">
               <a:rPr lang="pt-BR" smtClean="0"/>
-              <a:t>13/09/2019</a:t>
+              <a:t>16/09/2019</a:t>
             </a:fld>
             <a:endParaRPr lang="pt-BR"/>
           </a:p>
@@ -427,7 +428,7 @@
           <a:p>
             <a:fld id="{CC58B075-67F8-4A8D-AE1C-3D3E4193EBCA}" type="datetimeFigureOut">
               <a:rPr lang="pt-BR" smtClean="0"/>
-              <a:t>13/09/2019</a:t>
+              <a:t>16/09/2019</a:t>
             </a:fld>
             <a:endParaRPr lang="pt-BR"/>
           </a:p>
@@ -605,7 +606,7 @@
           <a:p>
             <a:fld id="{CC58B075-67F8-4A8D-AE1C-3D3E4193EBCA}" type="datetimeFigureOut">
               <a:rPr lang="pt-BR" smtClean="0"/>
-              <a:t>13/09/2019</a:t>
+              <a:t>16/09/2019</a:t>
             </a:fld>
             <a:endParaRPr lang="pt-BR"/>
           </a:p>
@@ -773,7 +774,7 @@
           <a:p>
             <a:fld id="{CC58B075-67F8-4A8D-AE1C-3D3E4193EBCA}" type="datetimeFigureOut">
               <a:rPr lang="pt-BR" smtClean="0"/>
-              <a:t>13/09/2019</a:t>
+              <a:t>16/09/2019</a:t>
             </a:fld>
             <a:endParaRPr lang="pt-BR"/>
           </a:p>
@@ -1018,7 +1019,7 @@
           <a:p>
             <a:fld id="{CC58B075-67F8-4A8D-AE1C-3D3E4193EBCA}" type="datetimeFigureOut">
               <a:rPr lang="pt-BR" smtClean="0"/>
-              <a:t>13/09/2019</a:t>
+              <a:t>16/09/2019</a:t>
             </a:fld>
             <a:endParaRPr lang="pt-BR"/>
           </a:p>
@@ -1247,7 +1248,7 @@
           <a:p>
             <a:fld id="{CC58B075-67F8-4A8D-AE1C-3D3E4193EBCA}" type="datetimeFigureOut">
               <a:rPr lang="pt-BR" smtClean="0"/>
-              <a:t>13/09/2019</a:t>
+              <a:t>16/09/2019</a:t>
             </a:fld>
             <a:endParaRPr lang="pt-BR"/>
           </a:p>
@@ -1611,7 +1612,7 @@
           <a:p>
             <a:fld id="{CC58B075-67F8-4A8D-AE1C-3D3E4193EBCA}" type="datetimeFigureOut">
               <a:rPr lang="pt-BR" smtClean="0"/>
-              <a:t>13/09/2019</a:t>
+              <a:t>16/09/2019</a:t>
             </a:fld>
             <a:endParaRPr lang="pt-BR"/>
           </a:p>
@@ -1728,7 +1729,7 @@
           <a:p>
             <a:fld id="{CC58B075-67F8-4A8D-AE1C-3D3E4193EBCA}" type="datetimeFigureOut">
               <a:rPr lang="pt-BR" smtClean="0"/>
-              <a:t>13/09/2019</a:t>
+              <a:t>16/09/2019</a:t>
             </a:fld>
             <a:endParaRPr lang="pt-BR"/>
           </a:p>
@@ -1823,7 +1824,7 @@
           <a:p>
             <a:fld id="{CC58B075-67F8-4A8D-AE1C-3D3E4193EBCA}" type="datetimeFigureOut">
               <a:rPr lang="pt-BR" smtClean="0"/>
-              <a:t>13/09/2019</a:t>
+              <a:t>16/09/2019</a:t>
             </a:fld>
             <a:endParaRPr lang="pt-BR"/>
           </a:p>
@@ -2098,7 +2099,7 @@
           <a:p>
             <a:fld id="{CC58B075-67F8-4A8D-AE1C-3D3E4193EBCA}" type="datetimeFigureOut">
               <a:rPr lang="pt-BR" smtClean="0"/>
-              <a:t>13/09/2019</a:t>
+              <a:t>16/09/2019</a:t>
             </a:fld>
             <a:endParaRPr lang="pt-BR"/>
           </a:p>
@@ -2350,7 +2351,7 @@
           <a:p>
             <a:fld id="{CC58B075-67F8-4A8D-AE1C-3D3E4193EBCA}" type="datetimeFigureOut">
               <a:rPr lang="pt-BR" smtClean="0"/>
-              <a:t>13/09/2019</a:t>
+              <a:t>16/09/2019</a:t>
             </a:fld>
             <a:endParaRPr lang="pt-BR"/>
           </a:p>
@@ -2561,7 +2562,7 @@
           <a:p>
             <a:fld id="{CC58B075-67F8-4A8D-AE1C-3D3E4193EBCA}" type="datetimeFigureOut">
               <a:rPr lang="pt-BR" smtClean="0"/>
-              <a:t>13/09/2019</a:t>
+              <a:t>16/09/2019</a:t>
             </a:fld>
             <a:endParaRPr lang="pt-BR"/>
           </a:p>
@@ -4140,11 +4141,7 @@
             <a:pPr lvl="1" algn="just"/>
             <a:r>
               <a:rPr lang="pt-BR" sz="1800" b="1" dirty="0" smtClean="0"/>
-              <a:t>B</a:t>
-            </a:r>
-            <a:r>
-              <a:rPr lang="pt-BR" sz="1800" b="1" dirty="0" smtClean="0"/>
-              <a:t>aixando essa imagem </a:t>
+              <a:t>Baixando essa imagem </a:t>
             </a:r>
             <a:r>
               <a:rPr lang="pt-BR" sz="1800" dirty="0" smtClean="0"/>
@@ -4363,7 +4360,7 @@
           <a:lstStyle/>
           <a:p>
             <a:r>
-              <a:rPr lang="en-US" sz="1600" dirty="0">
+              <a:rPr lang="en-US" sz="1600" b="1" dirty="0">
                 <a:solidFill>
                   <a:schemeClr val="accent5"/>
                 </a:solidFill>
@@ -4371,7 +4368,7 @@
               <a:t>CONTAINER ID   IMAGE                      </a:t>
             </a:r>
             <a:r>
-              <a:rPr lang="en-US" sz="1600" dirty="0" smtClean="0">
+              <a:rPr lang="en-US" sz="1600" b="1" dirty="0" smtClean="0">
                 <a:solidFill>
                   <a:schemeClr val="accent5"/>
                 </a:solidFill>
@@ -4379,7 +4376,7 @@
               <a:t>	COMMAND                  </a:t>
             </a:r>
             <a:r>
-              <a:rPr lang="en-US" sz="1600" dirty="0">
+              <a:rPr lang="en-US" sz="1600" b="1" dirty="0">
                 <a:solidFill>
                   <a:schemeClr val="accent5"/>
                 </a:solidFill>
@@ -4387,7 +4384,7 @@
               <a:t>CREATED              </a:t>
             </a:r>
             <a:r>
-              <a:rPr lang="en-US" sz="1600" dirty="0" smtClean="0">
+              <a:rPr lang="en-US" sz="1600" b="1" dirty="0" smtClean="0">
                 <a:solidFill>
                   <a:schemeClr val="accent5"/>
                 </a:solidFill>
@@ -4395,7 +4392,7 @@
               <a:t>	STATUS             	PORTS            </a:t>
             </a:r>
             <a:r>
-              <a:rPr lang="en-US" sz="1600" dirty="0">
+              <a:rPr lang="en-US" sz="1600" b="1" dirty="0">
                 <a:solidFill>
                   <a:schemeClr val="accent5"/>
                 </a:solidFill>
@@ -4534,15 +4531,6 @@
               </a:rPr>
               <a:t>Mas como fazer pra acessar o Site Estático? </a:t>
             </a:r>
-            <a:endParaRPr lang="pt-BR" sz="2800" dirty="0">
-              <a:effectLst>
-                <a:outerShdw blurRad="38100" dist="38100" dir="2700000" algn="tl">
-                  <a:srgbClr val="000000">
-                    <a:alpha val="43137"/>
-                  </a:srgbClr>
-                </a:outerShdw>
-              </a:effectLst>
-            </a:endParaRPr>
           </a:p>
         </p:txBody>
       </p:sp>
@@ -4636,7 +4624,7 @@
         </p:spPr>
         <p:txBody>
           <a:bodyPr>
-            <a:normAutofit lnSpcReduction="10000"/>
+            <a:normAutofit fontScale="92500" lnSpcReduction="20000"/>
           </a:bodyPr>
           <a:lstStyle/>
           <a:p>
@@ -4719,6 +4707,26 @@
               <a:rPr lang="pt-BR" sz="2000" dirty="0" smtClean="0"/>
               <a:t>Podemos visualizar também as portas através do comando: </a:t>
             </a:r>
+            <a:r>
+              <a:rPr lang="pt-BR" sz="2000" b="1" dirty="0" err="1" smtClean="0"/>
+              <a:t>docker</a:t>
+            </a:r>
+            <a:r>
+              <a:rPr lang="pt-BR" sz="2000" b="1" dirty="0" smtClean="0"/>
+              <a:t> </a:t>
+            </a:r>
+            <a:r>
+              <a:rPr lang="pt-BR" sz="2000" b="1" dirty="0" err="1" smtClean="0"/>
+              <a:t>port</a:t>
+            </a:r>
+            <a:r>
+              <a:rPr lang="pt-BR" sz="2000" b="1" dirty="0" smtClean="0"/>
+              <a:t> container</a:t>
+            </a:r>
+          </a:p>
+          <a:p>
+            <a:pPr algn="just"/>
+            <a:endParaRPr lang="pt-BR" sz="2000" dirty="0" smtClean="0"/>
           </a:p>
           <a:p>
             <a:pPr lvl="1" algn="just"/>
@@ -5643,7 +5651,7 @@
         </p:nvSpPr>
         <p:spPr>
           <a:xfrm>
-            <a:off x="838200" y="161925"/>
+            <a:off x="826168" y="89733"/>
             <a:ext cx="10515600" cy="422275"/>
           </a:xfrm>
         </p:spPr>
@@ -5656,19 +5664,15 @@
             <a:pPr algn="ctr"/>
             <a:r>
               <a:rPr lang="pt-BR" sz="2800" b="1" dirty="0" smtClean="0"/>
-              <a:t>Praticando com o </a:t>
+              <a:t>Revisão Comandos </a:t>
+            </a:r>
+            <a:r>
+              <a:rPr lang="pt-BR" sz="2800" b="1" dirty="0" smtClean="0"/>
+              <a:t>do </a:t>
             </a:r>
             <a:r>
               <a:rPr lang="pt-BR" sz="2800" b="1" dirty="0" err="1" smtClean="0"/>
-              <a:t>docker</a:t>
-            </a:r>
-            <a:r>
-              <a:rPr lang="pt-BR" sz="2800" b="1" dirty="0" smtClean="0"/>
-              <a:t> </a:t>
-            </a:r>
-            <a:r>
-              <a:rPr lang="pt-BR" sz="2800" b="1" dirty="0" err="1" smtClean="0"/>
-              <a:t>run</a:t>
+              <a:t>Docker</a:t>
             </a:r>
             <a:endParaRPr lang="pt-BR" sz="2800" b="1" dirty="0"/>
           </a:p>
@@ -5684,19 +5688,376 @@
             <p:ph idx="1"/>
           </p:nvPr>
         </p:nvSpPr>
-        <p:spPr/>
-        <p:txBody>
-          <a:bodyPr/>
+        <p:spPr>
+          <a:xfrm>
+            <a:off x="166437" y="584200"/>
+            <a:ext cx="11492164" cy="6273800"/>
+          </a:xfrm>
+        </p:spPr>
+        <p:txBody>
+          <a:bodyPr>
+            <a:noAutofit/>
+          </a:bodyPr>
           <a:lstStyle/>
           <a:p>
-            <a:endParaRPr lang="pt-BR" dirty="0"/>
+            <a:pPr lvl="1" algn="just">
+              <a:lnSpc>
+                <a:spcPct val="150000"/>
+              </a:lnSpc>
+            </a:pPr>
+            <a:r>
+              <a:rPr lang="pt-BR" sz="1600" b="1" dirty="0" err="1"/>
+              <a:t>docker</a:t>
+            </a:r>
+            <a:r>
+              <a:rPr lang="pt-BR" sz="1600" b="1" dirty="0"/>
+              <a:t> </a:t>
+            </a:r>
+            <a:r>
+              <a:rPr lang="pt-BR" sz="1600" b="1" dirty="0" err="1"/>
+              <a:t>ps</a:t>
+            </a:r>
+            <a:r>
+              <a:rPr lang="pt-BR" sz="1600" dirty="0"/>
+              <a:t> - exibe todos os containers em execução no momento.</a:t>
+            </a:r>
+          </a:p>
+          <a:p>
+            <a:pPr lvl="1" algn="just">
+              <a:lnSpc>
+                <a:spcPct val="150000"/>
+              </a:lnSpc>
+            </a:pPr>
+            <a:r>
+              <a:rPr lang="pt-BR" sz="1600" b="1" dirty="0" err="1"/>
+              <a:t>docker</a:t>
+            </a:r>
+            <a:r>
+              <a:rPr lang="pt-BR" sz="1600" b="1" dirty="0"/>
+              <a:t> </a:t>
+            </a:r>
+            <a:r>
+              <a:rPr lang="pt-BR" sz="1600" b="1" dirty="0" err="1"/>
+              <a:t>ps</a:t>
+            </a:r>
+            <a:r>
+              <a:rPr lang="pt-BR" sz="1600" b="1" dirty="0"/>
+              <a:t> -a</a:t>
+            </a:r>
+            <a:r>
+              <a:rPr lang="pt-BR" sz="1600" dirty="0"/>
+              <a:t> - exibe todos os containers, independentemente de estarem em execução ou não.</a:t>
+            </a:r>
+          </a:p>
+          <a:p>
+            <a:pPr lvl="1" algn="just">
+              <a:lnSpc>
+                <a:spcPct val="150000"/>
+              </a:lnSpc>
+            </a:pPr>
+            <a:r>
+              <a:rPr lang="pt-BR" sz="1600" b="1" dirty="0" err="1"/>
+              <a:t>docker</a:t>
+            </a:r>
+            <a:r>
+              <a:rPr lang="pt-BR" sz="1600" b="1" dirty="0"/>
+              <a:t> </a:t>
+            </a:r>
+            <a:r>
+              <a:rPr lang="pt-BR" sz="1600" b="1" dirty="0" err="1"/>
+              <a:t>run</a:t>
+            </a:r>
+            <a:r>
+              <a:rPr lang="pt-BR" sz="1600" b="1" dirty="0"/>
+              <a:t> -it NOME_DA_IMAGEM</a:t>
+            </a:r>
+            <a:r>
+              <a:rPr lang="pt-BR" sz="1600" dirty="0"/>
+              <a:t> - conecta o terminal que estamos utilizando com o do container.</a:t>
+            </a:r>
+          </a:p>
+          <a:p>
+            <a:pPr lvl="1" algn="just">
+              <a:lnSpc>
+                <a:spcPct val="150000"/>
+              </a:lnSpc>
+            </a:pPr>
+            <a:r>
+              <a:rPr lang="pt-BR" sz="1600" b="1" dirty="0" err="1"/>
+              <a:t>docker</a:t>
+            </a:r>
+            <a:r>
+              <a:rPr lang="pt-BR" sz="1600" b="1" dirty="0"/>
+              <a:t> start ID_CONTAINER</a:t>
+            </a:r>
+            <a:r>
+              <a:rPr lang="pt-BR" sz="1600" dirty="0"/>
+              <a:t> - inicia o container com id em questão.</a:t>
+            </a:r>
+          </a:p>
+          <a:p>
+            <a:pPr lvl="1" algn="just">
+              <a:lnSpc>
+                <a:spcPct val="150000"/>
+              </a:lnSpc>
+            </a:pPr>
+            <a:r>
+              <a:rPr lang="pt-BR" sz="1600" b="1" dirty="0" err="1"/>
+              <a:t>docker</a:t>
+            </a:r>
+            <a:r>
+              <a:rPr lang="pt-BR" sz="1600" b="1" dirty="0"/>
+              <a:t> stop ID_CONTAINER</a:t>
+            </a:r>
+            <a:r>
+              <a:rPr lang="pt-BR" sz="1600" dirty="0"/>
+              <a:t> - interrompe o container com id em questão.</a:t>
+            </a:r>
+          </a:p>
+          <a:p>
+            <a:pPr lvl="1" algn="just">
+              <a:lnSpc>
+                <a:spcPct val="150000"/>
+              </a:lnSpc>
+            </a:pPr>
+            <a:r>
+              <a:rPr lang="pt-BR" sz="1600" b="1" dirty="0" err="1"/>
+              <a:t>docker</a:t>
+            </a:r>
+            <a:r>
+              <a:rPr lang="pt-BR" sz="1600" b="1" dirty="0"/>
+              <a:t> start -a -i ID_CONTAINER</a:t>
+            </a:r>
+            <a:r>
+              <a:rPr lang="pt-BR" sz="1600" dirty="0"/>
+              <a:t> - inicia o container com id em questão e integra os terminais, além de permitir interação entre ambos.</a:t>
+            </a:r>
+          </a:p>
+          <a:p>
+            <a:pPr lvl="1" algn="just">
+              <a:lnSpc>
+                <a:spcPct val="150000"/>
+              </a:lnSpc>
+            </a:pPr>
+            <a:r>
+              <a:rPr lang="pt-BR" sz="1600" b="1" dirty="0" err="1"/>
+              <a:t>docker</a:t>
+            </a:r>
+            <a:r>
+              <a:rPr lang="pt-BR" sz="1600" b="1" dirty="0"/>
+              <a:t> </a:t>
+            </a:r>
+            <a:r>
+              <a:rPr lang="pt-BR" sz="1600" b="1" dirty="0" err="1"/>
+              <a:t>rm</a:t>
+            </a:r>
+            <a:r>
+              <a:rPr lang="pt-BR" sz="1600" b="1" dirty="0"/>
+              <a:t> ID_CONTAINER</a:t>
+            </a:r>
+            <a:r>
+              <a:rPr lang="pt-BR" sz="1600" dirty="0"/>
+              <a:t> - remove o container com id em questão.</a:t>
+            </a:r>
+          </a:p>
+          <a:p>
+            <a:pPr lvl="1" algn="just">
+              <a:lnSpc>
+                <a:spcPct val="150000"/>
+              </a:lnSpc>
+            </a:pPr>
+            <a:r>
+              <a:rPr lang="pt-BR" sz="1600" b="1" dirty="0" err="1"/>
+              <a:t>docker</a:t>
+            </a:r>
+            <a:r>
+              <a:rPr lang="pt-BR" sz="1600" b="1" dirty="0"/>
+              <a:t> container </a:t>
+            </a:r>
+            <a:r>
+              <a:rPr lang="pt-BR" sz="1600" b="1" dirty="0" err="1"/>
+              <a:t>prune</a:t>
+            </a:r>
+            <a:r>
+              <a:rPr lang="pt-BR" sz="1600" dirty="0"/>
+              <a:t> - remove todos os containers que estão parados.</a:t>
+            </a:r>
+          </a:p>
+          <a:p>
+            <a:pPr lvl="1" algn="just">
+              <a:lnSpc>
+                <a:spcPct val="150000"/>
+              </a:lnSpc>
+            </a:pPr>
+            <a:r>
+              <a:rPr lang="pt-BR" sz="1600" b="1" dirty="0" err="1"/>
+              <a:t>docker</a:t>
+            </a:r>
+            <a:r>
+              <a:rPr lang="pt-BR" sz="1600" b="1" dirty="0"/>
+              <a:t> </a:t>
+            </a:r>
+            <a:r>
+              <a:rPr lang="pt-BR" sz="1600" b="1" dirty="0" err="1"/>
+              <a:t>rmi</a:t>
+            </a:r>
+            <a:r>
+              <a:rPr lang="pt-BR" sz="1600" b="1" dirty="0"/>
+              <a:t> NOME_DA_IMAGEM</a:t>
+            </a:r>
+            <a:r>
+              <a:rPr lang="pt-BR" sz="1600" dirty="0"/>
+              <a:t> - remove a imagem passada como parâmetro.</a:t>
+            </a:r>
+          </a:p>
+          <a:p>
+            <a:pPr lvl="1" algn="just">
+              <a:lnSpc>
+                <a:spcPct val="150000"/>
+              </a:lnSpc>
+            </a:pPr>
+            <a:r>
+              <a:rPr lang="pt-BR" sz="1600" b="1" dirty="0" err="1"/>
+              <a:t>docker</a:t>
+            </a:r>
+            <a:r>
+              <a:rPr lang="pt-BR" sz="1600" b="1" dirty="0"/>
+              <a:t> </a:t>
+            </a:r>
+            <a:r>
+              <a:rPr lang="pt-BR" sz="1600" b="1" dirty="0" err="1"/>
+              <a:t>run</a:t>
+            </a:r>
+            <a:r>
+              <a:rPr lang="pt-BR" sz="1600" b="1" dirty="0"/>
+              <a:t> -d -P --</a:t>
+            </a:r>
+            <a:r>
+              <a:rPr lang="pt-BR" sz="1600" b="1" dirty="0" err="1"/>
+              <a:t>name</a:t>
+            </a:r>
+            <a:r>
+              <a:rPr lang="pt-BR" sz="1600" b="1" dirty="0"/>
+              <a:t> NOME </a:t>
+            </a:r>
+            <a:r>
+              <a:rPr lang="pt-BR" sz="1600" b="1" dirty="0" err="1"/>
+              <a:t>dockersamples</a:t>
+            </a:r>
+            <a:r>
+              <a:rPr lang="pt-BR" sz="1600" b="1" dirty="0"/>
+              <a:t>/</a:t>
+            </a:r>
+            <a:r>
+              <a:rPr lang="pt-BR" sz="1600" b="1" dirty="0" err="1"/>
+              <a:t>static</a:t>
+            </a:r>
+            <a:r>
+              <a:rPr lang="pt-BR" sz="1600" b="1" dirty="0"/>
+              <a:t>-site</a:t>
+            </a:r>
+            <a:r>
+              <a:rPr lang="pt-BR" sz="1600" dirty="0"/>
+              <a:t> - ao executar, dá um nome ao container.</a:t>
+            </a:r>
+          </a:p>
+          <a:p>
+            <a:pPr lvl="1" algn="just">
+              <a:lnSpc>
+                <a:spcPct val="150000"/>
+              </a:lnSpc>
+            </a:pPr>
+            <a:r>
+              <a:rPr lang="pt-BR" sz="1600" b="1" dirty="0" err="1"/>
+              <a:t>docker</a:t>
+            </a:r>
+            <a:r>
+              <a:rPr lang="pt-BR" sz="1600" b="1" dirty="0"/>
+              <a:t> </a:t>
+            </a:r>
+            <a:r>
+              <a:rPr lang="pt-BR" sz="1600" b="1" dirty="0" err="1"/>
+              <a:t>run</a:t>
+            </a:r>
+            <a:r>
+              <a:rPr lang="pt-BR" sz="1600" b="1" dirty="0"/>
+              <a:t> -d -p 12345:80 </a:t>
+            </a:r>
+            <a:r>
+              <a:rPr lang="pt-BR" sz="1600" b="1" dirty="0" err="1"/>
+              <a:t>dockersamples</a:t>
+            </a:r>
+            <a:r>
+              <a:rPr lang="pt-BR" sz="1600" b="1" dirty="0"/>
+              <a:t>/</a:t>
+            </a:r>
+            <a:r>
+              <a:rPr lang="pt-BR" sz="1600" b="1" dirty="0" err="1"/>
+              <a:t>static</a:t>
+            </a:r>
+            <a:r>
+              <a:rPr lang="pt-BR" sz="1600" b="1" dirty="0"/>
+              <a:t>-site</a:t>
+            </a:r>
+            <a:r>
+              <a:rPr lang="pt-BR" sz="1600" dirty="0"/>
+              <a:t> - define uma porta específica para ser atribuída à porta 80 do container, neste caso 12345.</a:t>
+            </a:r>
+          </a:p>
+          <a:p>
+            <a:pPr lvl="1" algn="just">
+              <a:lnSpc>
+                <a:spcPct val="150000"/>
+              </a:lnSpc>
+            </a:pPr>
+            <a:r>
+              <a:rPr lang="pt-BR" sz="1600" b="1" dirty="0" err="1"/>
+              <a:t>docker</a:t>
+            </a:r>
+            <a:r>
+              <a:rPr lang="pt-BR" sz="1600" b="1" dirty="0"/>
+              <a:t> </a:t>
+            </a:r>
+            <a:r>
+              <a:rPr lang="pt-BR" sz="1600" b="1" dirty="0" err="1"/>
+              <a:t>run</a:t>
+            </a:r>
+            <a:r>
+              <a:rPr lang="pt-BR" sz="1600" b="1" dirty="0"/>
+              <a:t> -d -e AUTHOR="Fulano" </a:t>
+            </a:r>
+            <a:r>
+              <a:rPr lang="pt-BR" sz="1600" b="1" dirty="0" err="1"/>
+              <a:t>dockersamples</a:t>
+            </a:r>
+            <a:r>
+              <a:rPr lang="pt-BR" sz="1600" b="1" dirty="0"/>
+              <a:t>/</a:t>
+            </a:r>
+            <a:r>
+              <a:rPr lang="pt-BR" sz="1600" b="1" dirty="0" err="1"/>
+              <a:t>static</a:t>
+            </a:r>
+            <a:r>
+              <a:rPr lang="pt-BR" sz="1600" b="1" dirty="0"/>
+              <a:t>-site</a:t>
+            </a:r>
+            <a:r>
+              <a:rPr lang="pt-BR" sz="1600" dirty="0"/>
+              <a:t> - define uma variável de ambiente AUTHOR com o valor Fulano no container criado</a:t>
+            </a:r>
+            <a:r>
+              <a:rPr lang="pt-BR" sz="1600" dirty="0" smtClean="0"/>
+              <a:t>.</a:t>
+            </a:r>
+            <a:endParaRPr lang="pt-BR" sz="1600" dirty="0" smtClean="0"/>
           </a:p>
         </p:txBody>
       </p:sp>
     </p:spTree>
     <p:extLst>
       <p:ext uri="{BB962C8B-B14F-4D97-AF65-F5344CB8AC3E}">
-        <p14:creationId xmlns:p14="http://schemas.microsoft.com/office/powerpoint/2010/main" val="1174364163"/>
+        <p14:creationId xmlns:p14="http://schemas.microsoft.com/office/powerpoint/2010/main" val="2636815561"/>
       </p:ext>
     </p:extLst>
   </p:cSld>
@@ -5740,18 +6101,30 @@
             <p:ph type="title"/>
           </p:nvPr>
         </p:nvSpPr>
-        <p:spPr/>
-        <p:txBody>
-          <a:bodyPr/>
+        <p:spPr>
+          <a:xfrm>
+            <a:off x="838200" y="161925"/>
+            <a:ext cx="10515600" cy="422275"/>
+          </a:xfrm>
+        </p:spPr>
+        <p:txBody>
+          <a:bodyPr vert="horz" lIns="91440" tIns="45720" rIns="91440" bIns="45720" rtlCol="0" anchor="ctr">
+            <a:normAutofit fontScale="90000"/>
+          </a:bodyPr>
           <a:lstStyle/>
           <a:p>
-            <a:endParaRPr lang="pt-BR"/>
-          </a:p>
-        </p:txBody>
-      </p:sp>
-      <p:sp>
-        <p:nvSpPr>
-          <p:cNvPr id="3" name="Espaço Reservado para Conteúdo 2"/>
+            <a:pPr algn="ctr"/>
+            <a:r>
+              <a:rPr lang="pt-BR" sz="2800" b="1" dirty="0" smtClean="0"/>
+              <a:t>Volumes</a:t>
+            </a:r>
+            <a:endParaRPr lang="pt-BR" sz="2800" b="1" dirty="0"/>
+          </a:p>
+        </p:txBody>
+      </p:sp>
+      <p:sp>
+        <p:nvSpPr>
+          <p:cNvPr id="4" name="Espaço Reservado para Conteúdo 2"/>
           <p:cNvSpPr>
             <a:spLocks noGrp="1"/>
           </p:cNvSpPr>
@@ -5759,25 +6132,160 @@
             <p:ph idx="1"/>
           </p:nvPr>
         </p:nvSpPr>
-        <p:spPr/>
-        <p:txBody>
-          <a:bodyPr/>
+        <p:spPr>
+          <a:xfrm>
+            <a:off x="286752" y="751474"/>
+            <a:ext cx="11618495" cy="2344016"/>
+          </a:xfrm>
+        </p:spPr>
+        <p:txBody>
+          <a:bodyPr>
+            <a:normAutofit fontScale="92500" lnSpcReduction="20000"/>
+          </a:bodyPr>
           <a:lstStyle/>
           <a:p>
-            <a:endParaRPr lang="pt-BR"/>
+            <a:pPr algn="just"/>
+            <a:r>
+              <a:rPr lang="pt-BR" sz="2000" dirty="0" smtClean="0"/>
+              <a:t>Qual porta acessar? Para isso podemos usar a </a:t>
+            </a:r>
+            <a:r>
+              <a:rPr lang="pt-BR" sz="2000" dirty="0" err="1" smtClean="0"/>
+              <a:t>flag</a:t>
+            </a:r>
+            <a:r>
+              <a:rPr lang="pt-BR" sz="2000" dirty="0" smtClean="0"/>
+              <a:t> </a:t>
+            </a:r>
+            <a:r>
+              <a:rPr lang="pt-BR" sz="2000" b="1" dirty="0" smtClean="0"/>
+              <a:t>–P </a:t>
+            </a:r>
+            <a:r>
+              <a:rPr lang="pt-BR" sz="2000" dirty="0" smtClean="0"/>
+              <a:t>que atribuirá portas aleatórias que farão com que o mundo externo(nossa máquina) se comunique com o container</a:t>
+            </a:r>
+          </a:p>
+          <a:p>
+            <a:pPr algn="just"/>
+            <a:endParaRPr lang="pt-BR" sz="2000" dirty="0" smtClean="0"/>
+          </a:p>
+          <a:p>
+            <a:pPr lvl="1" algn="just"/>
+            <a:r>
+              <a:rPr lang="pt-BR" sz="1800" dirty="0" err="1" smtClean="0"/>
+              <a:t>docker</a:t>
+            </a:r>
+            <a:r>
+              <a:rPr lang="pt-BR" sz="1800" dirty="0" smtClean="0"/>
+              <a:t> </a:t>
+            </a:r>
+            <a:r>
+              <a:rPr lang="pt-BR" sz="1800" dirty="0" err="1" smtClean="0"/>
+              <a:t>run</a:t>
+            </a:r>
+            <a:r>
+              <a:rPr lang="pt-BR" sz="1800" dirty="0" smtClean="0"/>
+              <a:t> </a:t>
+            </a:r>
+            <a:r>
+              <a:rPr lang="pt-BR" sz="1800" b="1" dirty="0" smtClean="0"/>
+              <a:t>–d –P </a:t>
+            </a:r>
+            <a:r>
+              <a:rPr lang="pt-BR" sz="1800" dirty="0" smtClean="0"/>
+              <a:t> </a:t>
+            </a:r>
+            <a:r>
+              <a:rPr lang="pt-BR" sz="1800" dirty="0" err="1" smtClean="0"/>
+              <a:t>dockersamples</a:t>
+            </a:r>
+            <a:r>
+              <a:rPr lang="pt-BR" sz="1800" dirty="0" smtClean="0"/>
+              <a:t>/</a:t>
+            </a:r>
+            <a:r>
+              <a:rPr lang="pt-BR" sz="1800" dirty="0" err="1" smtClean="0"/>
+              <a:t>static</a:t>
+            </a:r>
+            <a:r>
+              <a:rPr lang="pt-BR" sz="1800" dirty="0" smtClean="0"/>
+              <a:t>-site</a:t>
+            </a:r>
+          </a:p>
+          <a:p>
+            <a:pPr lvl="1" algn="just"/>
+            <a:endParaRPr lang="pt-BR" sz="1800" dirty="0"/>
+          </a:p>
+          <a:p>
+            <a:pPr algn="just"/>
+            <a:r>
+              <a:rPr lang="pt-BR" sz="2000" dirty="0" smtClean="0"/>
+              <a:t>Podemos visualizar também as portas através do comando: </a:t>
+            </a:r>
+            <a:r>
+              <a:rPr lang="pt-BR" sz="2000" b="1" dirty="0" err="1" smtClean="0"/>
+              <a:t>docker</a:t>
+            </a:r>
+            <a:r>
+              <a:rPr lang="pt-BR" sz="2000" b="1" dirty="0" smtClean="0"/>
+              <a:t> </a:t>
+            </a:r>
+            <a:r>
+              <a:rPr lang="pt-BR" sz="2000" b="1" dirty="0" err="1" smtClean="0"/>
+              <a:t>port</a:t>
+            </a:r>
+            <a:r>
+              <a:rPr lang="pt-BR" sz="2000" b="1" dirty="0" smtClean="0"/>
+              <a:t> container</a:t>
+            </a:r>
+          </a:p>
+          <a:p>
+            <a:pPr algn="just"/>
+            <a:endParaRPr lang="pt-BR" sz="2000" dirty="0" smtClean="0"/>
+          </a:p>
+          <a:p>
+            <a:pPr lvl="1" algn="just"/>
+            <a:r>
+              <a:rPr lang="pt-BR" sz="1800" dirty="0" err="1" smtClean="0"/>
+              <a:t>docker</a:t>
+            </a:r>
+            <a:r>
+              <a:rPr lang="pt-BR" sz="1800" dirty="0" smtClean="0"/>
+              <a:t> </a:t>
+            </a:r>
+            <a:r>
+              <a:rPr lang="pt-BR" sz="1800" b="1" dirty="0" err="1" smtClean="0"/>
+              <a:t>port</a:t>
+            </a:r>
+            <a:r>
+              <a:rPr lang="pt-BR" sz="1800" dirty="0"/>
+              <a:t> </a:t>
+            </a:r>
+            <a:r>
+              <a:rPr lang="pt-BR" sz="1800" u="sng" dirty="0"/>
+              <a:t>989e4d7d3638</a:t>
+            </a:r>
           </a:p>
         </p:txBody>
       </p:sp>
     </p:spTree>
     <p:extLst>
       <p:ext uri="{BB962C8B-B14F-4D97-AF65-F5344CB8AC3E}">
-        <p14:creationId xmlns:p14="http://schemas.microsoft.com/office/powerpoint/2010/main" val="517489975"/>
+        <p14:creationId xmlns:p14="http://schemas.microsoft.com/office/powerpoint/2010/main" val="1174364163"/>
       </p:ext>
     </p:extLst>
   </p:cSld>
   <p:clrMapOvr>
     <a:masterClrMapping/>
   </p:clrMapOvr>
+  <p:timing>
+    <p:tnLst>
+      <p:par>
+        <p:cTn id="1" dur="indefinite" restart="never" nodeType="tmRoot"/>
+      </p:par>
+    </p:tnLst>
+  </p:timing>
 </p:sld>
 </file>
 
@@ -5839,7 +6347,7 @@
     </p:spTree>
     <p:extLst>
       <p:ext uri="{BB962C8B-B14F-4D97-AF65-F5344CB8AC3E}">
-        <p14:creationId xmlns:p14="http://schemas.microsoft.com/office/powerpoint/2010/main" val="2333415383"/>
+        <p14:creationId xmlns:p14="http://schemas.microsoft.com/office/powerpoint/2010/main" val="517489975"/>
       </p:ext>
     </p:extLst>
   </p:cSld>
@@ -5907,7 +6415,7 @@
     </p:spTree>
     <p:extLst>
       <p:ext uri="{BB962C8B-B14F-4D97-AF65-F5344CB8AC3E}">
-        <p14:creationId xmlns:p14="http://schemas.microsoft.com/office/powerpoint/2010/main" val="3094957484"/>
+        <p14:creationId xmlns:p14="http://schemas.microsoft.com/office/powerpoint/2010/main" val="2333415383"/>
       </p:ext>
     </p:extLst>
   </p:cSld>
@@ -5949,11 +6457,7 @@
           <a:bodyPr/>
           <a:lstStyle/>
           <a:p>
-            <a:r>
-              <a:rPr lang="pt-BR" dirty="0" smtClean="0"/>
-              <a:t>Referências Bibliográficas</a:t>
-            </a:r>
-            <a:endParaRPr lang="pt-BR" dirty="0"/>
+            <a:endParaRPr lang="pt-BR"/>
           </a:p>
         </p:txBody>
       </p:sp>
@@ -5972,26 +6476,14 @@
           <a:bodyPr/>
           <a:lstStyle/>
           <a:p>
-            <a:r>
-              <a:rPr lang="pt-BR" dirty="0" smtClean="0"/>
-              <a:t>Curso </a:t>
-            </a:r>
-            <a:r>
-              <a:rPr lang="pt-BR" dirty="0" err="1" smtClean="0"/>
-              <a:t>Alura</a:t>
-            </a:r>
-            <a:r>
-              <a:rPr lang="pt-BR" dirty="0" smtClean="0"/>
-              <a:t> Docker</a:t>
-            </a:r>
-            <a:endParaRPr lang="pt-BR" dirty="0"/>
+            <a:endParaRPr lang="pt-BR"/>
           </a:p>
         </p:txBody>
       </p:sp>
     </p:spTree>
     <p:extLst>
       <p:ext uri="{BB962C8B-B14F-4D97-AF65-F5344CB8AC3E}">
-        <p14:creationId xmlns:p14="http://schemas.microsoft.com/office/powerpoint/2010/main" val="893777767"/>
+        <p14:creationId xmlns:p14="http://schemas.microsoft.com/office/powerpoint/2010/main" val="3094957484"/>
       </p:ext>
     </p:extLst>
   </p:cSld>
@@ -6160,6 +6652,90 @@
 </p:sld>
 </file>
 
+<file path=ppt/slides/slide20.xml><?xml version="1.0" encoding="utf-8"?>
+<p:sld xmlns:a="http://schemas.openxmlformats.org/drawingml/2006/main" xmlns:r="http://schemas.openxmlformats.org/officeDocument/2006/relationships" xmlns:p="http://schemas.openxmlformats.org/presentationml/2006/main">
+  <p:cSld>
+    <p:spTree>
+      <p:nvGrpSpPr>
+        <p:cNvPr id="1" name=""/>
+        <p:cNvGrpSpPr/>
+        <p:nvPr/>
+      </p:nvGrpSpPr>
+      <p:grpSpPr>
+        <a:xfrm>
+          <a:off x="0" y="0"/>
+          <a:ext cx="0" cy="0"/>
+          <a:chOff x="0" y="0"/>
+          <a:chExt cx="0" cy="0"/>
+        </a:xfrm>
+      </p:grpSpPr>
+      <p:sp>
+        <p:nvSpPr>
+          <p:cNvPr id="2" name="Título 1"/>
+          <p:cNvSpPr>
+            <a:spLocks noGrp="1"/>
+          </p:cNvSpPr>
+          <p:nvPr>
+            <p:ph type="title"/>
+          </p:nvPr>
+        </p:nvSpPr>
+        <p:spPr/>
+        <p:txBody>
+          <a:bodyPr/>
+          <a:lstStyle/>
+          <a:p>
+            <a:r>
+              <a:rPr lang="pt-BR" dirty="0" smtClean="0"/>
+              <a:t>Referências Bibliográficas</a:t>
+            </a:r>
+            <a:endParaRPr lang="pt-BR" dirty="0"/>
+          </a:p>
+        </p:txBody>
+      </p:sp>
+      <p:sp>
+        <p:nvSpPr>
+          <p:cNvPr id="3" name="Espaço Reservado para Conteúdo 2"/>
+          <p:cNvSpPr>
+            <a:spLocks noGrp="1"/>
+          </p:cNvSpPr>
+          <p:nvPr>
+            <p:ph idx="1"/>
+          </p:nvPr>
+        </p:nvSpPr>
+        <p:spPr/>
+        <p:txBody>
+          <a:bodyPr/>
+          <a:lstStyle/>
+          <a:p>
+            <a:r>
+              <a:rPr lang="pt-BR" dirty="0" smtClean="0"/>
+              <a:t>Curso </a:t>
+            </a:r>
+            <a:r>
+              <a:rPr lang="pt-BR" dirty="0" err="1" smtClean="0"/>
+              <a:t>Alura</a:t>
+            </a:r>
+            <a:r>
+              <a:rPr lang="pt-BR" dirty="0" smtClean="0"/>
+              <a:t> Docker</a:t>
+            </a:r>
+            <a:endParaRPr lang="pt-BR" dirty="0"/>
+          </a:p>
+        </p:txBody>
+      </p:sp>
+    </p:spTree>
+    <p:extLst>
+      <p:ext uri="{BB962C8B-B14F-4D97-AF65-F5344CB8AC3E}">
+        <p14:creationId xmlns:p14="http://schemas.microsoft.com/office/powerpoint/2010/main" val="893777767"/>
+      </p:ext>
+    </p:extLst>
+  </p:cSld>
+  <p:clrMapOvr>
+    <a:masterClrMapping/>
+  </p:clrMapOvr>
+</p:sld>
+</file>
+
 <file path=ppt/slides/slide3.xml><?xml version="1.0" encoding="utf-8"?>
 <p:sld xmlns:a="http://schemas.openxmlformats.org/drawingml/2006/main" xmlns:r="http://schemas.openxmlformats.org/officeDocument/2006/relationships" xmlns:p="http://schemas.openxmlformats.org/presentationml/2006/main">
   <p:cSld>
@@ -6831,8 +7407,8 @@
         </p:nvSpPr>
         <p:spPr>
           <a:xfrm>
-            <a:off x="530577" y="5062965"/>
-            <a:ext cx="10519064" cy="1397813"/>
+            <a:off x="530576" y="5062965"/>
+            <a:ext cx="11140055" cy="1662688"/>
           </a:xfrm>
           <a:prstGeom prst="rect">
             <a:avLst/>
@@ -7040,12 +7616,12 @@
               <a:t>Sem contar que uma </a:t>
             </a:r>
             <a:r>
-              <a:rPr lang="pt-BR" sz="1800" dirty="0" err="1" smtClean="0"/>
-              <a:t>únca</a:t>
-            </a:r>
-            <a:r>
               <a:rPr lang="pt-BR" sz="1800" dirty="0" smtClean="0"/>
-              <a:t> aplicação pode congelar um ambiente</a:t>
+              <a:t>única </a:t>
+            </a:r>
+            <a:r>
+              <a:rPr lang="pt-BR" sz="1800" dirty="0" smtClean="0"/>
+              <a:t>aplicação pode congelar um ambiente</a:t>
             </a:r>
             <a:endParaRPr lang="pt-BR" sz="1800" dirty="0"/>
           </a:p>
@@ -7140,11 +7716,27 @@
             </a:r>
             <a:r>
               <a:rPr lang="pt-BR" sz="2000" b="1" dirty="0"/>
-              <a:t>Docker, Inc.</a:t>
+              <a:t>Docker, Inc</a:t>
+            </a:r>
+            <a:r>
+              <a:rPr lang="pt-BR" sz="2000" b="1" dirty="0" smtClean="0"/>
+              <a:t>. </a:t>
+            </a:r>
+            <a:r>
+              <a:rPr lang="pt-BR" sz="2000" dirty="0" smtClean="0"/>
+              <a:t>é</a:t>
+            </a:r>
+            <a:r>
+              <a:rPr lang="pt-BR" sz="2000" b="1" dirty="0" smtClean="0"/>
+              <a:t> </a:t>
+            </a:r>
+            <a:r>
+              <a:rPr lang="pt-BR" sz="2000" dirty="0" smtClean="0"/>
+              <a:t>empresa </a:t>
             </a:r>
             <a:r>
               <a:rPr lang="pt-BR" sz="2000" dirty="0"/>
-              <a:t>, empresa que toma conta do </a:t>
+              <a:t>que toma conta do </a:t>
             </a:r>
             <a:r>
               <a:rPr lang="pt-BR" sz="2000" dirty="0" smtClean="0"/>
@@ -8979,11 +9571,7 @@
             <a:pPr algn="ctr"/>
             <a:r>
               <a:rPr lang="pt-BR" sz="2800" b="1" dirty="0" smtClean="0"/>
-              <a:t>Diferença entre Imagens e </a:t>
-            </a:r>
-            <a:r>
-              <a:rPr lang="pt-BR" sz="2800" b="1" dirty="0" smtClean="0"/>
-              <a:t>Containers  - E alguns comandos</a:t>
+              <a:t>Diferença entre Imagens e Containers  - E alguns comandos</a:t>
             </a:r>
             <a:endParaRPr lang="pt-BR" sz="2800" b="1" dirty="0"/>
           </a:p>
@@ -10257,11 +10845,7 @@
             <a:pPr algn="ctr"/>
             <a:r>
               <a:rPr lang="pt-BR" sz="2800" b="1" dirty="0" smtClean="0"/>
-              <a:t>Diferença entre Imagens e </a:t>
-            </a:r>
-            <a:r>
-              <a:rPr lang="pt-BR" sz="2800" b="1" dirty="0" smtClean="0"/>
-              <a:t>Containers  - E alguns comandos</a:t>
+              <a:t>Diferença entre Imagens e Containers  - E alguns comandos</a:t>
             </a:r>
             <a:endParaRPr lang="pt-BR" sz="2800" b="1" dirty="0"/>
           </a:p>

</xml_diff>

<commit_message>
Ajustes em alguns slides
</commit_message>
<xml_diff>
--- a/docs/docker-resumo.pptx
+++ b/docs/docker-resumo.pptx
@@ -260,7 +260,7 @@
           <a:p>
             <a:fld id="{CC58B075-67F8-4A8D-AE1C-3D3E4193EBCA}" type="datetimeFigureOut">
               <a:rPr lang="pt-BR" smtClean="0"/>
-              <a:t>16/09/2019</a:t>
+              <a:t>20/09/2019</a:t>
             </a:fld>
             <a:endParaRPr lang="pt-BR"/>
           </a:p>
@@ -428,7 +428,7 @@
           <a:p>
             <a:fld id="{CC58B075-67F8-4A8D-AE1C-3D3E4193EBCA}" type="datetimeFigureOut">
               <a:rPr lang="pt-BR" smtClean="0"/>
-              <a:t>16/09/2019</a:t>
+              <a:t>20/09/2019</a:t>
             </a:fld>
             <a:endParaRPr lang="pt-BR"/>
           </a:p>
@@ -606,7 +606,7 @@
           <a:p>
             <a:fld id="{CC58B075-67F8-4A8D-AE1C-3D3E4193EBCA}" type="datetimeFigureOut">
               <a:rPr lang="pt-BR" smtClean="0"/>
-              <a:t>16/09/2019</a:t>
+              <a:t>20/09/2019</a:t>
             </a:fld>
             <a:endParaRPr lang="pt-BR"/>
           </a:p>
@@ -774,7 +774,7 @@
           <a:p>
             <a:fld id="{CC58B075-67F8-4A8D-AE1C-3D3E4193EBCA}" type="datetimeFigureOut">
               <a:rPr lang="pt-BR" smtClean="0"/>
-              <a:t>16/09/2019</a:t>
+              <a:t>20/09/2019</a:t>
             </a:fld>
             <a:endParaRPr lang="pt-BR"/>
           </a:p>
@@ -1019,7 +1019,7 @@
           <a:p>
             <a:fld id="{CC58B075-67F8-4A8D-AE1C-3D3E4193EBCA}" type="datetimeFigureOut">
               <a:rPr lang="pt-BR" smtClean="0"/>
-              <a:t>16/09/2019</a:t>
+              <a:t>20/09/2019</a:t>
             </a:fld>
             <a:endParaRPr lang="pt-BR"/>
           </a:p>
@@ -1248,7 +1248,7 @@
           <a:p>
             <a:fld id="{CC58B075-67F8-4A8D-AE1C-3D3E4193EBCA}" type="datetimeFigureOut">
               <a:rPr lang="pt-BR" smtClean="0"/>
-              <a:t>16/09/2019</a:t>
+              <a:t>20/09/2019</a:t>
             </a:fld>
             <a:endParaRPr lang="pt-BR"/>
           </a:p>
@@ -1612,7 +1612,7 @@
           <a:p>
             <a:fld id="{CC58B075-67F8-4A8D-AE1C-3D3E4193EBCA}" type="datetimeFigureOut">
               <a:rPr lang="pt-BR" smtClean="0"/>
-              <a:t>16/09/2019</a:t>
+              <a:t>20/09/2019</a:t>
             </a:fld>
             <a:endParaRPr lang="pt-BR"/>
           </a:p>
@@ -1729,7 +1729,7 @@
           <a:p>
             <a:fld id="{CC58B075-67F8-4A8D-AE1C-3D3E4193EBCA}" type="datetimeFigureOut">
               <a:rPr lang="pt-BR" smtClean="0"/>
-              <a:t>16/09/2019</a:t>
+              <a:t>20/09/2019</a:t>
             </a:fld>
             <a:endParaRPr lang="pt-BR"/>
           </a:p>
@@ -1824,7 +1824,7 @@
           <a:p>
             <a:fld id="{CC58B075-67F8-4A8D-AE1C-3D3E4193EBCA}" type="datetimeFigureOut">
               <a:rPr lang="pt-BR" smtClean="0"/>
-              <a:t>16/09/2019</a:t>
+              <a:t>20/09/2019</a:t>
             </a:fld>
             <a:endParaRPr lang="pt-BR"/>
           </a:p>
@@ -2099,7 +2099,7 @@
           <a:p>
             <a:fld id="{CC58B075-67F8-4A8D-AE1C-3D3E4193EBCA}" type="datetimeFigureOut">
               <a:rPr lang="pt-BR" smtClean="0"/>
-              <a:t>16/09/2019</a:t>
+              <a:t>20/09/2019</a:t>
             </a:fld>
             <a:endParaRPr lang="pt-BR"/>
           </a:p>
@@ -2351,7 +2351,7 @@
           <a:p>
             <a:fld id="{CC58B075-67F8-4A8D-AE1C-3D3E4193EBCA}" type="datetimeFigureOut">
               <a:rPr lang="pt-BR" smtClean="0"/>
-              <a:t>16/09/2019</a:t>
+              <a:t>20/09/2019</a:t>
             </a:fld>
             <a:endParaRPr lang="pt-BR"/>
           </a:p>
@@ -2562,7 +2562,7 @@
           <a:p>
             <a:fld id="{CC58B075-67F8-4A8D-AE1C-3D3E4193EBCA}" type="datetimeFigureOut">
               <a:rPr lang="pt-BR" smtClean="0"/>
-              <a:t>16/09/2019</a:t>
+              <a:t>20/09/2019</a:t>
             </a:fld>
             <a:endParaRPr lang="pt-BR"/>
           </a:p>
@@ -4843,7 +4843,7 @@
         </p:spPr>
         <p:txBody>
           <a:bodyPr vert="horz" lIns="91440" tIns="45720" rIns="91440" bIns="45720" rtlCol="0">
-            <a:normAutofit/>
+            <a:normAutofit lnSpcReduction="10000"/>
           </a:bodyPr>
           <a:lstStyle>
             <a:lvl1pPr marL="228600" indent="-228600" algn="l" defTabSz="914400" rtl="0" eaLnBrk="1" latinLnBrk="0" hangingPunct="1">
@@ -5012,7 +5012,12 @@
           <a:p>
             <a:pPr algn="just"/>
             <a:r>
-              <a:rPr lang="pt-BR" sz="2000" b="1" i="1" u="sng" dirty="0" smtClean="0">
+              <a:rPr lang="pt-BR" sz="2400" b="1" i="1" u="sng" dirty="0" smtClean="0">
+                <a:solidFill>
+                  <a:schemeClr val="accent1">
+                    <a:lumMod val="75000"/>
+                  </a:schemeClr>
+                </a:solidFill>
                 <a:effectLst>
                   <a:outerShdw blurRad="38100" dist="38100" dir="2700000" algn="tl">
                     <a:srgbClr val="000000">
@@ -5021,11 +5026,15 @@
                   </a:outerShdw>
                 </a:effectLst>
               </a:rPr>
-              <a:t>DETALHE</a:t>
+              <a:t>IMPORTANTE</a:t>
             </a:r>
             <a:r>
               <a:rPr lang="pt-BR" sz="2000" dirty="0" smtClean="0"/>
-              <a:t>: Se vocês está utilizando o </a:t>
+              <a:t>: </a:t>
+            </a:r>
+            <a:r>
+              <a:rPr lang="pt-BR" sz="2000" dirty="0" smtClean="0"/>
+              <a:t>Se vocês está utilizando o </a:t>
             </a:r>
             <a:r>
               <a:rPr lang="pt-BR" sz="2000" dirty="0" err="1" smtClean="0"/>
@@ -5049,7 +5058,23 @@
             </a:r>
             <a:r>
               <a:rPr lang="pt-BR" sz="2000" dirty="0" smtClean="0"/>
-              <a:t>, ele está rodando em cima de uma Máquina Virtual. Portanto, não será o IP da máquina local e sim da VM. Para isso, rode o comando: </a:t>
+              <a:t>, ele está rodando em cima de uma Máquina Virtual. Portanto, não será o IP da máquina </a:t>
+            </a:r>
+            <a:r>
+              <a:rPr lang="pt-BR" sz="2000" dirty="0" smtClean="0"/>
+              <a:t>local (</a:t>
+            </a:r>
+            <a:r>
+              <a:rPr lang="pt-BR" sz="2000" dirty="0" err="1" smtClean="0"/>
+              <a:t>localhost</a:t>
+            </a:r>
+            <a:r>
+              <a:rPr lang="pt-BR" sz="2000" dirty="0" smtClean="0"/>
+              <a:t>) </a:t>
+            </a:r>
+            <a:r>
+              <a:rPr lang="pt-BR" sz="2000" dirty="0" smtClean="0"/>
+              <a:t>e sim da VM. Para isso, rode o comando: </a:t>
             </a:r>
           </a:p>
           <a:p>
@@ -5299,7 +5324,7 @@
         <p:spPr>
           <a:xfrm>
             <a:off x="286752" y="584199"/>
-            <a:ext cx="11618495" cy="5612063"/>
+            <a:ext cx="11618495" cy="5876759"/>
           </a:xfrm>
         </p:spPr>
         <p:txBody>
@@ -5373,12 +5398,20 @@
           <a:p>
             <a:pPr lvl="1" algn="just"/>
             <a:r>
-              <a:rPr lang="pt-BR" sz="1400" dirty="0" err="1" smtClean="0"/>
+              <a:rPr lang="pt-BR" sz="1400" dirty="0" smtClean="0"/>
+              <a:t>Exemplo: Facilitaria para parar esse container posteriormente. -&gt; </a:t>
+            </a:r>
+            <a:r>
+              <a:rPr lang="pt-BR" sz="1400" b="1" dirty="0" err="1" smtClean="0"/>
               <a:t>docker</a:t>
             </a:r>
             <a:r>
-              <a:rPr lang="pt-BR" sz="1400" dirty="0" smtClean="0"/>
-              <a:t> stop meu-site</a:t>
+              <a:rPr lang="pt-BR" sz="1400" b="1" dirty="0" smtClean="0"/>
+              <a:t> </a:t>
+            </a:r>
+            <a:r>
+              <a:rPr lang="pt-BR" sz="1400" b="1" dirty="0" smtClean="0"/>
+              <a:t>stop meu-site</a:t>
             </a:r>
           </a:p>
           <a:p>
@@ -5480,30 +5513,38 @@
             </a:r>
             <a:r>
               <a:rPr lang="pt-BR" sz="1800" dirty="0" smtClean="0"/>
-              <a:t>–P </a:t>
+              <a:t>–p </a:t>
+            </a:r>
+            <a:r>
+              <a:rPr lang="pt-BR" sz="1800" dirty="0" smtClean="0"/>
+              <a:t>12345:80 </a:t>
             </a:r>
             <a:r>
               <a:rPr lang="pt-BR" sz="1800" b="1" dirty="0" smtClean="0"/>
-              <a:t>-e AUTHOR=“Luciano Cordeiro” </a:t>
+              <a:t>-</a:t>
+            </a:r>
+            <a:r>
+              <a:rPr lang="pt-BR" sz="1800" b="1" dirty="0" smtClean="0"/>
+              <a:t>e AUTHOR=“Luciano Cordeiro” </a:t>
             </a:r>
             <a:r>
               <a:rPr lang="pt-BR" sz="1800" dirty="0" smtClean="0"/>
               <a:t> </a:t>
             </a:r>
             <a:r>
-              <a:rPr lang="pt-BR" sz="1800" dirty="0" err="1"/>
+              <a:rPr lang="pt-BR" sz="1800" dirty="0" err="1" smtClean="0"/>
               <a:t>dockersamples</a:t>
             </a:r>
             <a:r>
-              <a:rPr lang="pt-BR" sz="1800" dirty="0"/>
+              <a:rPr lang="pt-BR" sz="1800" dirty="0" smtClean="0"/>
               <a:t>/</a:t>
             </a:r>
             <a:r>
-              <a:rPr lang="pt-BR" sz="1800" dirty="0" err="1"/>
+              <a:rPr lang="pt-BR" sz="1800" dirty="0" err="1" smtClean="0"/>
               <a:t>static</a:t>
             </a:r>
             <a:r>
-              <a:rPr lang="pt-BR" sz="1800" dirty="0"/>
+              <a:rPr lang="pt-BR" sz="1800" dirty="0" smtClean="0"/>
               <a:t>-site</a:t>
             </a:r>
           </a:p>
@@ -5517,9 +5558,21 @@
           </a:p>
           <a:p>
             <a:pPr algn="just"/>
+            <a:endParaRPr lang="pt-BR" sz="2000" b="1" i="1" dirty="0" smtClean="0"/>
+          </a:p>
+          <a:p>
+            <a:pPr algn="just"/>
+            <a:endParaRPr lang="pt-BR" sz="2000" b="1" i="1" dirty="0"/>
+          </a:p>
+          <a:p>
+            <a:pPr algn="just"/>
             <a:r>
               <a:rPr lang="pt-BR" sz="2000" b="1" i="1" dirty="0" smtClean="0"/>
-              <a:t>Parando todos os containers de uma vez</a:t>
+              <a:t>Parando </a:t>
+            </a:r>
+            <a:r>
+              <a:rPr lang="pt-BR" sz="2000" b="1" i="1" dirty="0" smtClean="0"/>
+              <a:t>todos os containers de uma vez</a:t>
             </a:r>
             <a:endParaRPr lang="pt-BR" sz="2000" b="1" i="1" dirty="0"/>
           </a:p>
@@ -5589,7 +5642,7 @@
         </p:blipFill>
         <p:spPr>
           <a:xfrm>
-            <a:off x="8465970" y="3427329"/>
+            <a:off x="8278934" y="4348778"/>
             <a:ext cx="3152775" cy="1276350"/>
           </a:xfrm>
           <a:prstGeom prst="rect">
@@ -5602,6 +5655,103 @@
           </a:ln>
         </p:spPr>
       </p:pic>
+      <p:sp>
+        <p:nvSpPr>
+          <p:cNvPr id="5" name="Retângulo 4"/>
+          <p:cNvSpPr/>
+          <p:nvPr/>
+        </p:nvSpPr>
+        <p:spPr>
+          <a:xfrm>
+            <a:off x="2684842" y="4786898"/>
+            <a:ext cx="3326936" cy="400110"/>
+          </a:xfrm>
+          <a:prstGeom prst="rect">
+            <a:avLst/>
+          </a:prstGeom>
+        </p:spPr>
+        <p:txBody>
+          <a:bodyPr wrap="none">
+            <a:spAutoFit/>
+          </a:bodyPr>
+          <a:lstStyle/>
+          <a:p>
+            <a:r>
+              <a:rPr lang="pt-BR" sz="2000" dirty="0">
+                <a:effectLst>
+                  <a:outerShdw blurRad="38100" dist="38100" dir="2700000" algn="tl">
+                    <a:srgbClr val="000000">
+                      <a:alpha val="43137"/>
+                    </a:srgbClr>
+                  </a:outerShdw>
+                </a:effectLst>
+              </a:rPr>
+              <a:t>http://</a:t>
+            </a:r>
+            <a:r>
+              <a:rPr lang="pt-BR" sz="2000" dirty="0" smtClean="0">
+                <a:effectLst>
+                  <a:outerShdw blurRad="38100" dist="38100" dir="2700000" algn="tl">
+                    <a:srgbClr val="000000">
+                      <a:alpha val="43137"/>
+                    </a:srgbClr>
+                  </a:outerShdw>
+                </a:effectLst>
+              </a:rPr>
+              <a:t>192.168.98.112:12345/</a:t>
+            </a:r>
+            <a:endParaRPr lang="pt-BR" sz="2000" dirty="0">
+              <a:effectLst>
+                <a:outerShdw blurRad="38100" dist="38100" dir="2700000" algn="tl">
+                  <a:srgbClr val="000000">
+                    <a:alpha val="43137"/>
+                  </a:srgbClr>
+                </a:outerShdw>
+              </a:effectLst>
+            </a:endParaRPr>
+          </a:p>
+        </p:txBody>
+      </p:sp>
+      <p:sp>
+        <p:nvSpPr>
+          <p:cNvPr id="6" name="Seta para a Direita 5"/>
+          <p:cNvSpPr/>
+          <p:nvPr/>
+        </p:nvSpPr>
+        <p:spPr>
+          <a:xfrm>
+            <a:off x="5979124" y="4857673"/>
+            <a:ext cx="2158303" cy="329335"/>
+          </a:xfrm>
+          <a:prstGeom prst="rightArrow">
+            <a:avLst/>
+          </a:prstGeom>
+        </p:spPr>
+        <p:style>
+          <a:lnRef idx="2">
+            <a:schemeClr val="accent1">
+              <a:shade val="50000"/>
+            </a:schemeClr>
+          </a:lnRef>
+          <a:fillRef idx="1">
+            <a:schemeClr val="accent1"/>
+          </a:fillRef>
+          <a:effectRef idx="0">
+            <a:schemeClr val="accent1"/>
+          </a:effectRef>
+          <a:fontRef idx="minor">
+            <a:schemeClr val="lt1"/>
+          </a:fontRef>
+        </p:style>
+        <p:txBody>
+          <a:bodyPr rtlCol="0" anchor="ctr"/>
+          <a:lstStyle/>
+          <a:p>
+            <a:pPr algn="ctr"/>
+            <a:endParaRPr lang="pt-BR"/>
+          </a:p>
+        </p:txBody>
+      </p:sp>
     </p:spTree>
     <p:extLst>
       <p:ext uri="{BB962C8B-B14F-4D97-AF65-F5344CB8AC3E}">
@@ -5664,11 +5814,7 @@
             <a:pPr algn="ctr"/>
             <a:r>
               <a:rPr lang="pt-BR" sz="2800" b="1" dirty="0" smtClean="0"/>
-              <a:t>Revisão Comandos </a:t>
-            </a:r>
-            <a:r>
-              <a:rPr lang="pt-BR" sz="2800" b="1" dirty="0" smtClean="0"/>
-              <a:t>do </a:t>
+              <a:t>Revisão Comandos do </a:t>
             </a:r>
             <a:r>
               <a:rPr lang="pt-BR" sz="2800" b="1" dirty="0" err="1" smtClean="0"/>
@@ -6050,7 +6196,6 @@
               <a:rPr lang="pt-BR" sz="1600" dirty="0" smtClean="0"/>
               <a:t>.</a:t>
             </a:r>
-            <a:endParaRPr lang="pt-BR" sz="1600" dirty="0" smtClean="0"/>
           </a:p>
         </p:txBody>
       </p:sp>
@@ -7613,15 +7758,7 @@
             <a:pPr lvl="1"/>
             <a:r>
               <a:rPr lang="pt-BR" sz="1800" dirty="0" smtClean="0"/>
-              <a:t>Sem contar que uma </a:t>
-            </a:r>
-            <a:r>
-              <a:rPr lang="pt-BR" sz="1800" dirty="0" smtClean="0"/>
-              <a:t>única </a:t>
-            </a:r>
-            <a:r>
-              <a:rPr lang="pt-BR" sz="1800" dirty="0" smtClean="0"/>
-              <a:t>aplicação pode congelar um ambiente</a:t>
+              <a:t>Sem contar que uma única aplicação pode congelar um ambiente</a:t>
             </a:r>
             <a:endParaRPr lang="pt-BR" sz="1800" dirty="0"/>
           </a:p>

</xml_diff>

<commit_message>
Adicionando conceitos de Volumes
</commit_message>
<xml_diff>
--- a/docs/docker-resumo.pptx
+++ b/docs/docker-resumo.pptx
@@ -21,10 +21,12 @@
     <p:sldId id="299" r:id="rId15"/>
     <p:sldId id="300" r:id="rId16"/>
     <p:sldId id="294" r:id="rId17"/>
-    <p:sldId id="281" r:id="rId18"/>
-    <p:sldId id="280" r:id="rId19"/>
-    <p:sldId id="284" r:id="rId20"/>
-    <p:sldId id="285" r:id="rId21"/>
+    <p:sldId id="301" r:id="rId18"/>
+    <p:sldId id="302" r:id="rId19"/>
+    <p:sldId id="281" r:id="rId20"/>
+    <p:sldId id="280" r:id="rId21"/>
+    <p:sldId id="284" r:id="rId22"/>
+    <p:sldId id="285" r:id="rId23"/>
   </p:sldIdLst>
   <p:sldSz cx="12192000" cy="6858000"/>
   <p:notesSz cx="6858000" cy="9144000"/>
@@ -260,7 +262,7 @@
           <a:p>
             <a:fld id="{CC58B075-67F8-4A8D-AE1C-3D3E4193EBCA}" type="datetimeFigureOut">
               <a:rPr lang="pt-BR" smtClean="0"/>
-              <a:t>20/09/2019</a:t>
+              <a:t>23/09/2019</a:t>
             </a:fld>
             <a:endParaRPr lang="pt-BR"/>
           </a:p>
@@ -428,7 +430,7 @@
           <a:p>
             <a:fld id="{CC58B075-67F8-4A8D-AE1C-3D3E4193EBCA}" type="datetimeFigureOut">
               <a:rPr lang="pt-BR" smtClean="0"/>
-              <a:t>20/09/2019</a:t>
+              <a:t>23/09/2019</a:t>
             </a:fld>
             <a:endParaRPr lang="pt-BR"/>
           </a:p>
@@ -606,7 +608,7 @@
           <a:p>
             <a:fld id="{CC58B075-67F8-4A8D-AE1C-3D3E4193EBCA}" type="datetimeFigureOut">
               <a:rPr lang="pt-BR" smtClean="0"/>
-              <a:t>20/09/2019</a:t>
+              <a:t>23/09/2019</a:t>
             </a:fld>
             <a:endParaRPr lang="pt-BR"/>
           </a:p>
@@ -774,7 +776,7 @@
           <a:p>
             <a:fld id="{CC58B075-67F8-4A8D-AE1C-3D3E4193EBCA}" type="datetimeFigureOut">
               <a:rPr lang="pt-BR" smtClean="0"/>
-              <a:t>20/09/2019</a:t>
+              <a:t>23/09/2019</a:t>
             </a:fld>
             <a:endParaRPr lang="pt-BR"/>
           </a:p>
@@ -1019,7 +1021,7 @@
           <a:p>
             <a:fld id="{CC58B075-67F8-4A8D-AE1C-3D3E4193EBCA}" type="datetimeFigureOut">
               <a:rPr lang="pt-BR" smtClean="0"/>
-              <a:t>20/09/2019</a:t>
+              <a:t>23/09/2019</a:t>
             </a:fld>
             <a:endParaRPr lang="pt-BR"/>
           </a:p>
@@ -1248,7 +1250,7 @@
           <a:p>
             <a:fld id="{CC58B075-67F8-4A8D-AE1C-3D3E4193EBCA}" type="datetimeFigureOut">
               <a:rPr lang="pt-BR" smtClean="0"/>
-              <a:t>20/09/2019</a:t>
+              <a:t>23/09/2019</a:t>
             </a:fld>
             <a:endParaRPr lang="pt-BR"/>
           </a:p>
@@ -1612,7 +1614,7 @@
           <a:p>
             <a:fld id="{CC58B075-67F8-4A8D-AE1C-3D3E4193EBCA}" type="datetimeFigureOut">
               <a:rPr lang="pt-BR" smtClean="0"/>
-              <a:t>20/09/2019</a:t>
+              <a:t>23/09/2019</a:t>
             </a:fld>
             <a:endParaRPr lang="pt-BR"/>
           </a:p>
@@ -1729,7 +1731,7 @@
           <a:p>
             <a:fld id="{CC58B075-67F8-4A8D-AE1C-3D3E4193EBCA}" type="datetimeFigureOut">
               <a:rPr lang="pt-BR" smtClean="0"/>
-              <a:t>20/09/2019</a:t>
+              <a:t>23/09/2019</a:t>
             </a:fld>
             <a:endParaRPr lang="pt-BR"/>
           </a:p>
@@ -1824,7 +1826,7 @@
           <a:p>
             <a:fld id="{CC58B075-67F8-4A8D-AE1C-3D3E4193EBCA}" type="datetimeFigureOut">
               <a:rPr lang="pt-BR" smtClean="0"/>
-              <a:t>20/09/2019</a:t>
+              <a:t>23/09/2019</a:t>
             </a:fld>
             <a:endParaRPr lang="pt-BR"/>
           </a:p>
@@ -2099,7 +2101,7 @@
           <a:p>
             <a:fld id="{CC58B075-67F8-4A8D-AE1C-3D3E4193EBCA}" type="datetimeFigureOut">
               <a:rPr lang="pt-BR" smtClean="0"/>
-              <a:t>20/09/2019</a:t>
+              <a:t>23/09/2019</a:t>
             </a:fld>
             <a:endParaRPr lang="pt-BR"/>
           </a:p>
@@ -2351,7 +2353,7 @@
           <a:p>
             <a:fld id="{CC58B075-67F8-4A8D-AE1C-3D3E4193EBCA}" type="datetimeFigureOut">
               <a:rPr lang="pt-BR" smtClean="0"/>
-              <a:t>20/09/2019</a:t>
+              <a:t>23/09/2019</a:t>
             </a:fld>
             <a:endParaRPr lang="pt-BR"/>
           </a:p>
@@ -2562,7 +2564,7 @@
           <a:p>
             <a:fld id="{CC58B075-67F8-4A8D-AE1C-3D3E4193EBCA}" type="datetimeFigureOut">
               <a:rPr lang="pt-BR" smtClean="0"/>
-              <a:t>20/09/2019</a:t>
+              <a:t>23/09/2019</a:t>
             </a:fld>
             <a:endParaRPr lang="pt-BR"/>
           </a:p>
@@ -5030,11 +5032,7 @@
             </a:r>
             <a:r>
               <a:rPr lang="pt-BR" sz="2000" dirty="0" smtClean="0"/>
-              <a:t>: </a:t>
-            </a:r>
-            <a:r>
-              <a:rPr lang="pt-BR" sz="2000" dirty="0" smtClean="0"/>
-              <a:t>Se vocês está utilizando o </a:t>
+              <a:t>: Se vocês está utilizando o </a:t>
             </a:r>
             <a:r>
               <a:rPr lang="pt-BR" sz="2000" dirty="0" err="1" smtClean="0"/>
@@ -5058,11 +5056,7 @@
             </a:r>
             <a:r>
               <a:rPr lang="pt-BR" sz="2000" dirty="0" smtClean="0"/>
-              <a:t>, ele está rodando em cima de uma Máquina Virtual. Portanto, não será o IP da máquina </a:t>
-            </a:r>
-            <a:r>
-              <a:rPr lang="pt-BR" sz="2000" dirty="0" smtClean="0"/>
-              <a:t>local (</a:t>
+              <a:t>, ele está rodando em cima de uma Máquina Virtual. Portanto, não será o IP da máquina local (</a:t>
             </a:r>
             <a:r>
               <a:rPr lang="pt-BR" sz="2000" dirty="0" err="1" smtClean="0"/>
@@ -5070,11 +5064,7 @@
             </a:r>
             <a:r>
               <a:rPr lang="pt-BR" sz="2000" dirty="0" smtClean="0"/>
-              <a:t>) </a:t>
-            </a:r>
-            <a:r>
-              <a:rPr lang="pt-BR" sz="2000" dirty="0" smtClean="0"/>
-              <a:t>e sim da VM. Para isso, rode o comando: </a:t>
+              <a:t>) e sim da VM. Para isso, rode o comando: </a:t>
             </a:r>
           </a:p>
           <a:p>
@@ -5407,11 +5397,7 @@
             </a:r>
             <a:r>
               <a:rPr lang="pt-BR" sz="1400" b="1" dirty="0" smtClean="0"/>
-              <a:t> </a:t>
-            </a:r>
-            <a:r>
-              <a:rPr lang="pt-BR" sz="1400" b="1" dirty="0" smtClean="0"/>
-              <a:t>stop meu-site</a:t>
+              <a:t> stop meu-site</a:t>
             </a:r>
           </a:p>
           <a:p>
@@ -5513,19 +5499,11 @@
             </a:r>
             <a:r>
               <a:rPr lang="pt-BR" sz="1800" dirty="0" smtClean="0"/>
-              <a:t>–p </a:t>
-            </a:r>
-            <a:r>
-              <a:rPr lang="pt-BR" sz="1800" dirty="0" smtClean="0"/>
-              <a:t>12345:80 </a:t>
+              <a:t>–p 12345:80 </a:t>
             </a:r>
             <a:r>
               <a:rPr lang="pt-BR" sz="1800" b="1" dirty="0" smtClean="0"/>
-              <a:t>-</a:t>
-            </a:r>
-            <a:r>
-              <a:rPr lang="pt-BR" sz="1800" b="1" dirty="0" smtClean="0"/>
-              <a:t>e AUTHOR=“Luciano Cordeiro” </a:t>
+              <a:t>-e AUTHOR=“Luciano Cordeiro” </a:t>
             </a:r>
             <a:r>
               <a:rPr lang="pt-BR" sz="1800" dirty="0" smtClean="0"/>
@@ -5568,11 +5546,7 @@
             <a:pPr algn="just"/>
             <a:r>
               <a:rPr lang="pt-BR" sz="2000" b="1" i="1" dirty="0" smtClean="0"/>
-              <a:t>Parando </a:t>
-            </a:r>
-            <a:r>
-              <a:rPr lang="pt-BR" sz="2000" b="1" i="1" dirty="0" smtClean="0"/>
-              <a:t>todos os containers de uma vez</a:t>
+              <a:t>Parando todos os containers de uma vez</a:t>
             </a:r>
             <a:endParaRPr lang="pt-BR" sz="2000" b="1" i="1" dirty="0"/>
           </a:p>
@@ -6267,9 +6241,33 @@
           </a:p>
         </p:txBody>
       </p:sp>
-      <p:sp>
-        <p:nvSpPr>
-          <p:cNvPr id="4" name="Espaço Reservado para Conteúdo 2"/>
+      <p:pic>
+        <p:nvPicPr>
+          <p:cNvPr id="3" name="Imagem 2"/>
+          <p:cNvPicPr>
+            <a:picLocks noChangeAspect="1"/>
+          </p:cNvPicPr>
+          <p:nvPr/>
+        </p:nvPicPr>
+        <p:blipFill>
+          <a:blip r:embed="rId2"/>
+          <a:stretch>
+            <a:fillRect/>
+          </a:stretch>
+        </p:blipFill>
+        <p:spPr>
+          <a:xfrm>
+            <a:off x="3039415" y="584200"/>
+            <a:ext cx="6166832" cy="4207420"/>
+          </a:xfrm>
+          <a:prstGeom prst="rect">
+            <a:avLst/>
+          </a:prstGeom>
+        </p:spPr>
+      </p:pic>
+      <p:sp>
+        <p:nvSpPr>
+          <p:cNvPr id="5" name="Espaço Reservado para Conteúdo 4"/>
           <p:cNvSpPr>
             <a:spLocks noGrp="1"/>
           </p:cNvSpPr>
@@ -6279,138 +6277,25 @@
         </p:nvSpPr>
         <p:spPr>
           <a:xfrm>
-            <a:off x="286752" y="751474"/>
-            <a:ext cx="11618495" cy="2344016"/>
+            <a:off x="1044262" y="5164428"/>
+            <a:ext cx="9980054" cy="1017432"/>
           </a:xfrm>
         </p:spPr>
         <p:txBody>
           <a:bodyPr>
-            <a:normAutofit fontScale="92500" lnSpcReduction="20000"/>
+            <a:normAutofit/>
           </a:bodyPr>
           <a:lstStyle/>
           <a:p>
-            <a:pPr algn="just"/>
             <a:r>
               <a:rPr lang="pt-BR" sz="2000" dirty="0" smtClean="0"/>
-              <a:t>Qual porta acessar? Para isso podemos usar a </a:t>
-            </a:r>
-            <a:r>
-              <a:rPr lang="pt-BR" sz="2000" dirty="0" err="1" smtClean="0"/>
-              <a:t>flag</a:t>
-            </a:r>
-            <a:r>
-              <a:rPr lang="pt-BR" sz="2000" dirty="0" smtClean="0"/>
-              <a:t> </a:t>
+              <a:t>Se você escrever algo nesse container e este for removido, todo o conteúdo será perdido. Por isso é interessante que você utilize o conceito de </a:t>
             </a:r>
             <a:r>
               <a:rPr lang="pt-BR" sz="2000" b="1" dirty="0" smtClean="0"/>
-              <a:t>–P </a:t>
-            </a:r>
-            <a:r>
-              <a:rPr lang="pt-BR" sz="2000" dirty="0" smtClean="0"/>
-              <a:t>que atribuirá portas aleatórias que farão com que o mundo externo(nossa máquina) se comunique com o container</a:t>
-            </a:r>
-          </a:p>
-          <a:p>
-            <a:pPr algn="just"/>
-            <a:endParaRPr lang="pt-BR" sz="2000" dirty="0" smtClean="0"/>
-          </a:p>
-          <a:p>
-            <a:pPr lvl="1" algn="just"/>
-            <a:r>
-              <a:rPr lang="pt-BR" sz="1800" dirty="0" err="1" smtClean="0"/>
-              <a:t>docker</a:t>
-            </a:r>
-            <a:r>
-              <a:rPr lang="pt-BR" sz="1800" dirty="0" smtClean="0"/>
-              <a:t> </a:t>
-            </a:r>
-            <a:r>
-              <a:rPr lang="pt-BR" sz="1800" dirty="0" err="1" smtClean="0"/>
-              <a:t>run</a:t>
-            </a:r>
-            <a:r>
-              <a:rPr lang="pt-BR" sz="1800" dirty="0" smtClean="0"/>
-              <a:t> </a:t>
-            </a:r>
-            <a:r>
-              <a:rPr lang="pt-BR" sz="1800" b="1" dirty="0" smtClean="0"/>
-              <a:t>–d –P </a:t>
-            </a:r>
-            <a:r>
-              <a:rPr lang="pt-BR" sz="1800" dirty="0" smtClean="0"/>
-              <a:t> </a:t>
-            </a:r>
-            <a:r>
-              <a:rPr lang="pt-BR" sz="1800" dirty="0" err="1" smtClean="0"/>
-              <a:t>dockersamples</a:t>
-            </a:r>
-            <a:r>
-              <a:rPr lang="pt-BR" sz="1800" dirty="0" smtClean="0"/>
-              <a:t>/</a:t>
-            </a:r>
-            <a:r>
-              <a:rPr lang="pt-BR" sz="1800" dirty="0" err="1" smtClean="0"/>
-              <a:t>static</a:t>
-            </a:r>
-            <a:r>
-              <a:rPr lang="pt-BR" sz="1800" dirty="0" smtClean="0"/>
-              <a:t>-site</a:t>
-            </a:r>
-          </a:p>
-          <a:p>
-            <a:pPr lvl="1" algn="just"/>
-            <a:endParaRPr lang="pt-BR" sz="1800" dirty="0"/>
-          </a:p>
-          <a:p>
-            <a:pPr algn="just"/>
-            <a:r>
-              <a:rPr lang="pt-BR" sz="2000" dirty="0" smtClean="0"/>
-              <a:t>Podemos visualizar também as portas através do comando: </a:t>
-            </a:r>
-            <a:r>
-              <a:rPr lang="pt-BR" sz="2000" b="1" dirty="0" err="1" smtClean="0"/>
-              <a:t>docker</a:t>
-            </a:r>
-            <a:r>
-              <a:rPr lang="pt-BR" sz="2000" b="1" dirty="0" smtClean="0"/>
-              <a:t> </a:t>
-            </a:r>
-            <a:r>
-              <a:rPr lang="pt-BR" sz="2000" b="1" dirty="0" err="1" smtClean="0"/>
-              <a:t>port</a:t>
-            </a:r>
-            <a:r>
-              <a:rPr lang="pt-BR" sz="2000" b="1" dirty="0" smtClean="0"/>
-              <a:t> container</a:t>
-            </a:r>
-          </a:p>
-          <a:p>
-            <a:pPr algn="just"/>
-            <a:endParaRPr lang="pt-BR" sz="2000" dirty="0" smtClean="0"/>
-          </a:p>
-          <a:p>
-            <a:pPr lvl="1" algn="just"/>
-            <a:r>
-              <a:rPr lang="pt-BR" sz="1800" dirty="0" err="1" smtClean="0"/>
-              <a:t>docker</a:t>
-            </a:r>
-            <a:r>
-              <a:rPr lang="pt-BR" sz="1800" dirty="0" smtClean="0"/>
-              <a:t> </a:t>
-            </a:r>
-            <a:r>
-              <a:rPr lang="pt-BR" sz="1800" b="1" dirty="0" err="1" smtClean="0"/>
-              <a:t>port</a:t>
-            </a:r>
-            <a:r>
-              <a:rPr lang="pt-BR" sz="1800" dirty="0"/>
-              <a:t> </a:t>
-            </a:r>
-            <a:r>
-              <a:rPr lang="pt-BR" sz="1800" u="sng" dirty="0"/>
-              <a:t>989e4d7d3638</a:t>
-            </a:r>
+              <a:t>Volumes</a:t>
+            </a:r>
+            <a:endParaRPr lang="pt-BR" sz="2000" b="1" dirty="0"/>
           </a:p>
         </p:txBody>
       </p:sp>
@@ -6461,18 +6346,30 @@
             <p:ph type="title"/>
           </p:nvPr>
         </p:nvSpPr>
-        <p:spPr/>
-        <p:txBody>
-          <a:bodyPr/>
+        <p:spPr>
+          <a:xfrm>
+            <a:off x="838200" y="123288"/>
+            <a:ext cx="10515600" cy="422275"/>
+          </a:xfrm>
+        </p:spPr>
+        <p:txBody>
+          <a:bodyPr vert="horz" lIns="91440" tIns="45720" rIns="91440" bIns="45720" rtlCol="0" anchor="ctr">
+            <a:normAutofit fontScale="90000"/>
+          </a:bodyPr>
           <a:lstStyle/>
           <a:p>
-            <a:endParaRPr lang="pt-BR"/>
-          </a:p>
-        </p:txBody>
-      </p:sp>
-      <p:sp>
-        <p:nvSpPr>
-          <p:cNvPr id="3" name="Espaço Reservado para Conteúdo 2"/>
+            <a:pPr algn="ctr"/>
+            <a:r>
+              <a:rPr lang="pt-BR" sz="2800" b="1" dirty="0" smtClean="0"/>
+              <a:t>Volumes</a:t>
+            </a:r>
+            <a:endParaRPr lang="pt-BR" sz="2800" b="1" dirty="0"/>
+          </a:p>
+        </p:txBody>
+      </p:sp>
+      <p:sp>
+        <p:nvSpPr>
+          <p:cNvPr id="5" name="Espaço Reservado para Conteúdo 4"/>
           <p:cNvSpPr>
             <a:spLocks noGrp="1"/>
           </p:cNvSpPr>
@@ -6480,25 +6377,673 @@
             <p:ph idx="1"/>
           </p:nvPr>
         </p:nvSpPr>
-        <p:spPr/>
-        <p:txBody>
-          <a:bodyPr/>
+        <p:spPr>
+          <a:xfrm>
+            <a:off x="619259" y="626948"/>
+            <a:ext cx="9980054" cy="1017432"/>
+          </a:xfrm>
+        </p:spPr>
+        <p:txBody>
+          <a:bodyPr>
+            <a:normAutofit/>
+          </a:bodyPr>
           <a:lstStyle/>
           <a:p>
-            <a:endParaRPr lang="pt-BR"/>
+            <a:r>
+              <a:rPr lang="pt-BR" sz="2000" dirty="0" smtClean="0"/>
+              <a:t>A solução de Volumes faz com que ao se criar um conteúdo numa pasta, por exemplo, “/var/</a:t>
+            </a:r>
+            <a:r>
+              <a:rPr lang="pt-BR" sz="2000" dirty="0" err="1" smtClean="0"/>
+              <a:t>www</a:t>
+            </a:r>
+            <a:r>
+              <a:rPr lang="pt-BR" sz="2000" dirty="0" smtClean="0"/>
+              <a:t>” esse conteúdo vá para o </a:t>
+            </a:r>
+            <a:r>
+              <a:rPr lang="pt-BR" sz="2000" b="1" dirty="0" err="1" smtClean="0"/>
+              <a:t>Docker</a:t>
+            </a:r>
+            <a:r>
+              <a:rPr lang="pt-BR" sz="2000" b="1" dirty="0" smtClean="0"/>
+              <a:t> Host, </a:t>
+            </a:r>
+            <a:r>
+              <a:rPr lang="pt-BR" sz="2000" dirty="0" smtClean="0"/>
+              <a:t>fazendo com que este conteúdo não se perca se o container for apagado.</a:t>
+            </a:r>
+            <a:endParaRPr lang="pt-BR" sz="2000" b="1" dirty="0"/>
+          </a:p>
+        </p:txBody>
+      </p:sp>
+      <p:pic>
+        <p:nvPicPr>
+          <p:cNvPr id="4" name="Imagem 3"/>
+          <p:cNvPicPr>
+            <a:picLocks noChangeAspect="1"/>
+          </p:cNvPicPr>
+          <p:nvPr/>
+        </p:nvPicPr>
+        <p:blipFill>
+          <a:blip r:embed="rId2"/>
+          <a:stretch>
+            <a:fillRect/>
+          </a:stretch>
+        </p:blipFill>
+        <p:spPr>
+          <a:xfrm>
+            <a:off x="2944030" y="1495200"/>
+            <a:ext cx="5124450" cy="1676400"/>
+          </a:xfrm>
+          <a:prstGeom prst="rect">
+            <a:avLst/>
+          </a:prstGeom>
+        </p:spPr>
+      </p:pic>
+      <p:sp>
+        <p:nvSpPr>
+          <p:cNvPr id="6" name="Espaço Reservado para Conteúdo 4"/>
+          <p:cNvSpPr txBox="1">
+            <a:spLocks/>
+          </p:cNvSpPr>
+          <p:nvPr/>
+        </p:nvSpPr>
+        <p:spPr>
+          <a:xfrm>
+            <a:off x="704045" y="3171600"/>
+            <a:ext cx="10649755" cy="1378040"/>
+          </a:xfrm>
+          <a:prstGeom prst="rect">
+            <a:avLst/>
+          </a:prstGeom>
+        </p:spPr>
+        <p:txBody>
+          <a:bodyPr vert="horz" lIns="91440" tIns="45720" rIns="91440" bIns="45720" rtlCol="0">
+            <a:normAutofit/>
+          </a:bodyPr>
+          <a:lstStyle>
+            <a:lvl1pPr marL="228600" indent="-228600" algn="l" defTabSz="914400" rtl="0" eaLnBrk="1" latinLnBrk="0" hangingPunct="1">
+              <a:lnSpc>
+                <a:spcPct val="90000"/>
+              </a:lnSpc>
+              <a:spcBef>
+                <a:spcPts val="1000"/>
+              </a:spcBef>
+              <a:buFont typeface="Arial" panose="020B0604020202020204" pitchFamily="34" charset="0"/>
+              <a:buChar char="•"/>
+              <a:defRPr sz="2800" kern="1200">
+                <a:solidFill>
+                  <a:schemeClr val="tx1"/>
+                </a:solidFill>
+                <a:latin typeface="+mn-lt"/>
+                <a:ea typeface="+mn-ea"/>
+                <a:cs typeface="+mn-cs"/>
+              </a:defRPr>
+            </a:lvl1pPr>
+            <a:lvl2pPr marL="685800" indent="-228600" algn="l" defTabSz="914400" rtl="0" eaLnBrk="1" latinLnBrk="0" hangingPunct="1">
+              <a:lnSpc>
+                <a:spcPct val="90000"/>
+              </a:lnSpc>
+              <a:spcBef>
+                <a:spcPts val="500"/>
+              </a:spcBef>
+              <a:buFont typeface="Arial" panose="020B0604020202020204" pitchFamily="34" charset="0"/>
+              <a:buChar char="•"/>
+              <a:defRPr sz="2400" kern="1200">
+                <a:solidFill>
+                  <a:schemeClr val="tx1"/>
+                </a:solidFill>
+                <a:latin typeface="+mn-lt"/>
+                <a:ea typeface="+mn-ea"/>
+                <a:cs typeface="+mn-cs"/>
+              </a:defRPr>
+            </a:lvl2pPr>
+            <a:lvl3pPr marL="1143000" indent="-228600" algn="l" defTabSz="914400" rtl="0" eaLnBrk="1" latinLnBrk="0" hangingPunct="1">
+              <a:lnSpc>
+                <a:spcPct val="90000"/>
+              </a:lnSpc>
+              <a:spcBef>
+                <a:spcPts val="500"/>
+              </a:spcBef>
+              <a:buFont typeface="Arial" panose="020B0604020202020204" pitchFamily="34" charset="0"/>
+              <a:buChar char="•"/>
+              <a:defRPr sz="2000" kern="1200">
+                <a:solidFill>
+                  <a:schemeClr val="tx1"/>
+                </a:solidFill>
+                <a:latin typeface="+mn-lt"/>
+                <a:ea typeface="+mn-ea"/>
+                <a:cs typeface="+mn-cs"/>
+              </a:defRPr>
+            </a:lvl3pPr>
+            <a:lvl4pPr marL="1600200" indent="-228600" algn="l" defTabSz="914400" rtl="0" eaLnBrk="1" latinLnBrk="0" hangingPunct="1">
+              <a:lnSpc>
+                <a:spcPct val="90000"/>
+              </a:lnSpc>
+              <a:spcBef>
+                <a:spcPts val="500"/>
+              </a:spcBef>
+              <a:buFont typeface="Arial" panose="020B0604020202020204" pitchFamily="34" charset="0"/>
+              <a:buChar char="•"/>
+              <a:defRPr sz="1800" kern="1200">
+                <a:solidFill>
+                  <a:schemeClr val="tx1"/>
+                </a:solidFill>
+                <a:latin typeface="+mn-lt"/>
+                <a:ea typeface="+mn-ea"/>
+                <a:cs typeface="+mn-cs"/>
+              </a:defRPr>
+            </a:lvl4pPr>
+            <a:lvl5pPr marL="2057400" indent="-228600" algn="l" defTabSz="914400" rtl="0" eaLnBrk="1" latinLnBrk="0" hangingPunct="1">
+              <a:lnSpc>
+                <a:spcPct val="90000"/>
+              </a:lnSpc>
+              <a:spcBef>
+                <a:spcPts val="500"/>
+              </a:spcBef>
+              <a:buFont typeface="Arial" panose="020B0604020202020204" pitchFamily="34" charset="0"/>
+              <a:buChar char="•"/>
+              <a:defRPr sz="1800" kern="1200">
+                <a:solidFill>
+                  <a:schemeClr val="tx1"/>
+                </a:solidFill>
+                <a:latin typeface="+mn-lt"/>
+                <a:ea typeface="+mn-ea"/>
+                <a:cs typeface="+mn-cs"/>
+              </a:defRPr>
+            </a:lvl5pPr>
+            <a:lvl6pPr marL="2514600" indent="-228600" algn="l" defTabSz="914400" rtl="0" eaLnBrk="1" latinLnBrk="0" hangingPunct="1">
+              <a:lnSpc>
+                <a:spcPct val="90000"/>
+              </a:lnSpc>
+              <a:spcBef>
+                <a:spcPts val="500"/>
+              </a:spcBef>
+              <a:buFont typeface="Arial" panose="020B0604020202020204" pitchFamily="34" charset="0"/>
+              <a:buChar char="•"/>
+              <a:defRPr sz="1800" kern="1200">
+                <a:solidFill>
+                  <a:schemeClr val="tx1"/>
+                </a:solidFill>
+                <a:latin typeface="+mn-lt"/>
+                <a:ea typeface="+mn-ea"/>
+                <a:cs typeface="+mn-cs"/>
+              </a:defRPr>
+            </a:lvl6pPr>
+            <a:lvl7pPr marL="2971800" indent="-228600" algn="l" defTabSz="914400" rtl="0" eaLnBrk="1" latinLnBrk="0" hangingPunct="1">
+              <a:lnSpc>
+                <a:spcPct val="90000"/>
+              </a:lnSpc>
+              <a:spcBef>
+                <a:spcPts val="500"/>
+              </a:spcBef>
+              <a:buFont typeface="Arial" panose="020B0604020202020204" pitchFamily="34" charset="0"/>
+              <a:buChar char="•"/>
+              <a:defRPr sz="1800" kern="1200">
+                <a:solidFill>
+                  <a:schemeClr val="tx1"/>
+                </a:solidFill>
+                <a:latin typeface="+mn-lt"/>
+                <a:ea typeface="+mn-ea"/>
+                <a:cs typeface="+mn-cs"/>
+              </a:defRPr>
+            </a:lvl7pPr>
+            <a:lvl8pPr marL="3429000" indent="-228600" algn="l" defTabSz="914400" rtl="0" eaLnBrk="1" latinLnBrk="0" hangingPunct="1">
+              <a:lnSpc>
+                <a:spcPct val="90000"/>
+              </a:lnSpc>
+              <a:spcBef>
+                <a:spcPts val="500"/>
+              </a:spcBef>
+              <a:buFont typeface="Arial" panose="020B0604020202020204" pitchFamily="34" charset="0"/>
+              <a:buChar char="•"/>
+              <a:defRPr sz="1800" kern="1200">
+                <a:solidFill>
+                  <a:schemeClr val="tx1"/>
+                </a:solidFill>
+                <a:latin typeface="+mn-lt"/>
+                <a:ea typeface="+mn-ea"/>
+                <a:cs typeface="+mn-cs"/>
+              </a:defRPr>
+            </a:lvl8pPr>
+            <a:lvl9pPr marL="3886200" indent="-228600" algn="l" defTabSz="914400" rtl="0" eaLnBrk="1" latinLnBrk="0" hangingPunct="1">
+              <a:lnSpc>
+                <a:spcPct val="90000"/>
+              </a:lnSpc>
+              <a:spcBef>
+                <a:spcPts val="500"/>
+              </a:spcBef>
+              <a:buFont typeface="Arial" panose="020B0604020202020204" pitchFamily="34" charset="0"/>
+              <a:buChar char="•"/>
+              <a:defRPr sz="1800" kern="1200">
+                <a:solidFill>
+                  <a:schemeClr val="tx1"/>
+                </a:solidFill>
+                <a:latin typeface="+mn-lt"/>
+                <a:ea typeface="+mn-ea"/>
+                <a:cs typeface="+mn-cs"/>
+              </a:defRPr>
+            </a:lvl9pPr>
+          </a:lstStyle>
+          <a:p>
+            <a:r>
+              <a:rPr lang="pt-BR" sz="2000" b="1" dirty="0" err="1"/>
+              <a:t>docker</a:t>
+            </a:r>
+            <a:r>
+              <a:rPr lang="pt-BR" sz="2000" b="1" dirty="0"/>
+              <a:t> </a:t>
+            </a:r>
+            <a:r>
+              <a:rPr lang="pt-BR" sz="2000" b="1" dirty="0" err="1"/>
+              <a:t>run</a:t>
+            </a:r>
+            <a:r>
+              <a:rPr lang="pt-BR" sz="2000" b="1" dirty="0"/>
+              <a:t> -v "/var/</a:t>
+            </a:r>
+            <a:r>
+              <a:rPr lang="pt-BR" sz="2000" b="1" dirty="0" err="1"/>
+              <a:t>www</a:t>
+            </a:r>
+            <a:r>
+              <a:rPr lang="pt-BR" sz="2000" b="1" dirty="0"/>
+              <a:t>" </a:t>
+            </a:r>
+            <a:r>
+              <a:rPr lang="pt-BR" sz="2000" b="1" dirty="0" err="1" smtClean="0"/>
+              <a:t>ubuntu</a:t>
+            </a:r>
+            <a:r>
+              <a:rPr lang="pt-BR" sz="2000" b="1" dirty="0" smtClean="0"/>
+              <a:t> </a:t>
+            </a:r>
+          </a:p>
+          <a:p>
+            <a:pPr lvl="1"/>
+            <a:r>
+              <a:rPr lang="pt-BR" sz="1600" dirty="0" smtClean="0"/>
+              <a:t>Dessa forma </a:t>
+            </a:r>
+            <a:r>
+              <a:rPr lang="pt-BR" sz="1600" dirty="0" err="1" smtClean="0"/>
+              <a:t>vc</a:t>
+            </a:r>
+            <a:r>
+              <a:rPr lang="pt-BR" sz="1600" dirty="0" smtClean="0"/>
+              <a:t> precisa rodar um </a:t>
+            </a:r>
+            <a:r>
+              <a:rPr lang="pt-BR" sz="1600" b="1" dirty="0" err="1" smtClean="0"/>
+              <a:t>docker</a:t>
+            </a:r>
+            <a:r>
+              <a:rPr lang="pt-BR" sz="1600" b="1" dirty="0" smtClean="0"/>
+              <a:t> </a:t>
+            </a:r>
+            <a:r>
+              <a:rPr lang="pt-BR" sz="1600" b="1" dirty="0" err="1" smtClean="0"/>
+              <a:t>inspect</a:t>
+            </a:r>
+            <a:r>
+              <a:rPr lang="pt-BR" sz="1600" b="1" dirty="0" smtClean="0"/>
+              <a:t> &lt;código container&gt; </a:t>
+            </a:r>
+            <a:r>
+              <a:rPr lang="pt-BR" sz="1600" dirty="0" smtClean="0"/>
+              <a:t>para verificar o “</a:t>
+            </a:r>
+            <a:r>
+              <a:rPr lang="pt-BR" sz="1600" dirty="0" err="1" smtClean="0"/>
+              <a:t>Mounts</a:t>
+            </a:r>
+            <a:r>
+              <a:rPr lang="pt-BR" sz="1600" dirty="0" smtClean="0"/>
+              <a:t>”</a:t>
+            </a:r>
+            <a:endParaRPr lang="pt-BR" sz="1600" b="1" dirty="0"/>
+          </a:p>
+        </p:txBody>
+      </p:sp>
+      <p:sp>
+        <p:nvSpPr>
+          <p:cNvPr id="7" name="Retângulo 6"/>
+          <p:cNvSpPr/>
+          <p:nvPr/>
+        </p:nvSpPr>
+        <p:spPr>
+          <a:xfrm>
+            <a:off x="1390918" y="3967106"/>
+            <a:ext cx="10775324" cy="2800767"/>
+          </a:xfrm>
+          <a:prstGeom prst="rect">
+            <a:avLst/>
+          </a:prstGeom>
+        </p:spPr>
+        <p:txBody>
+          <a:bodyPr wrap="square">
+            <a:spAutoFit/>
+          </a:bodyPr>
+          <a:lstStyle/>
+          <a:p>
+            <a:r>
+              <a:rPr lang="pt-BR" sz="1600" dirty="0">
+                <a:solidFill>
+                  <a:schemeClr val="accent5"/>
+                </a:solidFill>
+              </a:rPr>
+              <a:t>"</a:t>
+            </a:r>
+            <a:r>
+              <a:rPr lang="pt-BR" sz="1600" dirty="0" err="1">
+                <a:solidFill>
+                  <a:schemeClr val="accent5"/>
+                </a:solidFill>
+              </a:rPr>
+              <a:t>Mounts</a:t>
+            </a:r>
+            <a:r>
+              <a:rPr lang="pt-BR" sz="1600" dirty="0">
+                <a:solidFill>
+                  <a:schemeClr val="accent5"/>
+                </a:solidFill>
+              </a:rPr>
+              <a:t>": </a:t>
+            </a:r>
+            <a:r>
+              <a:rPr lang="pt-BR" sz="1600" dirty="0" smtClean="0">
+                <a:solidFill>
+                  <a:schemeClr val="accent5"/>
+                </a:solidFill>
+              </a:rPr>
+              <a:t>[{</a:t>
+            </a:r>
+            <a:endParaRPr lang="pt-BR" sz="1600" dirty="0">
+              <a:solidFill>
+                <a:schemeClr val="accent5"/>
+              </a:solidFill>
+            </a:endParaRPr>
+          </a:p>
+          <a:p>
+            <a:r>
+              <a:rPr lang="pt-BR" sz="1600" dirty="0">
+                <a:solidFill>
+                  <a:schemeClr val="accent5"/>
+                </a:solidFill>
+              </a:rPr>
+              <a:t>        "</a:t>
+            </a:r>
+            <a:r>
+              <a:rPr lang="pt-BR" sz="1600" dirty="0" err="1">
+                <a:solidFill>
+                  <a:schemeClr val="accent5"/>
+                </a:solidFill>
+              </a:rPr>
+              <a:t>Type</a:t>
+            </a:r>
+            <a:r>
+              <a:rPr lang="pt-BR" sz="1600" dirty="0">
+                <a:solidFill>
+                  <a:schemeClr val="accent5"/>
+                </a:solidFill>
+              </a:rPr>
+              <a:t>": "volume",</a:t>
+            </a:r>
+          </a:p>
+          <a:p>
+            <a:r>
+              <a:rPr lang="pt-BR" sz="1600" dirty="0">
+                <a:solidFill>
+                  <a:schemeClr val="accent5"/>
+                </a:solidFill>
+              </a:rPr>
+              <a:t>        "</a:t>
+            </a:r>
+            <a:r>
+              <a:rPr lang="pt-BR" sz="1600" dirty="0" err="1">
+                <a:solidFill>
+                  <a:schemeClr val="accent5"/>
+                </a:solidFill>
+              </a:rPr>
+              <a:t>Name</a:t>
+            </a:r>
+            <a:r>
+              <a:rPr lang="pt-BR" sz="1600" dirty="0">
+                <a:solidFill>
+                  <a:schemeClr val="accent5"/>
+                </a:solidFill>
+              </a:rPr>
+              <a:t>": "5e1cbfd48d07284680552e56087c9d5196659600ccd6874bfa3831b51ddd0576",</a:t>
+            </a:r>
+          </a:p>
+          <a:p>
+            <a:r>
+              <a:rPr lang="pt-BR" sz="1600" dirty="0">
+                <a:solidFill>
+                  <a:schemeClr val="accent5"/>
+                </a:solidFill>
+              </a:rPr>
+              <a:t>        "</a:t>
+            </a:r>
+            <a:r>
+              <a:rPr lang="pt-BR" sz="1600" dirty="0" err="1">
+                <a:solidFill>
+                  <a:schemeClr val="accent5"/>
+                </a:solidFill>
+              </a:rPr>
+              <a:t>Source</a:t>
+            </a:r>
+            <a:r>
+              <a:rPr lang="pt-BR" sz="1600" dirty="0">
+                <a:solidFill>
+                  <a:schemeClr val="accent5"/>
+                </a:solidFill>
+              </a:rPr>
+              <a:t>": "/var/</a:t>
+            </a:r>
+            <a:r>
+              <a:rPr lang="pt-BR" sz="1600" dirty="0" err="1">
+                <a:solidFill>
+                  <a:schemeClr val="accent5"/>
+                </a:solidFill>
+              </a:rPr>
+              <a:t>lib</a:t>
+            </a:r>
+            <a:r>
+              <a:rPr lang="pt-BR" sz="1600" dirty="0">
+                <a:solidFill>
+                  <a:schemeClr val="accent5"/>
+                </a:solidFill>
+              </a:rPr>
+              <a:t>/</a:t>
+            </a:r>
+            <a:r>
+              <a:rPr lang="pt-BR" sz="1600" dirty="0" err="1">
+                <a:solidFill>
+                  <a:schemeClr val="accent5"/>
+                </a:solidFill>
+              </a:rPr>
+              <a:t>docker</a:t>
+            </a:r>
+            <a:r>
+              <a:rPr lang="pt-BR" sz="1600" dirty="0">
+                <a:solidFill>
+                  <a:schemeClr val="accent5"/>
+                </a:solidFill>
+              </a:rPr>
+              <a:t>/volumes/5e1cbfd48d07284680552e56087c9d5196659600ccd6874bfa3831b51ddd0576/_data",</a:t>
+            </a:r>
+          </a:p>
+          <a:p>
+            <a:r>
+              <a:rPr lang="pt-BR" sz="1600" dirty="0">
+                <a:solidFill>
+                  <a:schemeClr val="accent5"/>
+                </a:solidFill>
+              </a:rPr>
+              <a:t>        "</a:t>
+            </a:r>
+            <a:r>
+              <a:rPr lang="pt-BR" sz="1600" dirty="0" err="1">
+                <a:solidFill>
+                  <a:schemeClr val="accent5"/>
+                </a:solidFill>
+              </a:rPr>
+              <a:t>Destination</a:t>
+            </a:r>
+            <a:r>
+              <a:rPr lang="pt-BR" sz="1600" dirty="0">
+                <a:solidFill>
+                  <a:schemeClr val="accent5"/>
+                </a:solidFill>
+              </a:rPr>
+              <a:t>": "/var/</a:t>
+            </a:r>
+            <a:r>
+              <a:rPr lang="pt-BR" sz="1600" dirty="0" err="1">
+                <a:solidFill>
+                  <a:schemeClr val="accent5"/>
+                </a:solidFill>
+              </a:rPr>
+              <a:t>www</a:t>
+            </a:r>
+            <a:r>
+              <a:rPr lang="pt-BR" sz="1600" dirty="0">
+                <a:solidFill>
+                  <a:schemeClr val="accent5"/>
+                </a:solidFill>
+              </a:rPr>
+              <a:t>",</a:t>
+            </a:r>
+          </a:p>
+          <a:p>
+            <a:r>
+              <a:rPr lang="pt-BR" sz="1600" dirty="0">
+                <a:solidFill>
+                  <a:schemeClr val="accent5"/>
+                </a:solidFill>
+              </a:rPr>
+              <a:t>        "Driver": "local",</a:t>
+            </a:r>
+          </a:p>
+          <a:p>
+            <a:r>
+              <a:rPr lang="pt-BR" sz="1600" dirty="0">
+                <a:solidFill>
+                  <a:schemeClr val="accent5"/>
+                </a:solidFill>
+              </a:rPr>
+              <a:t>        "</a:t>
+            </a:r>
+            <a:r>
+              <a:rPr lang="pt-BR" sz="1600" dirty="0" err="1">
+                <a:solidFill>
+                  <a:schemeClr val="accent5"/>
+                </a:solidFill>
+              </a:rPr>
+              <a:t>Mode</a:t>
+            </a:r>
+            <a:r>
+              <a:rPr lang="pt-BR" sz="1600" dirty="0">
+                <a:solidFill>
+                  <a:schemeClr val="accent5"/>
+                </a:solidFill>
+              </a:rPr>
+              <a:t>": "",</a:t>
+            </a:r>
+          </a:p>
+          <a:p>
+            <a:r>
+              <a:rPr lang="pt-BR" sz="1600" dirty="0">
+                <a:solidFill>
+                  <a:schemeClr val="accent5"/>
+                </a:solidFill>
+              </a:rPr>
+              <a:t>        "RW": </a:t>
+            </a:r>
+            <a:r>
+              <a:rPr lang="pt-BR" sz="1600" dirty="0" err="1">
+                <a:solidFill>
+                  <a:schemeClr val="accent5"/>
+                </a:solidFill>
+              </a:rPr>
+              <a:t>true</a:t>
+            </a:r>
+            <a:r>
+              <a:rPr lang="pt-BR" sz="1600" dirty="0">
+                <a:solidFill>
+                  <a:schemeClr val="accent5"/>
+                </a:solidFill>
+              </a:rPr>
+              <a:t>,</a:t>
+            </a:r>
+          </a:p>
+          <a:p>
+            <a:r>
+              <a:rPr lang="pt-BR" sz="1600" dirty="0">
+                <a:solidFill>
+                  <a:schemeClr val="accent5"/>
+                </a:solidFill>
+              </a:rPr>
+              <a:t>        "</a:t>
+            </a:r>
+            <a:r>
+              <a:rPr lang="pt-BR" sz="1600" dirty="0" err="1">
+                <a:solidFill>
+                  <a:schemeClr val="accent5"/>
+                </a:solidFill>
+              </a:rPr>
+              <a:t>Propagation</a:t>
+            </a:r>
+            <a:r>
+              <a:rPr lang="pt-BR" sz="1600" dirty="0">
+                <a:solidFill>
+                  <a:schemeClr val="accent5"/>
+                </a:solidFill>
+              </a:rPr>
+              <a:t>": ""</a:t>
+            </a:r>
+          </a:p>
+          <a:p>
+            <a:r>
+              <a:rPr lang="pt-BR" sz="1600" dirty="0">
+                <a:solidFill>
+                  <a:schemeClr val="accent5"/>
+                </a:solidFill>
+              </a:rPr>
+              <a:t>    }</a:t>
+            </a:r>
+          </a:p>
+          <a:p>
+            <a:r>
+              <a:rPr lang="pt-BR" sz="1600" dirty="0">
+                <a:solidFill>
+                  <a:schemeClr val="accent5"/>
+                </a:solidFill>
+              </a:rPr>
+              <a:t>]</a:t>
+            </a:r>
           </a:p>
         </p:txBody>
       </p:sp>
     </p:spTree>
     <p:extLst>
       <p:ext uri="{BB962C8B-B14F-4D97-AF65-F5344CB8AC3E}">
-        <p14:creationId xmlns:p14="http://schemas.microsoft.com/office/powerpoint/2010/main" val="517489975"/>
+        <p14:creationId xmlns:p14="http://schemas.microsoft.com/office/powerpoint/2010/main" val="3985672435"/>
       </p:ext>
     </p:extLst>
   </p:cSld>
   <p:clrMapOvr>
     <a:masterClrMapping/>
   </p:clrMapOvr>
+  <p:timing>
+    <p:tnLst>
+      <p:par>
+        <p:cTn id="1" dur="indefinite" restart="never" nodeType="tmRoot"/>
+      </p:par>
+    </p:tnLst>
+  </p:timing>
 </p:sld>
 </file>
 
@@ -6529,18 +7074,30 @@
             <p:ph type="title"/>
           </p:nvPr>
         </p:nvSpPr>
-        <p:spPr/>
-        <p:txBody>
-          <a:bodyPr/>
+        <p:spPr>
+          <a:xfrm>
+            <a:off x="115910" y="123288"/>
+            <a:ext cx="11951594" cy="422275"/>
+          </a:xfrm>
+        </p:spPr>
+        <p:txBody>
+          <a:bodyPr vert="horz" lIns="91440" tIns="45720" rIns="91440" bIns="45720" rtlCol="0" anchor="ctr">
+            <a:normAutofit fontScale="90000"/>
+          </a:bodyPr>
           <a:lstStyle/>
           <a:p>
-            <a:endParaRPr lang="pt-BR"/>
-          </a:p>
-        </p:txBody>
-      </p:sp>
-      <p:sp>
-        <p:nvSpPr>
-          <p:cNvPr id="3" name="Espaço Reservado para Conteúdo 2"/>
+            <a:pPr algn="ctr"/>
+            <a:r>
+              <a:rPr lang="pt-BR" sz="2800" b="1" dirty="0" smtClean="0"/>
+              <a:t>Volumes</a:t>
+            </a:r>
+            <a:endParaRPr lang="pt-BR" sz="2800" b="1" dirty="0"/>
+          </a:p>
+        </p:txBody>
+      </p:sp>
+      <p:sp>
+        <p:nvSpPr>
+          <p:cNvPr id="5" name="Espaço Reservado para Conteúdo 4"/>
           <p:cNvSpPr>
             <a:spLocks noGrp="1"/>
           </p:cNvSpPr>
@@ -6548,25 +7105,521 @@
             <p:ph idx="1"/>
           </p:nvPr>
         </p:nvSpPr>
-        <p:spPr/>
-        <p:txBody>
-          <a:bodyPr/>
+        <p:spPr>
+          <a:xfrm>
+            <a:off x="241478" y="545562"/>
+            <a:ext cx="11259355" cy="5700691"/>
+          </a:xfrm>
+        </p:spPr>
+        <p:txBody>
+          <a:bodyPr>
+            <a:noAutofit/>
+          </a:bodyPr>
           <a:lstStyle/>
           <a:p>
-            <a:endParaRPr lang="pt-BR"/>
+            <a:r>
+              <a:rPr lang="pt-BR" sz="2000" dirty="0" smtClean="0"/>
+              <a:t>A pasta que é gerada no </a:t>
+            </a:r>
+            <a:r>
+              <a:rPr lang="pt-BR" sz="2000" dirty="0" err="1" smtClean="0"/>
+              <a:t>Docker</a:t>
+            </a:r>
+            <a:r>
+              <a:rPr lang="pt-BR" sz="2000" dirty="0" smtClean="0"/>
+              <a:t> Host pode ser configurada</a:t>
+            </a:r>
+          </a:p>
+          <a:p>
+            <a:endParaRPr lang="pt-BR" sz="2000" b="1" dirty="0"/>
+          </a:p>
+          <a:p>
+            <a:pPr lvl="1">
+              <a:buFont typeface="Wingdings" panose="05000000000000000000" pitchFamily="2" charset="2"/>
+              <a:buChar char="Ø"/>
+            </a:pPr>
+            <a:r>
+              <a:rPr lang="en-US" sz="2000" dirty="0" err="1">
+                <a:solidFill>
+                  <a:schemeClr val="accent5"/>
+                </a:solidFill>
+              </a:rPr>
+              <a:t>docker</a:t>
+            </a:r>
+            <a:r>
+              <a:rPr lang="en-US" sz="2000" dirty="0">
+                <a:solidFill>
+                  <a:schemeClr val="accent5"/>
+                </a:solidFill>
+              </a:rPr>
+              <a:t> run -it -v "C:\</a:t>
+            </a:r>
+            <a:r>
+              <a:rPr lang="en-US" sz="2000" dirty="0" smtClean="0">
+                <a:solidFill>
+                  <a:schemeClr val="accent5"/>
+                </a:solidFill>
+              </a:rPr>
+              <a:t>Users\Luciano\Desktop</a:t>
+            </a:r>
+            <a:r>
+              <a:rPr lang="en-US" sz="2000" dirty="0">
+                <a:solidFill>
+                  <a:schemeClr val="accent5"/>
+                </a:solidFill>
+              </a:rPr>
+              <a:t>:/var/www" </a:t>
+            </a:r>
+            <a:r>
+              <a:rPr lang="en-US" sz="2000" dirty="0" err="1">
+                <a:solidFill>
+                  <a:schemeClr val="accent5"/>
+                </a:solidFill>
+              </a:rPr>
+              <a:t>ubuntu</a:t>
+            </a:r>
+            <a:endParaRPr lang="en-US" sz="2000" dirty="0">
+              <a:solidFill>
+                <a:schemeClr val="accent5"/>
+              </a:solidFill>
+            </a:endParaRPr>
+          </a:p>
+          <a:p>
+            <a:pPr lvl="1">
+              <a:buFont typeface="Wingdings" panose="05000000000000000000" pitchFamily="2" charset="2"/>
+              <a:buChar char="Ø"/>
+            </a:pPr>
+            <a:r>
+              <a:rPr lang="en-US" sz="2000" dirty="0">
+                <a:solidFill>
+                  <a:schemeClr val="accent5"/>
+                </a:solidFill>
+              </a:rPr>
+              <a:t>root@abd0286c0083</a:t>
+            </a:r>
+            <a:r>
+              <a:rPr lang="en-US" sz="2000" dirty="0" smtClean="0">
+                <a:solidFill>
+                  <a:schemeClr val="accent5"/>
+                </a:solidFill>
+              </a:rPr>
+              <a:t>:/#</a:t>
+            </a:r>
+          </a:p>
+          <a:p>
+            <a:pPr lvl="1">
+              <a:buFont typeface="Wingdings" panose="05000000000000000000" pitchFamily="2" charset="2"/>
+              <a:buChar char="Ø"/>
+            </a:pPr>
+            <a:endParaRPr lang="en-US" sz="2000" dirty="0">
+              <a:solidFill>
+                <a:schemeClr val="accent5"/>
+              </a:solidFill>
+            </a:endParaRPr>
+          </a:p>
+          <a:p>
+            <a:pPr lvl="1">
+              <a:buFont typeface="Wingdings" panose="05000000000000000000" pitchFamily="2" charset="2"/>
+              <a:buChar char="Ø"/>
+            </a:pPr>
+            <a:endParaRPr lang="en-US" sz="2000" dirty="0">
+              <a:solidFill>
+                <a:schemeClr val="accent5"/>
+              </a:solidFill>
+            </a:endParaRPr>
+          </a:p>
+          <a:p>
+            <a:pPr lvl="1">
+              <a:buFont typeface="Wingdings" panose="05000000000000000000" pitchFamily="2" charset="2"/>
+              <a:buChar char="Ø"/>
+            </a:pPr>
+            <a:r>
+              <a:rPr lang="pt-BR" sz="2000" dirty="0">
+                <a:solidFill>
+                  <a:schemeClr val="accent5"/>
+                </a:solidFill>
+              </a:rPr>
+              <a:t>root@6ec39d5e9175:/# </a:t>
+            </a:r>
+            <a:r>
+              <a:rPr lang="pt-BR" sz="2000" dirty="0" err="1">
+                <a:solidFill>
+                  <a:schemeClr val="accent5"/>
+                </a:solidFill>
+              </a:rPr>
+              <a:t>cd</a:t>
+            </a:r>
+            <a:r>
+              <a:rPr lang="pt-BR" sz="2000" dirty="0">
+                <a:solidFill>
+                  <a:schemeClr val="accent5"/>
+                </a:solidFill>
+              </a:rPr>
+              <a:t> /var/</a:t>
+            </a:r>
+            <a:r>
+              <a:rPr lang="pt-BR" sz="2000" dirty="0" err="1">
+                <a:solidFill>
+                  <a:schemeClr val="accent5"/>
+                </a:solidFill>
+              </a:rPr>
+              <a:t>www</a:t>
+            </a:r>
+            <a:r>
+              <a:rPr lang="pt-BR" sz="2000" dirty="0">
+                <a:solidFill>
+                  <a:schemeClr val="accent5"/>
+                </a:solidFill>
+              </a:rPr>
+              <a:t>/</a:t>
+            </a:r>
+          </a:p>
+          <a:p>
+            <a:pPr lvl="1">
+              <a:buFont typeface="Wingdings" panose="05000000000000000000" pitchFamily="2" charset="2"/>
+              <a:buChar char="Ø"/>
+            </a:pPr>
+            <a:r>
+              <a:rPr lang="pt-BR" sz="2000" dirty="0">
+                <a:solidFill>
+                  <a:schemeClr val="accent5"/>
+                </a:solidFill>
+              </a:rPr>
+              <a:t>root@6ec39d5e9175 </a:t>
+            </a:r>
+            <a:r>
+              <a:rPr lang="pt-BR" sz="2000" dirty="0" smtClean="0">
+                <a:solidFill>
+                  <a:schemeClr val="accent5"/>
+                </a:solidFill>
+              </a:rPr>
+              <a:t>:/</a:t>
+            </a:r>
+            <a:r>
+              <a:rPr lang="pt-BR" sz="2000" dirty="0">
+                <a:solidFill>
+                  <a:schemeClr val="accent5"/>
+                </a:solidFill>
+              </a:rPr>
+              <a:t>var/</a:t>
+            </a:r>
+            <a:r>
+              <a:rPr lang="pt-BR" sz="2000" dirty="0" err="1">
+                <a:solidFill>
+                  <a:schemeClr val="accent5"/>
+                </a:solidFill>
+              </a:rPr>
+              <a:t>www</a:t>
+            </a:r>
+            <a:r>
+              <a:rPr lang="pt-BR" sz="2000" dirty="0">
+                <a:solidFill>
+                  <a:schemeClr val="accent5"/>
+                </a:solidFill>
+              </a:rPr>
+              <a:t># </a:t>
+            </a:r>
+            <a:r>
+              <a:rPr lang="pt-BR" sz="2000" dirty="0" err="1">
+                <a:solidFill>
+                  <a:schemeClr val="accent5"/>
+                </a:solidFill>
+              </a:rPr>
+              <a:t>touch</a:t>
+            </a:r>
+            <a:r>
+              <a:rPr lang="pt-BR" sz="2000" dirty="0">
+                <a:solidFill>
+                  <a:schemeClr val="accent5"/>
+                </a:solidFill>
+              </a:rPr>
+              <a:t> </a:t>
+            </a:r>
+            <a:r>
+              <a:rPr lang="pt-BR" sz="2000" dirty="0" smtClean="0">
+                <a:solidFill>
+                  <a:schemeClr val="accent5"/>
+                </a:solidFill>
+              </a:rPr>
+              <a:t>arquivo1.txt</a:t>
+            </a:r>
+            <a:endParaRPr lang="pt-BR" sz="2000" dirty="0">
+              <a:solidFill>
+                <a:schemeClr val="accent5"/>
+              </a:solidFill>
+            </a:endParaRPr>
+          </a:p>
+          <a:p>
+            <a:pPr lvl="1">
+              <a:buFont typeface="Wingdings" panose="05000000000000000000" pitchFamily="2" charset="2"/>
+              <a:buChar char="Ø"/>
+            </a:pPr>
+            <a:r>
+              <a:rPr lang="pt-BR" sz="2000" dirty="0" smtClean="0">
+                <a:solidFill>
+                  <a:schemeClr val="accent5"/>
+                </a:solidFill>
+              </a:rPr>
+              <a:t>root@6ec39d5e9175 :/</a:t>
+            </a:r>
+            <a:r>
+              <a:rPr lang="pt-BR" sz="2000" dirty="0">
+                <a:solidFill>
+                  <a:schemeClr val="accent5"/>
+                </a:solidFill>
+              </a:rPr>
+              <a:t>var/</a:t>
+            </a:r>
+            <a:r>
+              <a:rPr lang="pt-BR" sz="2000" dirty="0" err="1">
+                <a:solidFill>
+                  <a:schemeClr val="accent5"/>
+                </a:solidFill>
+              </a:rPr>
+              <a:t>www</a:t>
+            </a:r>
+            <a:r>
+              <a:rPr lang="pt-BR" sz="2000" dirty="0">
+                <a:solidFill>
+                  <a:schemeClr val="accent5"/>
+                </a:solidFill>
+              </a:rPr>
+              <a:t># </a:t>
+            </a:r>
+            <a:r>
+              <a:rPr lang="pt-BR" sz="2000" dirty="0" err="1">
+                <a:solidFill>
+                  <a:schemeClr val="accent5"/>
+                </a:solidFill>
+              </a:rPr>
+              <a:t>echo</a:t>
+            </a:r>
+            <a:r>
+              <a:rPr lang="pt-BR" sz="2000" dirty="0">
+                <a:solidFill>
+                  <a:schemeClr val="accent5"/>
+                </a:solidFill>
+              </a:rPr>
+              <a:t> "Este arquivo foi criado dentro de um volume" &gt; </a:t>
+            </a:r>
+            <a:r>
+              <a:rPr lang="pt-BR" sz="2000" dirty="0" smtClean="0">
+                <a:solidFill>
+                  <a:schemeClr val="accent5"/>
+                </a:solidFill>
+              </a:rPr>
+              <a:t>arquivo1.txt</a:t>
+            </a:r>
+          </a:p>
+          <a:p>
+            <a:pPr lvl="1">
+              <a:buFont typeface="Wingdings" panose="05000000000000000000" pitchFamily="2" charset="2"/>
+              <a:buChar char="Ø"/>
+            </a:pPr>
+            <a:endParaRPr lang="pt-BR" sz="2000" dirty="0">
+              <a:solidFill>
+                <a:schemeClr val="accent5"/>
+              </a:solidFill>
+            </a:endParaRPr>
+          </a:p>
+          <a:p>
+            <a:pPr marL="228600" lvl="1">
+              <a:spcBef>
+                <a:spcPts val="1000"/>
+              </a:spcBef>
+            </a:pPr>
+            <a:r>
+              <a:rPr lang="pt-BR" sz="2000" dirty="0" smtClean="0"/>
+              <a:t>Detalhe Importante: Se você estiver rodando no </a:t>
+            </a:r>
+            <a:r>
+              <a:rPr lang="pt-BR" sz="2000" dirty="0" err="1" smtClean="0"/>
+              <a:t>Docker</a:t>
+            </a:r>
+            <a:r>
+              <a:rPr lang="pt-BR" sz="2000" dirty="0" smtClean="0"/>
+              <a:t> Toolbox</a:t>
+            </a:r>
+          </a:p>
+          <a:p>
+            <a:pPr marL="685800" lvl="2">
+              <a:spcBef>
+                <a:spcPts val="1000"/>
+              </a:spcBef>
+            </a:pPr>
+            <a:endParaRPr lang="pt-BR" sz="1600" dirty="0" smtClean="0"/>
+          </a:p>
+          <a:p>
+            <a:pPr lvl="1">
+              <a:buFont typeface="Wingdings" panose="05000000000000000000" pitchFamily="2" charset="2"/>
+              <a:buChar char="Ø"/>
+            </a:pPr>
+            <a:r>
+              <a:rPr lang="pt-BR" sz="2000" dirty="0" smtClean="0">
+                <a:solidFill>
+                  <a:schemeClr val="accent5"/>
+                </a:solidFill>
+              </a:rPr>
+              <a:t> </a:t>
+            </a:r>
+            <a:r>
+              <a:rPr lang="pt-BR" sz="2000" dirty="0" err="1">
+                <a:solidFill>
+                  <a:schemeClr val="accent5"/>
+                </a:solidFill>
+              </a:rPr>
+              <a:t>docker</a:t>
+            </a:r>
+            <a:r>
+              <a:rPr lang="pt-BR" sz="2000" dirty="0">
+                <a:solidFill>
+                  <a:schemeClr val="accent5"/>
+                </a:solidFill>
+              </a:rPr>
+              <a:t> </a:t>
+            </a:r>
+            <a:r>
+              <a:rPr lang="pt-BR" sz="2000" dirty="0" err="1">
+                <a:solidFill>
+                  <a:schemeClr val="accent5"/>
+                </a:solidFill>
+              </a:rPr>
+              <a:t>run</a:t>
+            </a:r>
+            <a:r>
+              <a:rPr lang="pt-BR" sz="2000" dirty="0">
+                <a:solidFill>
+                  <a:schemeClr val="accent5"/>
+                </a:solidFill>
+              </a:rPr>
+              <a:t> -it -v "//</a:t>
+            </a:r>
+            <a:r>
+              <a:rPr lang="pt-BR" sz="2000" dirty="0">
+                <a:solidFill>
+                  <a:schemeClr val="accent5"/>
+                </a:solidFill>
+              </a:rPr>
+              <a:t>c/</a:t>
+            </a:r>
+            <a:r>
+              <a:rPr lang="pt-BR" sz="2000" dirty="0" err="1">
+                <a:solidFill>
+                  <a:schemeClr val="accent5"/>
+                </a:solidFill>
+              </a:rPr>
+              <a:t>Users</a:t>
+            </a:r>
+            <a:r>
+              <a:rPr lang="pt-BR" sz="2000" dirty="0">
+                <a:solidFill>
+                  <a:schemeClr val="accent5"/>
+                </a:solidFill>
+              </a:rPr>
+              <a:t>/Luciano/Desktop</a:t>
+            </a:r>
+            <a:r>
+              <a:rPr lang="pt-BR" sz="2000" dirty="0">
+                <a:solidFill>
+                  <a:schemeClr val="accent5"/>
+                </a:solidFill>
+              </a:rPr>
+              <a:t>:/var/</a:t>
+            </a:r>
+            <a:r>
+              <a:rPr lang="pt-BR" sz="2000" dirty="0" err="1">
+                <a:solidFill>
+                  <a:schemeClr val="accent5"/>
+                </a:solidFill>
+              </a:rPr>
+              <a:t>www</a:t>
+            </a:r>
+            <a:r>
+              <a:rPr lang="pt-BR" sz="2000" dirty="0">
+                <a:solidFill>
+                  <a:schemeClr val="accent5"/>
+                </a:solidFill>
+              </a:rPr>
+              <a:t>" </a:t>
+            </a:r>
+            <a:r>
+              <a:rPr lang="pt-BR" sz="2000" dirty="0" err="1" smtClean="0">
+                <a:solidFill>
+                  <a:schemeClr val="accent5"/>
+                </a:solidFill>
+              </a:rPr>
+              <a:t>ubuntu</a:t>
+            </a:r>
+            <a:endParaRPr lang="pt-BR" sz="2000" dirty="0" smtClean="0">
+              <a:solidFill>
+                <a:schemeClr val="accent5"/>
+              </a:solidFill>
+            </a:endParaRPr>
+          </a:p>
+          <a:p>
+            <a:pPr lvl="2"/>
+            <a:r>
+              <a:rPr lang="pt-BR" sz="1600" dirty="0" smtClean="0"/>
+              <a:t>(</a:t>
+            </a:r>
+            <a:r>
+              <a:rPr lang="pt-BR" sz="1600" dirty="0">
+                <a:hlinkClick r:id="rId2"/>
+              </a:rPr>
+              <a:t>https://medium.com/@</a:t>
+            </a:r>
+            <a:r>
+              <a:rPr lang="pt-BR" sz="1600" dirty="0" smtClean="0">
+                <a:hlinkClick r:id="rId2"/>
+              </a:rPr>
+              <a:t>Charles_Stover/fixing-volumes-in-docker-toolbox-4ad5ace0e572</a:t>
+            </a:r>
+            <a:r>
+              <a:rPr lang="pt-BR" sz="1600" dirty="0" smtClean="0"/>
+              <a:t> ) </a:t>
+            </a:r>
+          </a:p>
+          <a:p>
+            <a:pPr lvl="2">
+              <a:buFont typeface="Wingdings" panose="05000000000000000000" pitchFamily="2" charset="2"/>
+              <a:buChar char="Ø"/>
+            </a:pPr>
+            <a:endParaRPr lang="pt-BR" sz="1600" dirty="0">
+              <a:solidFill>
+                <a:schemeClr val="accent5"/>
+              </a:solidFill>
+            </a:endParaRPr>
+          </a:p>
+          <a:p>
+            <a:pPr>
+              <a:buFont typeface="Wingdings" panose="05000000000000000000" pitchFamily="2" charset="2"/>
+              <a:buChar char="Ø"/>
+            </a:pPr>
+            <a:endParaRPr lang="pt-BR" sz="2400" dirty="0">
+              <a:solidFill>
+                <a:schemeClr val="accent5"/>
+              </a:solidFill>
+            </a:endParaRPr>
           </a:p>
         </p:txBody>
       </p:sp>
     </p:spTree>
     <p:extLst>
       <p:ext uri="{BB962C8B-B14F-4D97-AF65-F5344CB8AC3E}">
-        <p14:creationId xmlns:p14="http://schemas.microsoft.com/office/powerpoint/2010/main" val="2333415383"/>
+        <p14:creationId xmlns:p14="http://schemas.microsoft.com/office/powerpoint/2010/main" val="2857905960"/>
       </p:ext>
     </p:extLst>
   </p:cSld>
   <p:clrMapOvr>
     <a:masterClrMapping/>
   </p:clrMapOvr>
+  <p:timing>
+    <p:tnLst>
+      <p:par>
+        <p:cTn id="1" dur="indefinite" restart="never" nodeType="tmRoot"/>
+      </p:par>
+    </p:tnLst>
+  </p:timing>
 </p:sld>
 </file>
 
@@ -6628,7 +7681,7 @@
     </p:spTree>
     <p:extLst>
       <p:ext uri="{BB962C8B-B14F-4D97-AF65-F5344CB8AC3E}">
-        <p14:creationId xmlns:p14="http://schemas.microsoft.com/office/powerpoint/2010/main" val="3094957484"/>
+        <p14:creationId xmlns:p14="http://schemas.microsoft.com/office/powerpoint/2010/main" val="517489975"/>
       </p:ext>
     </p:extLst>
   </p:cSld>
@@ -6798,6 +7851,142 @@
 </file>
 
 <file path=ppt/slides/slide20.xml><?xml version="1.0" encoding="utf-8"?>
+<p:sld xmlns:a="http://schemas.openxmlformats.org/drawingml/2006/main" xmlns:r="http://schemas.openxmlformats.org/officeDocument/2006/relationships" xmlns:p="http://schemas.openxmlformats.org/presentationml/2006/main">
+  <p:cSld>
+    <p:spTree>
+      <p:nvGrpSpPr>
+        <p:cNvPr id="1" name=""/>
+        <p:cNvGrpSpPr/>
+        <p:nvPr/>
+      </p:nvGrpSpPr>
+      <p:grpSpPr>
+        <a:xfrm>
+          <a:off x="0" y="0"/>
+          <a:ext cx="0" cy="0"/>
+          <a:chOff x="0" y="0"/>
+          <a:chExt cx="0" cy="0"/>
+        </a:xfrm>
+      </p:grpSpPr>
+      <p:sp>
+        <p:nvSpPr>
+          <p:cNvPr id="2" name="Título 1"/>
+          <p:cNvSpPr>
+            <a:spLocks noGrp="1"/>
+          </p:cNvSpPr>
+          <p:nvPr>
+            <p:ph type="title"/>
+          </p:nvPr>
+        </p:nvSpPr>
+        <p:spPr/>
+        <p:txBody>
+          <a:bodyPr/>
+          <a:lstStyle/>
+          <a:p>
+            <a:endParaRPr lang="pt-BR"/>
+          </a:p>
+        </p:txBody>
+      </p:sp>
+      <p:sp>
+        <p:nvSpPr>
+          <p:cNvPr id="3" name="Espaço Reservado para Conteúdo 2"/>
+          <p:cNvSpPr>
+            <a:spLocks noGrp="1"/>
+          </p:cNvSpPr>
+          <p:nvPr>
+            <p:ph idx="1"/>
+          </p:nvPr>
+        </p:nvSpPr>
+        <p:spPr/>
+        <p:txBody>
+          <a:bodyPr/>
+          <a:lstStyle/>
+          <a:p>
+            <a:endParaRPr lang="pt-BR"/>
+          </a:p>
+        </p:txBody>
+      </p:sp>
+    </p:spTree>
+    <p:extLst>
+      <p:ext uri="{BB962C8B-B14F-4D97-AF65-F5344CB8AC3E}">
+        <p14:creationId xmlns:p14="http://schemas.microsoft.com/office/powerpoint/2010/main" val="2333415383"/>
+      </p:ext>
+    </p:extLst>
+  </p:cSld>
+  <p:clrMapOvr>
+    <a:masterClrMapping/>
+  </p:clrMapOvr>
+</p:sld>
+</file>
+
+<file path=ppt/slides/slide21.xml><?xml version="1.0" encoding="utf-8"?>
+<p:sld xmlns:a="http://schemas.openxmlformats.org/drawingml/2006/main" xmlns:r="http://schemas.openxmlformats.org/officeDocument/2006/relationships" xmlns:p="http://schemas.openxmlformats.org/presentationml/2006/main">
+  <p:cSld>
+    <p:spTree>
+      <p:nvGrpSpPr>
+        <p:cNvPr id="1" name=""/>
+        <p:cNvGrpSpPr/>
+        <p:nvPr/>
+      </p:nvGrpSpPr>
+      <p:grpSpPr>
+        <a:xfrm>
+          <a:off x="0" y="0"/>
+          <a:ext cx="0" cy="0"/>
+          <a:chOff x="0" y="0"/>
+          <a:chExt cx="0" cy="0"/>
+        </a:xfrm>
+      </p:grpSpPr>
+      <p:sp>
+        <p:nvSpPr>
+          <p:cNvPr id="2" name="Título 1"/>
+          <p:cNvSpPr>
+            <a:spLocks noGrp="1"/>
+          </p:cNvSpPr>
+          <p:nvPr>
+            <p:ph type="title"/>
+          </p:nvPr>
+        </p:nvSpPr>
+        <p:spPr/>
+        <p:txBody>
+          <a:bodyPr/>
+          <a:lstStyle/>
+          <a:p>
+            <a:endParaRPr lang="pt-BR"/>
+          </a:p>
+        </p:txBody>
+      </p:sp>
+      <p:sp>
+        <p:nvSpPr>
+          <p:cNvPr id="3" name="Espaço Reservado para Conteúdo 2"/>
+          <p:cNvSpPr>
+            <a:spLocks noGrp="1"/>
+          </p:cNvSpPr>
+          <p:nvPr>
+            <p:ph idx="1"/>
+          </p:nvPr>
+        </p:nvSpPr>
+        <p:spPr/>
+        <p:txBody>
+          <a:bodyPr/>
+          <a:lstStyle/>
+          <a:p>
+            <a:endParaRPr lang="pt-BR"/>
+          </a:p>
+        </p:txBody>
+      </p:sp>
+    </p:spTree>
+    <p:extLst>
+      <p:ext uri="{BB962C8B-B14F-4D97-AF65-F5344CB8AC3E}">
+        <p14:creationId xmlns:p14="http://schemas.microsoft.com/office/powerpoint/2010/main" val="3094957484"/>
+      </p:ext>
+    </p:extLst>
+  </p:cSld>
+  <p:clrMapOvr>
+    <a:masterClrMapping/>
+  </p:clrMapOvr>
+</p:sld>
+</file>
+
+<file path=ppt/slides/slide22.xml><?xml version="1.0" encoding="utf-8"?>
 <p:sld xmlns:a="http://schemas.openxmlformats.org/drawingml/2006/main" xmlns:r="http://schemas.openxmlformats.org/officeDocument/2006/relationships" xmlns:p="http://schemas.openxmlformats.org/presentationml/2006/main">
   <p:cSld>
     <p:spTree>

</xml_diff>

<commit_message>
Exemplos com Volumes e execução de Containers
</commit_message>
<xml_diff>
--- a/docs/docker-resumo.pptx
+++ b/docs/docker-resumo.pptx
@@ -23,10 +23,16 @@
     <p:sldId id="294" r:id="rId17"/>
     <p:sldId id="301" r:id="rId18"/>
     <p:sldId id="302" r:id="rId19"/>
-    <p:sldId id="281" r:id="rId20"/>
-    <p:sldId id="280" r:id="rId21"/>
-    <p:sldId id="284" r:id="rId22"/>
-    <p:sldId id="285" r:id="rId23"/>
+    <p:sldId id="303" r:id="rId20"/>
+    <p:sldId id="281" r:id="rId21"/>
+    <p:sldId id="306" r:id="rId22"/>
+    <p:sldId id="304" r:id="rId23"/>
+    <p:sldId id="307" r:id="rId24"/>
+    <p:sldId id="305" r:id="rId25"/>
+    <p:sldId id="308" r:id="rId26"/>
+    <p:sldId id="280" r:id="rId27"/>
+    <p:sldId id="284" r:id="rId28"/>
+    <p:sldId id="285" r:id="rId29"/>
   </p:sldIdLst>
   <p:sldSz cx="12192000" cy="6858000"/>
   <p:notesSz cx="6858000" cy="9144000"/>
@@ -262,7 +268,7 @@
           <a:p>
             <a:fld id="{CC58B075-67F8-4A8D-AE1C-3D3E4193EBCA}" type="datetimeFigureOut">
               <a:rPr lang="pt-BR" smtClean="0"/>
-              <a:t>23/09/2019</a:t>
+              <a:t>09/10/2019</a:t>
             </a:fld>
             <a:endParaRPr lang="pt-BR"/>
           </a:p>
@@ -430,7 +436,7 @@
           <a:p>
             <a:fld id="{CC58B075-67F8-4A8D-AE1C-3D3E4193EBCA}" type="datetimeFigureOut">
               <a:rPr lang="pt-BR" smtClean="0"/>
-              <a:t>23/09/2019</a:t>
+              <a:t>09/10/2019</a:t>
             </a:fld>
             <a:endParaRPr lang="pt-BR"/>
           </a:p>
@@ -608,7 +614,7 @@
           <a:p>
             <a:fld id="{CC58B075-67F8-4A8D-AE1C-3D3E4193EBCA}" type="datetimeFigureOut">
               <a:rPr lang="pt-BR" smtClean="0"/>
-              <a:t>23/09/2019</a:t>
+              <a:t>09/10/2019</a:t>
             </a:fld>
             <a:endParaRPr lang="pt-BR"/>
           </a:p>
@@ -776,7 +782,7 @@
           <a:p>
             <a:fld id="{CC58B075-67F8-4A8D-AE1C-3D3E4193EBCA}" type="datetimeFigureOut">
               <a:rPr lang="pt-BR" smtClean="0"/>
-              <a:t>23/09/2019</a:t>
+              <a:t>09/10/2019</a:t>
             </a:fld>
             <a:endParaRPr lang="pt-BR"/>
           </a:p>
@@ -1021,7 +1027,7 @@
           <a:p>
             <a:fld id="{CC58B075-67F8-4A8D-AE1C-3D3E4193EBCA}" type="datetimeFigureOut">
               <a:rPr lang="pt-BR" smtClean="0"/>
-              <a:t>23/09/2019</a:t>
+              <a:t>09/10/2019</a:t>
             </a:fld>
             <a:endParaRPr lang="pt-BR"/>
           </a:p>
@@ -1250,7 +1256,7 @@
           <a:p>
             <a:fld id="{CC58B075-67F8-4A8D-AE1C-3D3E4193EBCA}" type="datetimeFigureOut">
               <a:rPr lang="pt-BR" smtClean="0"/>
-              <a:t>23/09/2019</a:t>
+              <a:t>09/10/2019</a:t>
             </a:fld>
             <a:endParaRPr lang="pt-BR"/>
           </a:p>
@@ -1614,7 +1620,7 @@
           <a:p>
             <a:fld id="{CC58B075-67F8-4A8D-AE1C-3D3E4193EBCA}" type="datetimeFigureOut">
               <a:rPr lang="pt-BR" smtClean="0"/>
-              <a:t>23/09/2019</a:t>
+              <a:t>09/10/2019</a:t>
             </a:fld>
             <a:endParaRPr lang="pt-BR"/>
           </a:p>
@@ -1731,7 +1737,7 @@
           <a:p>
             <a:fld id="{CC58B075-67F8-4A8D-AE1C-3D3E4193EBCA}" type="datetimeFigureOut">
               <a:rPr lang="pt-BR" smtClean="0"/>
-              <a:t>23/09/2019</a:t>
+              <a:t>09/10/2019</a:t>
             </a:fld>
             <a:endParaRPr lang="pt-BR"/>
           </a:p>
@@ -1826,7 +1832,7 @@
           <a:p>
             <a:fld id="{CC58B075-67F8-4A8D-AE1C-3D3E4193EBCA}" type="datetimeFigureOut">
               <a:rPr lang="pt-BR" smtClean="0"/>
-              <a:t>23/09/2019</a:t>
+              <a:t>09/10/2019</a:t>
             </a:fld>
             <a:endParaRPr lang="pt-BR"/>
           </a:p>
@@ -2101,7 +2107,7 @@
           <a:p>
             <a:fld id="{CC58B075-67F8-4A8D-AE1C-3D3E4193EBCA}" type="datetimeFigureOut">
               <a:rPr lang="pt-BR" smtClean="0"/>
-              <a:t>23/09/2019</a:t>
+              <a:t>09/10/2019</a:t>
             </a:fld>
             <a:endParaRPr lang="pt-BR"/>
           </a:p>
@@ -2353,7 +2359,7 @@
           <a:p>
             <a:fld id="{CC58B075-67F8-4A8D-AE1C-3D3E4193EBCA}" type="datetimeFigureOut">
               <a:rPr lang="pt-BR" smtClean="0"/>
-              <a:t>23/09/2019</a:t>
+              <a:t>09/10/2019</a:t>
             </a:fld>
             <a:endParaRPr lang="pt-BR"/>
           </a:p>
@@ -2564,7 +2570,7 @@
           <a:p>
             <a:fld id="{CC58B075-67F8-4A8D-AE1C-3D3E4193EBCA}" type="datetimeFigureOut">
               <a:rPr lang="pt-BR" smtClean="0"/>
-              <a:t>23/09/2019</a:t>
+              <a:t>09/10/2019</a:t>
             </a:fld>
             <a:endParaRPr lang="pt-BR"/>
           </a:p>
@@ -4585,7 +4591,7 @@
         </p:nvSpPr>
         <p:spPr>
           <a:xfrm>
-            <a:off x="838200" y="161925"/>
+            <a:off x="3401096" y="1372539"/>
             <a:ext cx="10515600" cy="422275"/>
           </a:xfrm>
         </p:spPr>
@@ -7492,15 +7498,7 @@
                   <a:schemeClr val="accent5"/>
                 </a:solidFill>
               </a:rPr>
-              <a:t> -it -v "//</a:t>
-            </a:r>
-            <a:r>
-              <a:rPr lang="pt-BR" sz="2000" dirty="0">
-                <a:solidFill>
-                  <a:schemeClr val="accent5"/>
-                </a:solidFill>
-              </a:rPr>
-              <a:t>c/</a:t>
+              <a:t> -it -v "//c/</a:t>
             </a:r>
             <a:r>
               <a:rPr lang="pt-BR" sz="2000" dirty="0" err="1">
@@ -7516,15 +7514,7 @@
                   <a:schemeClr val="accent5"/>
                 </a:solidFill>
               </a:rPr>
-              <a:t>/Luciano/Desktop</a:t>
-            </a:r>
-            <a:r>
-              <a:rPr lang="pt-BR" sz="2000" dirty="0">
-                <a:solidFill>
-                  <a:schemeClr val="accent5"/>
-                </a:solidFill>
-              </a:rPr>
-              <a:t>:/var/</a:t>
+              <a:t>/Luciano/Desktop:/var/</a:t>
             </a:r>
             <a:r>
               <a:rPr lang="pt-BR" sz="2000" dirty="0" err="1">
@@ -7650,18 +7640,30 @@
             <p:ph type="title"/>
           </p:nvPr>
         </p:nvSpPr>
-        <p:spPr/>
-        <p:txBody>
-          <a:bodyPr/>
+        <p:spPr>
+          <a:xfrm>
+            <a:off x="115910" y="123288"/>
+            <a:ext cx="11951594" cy="422275"/>
+          </a:xfrm>
+        </p:spPr>
+        <p:txBody>
+          <a:bodyPr vert="horz" lIns="91440" tIns="45720" rIns="91440" bIns="45720" rtlCol="0" anchor="ctr">
+            <a:normAutofit fontScale="90000"/>
+          </a:bodyPr>
           <a:lstStyle/>
           <a:p>
-            <a:endParaRPr lang="pt-BR"/>
-          </a:p>
-        </p:txBody>
-      </p:sp>
-      <p:sp>
-        <p:nvSpPr>
-          <p:cNvPr id="3" name="Espaço Reservado para Conteúdo 2"/>
+            <a:pPr algn="ctr"/>
+            <a:r>
+              <a:rPr lang="pt-BR" sz="2800" b="1" dirty="0" smtClean="0"/>
+              <a:t>Rodando código em um Container</a:t>
+            </a:r>
+            <a:endParaRPr lang="pt-BR" sz="2800" b="1" dirty="0"/>
+          </a:p>
+        </p:txBody>
+      </p:sp>
+      <p:sp>
+        <p:nvSpPr>
+          <p:cNvPr id="5" name="Espaço Reservado para Conteúdo 4"/>
           <p:cNvSpPr>
             <a:spLocks noGrp="1"/>
           </p:cNvSpPr>
@@ -7669,25 +7671,656 @@
             <p:ph idx="1"/>
           </p:nvPr>
         </p:nvSpPr>
-        <p:spPr/>
-        <p:txBody>
-          <a:bodyPr/>
+        <p:spPr>
+          <a:xfrm>
+            <a:off x="241478" y="927279"/>
+            <a:ext cx="11259355" cy="2434107"/>
+          </a:xfrm>
+        </p:spPr>
+        <p:txBody>
+          <a:bodyPr>
+            <a:noAutofit/>
+          </a:bodyPr>
           <a:lstStyle/>
           <a:p>
-            <a:endParaRPr lang="pt-BR"/>
+            <a:r>
+              <a:rPr lang="pt-BR" sz="2000" dirty="0" smtClean="0"/>
+              <a:t>Um exemplo que roda em </a:t>
+            </a:r>
+            <a:r>
+              <a:rPr lang="pt-BR" sz="2000" b="1" dirty="0" smtClean="0"/>
+              <a:t>Node.js </a:t>
+            </a:r>
+            <a:r>
+              <a:rPr lang="pt-BR" sz="2000" dirty="0" smtClean="0"/>
+              <a:t>e não possuímos o Node na máquina.</a:t>
+            </a:r>
+          </a:p>
+          <a:p>
+            <a:endParaRPr lang="pt-BR" sz="2000" b="1" dirty="0"/>
+          </a:p>
+          <a:p>
+            <a:pPr lvl="2">
+              <a:buFont typeface="Wingdings" panose="05000000000000000000" pitchFamily="2" charset="2"/>
+              <a:buChar char="Ø"/>
+            </a:pPr>
+            <a:r>
+              <a:rPr lang="pt-BR" sz="1600" dirty="0" err="1">
+                <a:solidFill>
+                  <a:schemeClr val="accent5"/>
+                </a:solidFill>
+              </a:rPr>
+              <a:t>docker</a:t>
+            </a:r>
+            <a:r>
+              <a:rPr lang="pt-BR" sz="1600" dirty="0">
+                <a:solidFill>
+                  <a:schemeClr val="accent5"/>
+                </a:solidFill>
+              </a:rPr>
+              <a:t> </a:t>
+            </a:r>
+            <a:r>
+              <a:rPr lang="pt-BR" sz="1600" dirty="0" err="1">
+                <a:solidFill>
+                  <a:schemeClr val="accent5"/>
+                </a:solidFill>
+              </a:rPr>
+              <a:t>run</a:t>
+            </a:r>
+            <a:r>
+              <a:rPr lang="pt-BR" sz="1600" dirty="0">
+                <a:solidFill>
+                  <a:schemeClr val="accent5"/>
+                </a:solidFill>
+              </a:rPr>
+              <a:t> -d -p 8080:3000 -v "//c/</a:t>
+            </a:r>
+            <a:r>
+              <a:rPr lang="pt-BR" sz="1600" dirty="0" err="1">
+                <a:solidFill>
+                  <a:schemeClr val="accent5"/>
+                </a:solidFill>
+              </a:rPr>
+              <a:t>Users</a:t>
+            </a:r>
+            <a:r>
+              <a:rPr lang="pt-BR" sz="1600" dirty="0" smtClean="0">
+                <a:solidFill>
+                  <a:schemeClr val="accent5"/>
+                </a:solidFill>
+              </a:rPr>
+              <a:t>/&lt;&lt;Seu caminho local&gt;&gt;/volume-exemplo</a:t>
+            </a:r>
+            <a:r>
+              <a:rPr lang="pt-BR" sz="1600" dirty="0">
+                <a:solidFill>
+                  <a:schemeClr val="accent5"/>
+                </a:solidFill>
+              </a:rPr>
+              <a:t>:/var/</a:t>
+            </a:r>
+            <a:r>
+              <a:rPr lang="pt-BR" sz="1600" dirty="0" err="1">
+                <a:solidFill>
+                  <a:schemeClr val="accent5"/>
+                </a:solidFill>
+              </a:rPr>
+              <a:t>www</a:t>
+            </a:r>
+            <a:r>
+              <a:rPr lang="pt-BR" sz="1600" dirty="0">
+                <a:solidFill>
+                  <a:schemeClr val="accent5"/>
+                </a:solidFill>
+              </a:rPr>
+              <a:t>" -w "/var/</a:t>
+            </a:r>
+            <a:r>
+              <a:rPr lang="pt-BR" sz="1600" dirty="0" err="1">
+                <a:solidFill>
+                  <a:schemeClr val="accent5"/>
+                </a:solidFill>
+              </a:rPr>
+              <a:t>www</a:t>
+            </a:r>
+            <a:r>
+              <a:rPr lang="pt-BR" sz="1600" dirty="0">
+                <a:solidFill>
+                  <a:schemeClr val="accent5"/>
+                </a:solidFill>
+              </a:rPr>
+              <a:t>" </a:t>
+            </a:r>
+            <a:r>
+              <a:rPr lang="pt-BR" sz="1600" dirty="0" smtClean="0">
+                <a:solidFill>
+                  <a:schemeClr val="accent5"/>
+                </a:solidFill>
+              </a:rPr>
+              <a:t>node </a:t>
+            </a:r>
+            <a:r>
+              <a:rPr lang="pt-BR" sz="1600" dirty="0" err="1">
+                <a:solidFill>
+                  <a:schemeClr val="accent5"/>
+                </a:solidFill>
+              </a:rPr>
+              <a:t>npm</a:t>
+            </a:r>
+            <a:r>
+              <a:rPr lang="pt-BR" sz="1600" dirty="0">
+                <a:solidFill>
+                  <a:schemeClr val="accent5"/>
+                </a:solidFill>
+              </a:rPr>
+              <a:t> start</a:t>
+            </a:r>
+            <a:endParaRPr lang="pt-BR" sz="1600" dirty="0">
+              <a:solidFill>
+                <a:schemeClr val="accent5"/>
+              </a:solidFill>
+            </a:endParaRPr>
+          </a:p>
+          <a:p>
+            <a:pPr>
+              <a:buFont typeface="Wingdings" panose="05000000000000000000" pitchFamily="2" charset="2"/>
+              <a:buChar char="Ø"/>
+            </a:pPr>
+            <a:endParaRPr lang="pt-BR" sz="2400" dirty="0" smtClean="0">
+              <a:solidFill>
+                <a:schemeClr val="accent5"/>
+              </a:solidFill>
+            </a:endParaRPr>
+          </a:p>
+          <a:p>
+            <a:pPr>
+              <a:buFont typeface="Wingdings" panose="05000000000000000000" pitchFamily="2" charset="2"/>
+              <a:buChar char="Ø"/>
+            </a:pPr>
+            <a:r>
+              <a:rPr lang="pt-BR" sz="2400" dirty="0" smtClean="0">
+                <a:solidFill>
+                  <a:schemeClr val="accent5"/>
+                </a:solidFill>
+              </a:rPr>
+              <a:t>Você conseguirá executar o código em http://localhost:8080</a:t>
+            </a:r>
+            <a:endParaRPr lang="pt-BR" sz="2400" dirty="0" smtClean="0">
+              <a:solidFill>
+                <a:schemeClr val="accent5"/>
+              </a:solidFill>
+            </a:endParaRPr>
+          </a:p>
+          <a:p>
+            <a:pPr>
+              <a:buFont typeface="Wingdings" panose="05000000000000000000" pitchFamily="2" charset="2"/>
+              <a:buChar char="Ø"/>
+            </a:pPr>
+            <a:endParaRPr lang="pt-BR" sz="2400" dirty="0">
+              <a:solidFill>
+                <a:schemeClr val="accent5"/>
+              </a:solidFill>
+            </a:endParaRPr>
+          </a:p>
+        </p:txBody>
+      </p:sp>
+      <p:sp>
+        <p:nvSpPr>
+          <p:cNvPr id="4" name="Espaço Reservado para Conteúdo 2"/>
+          <p:cNvSpPr txBox="1">
+            <a:spLocks/>
+          </p:cNvSpPr>
+          <p:nvPr/>
+        </p:nvSpPr>
+        <p:spPr>
+          <a:xfrm>
+            <a:off x="288164" y="3271233"/>
+            <a:ext cx="11165982" cy="3438659"/>
+          </a:xfrm>
+          <a:prstGeom prst="rect">
+            <a:avLst/>
+          </a:prstGeom>
+        </p:spPr>
+        <p:txBody>
+          <a:bodyPr vert="horz" lIns="91440" tIns="45720" rIns="91440" bIns="45720" rtlCol="0">
+            <a:noAutofit/>
+          </a:bodyPr>
+          <a:lstStyle>
+            <a:lvl1pPr marL="228600" indent="-228600" algn="l" defTabSz="914400" rtl="0" eaLnBrk="1" latinLnBrk="0" hangingPunct="1">
+              <a:lnSpc>
+                <a:spcPct val="90000"/>
+              </a:lnSpc>
+              <a:spcBef>
+                <a:spcPts val="1000"/>
+              </a:spcBef>
+              <a:buFont typeface="Arial" panose="020B0604020202020204" pitchFamily="34" charset="0"/>
+              <a:buChar char="•"/>
+              <a:defRPr sz="2800" kern="1200">
+                <a:solidFill>
+                  <a:schemeClr val="tx1"/>
+                </a:solidFill>
+                <a:latin typeface="+mn-lt"/>
+                <a:ea typeface="+mn-ea"/>
+                <a:cs typeface="+mn-cs"/>
+              </a:defRPr>
+            </a:lvl1pPr>
+            <a:lvl2pPr marL="685800" indent="-228600" algn="l" defTabSz="914400" rtl="0" eaLnBrk="1" latinLnBrk="0" hangingPunct="1">
+              <a:lnSpc>
+                <a:spcPct val="90000"/>
+              </a:lnSpc>
+              <a:spcBef>
+                <a:spcPts val="500"/>
+              </a:spcBef>
+              <a:buFont typeface="Arial" panose="020B0604020202020204" pitchFamily="34" charset="0"/>
+              <a:buChar char="•"/>
+              <a:defRPr sz="2400" kern="1200">
+                <a:solidFill>
+                  <a:schemeClr val="tx1"/>
+                </a:solidFill>
+                <a:latin typeface="+mn-lt"/>
+                <a:ea typeface="+mn-ea"/>
+                <a:cs typeface="+mn-cs"/>
+              </a:defRPr>
+            </a:lvl2pPr>
+            <a:lvl3pPr marL="1143000" indent="-228600" algn="l" defTabSz="914400" rtl="0" eaLnBrk="1" latinLnBrk="0" hangingPunct="1">
+              <a:lnSpc>
+                <a:spcPct val="90000"/>
+              </a:lnSpc>
+              <a:spcBef>
+                <a:spcPts val="500"/>
+              </a:spcBef>
+              <a:buFont typeface="Arial" panose="020B0604020202020204" pitchFamily="34" charset="0"/>
+              <a:buChar char="•"/>
+              <a:defRPr sz="2000" kern="1200">
+                <a:solidFill>
+                  <a:schemeClr val="tx1"/>
+                </a:solidFill>
+                <a:latin typeface="+mn-lt"/>
+                <a:ea typeface="+mn-ea"/>
+                <a:cs typeface="+mn-cs"/>
+              </a:defRPr>
+            </a:lvl3pPr>
+            <a:lvl4pPr marL="1600200" indent="-228600" algn="l" defTabSz="914400" rtl="0" eaLnBrk="1" latinLnBrk="0" hangingPunct="1">
+              <a:lnSpc>
+                <a:spcPct val="90000"/>
+              </a:lnSpc>
+              <a:spcBef>
+                <a:spcPts val="500"/>
+              </a:spcBef>
+              <a:buFont typeface="Arial" panose="020B0604020202020204" pitchFamily="34" charset="0"/>
+              <a:buChar char="•"/>
+              <a:defRPr sz="1800" kern="1200">
+                <a:solidFill>
+                  <a:schemeClr val="tx1"/>
+                </a:solidFill>
+                <a:latin typeface="+mn-lt"/>
+                <a:ea typeface="+mn-ea"/>
+                <a:cs typeface="+mn-cs"/>
+              </a:defRPr>
+            </a:lvl4pPr>
+            <a:lvl5pPr marL="2057400" indent="-228600" algn="l" defTabSz="914400" rtl="0" eaLnBrk="1" latinLnBrk="0" hangingPunct="1">
+              <a:lnSpc>
+                <a:spcPct val="90000"/>
+              </a:lnSpc>
+              <a:spcBef>
+                <a:spcPts val="500"/>
+              </a:spcBef>
+              <a:buFont typeface="Arial" panose="020B0604020202020204" pitchFamily="34" charset="0"/>
+              <a:buChar char="•"/>
+              <a:defRPr sz="1800" kern="1200">
+                <a:solidFill>
+                  <a:schemeClr val="tx1"/>
+                </a:solidFill>
+                <a:latin typeface="+mn-lt"/>
+                <a:ea typeface="+mn-ea"/>
+                <a:cs typeface="+mn-cs"/>
+              </a:defRPr>
+            </a:lvl5pPr>
+            <a:lvl6pPr marL="2514600" indent="-228600" algn="l" defTabSz="914400" rtl="0" eaLnBrk="1" latinLnBrk="0" hangingPunct="1">
+              <a:lnSpc>
+                <a:spcPct val="90000"/>
+              </a:lnSpc>
+              <a:spcBef>
+                <a:spcPts val="500"/>
+              </a:spcBef>
+              <a:buFont typeface="Arial" panose="020B0604020202020204" pitchFamily="34" charset="0"/>
+              <a:buChar char="•"/>
+              <a:defRPr sz="1800" kern="1200">
+                <a:solidFill>
+                  <a:schemeClr val="tx1"/>
+                </a:solidFill>
+                <a:latin typeface="+mn-lt"/>
+                <a:ea typeface="+mn-ea"/>
+                <a:cs typeface="+mn-cs"/>
+              </a:defRPr>
+            </a:lvl6pPr>
+            <a:lvl7pPr marL="2971800" indent="-228600" algn="l" defTabSz="914400" rtl="0" eaLnBrk="1" latinLnBrk="0" hangingPunct="1">
+              <a:lnSpc>
+                <a:spcPct val="90000"/>
+              </a:lnSpc>
+              <a:spcBef>
+                <a:spcPts val="500"/>
+              </a:spcBef>
+              <a:buFont typeface="Arial" panose="020B0604020202020204" pitchFamily="34" charset="0"/>
+              <a:buChar char="•"/>
+              <a:defRPr sz="1800" kern="1200">
+                <a:solidFill>
+                  <a:schemeClr val="tx1"/>
+                </a:solidFill>
+                <a:latin typeface="+mn-lt"/>
+                <a:ea typeface="+mn-ea"/>
+                <a:cs typeface="+mn-cs"/>
+              </a:defRPr>
+            </a:lvl7pPr>
+            <a:lvl8pPr marL="3429000" indent="-228600" algn="l" defTabSz="914400" rtl="0" eaLnBrk="1" latinLnBrk="0" hangingPunct="1">
+              <a:lnSpc>
+                <a:spcPct val="90000"/>
+              </a:lnSpc>
+              <a:spcBef>
+                <a:spcPts val="500"/>
+              </a:spcBef>
+              <a:buFont typeface="Arial" panose="020B0604020202020204" pitchFamily="34" charset="0"/>
+              <a:buChar char="•"/>
+              <a:defRPr sz="1800" kern="1200">
+                <a:solidFill>
+                  <a:schemeClr val="tx1"/>
+                </a:solidFill>
+                <a:latin typeface="+mn-lt"/>
+                <a:ea typeface="+mn-ea"/>
+                <a:cs typeface="+mn-cs"/>
+              </a:defRPr>
+            </a:lvl8pPr>
+            <a:lvl9pPr marL="3886200" indent="-228600" algn="l" defTabSz="914400" rtl="0" eaLnBrk="1" latinLnBrk="0" hangingPunct="1">
+              <a:lnSpc>
+                <a:spcPct val="90000"/>
+              </a:lnSpc>
+              <a:spcBef>
+                <a:spcPts val="500"/>
+              </a:spcBef>
+              <a:buFont typeface="Arial" panose="020B0604020202020204" pitchFamily="34" charset="0"/>
+              <a:buChar char="•"/>
+              <a:defRPr sz="1800" kern="1200">
+                <a:solidFill>
+                  <a:schemeClr val="tx1"/>
+                </a:solidFill>
+                <a:latin typeface="+mn-lt"/>
+                <a:ea typeface="+mn-ea"/>
+                <a:cs typeface="+mn-cs"/>
+              </a:defRPr>
+            </a:lvl9pPr>
+          </a:lstStyle>
+          <a:p>
+            <a:pPr lvl="1" algn="just">
+              <a:lnSpc>
+                <a:spcPct val="150000"/>
+              </a:lnSpc>
+            </a:pPr>
+            <a:r>
+              <a:rPr lang="pt-BR" sz="1800" dirty="0" smtClean="0"/>
+              <a:t>Nessa pasta volume-exemplo existe um pequeno projeto</a:t>
+            </a:r>
+            <a:r>
+              <a:rPr lang="pt-BR" sz="1800" b="1" dirty="0" smtClean="0"/>
+              <a:t> Node.js</a:t>
+            </a:r>
+          </a:p>
+          <a:p>
+            <a:pPr lvl="1" algn="just">
+              <a:lnSpc>
+                <a:spcPct val="150000"/>
+              </a:lnSpc>
+            </a:pPr>
+            <a:r>
+              <a:rPr lang="pt-BR" sz="1800" b="1" dirty="0" smtClean="0"/>
+              <a:t>“-d”</a:t>
+            </a:r>
+            <a:r>
+              <a:rPr lang="pt-BR" sz="1800" dirty="0" smtClean="0"/>
+              <a:t> – executa em modo </a:t>
+            </a:r>
+            <a:r>
+              <a:rPr lang="pt-BR" sz="1800" dirty="0" err="1" smtClean="0"/>
+              <a:t>dettached</a:t>
+            </a:r>
+            <a:r>
+              <a:rPr lang="pt-BR" sz="1800" dirty="0" smtClean="0"/>
+              <a:t> e libera o terminal </a:t>
+            </a:r>
+          </a:p>
+          <a:p>
+            <a:pPr lvl="1" algn="just">
+              <a:lnSpc>
+                <a:spcPct val="150000"/>
+              </a:lnSpc>
+            </a:pPr>
+            <a:r>
+              <a:rPr lang="pt-BR" sz="1800" b="1" dirty="0" smtClean="0"/>
+              <a:t>“-w”</a:t>
+            </a:r>
+            <a:r>
+              <a:rPr lang="pt-BR" sz="1800" dirty="0" smtClean="0"/>
+              <a:t> </a:t>
+            </a:r>
+            <a:r>
+              <a:rPr lang="pt-BR" sz="1800" dirty="0"/>
+              <a:t>– </a:t>
+            </a:r>
+            <a:r>
+              <a:rPr lang="pt-BR" sz="1800" dirty="0" smtClean="0"/>
+              <a:t>“</a:t>
+            </a:r>
+            <a:r>
+              <a:rPr lang="pt-BR" sz="1800" dirty="0" err="1" smtClean="0"/>
+              <a:t>Working</a:t>
+            </a:r>
+            <a:r>
+              <a:rPr lang="pt-BR" sz="1800" dirty="0" smtClean="0"/>
+              <a:t> </a:t>
+            </a:r>
+            <a:r>
+              <a:rPr lang="pt-BR" sz="1800" dirty="0" err="1" smtClean="0"/>
+              <a:t>Directory</a:t>
+            </a:r>
+            <a:r>
+              <a:rPr lang="pt-BR" sz="1800" dirty="0" smtClean="0"/>
+              <a:t>” informa em qual pasta o comando deve ser executado dentro do container</a:t>
+            </a:r>
+          </a:p>
+          <a:p>
+            <a:pPr lvl="1" algn="just">
+              <a:lnSpc>
+                <a:spcPct val="150000"/>
+              </a:lnSpc>
+            </a:pPr>
+            <a:endParaRPr lang="pt-BR" sz="1800" dirty="0"/>
+          </a:p>
+          <a:p>
+            <a:pPr marL="457200" lvl="1" indent="0" algn="just">
+              <a:lnSpc>
+                <a:spcPct val="100000"/>
+              </a:lnSpc>
+              <a:spcBef>
+                <a:spcPts val="0"/>
+              </a:spcBef>
+              <a:buNone/>
+            </a:pPr>
+            <a:r>
+              <a:rPr lang="pt-BR" sz="1800" dirty="0" smtClean="0"/>
+              <a:t>	Lembrando que se você estiver rodando num Windows com uma máquina virtual e rodando o </a:t>
+            </a:r>
+            <a:r>
+              <a:rPr lang="pt-BR" sz="1800" dirty="0" err="1" smtClean="0"/>
+              <a:t>Docker</a:t>
+            </a:r>
+            <a:r>
+              <a:rPr lang="pt-BR" sz="1800" dirty="0" smtClean="0"/>
+              <a:t> Toolbox, o </a:t>
+            </a:r>
+            <a:r>
+              <a:rPr lang="pt-BR" sz="1800" dirty="0" err="1" smtClean="0"/>
+              <a:t>ip</a:t>
+            </a:r>
+            <a:r>
+              <a:rPr lang="pt-BR" sz="1800" dirty="0" smtClean="0"/>
+              <a:t> será descoberto pelo “</a:t>
+            </a:r>
+            <a:r>
+              <a:rPr lang="pt-BR" sz="1800" b="1" dirty="0" err="1">
+                <a:solidFill>
+                  <a:prstClr val="black"/>
+                </a:solidFill>
+              </a:rPr>
+              <a:t>docker-machine</a:t>
+            </a:r>
+            <a:r>
+              <a:rPr lang="pt-BR" sz="1800" b="1" dirty="0">
+                <a:solidFill>
+                  <a:prstClr val="black"/>
+                </a:solidFill>
+              </a:rPr>
+              <a:t> </a:t>
+            </a:r>
+            <a:r>
+              <a:rPr lang="pt-BR" sz="1800" b="1" dirty="0" err="1" smtClean="0">
+                <a:solidFill>
+                  <a:prstClr val="black"/>
+                </a:solidFill>
+              </a:rPr>
+              <a:t>ip</a:t>
+            </a:r>
+            <a:r>
+              <a:rPr lang="pt-BR" sz="1800" b="1" dirty="0" smtClean="0">
+                <a:solidFill>
+                  <a:prstClr val="black"/>
+                </a:solidFill>
+              </a:rPr>
+              <a:t>” e você executará o código com o endereço </a:t>
+            </a:r>
+            <a:r>
+              <a:rPr lang="pt-BR" sz="1800" b="1" dirty="0" err="1" smtClean="0">
+                <a:solidFill>
+                  <a:prstClr val="black"/>
+                </a:solidFill>
+              </a:rPr>
+              <a:t>ip</a:t>
+            </a:r>
+            <a:r>
+              <a:rPr lang="pt-BR" sz="1800" b="1" dirty="0" smtClean="0">
+                <a:solidFill>
+                  <a:prstClr val="black"/>
+                </a:solidFill>
+              </a:rPr>
+              <a:t> encontrado e a porta configurada, nesse caso a 8080.</a:t>
+            </a:r>
+          </a:p>
+          <a:p>
+            <a:pPr marL="457200" lvl="1" indent="0" algn="just">
+              <a:lnSpc>
+                <a:spcPct val="100000"/>
+              </a:lnSpc>
+              <a:spcBef>
+                <a:spcPts val="0"/>
+              </a:spcBef>
+              <a:buNone/>
+            </a:pPr>
+            <a:endParaRPr lang="pt-BR" sz="1800" b="1" dirty="0">
+              <a:solidFill>
+                <a:prstClr val="black"/>
+              </a:solidFill>
+            </a:endParaRPr>
+          </a:p>
+          <a:p>
+            <a:pPr marL="457200" lvl="1" indent="0" algn="just">
+              <a:lnSpc>
+                <a:spcPct val="100000"/>
+              </a:lnSpc>
+              <a:spcBef>
+                <a:spcPts val="0"/>
+              </a:spcBef>
+              <a:buNone/>
+            </a:pPr>
+            <a:r>
+              <a:rPr lang="pt-BR" sz="1800" b="1" dirty="0" smtClean="0">
+                <a:solidFill>
+                  <a:prstClr val="black"/>
+                </a:solidFill>
+              </a:rPr>
+              <a:t>				</a:t>
+            </a:r>
+            <a:r>
+              <a:rPr lang="pt-BR" sz="1800" b="1" dirty="0" smtClean="0">
+                <a:solidFill>
+                  <a:schemeClr val="accent5"/>
+                </a:solidFill>
+              </a:rPr>
+              <a:t>http</a:t>
+            </a:r>
+            <a:r>
+              <a:rPr lang="pt-BR" sz="1800" b="1" dirty="0">
+                <a:solidFill>
+                  <a:schemeClr val="accent5"/>
+                </a:solidFill>
+              </a:rPr>
+              <a:t>://</a:t>
+            </a:r>
+            <a:r>
+              <a:rPr lang="pt-BR" sz="1800" b="1" dirty="0" smtClean="0">
+                <a:solidFill>
+                  <a:schemeClr val="accent5"/>
+                </a:solidFill>
+              </a:rPr>
+              <a:t>192.168.99.123:8080</a:t>
+            </a:r>
+            <a:r>
+              <a:rPr lang="pt-BR" sz="1800" b="1" dirty="0">
+                <a:solidFill>
+                  <a:schemeClr val="accent5"/>
+                </a:solidFill>
+              </a:rPr>
+              <a:t>/</a:t>
+            </a:r>
+            <a:endParaRPr lang="pt-BR" sz="1800" b="1" dirty="0" smtClean="0">
+              <a:solidFill>
+                <a:schemeClr val="accent5"/>
+              </a:solidFill>
+            </a:endParaRPr>
+          </a:p>
+          <a:p>
+            <a:pPr marL="457200" lvl="1" indent="0" algn="just">
+              <a:lnSpc>
+                <a:spcPct val="100000"/>
+              </a:lnSpc>
+              <a:spcBef>
+                <a:spcPts val="0"/>
+              </a:spcBef>
+              <a:buNone/>
+            </a:pPr>
+            <a:endParaRPr lang="pt-BR" sz="1800" b="1" dirty="0">
+              <a:solidFill>
+                <a:prstClr val="black"/>
+              </a:solidFill>
+            </a:endParaRPr>
           </a:p>
         </p:txBody>
       </p:sp>
     </p:spTree>
     <p:extLst>
       <p:ext uri="{BB962C8B-B14F-4D97-AF65-F5344CB8AC3E}">
-        <p14:creationId xmlns:p14="http://schemas.microsoft.com/office/powerpoint/2010/main" val="517489975"/>
+        <p14:creationId xmlns:p14="http://schemas.microsoft.com/office/powerpoint/2010/main" val="1371646598"/>
       </p:ext>
     </p:extLst>
   </p:cSld>
   <p:clrMapOvr>
     <a:masterClrMapping/>
   </p:clrMapOvr>
+  <p:timing>
+    <p:tnLst>
+      <p:par>
+        <p:cTn id="1" dur="indefinite" restart="never" nodeType="tmRoot"/>
+      </p:par>
+    </p:tnLst>
+  </p:timing>
 </p:sld>
 </file>
 
@@ -7869,7 +8502,7 @@
       </p:grpSpPr>
       <p:sp>
         <p:nvSpPr>
-          <p:cNvPr id="2" name="Título 1"/>
+          <p:cNvPr id="5" name="Título 1"/>
           <p:cNvSpPr>
             <a:spLocks noGrp="1"/>
           </p:cNvSpPr>
@@ -7877,18 +8510,30 @@
             <p:ph type="title"/>
           </p:nvPr>
         </p:nvSpPr>
-        <p:spPr/>
-        <p:txBody>
-          <a:bodyPr/>
+        <p:spPr>
+          <a:xfrm>
+            <a:off x="115910" y="123288"/>
+            <a:ext cx="11951594" cy="422275"/>
+          </a:xfrm>
+        </p:spPr>
+        <p:txBody>
+          <a:bodyPr vert="horz" lIns="91440" tIns="45720" rIns="91440" bIns="45720" rtlCol="0" anchor="ctr">
+            <a:normAutofit fontScale="90000"/>
+          </a:bodyPr>
           <a:lstStyle/>
           <a:p>
-            <a:endParaRPr lang="pt-BR"/>
-          </a:p>
-        </p:txBody>
-      </p:sp>
-      <p:sp>
-        <p:nvSpPr>
-          <p:cNvPr id="3" name="Espaço Reservado para Conteúdo 2"/>
+            <a:pPr algn="ctr"/>
+            <a:r>
+              <a:rPr lang="pt-BR" sz="2800" b="1" dirty="0" smtClean="0"/>
+              <a:t>Construir as Próprias Imagens</a:t>
+            </a:r>
+            <a:endParaRPr lang="pt-BR" sz="2800" b="1" dirty="0"/>
+          </a:p>
+        </p:txBody>
+      </p:sp>
+      <p:sp>
+        <p:nvSpPr>
+          <p:cNvPr id="6" name="Espaço Reservado para Conteúdo 2"/>
           <p:cNvSpPr>
             <a:spLocks noGrp="1"/>
           </p:cNvSpPr>
@@ -7896,19 +8541,37 @@
             <p:ph idx="1"/>
           </p:nvPr>
         </p:nvSpPr>
-        <p:spPr/>
-        <p:txBody>
-          <a:bodyPr/>
+        <p:spPr>
+          <a:xfrm>
+            <a:off x="286752" y="811369"/>
+            <a:ext cx="11618495" cy="5649589"/>
+          </a:xfrm>
+        </p:spPr>
+        <p:txBody>
+          <a:bodyPr>
+            <a:normAutofit/>
+          </a:bodyPr>
           <a:lstStyle/>
           <a:p>
-            <a:endParaRPr lang="pt-BR"/>
+            <a:pPr algn="just"/>
+            <a:r>
+              <a:rPr lang="pt-BR" sz="2000" b="1" i="1" dirty="0" smtClean="0"/>
+              <a:t>XXXXXX</a:t>
+            </a:r>
+            <a:endParaRPr lang="pt-BR" sz="1400" u="sng" dirty="0" smtClean="0"/>
+          </a:p>
+          <a:p>
+            <a:pPr marL="457200" lvl="1" indent="0" algn="just">
+              <a:buNone/>
+            </a:pPr>
+            <a:endParaRPr lang="pt-BR" sz="1400" u="sng" dirty="0" smtClean="0"/>
           </a:p>
         </p:txBody>
       </p:sp>
     </p:spTree>
     <p:extLst>
       <p:ext uri="{BB962C8B-B14F-4D97-AF65-F5344CB8AC3E}">
-        <p14:creationId xmlns:p14="http://schemas.microsoft.com/office/powerpoint/2010/main" val="2333415383"/>
+        <p14:creationId xmlns:p14="http://schemas.microsoft.com/office/powerpoint/2010/main" val="517489975"/>
       </p:ext>
     </p:extLst>
   </p:cSld>
@@ -7937,6 +8600,403 @@
       </p:grpSpPr>
       <p:sp>
         <p:nvSpPr>
+          <p:cNvPr id="5" name="Título 1"/>
+          <p:cNvSpPr>
+            <a:spLocks noGrp="1"/>
+          </p:cNvSpPr>
+          <p:nvPr>
+            <p:ph type="title"/>
+          </p:nvPr>
+        </p:nvSpPr>
+        <p:spPr>
+          <a:xfrm>
+            <a:off x="115910" y="123288"/>
+            <a:ext cx="11951594" cy="422275"/>
+          </a:xfrm>
+        </p:spPr>
+        <p:txBody>
+          <a:bodyPr vert="horz" lIns="91440" tIns="45720" rIns="91440" bIns="45720" rtlCol="0" anchor="ctr">
+            <a:normAutofit fontScale="90000"/>
+          </a:bodyPr>
+          <a:lstStyle/>
+          <a:p>
+            <a:pPr algn="ctr"/>
+            <a:r>
+              <a:rPr lang="pt-BR" sz="2800" b="1" dirty="0" smtClean="0"/>
+              <a:t>Construir as Próprias Imagens</a:t>
+            </a:r>
+            <a:endParaRPr lang="pt-BR" sz="2800" b="1" dirty="0"/>
+          </a:p>
+        </p:txBody>
+      </p:sp>
+    </p:spTree>
+    <p:extLst>
+      <p:ext uri="{BB962C8B-B14F-4D97-AF65-F5344CB8AC3E}">
+        <p14:creationId xmlns:p14="http://schemas.microsoft.com/office/powerpoint/2010/main" val="3241257494"/>
+      </p:ext>
+    </p:extLst>
+  </p:cSld>
+  <p:clrMapOvr>
+    <a:masterClrMapping/>
+  </p:clrMapOvr>
+</p:sld>
+</file>
+
+<file path=ppt/slides/slide22.xml><?xml version="1.0" encoding="utf-8"?>
+<p:sld xmlns:a="http://schemas.openxmlformats.org/drawingml/2006/main" xmlns:r="http://schemas.openxmlformats.org/officeDocument/2006/relationships" xmlns:p="http://schemas.openxmlformats.org/presentationml/2006/main">
+  <p:cSld>
+    <p:spTree>
+      <p:nvGrpSpPr>
+        <p:cNvPr id="1" name=""/>
+        <p:cNvGrpSpPr/>
+        <p:nvPr/>
+      </p:nvGrpSpPr>
+      <p:grpSpPr>
+        <a:xfrm>
+          <a:off x="0" y="0"/>
+          <a:ext cx="0" cy="0"/>
+          <a:chOff x="0" y="0"/>
+          <a:chExt cx="0" cy="0"/>
+        </a:xfrm>
+      </p:grpSpPr>
+      <p:sp>
+        <p:nvSpPr>
+          <p:cNvPr id="5" name="Título 1"/>
+          <p:cNvSpPr>
+            <a:spLocks noGrp="1"/>
+          </p:cNvSpPr>
+          <p:nvPr>
+            <p:ph type="title"/>
+          </p:nvPr>
+        </p:nvSpPr>
+        <p:spPr>
+          <a:xfrm>
+            <a:off x="115910" y="123288"/>
+            <a:ext cx="11951594" cy="422275"/>
+          </a:xfrm>
+        </p:spPr>
+        <p:txBody>
+          <a:bodyPr vert="horz" lIns="91440" tIns="45720" rIns="91440" bIns="45720" rtlCol="0" anchor="ctr">
+            <a:normAutofit fontScale="90000"/>
+          </a:bodyPr>
+          <a:lstStyle/>
+          <a:p>
+            <a:pPr algn="ctr"/>
+            <a:r>
+              <a:rPr lang="pt-BR" sz="2800" b="1" dirty="0" smtClean="0"/>
+              <a:t>Comunicação entre Containers</a:t>
+            </a:r>
+            <a:endParaRPr lang="pt-BR" sz="2800" b="1" dirty="0"/>
+          </a:p>
+        </p:txBody>
+      </p:sp>
+    </p:spTree>
+    <p:extLst>
+      <p:ext uri="{BB962C8B-B14F-4D97-AF65-F5344CB8AC3E}">
+        <p14:creationId xmlns:p14="http://schemas.microsoft.com/office/powerpoint/2010/main" val="595613826"/>
+      </p:ext>
+    </p:extLst>
+  </p:cSld>
+  <p:clrMapOvr>
+    <a:masterClrMapping/>
+  </p:clrMapOvr>
+</p:sld>
+</file>
+
+<file path=ppt/slides/slide23.xml><?xml version="1.0" encoding="utf-8"?>
+<p:sld xmlns:a="http://schemas.openxmlformats.org/drawingml/2006/main" xmlns:r="http://schemas.openxmlformats.org/officeDocument/2006/relationships" xmlns:p="http://schemas.openxmlformats.org/presentationml/2006/main">
+  <p:cSld>
+    <p:spTree>
+      <p:nvGrpSpPr>
+        <p:cNvPr id="1" name=""/>
+        <p:cNvGrpSpPr/>
+        <p:nvPr/>
+      </p:nvGrpSpPr>
+      <p:grpSpPr>
+        <a:xfrm>
+          <a:off x="0" y="0"/>
+          <a:ext cx="0" cy="0"/>
+          <a:chOff x="0" y="0"/>
+          <a:chExt cx="0" cy="0"/>
+        </a:xfrm>
+      </p:grpSpPr>
+      <p:sp>
+        <p:nvSpPr>
+          <p:cNvPr id="5" name="Título 1"/>
+          <p:cNvSpPr>
+            <a:spLocks noGrp="1"/>
+          </p:cNvSpPr>
+          <p:nvPr>
+            <p:ph type="title"/>
+          </p:nvPr>
+        </p:nvSpPr>
+        <p:spPr>
+          <a:xfrm>
+            <a:off x="115910" y="123288"/>
+            <a:ext cx="11951594" cy="422275"/>
+          </a:xfrm>
+        </p:spPr>
+        <p:txBody>
+          <a:bodyPr vert="horz" lIns="91440" tIns="45720" rIns="91440" bIns="45720" rtlCol="0" anchor="ctr">
+            <a:normAutofit fontScale="90000"/>
+          </a:bodyPr>
+          <a:lstStyle/>
+          <a:p>
+            <a:pPr algn="ctr"/>
+            <a:r>
+              <a:rPr lang="pt-BR" sz="2800" b="1" dirty="0" smtClean="0"/>
+              <a:t>Comunicação entre Containers</a:t>
+            </a:r>
+            <a:endParaRPr lang="pt-BR" sz="2800" b="1" dirty="0"/>
+          </a:p>
+        </p:txBody>
+      </p:sp>
+    </p:spTree>
+    <p:extLst>
+      <p:ext uri="{BB962C8B-B14F-4D97-AF65-F5344CB8AC3E}">
+        <p14:creationId xmlns:p14="http://schemas.microsoft.com/office/powerpoint/2010/main" val="3506319487"/>
+      </p:ext>
+    </p:extLst>
+  </p:cSld>
+  <p:clrMapOvr>
+    <a:masterClrMapping/>
+  </p:clrMapOvr>
+</p:sld>
+</file>
+
+<file path=ppt/slides/slide24.xml><?xml version="1.0" encoding="utf-8"?>
+<p:sld xmlns:a="http://schemas.openxmlformats.org/drawingml/2006/main" xmlns:r="http://schemas.openxmlformats.org/officeDocument/2006/relationships" xmlns:p="http://schemas.openxmlformats.org/presentationml/2006/main">
+  <p:cSld>
+    <p:spTree>
+      <p:nvGrpSpPr>
+        <p:cNvPr id="1" name=""/>
+        <p:cNvGrpSpPr/>
+        <p:nvPr/>
+      </p:nvGrpSpPr>
+      <p:grpSpPr>
+        <a:xfrm>
+          <a:off x="0" y="0"/>
+          <a:ext cx="0" cy="0"/>
+          <a:chOff x="0" y="0"/>
+          <a:chExt cx="0" cy="0"/>
+        </a:xfrm>
+      </p:grpSpPr>
+      <p:sp>
+        <p:nvSpPr>
+          <p:cNvPr id="5" name="Título 1"/>
+          <p:cNvSpPr>
+            <a:spLocks noGrp="1"/>
+          </p:cNvSpPr>
+          <p:nvPr>
+            <p:ph type="title"/>
+          </p:nvPr>
+        </p:nvSpPr>
+        <p:spPr>
+          <a:xfrm>
+            <a:off x="115910" y="123288"/>
+            <a:ext cx="11951594" cy="422275"/>
+          </a:xfrm>
+        </p:spPr>
+        <p:txBody>
+          <a:bodyPr vert="horz" lIns="91440" tIns="45720" rIns="91440" bIns="45720" rtlCol="0" anchor="ctr">
+            <a:normAutofit fontScale="90000"/>
+          </a:bodyPr>
+          <a:lstStyle/>
+          <a:p>
+            <a:pPr algn="ctr"/>
+            <a:r>
+              <a:rPr lang="pt-BR" sz="2800" b="1" dirty="0" smtClean="0"/>
+              <a:t>Trabalhando com o </a:t>
+            </a:r>
+            <a:r>
+              <a:rPr lang="pt-BR" sz="2800" b="1" dirty="0" err="1" smtClean="0"/>
+              <a:t>Docker</a:t>
+            </a:r>
+            <a:r>
+              <a:rPr lang="pt-BR" sz="2800" b="1" dirty="0" smtClean="0"/>
+              <a:t> </a:t>
+            </a:r>
+            <a:r>
+              <a:rPr lang="pt-BR" sz="2800" b="1" dirty="0" err="1" smtClean="0"/>
+              <a:t>Compose</a:t>
+            </a:r>
+            <a:endParaRPr lang="pt-BR" sz="2800" b="1" dirty="0"/>
+          </a:p>
+        </p:txBody>
+      </p:sp>
+    </p:spTree>
+    <p:extLst>
+      <p:ext uri="{BB962C8B-B14F-4D97-AF65-F5344CB8AC3E}">
+        <p14:creationId xmlns:p14="http://schemas.microsoft.com/office/powerpoint/2010/main" val="2618223457"/>
+      </p:ext>
+    </p:extLst>
+  </p:cSld>
+  <p:clrMapOvr>
+    <a:masterClrMapping/>
+  </p:clrMapOvr>
+</p:sld>
+</file>
+
+<file path=ppt/slides/slide25.xml><?xml version="1.0" encoding="utf-8"?>
+<p:sld xmlns:a="http://schemas.openxmlformats.org/drawingml/2006/main" xmlns:r="http://schemas.openxmlformats.org/officeDocument/2006/relationships" xmlns:p="http://schemas.openxmlformats.org/presentationml/2006/main">
+  <p:cSld>
+    <p:spTree>
+      <p:nvGrpSpPr>
+        <p:cNvPr id="1" name=""/>
+        <p:cNvGrpSpPr/>
+        <p:nvPr/>
+      </p:nvGrpSpPr>
+      <p:grpSpPr>
+        <a:xfrm>
+          <a:off x="0" y="0"/>
+          <a:ext cx="0" cy="0"/>
+          <a:chOff x="0" y="0"/>
+          <a:chExt cx="0" cy="0"/>
+        </a:xfrm>
+      </p:grpSpPr>
+      <p:sp>
+        <p:nvSpPr>
+          <p:cNvPr id="5" name="Título 1"/>
+          <p:cNvSpPr>
+            <a:spLocks noGrp="1"/>
+          </p:cNvSpPr>
+          <p:nvPr>
+            <p:ph type="title"/>
+          </p:nvPr>
+        </p:nvSpPr>
+        <p:spPr>
+          <a:xfrm>
+            <a:off x="115910" y="123288"/>
+            <a:ext cx="11951594" cy="422275"/>
+          </a:xfrm>
+        </p:spPr>
+        <p:txBody>
+          <a:bodyPr vert="horz" lIns="91440" tIns="45720" rIns="91440" bIns="45720" rtlCol="0" anchor="ctr">
+            <a:normAutofit fontScale="90000"/>
+          </a:bodyPr>
+          <a:lstStyle/>
+          <a:p>
+            <a:pPr algn="ctr"/>
+            <a:r>
+              <a:rPr lang="pt-BR" sz="2800" b="1" dirty="0" smtClean="0"/>
+              <a:t>Trabalhando com o </a:t>
+            </a:r>
+            <a:r>
+              <a:rPr lang="pt-BR" sz="2800" b="1" dirty="0" err="1" smtClean="0"/>
+              <a:t>Docker</a:t>
+            </a:r>
+            <a:r>
+              <a:rPr lang="pt-BR" sz="2800" b="1" dirty="0" smtClean="0"/>
+              <a:t> </a:t>
+            </a:r>
+            <a:r>
+              <a:rPr lang="pt-BR" sz="2800" b="1" dirty="0" err="1" smtClean="0"/>
+              <a:t>Compose</a:t>
+            </a:r>
+            <a:endParaRPr lang="pt-BR" sz="2800" b="1" dirty="0"/>
+          </a:p>
+        </p:txBody>
+      </p:sp>
+    </p:spTree>
+    <p:extLst>
+      <p:ext uri="{BB962C8B-B14F-4D97-AF65-F5344CB8AC3E}">
+        <p14:creationId xmlns:p14="http://schemas.microsoft.com/office/powerpoint/2010/main" val="1819436064"/>
+      </p:ext>
+    </p:extLst>
+  </p:cSld>
+  <p:clrMapOvr>
+    <a:masterClrMapping/>
+  </p:clrMapOvr>
+</p:sld>
+</file>
+
+<file path=ppt/slides/slide26.xml><?xml version="1.0" encoding="utf-8"?>
+<p:sld xmlns:a="http://schemas.openxmlformats.org/drawingml/2006/main" xmlns:r="http://schemas.openxmlformats.org/officeDocument/2006/relationships" xmlns:p="http://schemas.openxmlformats.org/presentationml/2006/main">
+  <p:cSld>
+    <p:spTree>
+      <p:nvGrpSpPr>
+        <p:cNvPr id="1" name=""/>
+        <p:cNvGrpSpPr/>
+        <p:nvPr/>
+      </p:nvGrpSpPr>
+      <p:grpSpPr>
+        <a:xfrm>
+          <a:off x="0" y="0"/>
+          <a:ext cx="0" cy="0"/>
+          <a:chOff x="0" y="0"/>
+          <a:chExt cx="0" cy="0"/>
+        </a:xfrm>
+      </p:grpSpPr>
+      <p:sp>
+        <p:nvSpPr>
+          <p:cNvPr id="2" name="Título 1"/>
+          <p:cNvSpPr>
+            <a:spLocks noGrp="1"/>
+          </p:cNvSpPr>
+          <p:nvPr>
+            <p:ph type="title"/>
+          </p:nvPr>
+        </p:nvSpPr>
+        <p:spPr/>
+        <p:txBody>
+          <a:bodyPr/>
+          <a:lstStyle/>
+          <a:p>
+            <a:endParaRPr lang="pt-BR"/>
+          </a:p>
+        </p:txBody>
+      </p:sp>
+      <p:sp>
+        <p:nvSpPr>
+          <p:cNvPr id="3" name="Espaço Reservado para Conteúdo 2"/>
+          <p:cNvSpPr>
+            <a:spLocks noGrp="1"/>
+          </p:cNvSpPr>
+          <p:nvPr>
+            <p:ph idx="1"/>
+          </p:nvPr>
+        </p:nvSpPr>
+        <p:spPr/>
+        <p:txBody>
+          <a:bodyPr/>
+          <a:lstStyle/>
+          <a:p>
+            <a:endParaRPr lang="pt-BR"/>
+          </a:p>
+        </p:txBody>
+      </p:sp>
+    </p:spTree>
+    <p:extLst>
+      <p:ext uri="{BB962C8B-B14F-4D97-AF65-F5344CB8AC3E}">
+        <p14:creationId xmlns:p14="http://schemas.microsoft.com/office/powerpoint/2010/main" val="2333415383"/>
+      </p:ext>
+    </p:extLst>
+  </p:cSld>
+  <p:clrMapOvr>
+    <a:masterClrMapping/>
+  </p:clrMapOvr>
+</p:sld>
+</file>
+
+<file path=ppt/slides/slide27.xml><?xml version="1.0" encoding="utf-8"?>
+<p:sld xmlns:a="http://schemas.openxmlformats.org/drawingml/2006/main" xmlns:r="http://schemas.openxmlformats.org/officeDocument/2006/relationships" xmlns:p="http://schemas.openxmlformats.org/presentationml/2006/main">
+  <p:cSld>
+    <p:spTree>
+      <p:nvGrpSpPr>
+        <p:cNvPr id="1" name=""/>
+        <p:cNvGrpSpPr/>
+        <p:nvPr/>
+      </p:nvGrpSpPr>
+      <p:grpSpPr>
+        <a:xfrm>
+          <a:off x="0" y="0"/>
+          <a:ext cx="0" cy="0"/>
+          <a:chOff x="0" y="0"/>
+          <a:chExt cx="0" cy="0"/>
+        </a:xfrm>
+      </p:grpSpPr>
+      <p:sp>
+        <p:nvSpPr>
           <p:cNvPr id="2" name="Título 1"/>
           <p:cNvSpPr>
             <a:spLocks noGrp="1"/>
@@ -7986,7 +9046,7 @@
 </p:sld>
 </file>
 
-<file path=ppt/slides/slide22.xml><?xml version="1.0" encoding="utf-8"?>
+<file path=ppt/slides/slide28.xml><?xml version="1.0" encoding="utf-8"?>
 <p:sld xmlns:a="http://schemas.openxmlformats.org/drawingml/2006/main" xmlns:r="http://schemas.openxmlformats.org/officeDocument/2006/relationships" xmlns:p="http://schemas.openxmlformats.org/presentationml/2006/main">
   <p:cSld>
     <p:spTree>

</xml_diff>

<commit_message>
Finalizando a parte de Volumes
</commit_message>
<xml_diff>
--- a/docs/docker-resumo.pptx
+++ b/docs/docker-resumo.pptx
@@ -268,7 +268,7 @@
           <a:p>
             <a:fld id="{CC58B075-67F8-4A8D-AE1C-3D3E4193EBCA}" type="datetimeFigureOut">
               <a:rPr lang="pt-BR" smtClean="0"/>
-              <a:t>09/10/2019</a:t>
+              <a:t>10/10/2019</a:t>
             </a:fld>
             <a:endParaRPr lang="pt-BR"/>
           </a:p>
@@ -436,7 +436,7 @@
           <a:p>
             <a:fld id="{CC58B075-67F8-4A8D-AE1C-3D3E4193EBCA}" type="datetimeFigureOut">
               <a:rPr lang="pt-BR" smtClean="0"/>
-              <a:t>09/10/2019</a:t>
+              <a:t>10/10/2019</a:t>
             </a:fld>
             <a:endParaRPr lang="pt-BR"/>
           </a:p>
@@ -614,7 +614,7 @@
           <a:p>
             <a:fld id="{CC58B075-67F8-4A8D-AE1C-3D3E4193EBCA}" type="datetimeFigureOut">
               <a:rPr lang="pt-BR" smtClean="0"/>
-              <a:t>09/10/2019</a:t>
+              <a:t>10/10/2019</a:t>
             </a:fld>
             <a:endParaRPr lang="pt-BR"/>
           </a:p>
@@ -782,7 +782,7 @@
           <a:p>
             <a:fld id="{CC58B075-67F8-4A8D-AE1C-3D3E4193EBCA}" type="datetimeFigureOut">
               <a:rPr lang="pt-BR" smtClean="0"/>
-              <a:t>09/10/2019</a:t>
+              <a:t>10/10/2019</a:t>
             </a:fld>
             <a:endParaRPr lang="pt-BR"/>
           </a:p>
@@ -1027,7 +1027,7 @@
           <a:p>
             <a:fld id="{CC58B075-67F8-4A8D-AE1C-3D3E4193EBCA}" type="datetimeFigureOut">
               <a:rPr lang="pt-BR" smtClean="0"/>
-              <a:t>09/10/2019</a:t>
+              <a:t>10/10/2019</a:t>
             </a:fld>
             <a:endParaRPr lang="pt-BR"/>
           </a:p>
@@ -1256,7 +1256,7 @@
           <a:p>
             <a:fld id="{CC58B075-67F8-4A8D-AE1C-3D3E4193EBCA}" type="datetimeFigureOut">
               <a:rPr lang="pt-BR" smtClean="0"/>
-              <a:t>09/10/2019</a:t>
+              <a:t>10/10/2019</a:t>
             </a:fld>
             <a:endParaRPr lang="pt-BR"/>
           </a:p>
@@ -1620,7 +1620,7 @@
           <a:p>
             <a:fld id="{CC58B075-67F8-4A8D-AE1C-3D3E4193EBCA}" type="datetimeFigureOut">
               <a:rPr lang="pt-BR" smtClean="0"/>
-              <a:t>09/10/2019</a:t>
+              <a:t>10/10/2019</a:t>
             </a:fld>
             <a:endParaRPr lang="pt-BR"/>
           </a:p>
@@ -1737,7 +1737,7 @@
           <a:p>
             <a:fld id="{CC58B075-67F8-4A8D-AE1C-3D3E4193EBCA}" type="datetimeFigureOut">
               <a:rPr lang="pt-BR" smtClean="0"/>
-              <a:t>09/10/2019</a:t>
+              <a:t>10/10/2019</a:t>
             </a:fld>
             <a:endParaRPr lang="pt-BR"/>
           </a:p>
@@ -1832,7 +1832,7 @@
           <a:p>
             <a:fld id="{CC58B075-67F8-4A8D-AE1C-3D3E4193EBCA}" type="datetimeFigureOut">
               <a:rPr lang="pt-BR" smtClean="0"/>
-              <a:t>09/10/2019</a:t>
+              <a:t>10/10/2019</a:t>
             </a:fld>
             <a:endParaRPr lang="pt-BR"/>
           </a:p>
@@ -2107,7 +2107,7 @@
           <a:p>
             <a:fld id="{CC58B075-67F8-4A8D-AE1C-3D3E4193EBCA}" type="datetimeFigureOut">
               <a:rPr lang="pt-BR" smtClean="0"/>
-              <a:t>09/10/2019</a:t>
+              <a:t>10/10/2019</a:t>
             </a:fld>
             <a:endParaRPr lang="pt-BR"/>
           </a:p>
@@ -2359,7 +2359,7 @@
           <a:p>
             <a:fld id="{CC58B075-67F8-4A8D-AE1C-3D3E4193EBCA}" type="datetimeFigureOut">
               <a:rPr lang="pt-BR" smtClean="0"/>
-              <a:t>09/10/2019</a:t>
+              <a:t>10/10/2019</a:t>
             </a:fld>
             <a:endParaRPr lang="pt-BR"/>
           </a:p>
@@ -2570,7 +2570,7 @@
           <a:p>
             <a:fld id="{CC58B075-67F8-4A8D-AE1C-3D3E4193EBCA}" type="datetimeFigureOut">
               <a:rPr lang="pt-BR" smtClean="0"/>
-              <a:t>09/10/2019</a:t>
+              <a:t>10/10/2019</a:t>
             </a:fld>
             <a:endParaRPr lang="pt-BR"/>
           </a:p>
@@ -2993,13 +2993,48 @@
           <a:lstStyle/>
           <a:p>
             <a:r>
+              <a:rPr lang="pt-BR" sz="3600" dirty="0" err="1" smtClean="0"/>
+              <a:t>Docker</a:t>
+            </a:r>
+            <a:r>
               <a:rPr lang="pt-BR" sz="3600" dirty="0" smtClean="0"/>
-              <a:t>Docker</a:t>
+              <a:t> </a:t>
+            </a:r>
+            <a:br>
+              <a:rPr lang="pt-BR" sz="3600" dirty="0" smtClean="0"/>
+            </a:br>
+            <a:r>
+              <a:rPr lang="pt-BR" sz="3600" dirty="0" smtClean="0"/>
+              <a:t>(resumo) </a:t>
             </a:r>
             <a:endParaRPr lang="pt-BR" sz="3600" dirty="0"/>
           </a:p>
         </p:txBody>
       </p:sp>
+      <p:pic>
+        <p:nvPicPr>
+          <p:cNvPr id="3" name="Imagem 2"/>
+          <p:cNvPicPr>
+            <a:picLocks noChangeAspect="1"/>
+          </p:cNvPicPr>
+          <p:nvPr/>
+        </p:nvPicPr>
+        <p:blipFill>
+          <a:blip r:embed="rId2"/>
+          <a:stretch>
+            <a:fillRect/>
+          </a:stretch>
+        </p:blipFill>
+        <p:spPr>
+          <a:xfrm>
+            <a:off x="4648200" y="3509963"/>
+            <a:ext cx="2895600" cy="1581150"/>
+          </a:xfrm>
+          <a:prstGeom prst="rect">
+            <a:avLst/>
+          </a:prstGeom>
+        </p:spPr>
+      </p:pic>
     </p:spTree>
     <p:extLst>
       <p:ext uri="{BB962C8B-B14F-4D97-AF65-F5344CB8AC3E}">
@@ -7816,11 +7851,6 @@
               </a:rPr>
               <a:t> start</a:t>
             </a:r>
-            <a:endParaRPr lang="pt-BR" sz="1600" dirty="0">
-              <a:solidFill>
-                <a:schemeClr val="accent5"/>
-              </a:solidFill>
-            </a:endParaRPr>
           </a:p>
           <a:p>
             <a:pPr>
@@ -7846,11 +7876,6 @@
               </a:rPr>
               <a:t>Você conseguirá executar o código em http://localhost:8080</a:t>
             </a:r>
-            <a:endParaRPr lang="pt-BR" sz="2400" dirty="0" smtClean="0">
-              <a:solidFill>
-                <a:schemeClr val="accent5"/>
-              </a:solidFill>
-            </a:endParaRPr>
           </a:p>
           <a:p>
             <a:pPr>

</xml_diff>

<commit_message>
Criando suas próprias imagens
</commit_message>
<xml_diff>
--- a/docs/docker-resumo.pptx
+++ b/docs/docker-resumo.pptx
@@ -268,7 +268,7 @@
           <a:p>
             <a:fld id="{CC58B075-67F8-4A8D-AE1C-3D3E4193EBCA}" type="datetimeFigureOut">
               <a:rPr lang="pt-BR" smtClean="0"/>
-              <a:t>10/10/2019</a:t>
+              <a:t>21/10/2019</a:t>
             </a:fld>
             <a:endParaRPr lang="pt-BR"/>
           </a:p>
@@ -436,7 +436,7 @@
           <a:p>
             <a:fld id="{CC58B075-67F8-4A8D-AE1C-3D3E4193EBCA}" type="datetimeFigureOut">
               <a:rPr lang="pt-BR" smtClean="0"/>
-              <a:t>10/10/2019</a:t>
+              <a:t>21/10/2019</a:t>
             </a:fld>
             <a:endParaRPr lang="pt-BR"/>
           </a:p>
@@ -614,7 +614,7 @@
           <a:p>
             <a:fld id="{CC58B075-67F8-4A8D-AE1C-3D3E4193EBCA}" type="datetimeFigureOut">
               <a:rPr lang="pt-BR" smtClean="0"/>
-              <a:t>10/10/2019</a:t>
+              <a:t>21/10/2019</a:t>
             </a:fld>
             <a:endParaRPr lang="pt-BR"/>
           </a:p>
@@ -782,7 +782,7 @@
           <a:p>
             <a:fld id="{CC58B075-67F8-4A8D-AE1C-3D3E4193EBCA}" type="datetimeFigureOut">
               <a:rPr lang="pt-BR" smtClean="0"/>
-              <a:t>10/10/2019</a:t>
+              <a:t>21/10/2019</a:t>
             </a:fld>
             <a:endParaRPr lang="pt-BR"/>
           </a:p>
@@ -1027,7 +1027,7 @@
           <a:p>
             <a:fld id="{CC58B075-67F8-4A8D-AE1C-3D3E4193EBCA}" type="datetimeFigureOut">
               <a:rPr lang="pt-BR" smtClean="0"/>
-              <a:t>10/10/2019</a:t>
+              <a:t>21/10/2019</a:t>
             </a:fld>
             <a:endParaRPr lang="pt-BR"/>
           </a:p>
@@ -1256,7 +1256,7 @@
           <a:p>
             <a:fld id="{CC58B075-67F8-4A8D-AE1C-3D3E4193EBCA}" type="datetimeFigureOut">
               <a:rPr lang="pt-BR" smtClean="0"/>
-              <a:t>10/10/2019</a:t>
+              <a:t>21/10/2019</a:t>
             </a:fld>
             <a:endParaRPr lang="pt-BR"/>
           </a:p>
@@ -1620,7 +1620,7 @@
           <a:p>
             <a:fld id="{CC58B075-67F8-4A8D-AE1C-3D3E4193EBCA}" type="datetimeFigureOut">
               <a:rPr lang="pt-BR" smtClean="0"/>
-              <a:t>10/10/2019</a:t>
+              <a:t>21/10/2019</a:t>
             </a:fld>
             <a:endParaRPr lang="pt-BR"/>
           </a:p>
@@ -1737,7 +1737,7 @@
           <a:p>
             <a:fld id="{CC58B075-67F8-4A8D-AE1C-3D3E4193EBCA}" type="datetimeFigureOut">
               <a:rPr lang="pt-BR" smtClean="0"/>
-              <a:t>10/10/2019</a:t>
+              <a:t>21/10/2019</a:t>
             </a:fld>
             <a:endParaRPr lang="pt-BR"/>
           </a:p>
@@ -1832,7 +1832,7 @@
           <a:p>
             <a:fld id="{CC58B075-67F8-4A8D-AE1C-3D3E4193EBCA}" type="datetimeFigureOut">
               <a:rPr lang="pt-BR" smtClean="0"/>
-              <a:t>10/10/2019</a:t>
+              <a:t>21/10/2019</a:t>
             </a:fld>
             <a:endParaRPr lang="pt-BR"/>
           </a:p>
@@ -2107,7 +2107,7 @@
           <a:p>
             <a:fld id="{CC58B075-67F8-4A8D-AE1C-3D3E4193EBCA}" type="datetimeFigureOut">
               <a:rPr lang="pt-BR" smtClean="0"/>
-              <a:t>10/10/2019</a:t>
+              <a:t>21/10/2019</a:t>
             </a:fld>
             <a:endParaRPr lang="pt-BR"/>
           </a:p>
@@ -2359,7 +2359,7 @@
           <a:p>
             <a:fld id="{CC58B075-67F8-4A8D-AE1C-3D3E4193EBCA}" type="datetimeFigureOut">
               <a:rPr lang="pt-BR" smtClean="0"/>
-              <a:t>10/10/2019</a:t>
+              <a:t>21/10/2019</a:t>
             </a:fld>
             <a:endParaRPr lang="pt-BR"/>
           </a:p>
@@ -2570,7 +2570,7 @@
           <a:p>
             <a:fld id="{CC58B075-67F8-4A8D-AE1C-3D3E4193EBCA}" type="datetimeFigureOut">
               <a:rPr lang="pt-BR" smtClean="0"/>
-              <a:t>10/10/2019</a:t>
+              <a:t>21/10/2019</a:t>
             </a:fld>
             <a:endParaRPr lang="pt-BR"/>
           </a:p>
@@ -7677,7 +7677,7 @@
         </p:nvSpPr>
         <p:spPr>
           <a:xfrm>
-            <a:off x="115910" y="123288"/>
+            <a:off x="115910" y="112271"/>
             <a:ext cx="11951594" cy="422275"/>
           </a:xfrm>
         </p:spPr>
@@ -7708,8 +7708,8 @@
         </p:nvSpPr>
         <p:spPr>
           <a:xfrm>
-            <a:off x="241478" y="927279"/>
-            <a:ext cx="11259355" cy="2434107"/>
+            <a:off x="194791" y="629823"/>
+            <a:ext cx="11259355" cy="2895575"/>
           </a:xfrm>
         </p:spPr>
         <p:txBody>
@@ -7732,20 +7732,33 @@
             </a:r>
           </a:p>
           <a:p>
-            <a:endParaRPr lang="pt-BR" sz="2000" b="1" dirty="0"/>
-          </a:p>
-          <a:p>
             <a:pPr lvl="2">
               <a:buFont typeface="Wingdings" panose="05000000000000000000" pitchFamily="2" charset="2"/>
               <a:buChar char="Ø"/>
             </a:pPr>
             <a:r>
+              <a:rPr lang="pt-BR" sz="1600" dirty="0" err="1" smtClean="0">
+                <a:solidFill>
+                  <a:schemeClr val="accent5"/>
+                </a:solidFill>
+              </a:rPr>
+              <a:t>docker</a:t>
+            </a:r>
+            <a:r>
+              <a:rPr lang="pt-BR" sz="1600" dirty="0" smtClean="0">
+                <a:solidFill>
+                  <a:schemeClr val="accent5"/>
+                </a:solidFill>
+              </a:rPr>
+              <a:t> </a:t>
+            </a:r>
+            <a:r>
               <a:rPr lang="pt-BR" sz="1600" dirty="0" err="1">
                 <a:solidFill>
                   <a:schemeClr val="accent5"/>
                 </a:solidFill>
               </a:rPr>
-              <a:t>docker</a:t>
+              <a:t>run</a:t>
             </a:r>
             <a:r>
               <a:rPr lang="pt-BR" sz="1600" dirty="0">
@@ -7753,128 +7766,278 @@
                   <a:schemeClr val="accent5"/>
                 </a:solidFill>
               </a:rPr>
+              <a:t> -d -p 8080:3000 -v "//c/</a:t>
+            </a:r>
+            <a:r>
+              <a:rPr lang="pt-BR" sz="1600" dirty="0" err="1">
+                <a:solidFill>
+                  <a:schemeClr val="accent5"/>
+                </a:solidFill>
+              </a:rPr>
+              <a:t>Users</a:t>
+            </a:r>
+            <a:r>
+              <a:rPr lang="pt-BR" sz="1600" dirty="0" smtClean="0">
+                <a:solidFill>
+                  <a:schemeClr val="accent5"/>
+                </a:solidFill>
+              </a:rPr>
+              <a:t>/&lt;&lt;Seu caminho local&gt;&gt;/volume-exemplo</a:t>
+            </a:r>
+            <a:r>
+              <a:rPr lang="pt-BR" sz="1600" dirty="0">
+                <a:solidFill>
+                  <a:schemeClr val="accent5"/>
+                </a:solidFill>
+              </a:rPr>
+              <a:t>:/var/</a:t>
+            </a:r>
+            <a:r>
+              <a:rPr lang="pt-BR" sz="1600" dirty="0" err="1">
+                <a:solidFill>
+                  <a:schemeClr val="accent5"/>
+                </a:solidFill>
+              </a:rPr>
+              <a:t>www</a:t>
+            </a:r>
+            <a:r>
+              <a:rPr lang="pt-BR" sz="1600" dirty="0">
+                <a:solidFill>
+                  <a:schemeClr val="accent5"/>
+                </a:solidFill>
+              </a:rPr>
+              <a:t>" -w "/var/</a:t>
+            </a:r>
+            <a:r>
+              <a:rPr lang="pt-BR" sz="1600" dirty="0" err="1">
+                <a:solidFill>
+                  <a:schemeClr val="accent5"/>
+                </a:solidFill>
+              </a:rPr>
+              <a:t>www</a:t>
+            </a:r>
+            <a:r>
+              <a:rPr lang="pt-BR" sz="1600" dirty="0">
+                <a:solidFill>
+                  <a:schemeClr val="accent5"/>
+                </a:solidFill>
+              </a:rPr>
+              <a:t>" </a:t>
+            </a:r>
+            <a:r>
+              <a:rPr lang="pt-BR" sz="1600" dirty="0" smtClean="0">
+                <a:solidFill>
+                  <a:schemeClr val="accent5"/>
+                </a:solidFill>
+              </a:rPr>
+              <a:t>node </a:t>
+            </a:r>
+            <a:r>
+              <a:rPr lang="pt-BR" sz="1600" dirty="0" err="1">
+                <a:solidFill>
+                  <a:schemeClr val="accent5"/>
+                </a:solidFill>
+              </a:rPr>
+              <a:t>npm</a:t>
+            </a:r>
+            <a:r>
+              <a:rPr lang="pt-BR" sz="1600" dirty="0">
+                <a:solidFill>
+                  <a:schemeClr val="accent5"/>
+                </a:solidFill>
+              </a:rPr>
               <a:t> </a:t>
             </a:r>
             <a:r>
-              <a:rPr lang="pt-BR" sz="1600" dirty="0" err="1">
+              <a:rPr lang="pt-BR" sz="1600" dirty="0" smtClean="0">
                 <a:solidFill>
                   <a:schemeClr val="accent5"/>
                 </a:solidFill>
               </a:rPr>
-              <a:t>run</a:t>
-            </a:r>
-            <a:r>
-              <a:rPr lang="pt-BR" sz="1600" dirty="0">
-                <a:solidFill>
-                  <a:schemeClr val="accent5"/>
-                </a:solidFill>
-              </a:rPr>
-              <a:t> -d -p 8080:3000 -v "//c/</a:t>
-            </a:r>
-            <a:r>
-              <a:rPr lang="pt-BR" sz="1600" dirty="0" err="1">
-                <a:solidFill>
-                  <a:schemeClr val="accent5"/>
-                </a:solidFill>
-              </a:rPr>
-              <a:t>Users</a:t>
-            </a:r>
-            <a:r>
-              <a:rPr lang="pt-BR" sz="1600" dirty="0" smtClean="0">
-                <a:solidFill>
-                  <a:schemeClr val="accent5"/>
-                </a:solidFill>
-              </a:rPr>
-              <a:t>/&lt;&lt;Seu caminho local&gt;&gt;/volume-exemplo</a:t>
-            </a:r>
-            <a:r>
-              <a:rPr lang="pt-BR" sz="1600" dirty="0">
-                <a:solidFill>
-                  <a:schemeClr val="accent5"/>
-                </a:solidFill>
-              </a:rPr>
-              <a:t>:/var/</a:t>
-            </a:r>
-            <a:r>
-              <a:rPr lang="pt-BR" sz="1600" dirty="0" err="1">
-                <a:solidFill>
-                  <a:schemeClr val="accent5"/>
-                </a:solidFill>
-              </a:rPr>
-              <a:t>www</a:t>
-            </a:r>
-            <a:r>
-              <a:rPr lang="pt-BR" sz="1600" dirty="0">
-                <a:solidFill>
-                  <a:schemeClr val="accent5"/>
-                </a:solidFill>
-              </a:rPr>
-              <a:t>" -w "/var/</a:t>
-            </a:r>
-            <a:r>
-              <a:rPr lang="pt-BR" sz="1600" dirty="0" err="1">
-                <a:solidFill>
-                  <a:schemeClr val="accent5"/>
-                </a:solidFill>
-              </a:rPr>
-              <a:t>www</a:t>
-            </a:r>
-            <a:r>
-              <a:rPr lang="pt-BR" sz="1600" dirty="0">
-                <a:solidFill>
-                  <a:schemeClr val="accent5"/>
-                </a:solidFill>
-              </a:rPr>
-              <a:t>" </a:t>
-            </a:r>
-            <a:r>
-              <a:rPr lang="pt-BR" sz="1600" dirty="0" smtClean="0">
-                <a:solidFill>
-                  <a:schemeClr val="accent5"/>
-                </a:solidFill>
-              </a:rPr>
-              <a:t>node </a:t>
-            </a:r>
-            <a:r>
-              <a:rPr lang="pt-BR" sz="1600" dirty="0" err="1">
-                <a:solidFill>
-                  <a:schemeClr val="accent5"/>
-                </a:solidFill>
-              </a:rPr>
-              <a:t>npm</a:t>
-            </a:r>
-            <a:r>
-              <a:rPr lang="pt-BR" sz="1600" dirty="0">
-                <a:solidFill>
-                  <a:schemeClr val="accent5"/>
-                </a:solidFill>
-              </a:rPr>
-              <a:t> start</a:t>
-            </a:r>
-          </a:p>
-          <a:p>
-            <a:pPr>
+              <a:t>start</a:t>
+            </a:r>
+          </a:p>
+          <a:p>
+            <a:pPr lvl="2">
               <a:buFont typeface="Wingdings" panose="05000000000000000000" pitchFamily="2" charset="2"/>
               <a:buChar char="Ø"/>
             </a:pPr>
-            <a:endParaRPr lang="pt-BR" sz="2400" dirty="0" smtClean="0">
+            <a:endParaRPr lang="pt-BR" sz="1600" dirty="0">
               <a:solidFill>
                 <a:schemeClr val="accent5"/>
               </a:solidFill>
             </a:endParaRPr>
           </a:p>
           <a:p>
-            <a:pPr>
+            <a:pPr marL="3200400" lvl="7" indent="0">
+              <a:buNone/>
+            </a:pPr>
+            <a:r>
+              <a:rPr lang="pt-BR" sz="1400" b="1" dirty="0" smtClean="0">
+                <a:solidFill>
+                  <a:schemeClr val="accent5"/>
+                </a:solidFill>
+              </a:rPr>
+              <a:t>Ou </a:t>
+            </a:r>
+          </a:p>
+          <a:p>
+            <a:pPr marL="3200400" lvl="7" indent="0">
+              <a:buNone/>
+            </a:pPr>
+            <a:endParaRPr lang="pt-BR" sz="1400" b="1" dirty="0">
+              <a:solidFill>
+                <a:schemeClr val="accent5"/>
+              </a:solidFill>
+            </a:endParaRPr>
+          </a:p>
+          <a:p>
+            <a:pPr lvl="2">
               <a:buFont typeface="Wingdings" panose="05000000000000000000" pitchFamily="2" charset="2"/>
               <a:buChar char="Ø"/>
             </a:pPr>
             <a:r>
+              <a:rPr lang="pt-BR" sz="1600" dirty="0" err="1">
+                <a:solidFill>
+                  <a:schemeClr val="accent5"/>
+                </a:solidFill>
+              </a:rPr>
+              <a:t>docker</a:t>
+            </a:r>
+            <a:r>
+              <a:rPr lang="pt-BR" sz="1600" dirty="0">
+                <a:solidFill>
+                  <a:schemeClr val="accent5"/>
+                </a:solidFill>
+              </a:rPr>
+              <a:t> </a:t>
+            </a:r>
+            <a:r>
+              <a:rPr lang="pt-BR" sz="1600" dirty="0" err="1">
+                <a:solidFill>
+                  <a:schemeClr val="accent5"/>
+                </a:solidFill>
+              </a:rPr>
+              <a:t>run</a:t>
+            </a:r>
+            <a:r>
+              <a:rPr lang="pt-BR" sz="1600" dirty="0">
+                <a:solidFill>
+                  <a:schemeClr val="accent5"/>
+                </a:solidFill>
+              </a:rPr>
+              <a:t> -d -p 8080:3000 -v </a:t>
+            </a:r>
+            <a:r>
+              <a:rPr lang="pt-BR" sz="1600" dirty="0" smtClean="0">
+                <a:solidFill>
+                  <a:schemeClr val="accent5"/>
+                </a:solidFill>
+              </a:rPr>
+              <a:t>“$(</a:t>
+            </a:r>
+            <a:r>
+              <a:rPr lang="pt-BR" sz="1600" dirty="0" err="1" smtClean="0">
+                <a:solidFill>
+                  <a:schemeClr val="accent5"/>
+                </a:solidFill>
+              </a:rPr>
+              <a:t>pwd</a:t>
+            </a:r>
+            <a:r>
+              <a:rPr lang="pt-BR" sz="1600" dirty="0" smtClean="0">
+                <a:solidFill>
+                  <a:schemeClr val="accent5"/>
+                </a:solidFill>
+              </a:rPr>
+              <a:t>):/</a:t>
+            </a:r>
+            <a:r>
+              <a:rPr lang="pt-BR" sz="1600" dirty="0">
+                <a:solidFill>
+                  <a:schemeClr val="accent5"/>
+                </a:solidFill>
+              </a:rPr>
+              <a:t>var/</a:t>
+            </a:r>
+            <a:r>
+              <a:rPr lang="pt-BR" sz="1600" dirty="0" err="1">
+                <a:solidFill>
+                  <a:schemeClr val="accent5"/>
+                </a:solidFill>
+              </a:rPr>
+              <a:t>www</a:t>
+            </a:r>
+            <a:r>
+              <a:rPr lang="pt-BR" sz="1600" dirty="0">
+                <a:solidFill>
+                  <a:schemeClr val="accent5"/>
+                </a:solidFill>
+              </a:rPr>
+              <a:t>" -w "/var/</a:t>
+            </a:r>
+            <a:r>
+              <a:rPr lang="pt-BR" sz="1600" dirty="0" err="1">
+                <a:solidFill>
+                  <a:schemeClr val="accent5"/>
+                </a:solidFill>
+              </a:rPr>
+              <a:t>www</a:t>
+            </a:r>
+            <a:r>
+              <a:rPr lang="pt-BR" sz="1600" dirty="0">
+                <a:solidFill>
+                  <a:schemeClr val="accent5"/>
+                </a:solidFill>
+              </a:rPr>
+              <a:t>" node </a:t>
+            </a:r>
+            <a:r>
+              <a:rPr lang="pt-BR" sz="1600" dirty="0" err="1">
+                <a:solidFill>
+                  <a:schemeClr val="accent5"/>
+                </a:solidFill>
+              </a:rPr>
+              <a:t>npm</a:t>
+            </a:r>
+            <a:r>
+              <a:rPr lang="pt-BR" sz="1600" dirty="0">
+                <a:solidFill>
+                  <a:schemeClr val="accent5"/>
+                </a:solidFill>
+              </a:rPr>
+              <a:t> start</a:t>
+            </a:r>
+          </a:p>
+          <a:p>
+            <a:pPr marL="3200400" lvl="7" indent="0">
+              <a:buNone/>
+            </a:pPr>
+            <a:endParaRPr lang="pt-BR" sz="1400" b="1" dirty="0" smtClean="0">
+              <a:solidFill>
+                <a:schemeClr val="accent5"/>
+              </a:solidFill>
+            </a:endParaRPr>
+          </a:p>
+          <a:p>
+            <a:pPr marL="0" indent="0" algn="ctr">
+              <a:buNone/>
+            </a:pPr>
+            <a:r>
               <a:rPr lang="pt-BR" sz="2400" dirty="0" smtClean="0">
                 <a:solidFill>
-                  <a:schemeClr val="accent5"/>
-                </a:solidFill>
-              </a:rPr>
-              <a:t>Você conseguirá executar o código em http://localhost:8080</a:t>
+                  <a:schemeClr val="accent6"/>
+                </a:solidFill>
+              </a:rPr>
+              <a:t>Você </a:t>
+            </a:r>
+            <a:r>
+              <a:rPr lang="pt-BR" sz="2400" dirty="0" smtClean="0">
+                <a:solidFill>
+                  <a:schemeClr val="accent6"/>
+                </a:solidFill>
+              </a:rPr>
+              <a:t>conseguirá executar o código em http://localhost:8080</a:t>
             </a:r>
           </a:p>
           <a:p>
@@ -7900,8 +8063,8 @@
         </p:nvSpPr>
         <p:spPr>
           <a:xfrm>
-            <a:off x="288164" y="3271233"/>
-            <a:ext cx="11165982" cy="3438659"/>
+            <a:off x="288164" y="3448280"/>
+            <a:ext cx="11165982" cy="3261612"/>
           </a:xfrm>
           <a:prstGeom prst="rect">
             <a:avLst/>
@@ -8581,15 +8744,377 @@
             <a:pPr algn="just"/>
             <a:r>
               <a:rPr lang="pt-BR" sz="2000" b="1" i="1" dirty="0" smtClean="0"/>
-              <a:t>XXXXXX</a:t>
-            </a:r>
+              <a:t>Criando um </a:t>
+            </a:r>
+            <a:r>
+              <a:rPr lang="pt-BR" sz="2000" b="1" i="1" dirty="0" err="1" smtClean="0"/>
+              <a:t>Dockerfile</a:t>
+            </a:r>
+            <a:endParaRPr lang="pt-BR" sz="2000" b="1" i="1" dirty="0" smtClean="0"/>
+          </a:p>
+          <a:p>
+            <a:pPr algn="just"/>
+            <a:endParaRPr lang="pt-BR" sz="2000" b="1" i="1" u="sng" dirty="0"/>
+          </a:p>
+          <a:p>
+            <a:pPr lvl="1"/>
+            <a:r>
+              <a:rPr lang="pt-BR" sz="1400" dirty="0">
+                <a:solidFill>
+                  <a:srgbClr val="6A9955"/>
+                </a:solidFill>
+                <a:latin typeface="Consolas" panose="020B0609020204030204" pitchFamily="49" charset="0"/>
+              </a:rPr>
+              <a:t># Poderia ter outros nomes como: </a:t>
+            </a:r>
+            <a:r>
+              <a:rPr lang="pt-BR" sz="1400" dirty="0" err="1">
+                <a:solidFill>
+                  <a:srgbClr val="6A9955"/>
+                </a:solidFill>
+                <a:latin typeface="Consolas" panose="020B0609020204030204" pitchFamily="49" charset="0"/>
+              </a:rPr>
+              <a:t>node.dockerfile</a:t>
+            </a:r>
+            <a:r>
+              <a:rPr lang="pt-BR" sz="1400" dirty="0">
+                <a:solidFill>
+                  <a:srgbClr val="6A9955"/>
+                </a:solidFill>
+                <a:latin typeface="Consolas" panose="020B0609020204030204" pitchFamily="49" charset="0"/>
+              </a:rPr>
+              <a:t>, se </a:t>
+            </a:r>
+            <a:r>
+              <a:rPr lang="pt-BR" sz="1400" dirty="0" err="1">
+                <a:solidFill>
+                  <a:srgbClr val="6A9955"/>
+                </a:solidFill>
+                <a:latin typeface="Consolas" panose="020B0609020204030204" pitchFamily="49" charset="0"/>
+              </a:rPr>
+              <a:t>vc</a:t>
+            </a:r>
+            <a:r>
+              <a:rPr lang="pt-BR" sz="1400" dirty="0">
+                <a:solidFill>
+                  <a:srgbClr val="6A9955"/>
+                </a:solidFill>
+                <a:latin typeface="Consolas" panose="020B0609020204030204" pitchFamily="49" charset="0"/>
+              </a:rPr>
+              <a:t> tivesse vários </a:t>
+            </a:r>
+            <a:r>
+              <a:rPr lang="pt-BR" sz="1400" dirty="0" err="1">
+                <a:solidFill>
+                  <a:srgbClr val="6A9955"/>
+                </a:solidFill>
+                <a:latin typeface="Consolas" panose="020B0609020204030204" pitchFamily="49" charset="0"/>
+              </a:rPr>
+              <a:t>Dockerfiles</a:t>
+            </a:r>
+            <a:endParaRPr lang="pt-BR" sz="1400" dirty="0">
+              <a:solidFill>
+                <a:srgbClr val="D4D4D4"/>
+              </a:solidFill>
+              <a:latin typeface="Consolas" panose="020B0609020204030204" pitchFamily="49" charset="0"/>
+            </a:endParaRPr>
+          </a:p>
+          <a:p>
+            <a:pPr lvl="1"/>
+            <a:r>
+              <a:rPr lang="pt-BR" sz="1400" dirty="0">
+                <a:solidFill>
+                  <a:srgbClr val="569CD6"/>
+                </a:solidFill>
+                <a:latin typeface="Consolas" panose="020B0609020204030204" pitchFamily="49" charset="0"/>
+              </a:rPr>
+              <a:t>FROM</a:t>
+            </a:r>
+            <a:r>
+              <a:rPr lang="pt-BR" sz="1400" dirty="0">
+                <a:solidFill>
+                  <a:srgbClr val="D4D4D4"/>
+                </a:solidFill>
+                <a:latin typeface="Consolas" panose="020B0609020204030204" pitchFamily="49" charset="0"/>
+              </a:rPr>
+              <a:t> </a:t>
+            </a:r>
+            <a:r>
+              <a:rPr lang="pt-BR" sz="1400" dirty="0" err="1">
+                <a:solidFill>
+                  <a:srgbClr val="D4D4D4"/>
+                </a:solidFill>
+                <a:latin typeface="Consolas" panose="020B0609020204030204" pitchFamily="49" charset="0"/>
+              </a:rPr>
+              <a:t>node:latest</a:t>
+            </a:r>
+            <a:endParaRPr lang="pt-BR" sz="1400" dirty="0">
+              <a:solidFill>
+                <a:srgbClr val="D4D4D4"/>
+              </a:solidFill>
+              <a:latin typeface="Consolas" panose="020B0609020204030204" pitchFamily="49" charset="0"/>
+            </a:endParaRPr>
+          </a:p>
+          <a:p>
+            <a:pPr lvl="1"/>
+            <a:r>
+              <a:rPr lang="pt-BR" sz="1400" dirty="0">
+                <a:solidFill>
+                  <a:srgbClr val="569CD6"/>
+                </a:solidFill>
+                <a:latin typeface="Consolas" panose="020B0609020204030204" pitchFamily="49" charset="0"/>
+              </a:rPr>
+              <a:t>MAINTAINER</a:t>
+            </a:r>
+            <a:r>
+              <a:rPr lang="pt-BR" sz="1400" dirty="0">
+                <a:solidFill>
+                  <a:srgbClr val="D4D4D4"/>
+                </a:solidFill>
+                <a:latin typeface="Consolas" panose="020B0609020204030204" pitchFamily="49" charset="0"/>
+              </a:rPr>
+              <a:t> Luciano Cordeiro</a:t>
+            </a:r>
+          </a:p>
+          <a:p>
+            <a:pPr lvl="1"/>
+            <a:r>
+              <a:rPr lang="pt-BR" sz="1400" dirty="0">
+                <a:solidFill>
+                  <a:srgbClr val="569CD6"/>
+                </a:solidFill>
+                <a:latin typeface="Consolas" panose="020B0609020204030204" pitchFamily="49" charset="0"/>
+              </a:rPr>
+              <a:t>COPY</a:t>
+            </a:r>
+            <a:r>
+              <a:rPr lang="pt-BR" sz="1400" dirty="0">
+                <a:solidFill>
+                  <a:srgbClr val="D4D4D4"/>
+                </a:solidFill>
+                <a:latin typeface="Consolas" panose="020B0609020204030204" pitchFamily="49" charset="0"/>
+              </a:rPr>
+              <a:t> . /var/</a:t>
+            </a:r>
+            <a:r>
+              <a:rPr lang="pt-BR" sz="1400" dirty="0" err="1">
+                <a:solidFill>
+                  <a:srgbClr val="D4D4D4"/>
+                </a:solidFill>
+                <a:latin typeface="Consolas" panose="020B0609020204030204" pitchFamily="49" charset="0"/>
+              </a:rPr>
+              <a:t>www</a:t>
+            </a:r>
+            <a:endParaRPr lang="pt-BR" sz="1400" dirty="0">
+              <a:solidFill>
+                <a:srgbClr val="D4D4D4"/>
+              </a:solidFill>
+              <a:latin typeface="Consolas" panose="020B0609020204030204" pitchFamily="49" charset="0"/>
+            </a:endParaRPr>
+          </a:p>
+          <a:p>
+            <a:pPr lvl="1"/>
+            <a:r>
+              <a:rPr lang="pt-BR" sz="1400" dirty="0">
+                <a:solidFill>
+                  <a:srgbClr val="569CD6"/>
+                </a:solidFill>
+                <a:latin typeface="Consolas" panose="020B0609020204030204" pitchFamily="49" charset="0"/>
+              </a:rPr>
+              <a:t>WORKDIR</a:t>
+            </a:r>
+            <a:r>
+              <a:rPr lang="pt-BR" sz="1400" dirty="0">
+                <a:solidFill>
+                  <a:srgbClr val="D4D4D4"/>
+                </a:solidFill>
+                <a:latin typeface="Consolas" panose="020B0609020204030204" pitchFamily="49" charset="0"/>
+              </a:rPr>
+              <a:t> /var/</a:t>
+            </a:r>
+            <a:r>
+              <a:rPr lang="pt-BR" sz="1400" dirty="0" err="1">
+                <a:solidFill>
+                  <a:srgbClr val="D4D4D4"/>
+                </a:solidFill>
+                <a:latin typeface="Consolas" panose="020B0609020204030204" pitchFamily="49" charset="0"/>
+              </a:rPr>
+              <a:t>www</a:t>
+            </a:r>
+            <a:endParaRPr lang="pt-BR" sz="1400" dirty="0">
+              <a:solidFill>
+                <a:srgbClr val="D4D4D4"/>
+              </a:solidFill>
+              <a:latin typeface="Consolas" panose="020B0609020204030204" pitchFamily="49" charset="0"/>
+            </a:endParaRPr>
+          </a:p>
+          <a:p>
+            <a:pPr lvl="1"/>
+            <a:r>
+              <a:rPr lang="pt-BR" sz="1400" dirty="0">
+                <a:solidFill>
+                  <a:srgbClr val="569CD6"/>
+                </a:solidFill>
+                <a:latin typeface="Consolas" panose="020B0609020204030204" pitchFamily="49" charset="0"/>
+              </a:rPr>
+              <a:t>RUN</a:t>
+            </a:r>
+            <a:r>
+              <a:rPr lang="pt-BR" sz="1400" dirty="0">
+                <a:solidFill>
+                  <a:srgbClr val="D4D4D4"/>
+                </a:solidFill>
+                <a:latin typeface="Consolas" panose="020B0609020204030204" pitchFamily="49" charset="0"/>
+              </a:rPr>
+              <a:t> </a:t>
+            </a:r>
+            <a:r>
+              <a:rPr lang="pt-BR" sz="1400" dirty="0" err="1">
+                <a:solidFill>
+                  <a:srgbClr val="D4D4D4"/>
+                </a:solidFill>
+                <a:latin typeface="Consolas" panose="020B0609020204030204" pitchFamily="49" charset="0"/>
+              </a:rPr>
+              <a:t>npm</a:t>
+            </a:r>
+            <a:r>
+              <a:rPr lang="pt-BR" sz="1400" dirty="0">
+                <a:solidFill>
+                  <a:srgbClr val="D4D4D4"/>
+                </a:solidFill>
+                <a:latin typeface="Consolas" panose="020B0609020204030204" pitchFamily="49" charset="0"/>
+              </a:rPr>
+              <a:t> </a:t>
+            </a:r>
+            <a:r>
+              <a:rPr lang="pt-BR" sz="1400" dirty="0" err="1">
+                <a:solidFill>
+                  <a:srgbClr val="D4D4D4"/>
+                </a:solidFill>
+                <a:latin typeface="Consolas" panose="020B0609020204030204" pitchFamily="49" charset="0"/>
+              </a:rPr>
+              <a:t>install</a:t>
+            </a:r>
+            <a:endParaRPr lang="pt-BR" sz="1400" dirty="0">
+              <a:solidFill>
+                <a:srgbClr val="D4D4D4"/>
+              </a:solidFill>
+              <a:latin typeface="Consolas" panose="020B0609020204030204" pitchFamily="49" charset="0"/>
+            </a:endParaRPr>
+          </a:p>
+          <a:p>
+            <a:pPr lvl="1"/>
+            <a:r>
+              <a:rPr lang="pt-BR" sz="1400" dirty="0">
+                <a:solidFill>
+                  <a:srgbClr val="569CD6"/>
+                </a:solidFill>
+                <a:latin typeface="Consolas" panose="020B0609020204030204" pitchFamily="49" charset="0"/>
+              </a:rPr>
+              <a:t>ENTRYPOINT</a:t>
+            </a:r>
+            <a:r>
+              <a:rPr lang="pt-BR" sz="1400" dirty="0">
+                <a:solidFill>
+                  <a:srgbClr val="D4D4D4"/>
+                </a:solidFill>
+                <a:latin typeface="Consolas" panose="020B0609020204030204" pitchFamily="49" charset="0"/>
+              </a:rPr>
+              <a:t> </a:t>
+            </a:r>
+            <a:r>
+              <a:rPr lang="pt-BR" sz="1400" dirty="0" err="1">
+                <a:solidFill>
+                  <a:srgbClr val="D4D4D4"/>
+                </a:solidFill>
+                <a:latin typeface="Consolas" panose="020B0609020204030204" pitchFamily="49" charset="0"/>
+              </a:rPr>
+              <a:t>npm</a:t>
+            </a:r>
+            <a:r>
+              <a:rPr lang="pt-BR" sz="1400" dirty="0">
+                <a:solidFill>
+                  <a:srgbClr val="D4D4D4"/>
+                </a:solidFill>
+                <a:latin typeface="Consolas" panose="020B0609020204030204" pitchFamily="49" charset="0"/>
+              </a:rPr>
+              <a:t> start</a:t>
+            </a:r>
+          </a:p>
+          <a:p>
+            <a:pPr lvl="1"/>
+            <a:r>
+              <a:rPr lang="pt-BR" sz="1400" dirty="0">
+                <a:solidFill>
+                  <a:srgbClr val="569CD6"/>
+                </a:solidFill>
+                <a:latin typeface="Consolas" panose="020B0609020204030204" pitchFamily="49" charset="0"/>
+              </a:rPr>
+              <a:t>EXPOSE</a:t>
+            </a:r>
+            <a:r>
+              <a:rPr lang="pt-BR" sz="1400" dirty="0">
+                <a:solidFill>
+                  <a:srgbClr val="D4D4D4"/>
+                </a:solidFill>
+                <a:latin typeface="Consolas" panose="020B0609020204030204" pitchFamily="49" charset="0"/>
+              </a:rPr>
+              <a:t> 3000</a:t>
+            </a:r>
+          </a:p>
+          <a:p>
+            <a:pPr algn="just"/>
             <a:endParaRPr lang="pt-BR" sz="1400" u="sng" dirty="0" smtClean="0"/>
           </a:p>
           <a:p>
-            <a:pPr marL="457200" lvl="1" indent="0" algn="just">
-              <a:buNone/>
+            <a:pPr marL="228600" lvl="1" algn="just">
+              <a:spcBef>
+                <a:spcPts val="1000"/>
+              </a:spcBef>
             </a:pPr>
-            <a:endParaRPr lang="pt-BR" sz="1400" u="sng" dirty="0" smtClean="0"/>
+            <a:r>
+              <a:rPr lang="pt-BR" sz="2000" b="1" i="1" dirty="0" smtClean="0"/>
+              <a:t>Build do arquivo</a:t>
+            </a:r>
+          </a:p>
+          <a:p>
+            <a:pPr marL="685800" lvl="2" algn="just">
+              <a:spcBef>
+                <a:spcPts val="1000"/>
+              </a:spcBef>
+            </a:pPr>
+            <a:r>
+              <a:rPr lang="pt-BR" sz="1600" b="1" i="1" dirty="0" err="1" smtClean="0"/>
+              <a:t>docker</a:t>
+            </a:r>
+            <a:r>
+              <a:rPr lang="pt-BR" sz="1600" b="1" i="1" dirty="0" smtClean="0"/>
+              <a:t> </a:t>
+            </a:r>
+            <a:r>
+              <a:rPr lang="pt-BR" sz="1600" b="1" i="1" dirty="0"/>
+              <a:t>build -f </a:t>
+            </a:r>
+            <a:r>
+              <a:rPr lang="pt-BR" sz="1600" b="1" i="1" dirty="0" err="1" smtClean="0"/>
+              <a:t>Dockerfile</a:t>
+            </a:r>
+            <a:r>
+              <a:rPr lang="pt-BR" sz="1600" b="1" i="1" dirty="0" smtClean="0"/>
+              <a:t> </a:t>
+            </a:r>
+            <a:r>
+              <a:rPr lang="pt-BR" sz="1600" b="1" i="1" dirty="0"/>
+              <a:t>-t </a:t>
+            </a:r>
+            <a:r>
+              <a:rPr lang="pt-BR" sz="1600" b="1" i="1" dirty="0" err="1"/>
+              <a:t>lacsousa</a:t>
+            </a:r>
+            <a:r>
+              <a:rPr lang="pt-BR" sz="1600" b="1" i="1" dirty="0"/>
+              <a:t>/node .</a:t>
+            </a:r>
           </a:p>
         </p:txBody>
       </p:sp>

</xml_diff>

<commit_message>
Comandos de criação de Imagens
</commit_message>
<xml_diff>
--- a/docs/docker-resumo.pptx
+++ b/docs/docker-resumo.pptx
@@ -268,7 +268,7 @@
           <a:p>
             <a:fld id="{CC58B075-67F8-4A8D-AE1C-3D3E4193EBCA}" type="datetimeFigureOut">
               <a:rPr lang="pt-BR" smtClean="0"/>
-              <a:t>21/10/2019</a:t>
+              <a:t>22/10/2019</a:t>
             </a:fld>
             <a:endParaRPr lang="pt-BR"/>
           </a:p>
@@ -436,7 +436,7 @@
           <a:p>
             <a:fld id="{CC58B075-67F8-4A8D-AE1C-3D3E4193EBCA}" type="datetimeFigureOut">
               <a:rPr lang="pt-BR" smtClean="0"/>
-              <a:t>21/10/2019</a:t>
+              <a:t>22/10/2019</a:t>
             </a:fld>
             <a:endParaRPr lang="pt-BR"/>
           </a:p>
@@ -614,7 +614,7 @@
           <a:p>
             <a:fld id="{CC58B075-67F8-4A8D-AE1C-3D3E4193EBCA}" type="datetimeFigureOut">
               <a:rPr lang="pt-BR" smtClean="0"/>
-              <a:t>21/10/2019</a:t>
+              <a:t>22/10/2019</a:t>
             </a:fld>
             <a:endParaRPr lang="pt-BR"/>
           </a:p>
@@ -782,7 +782,7 @@
           <a:p>
             <a:fld id="{CC58B075-67F8-4A8D-AE1C-3D3E4193EBCA}" type="datetimeFigureOut">
               <a:rPr lang="pt-BR" smtClean="0"/>
-              <a:t>21/10/2019</a:t>
+              <a:t>22/10/2019</a:t>
             </a:fld>
             <a:endParaRPr lang="pt-BR"/>
           </a:p>
@@ -1027,7 +1027,7 @@
           <a:p>
             <a:fld id="{CC58B075-67F8-4A8D-AE1C-3D3E4193EBCA}" type="datetimeFigureOut">
               <a:rPr lang="pt-BR" smtClean="0"/>
-              <a:t>21/10/2019</a:t>
+              <a:t>22/10/2019</a:t>
             </a:fld>
             <a:endParaRPr lang="pt-BR"/>
           </a:p>
@@ -1256,7 +1256,7 @@
           <a:p>
             <a:fld id="{CC58B075-67F8-4A8D-AE1C-3D3E4193EBCA}" type="datetimeFigureOut">
               <a:rPr lang="pt-BR" smtClean="0"/>
-              <a:t>21/10/2019</a:t>
+              <a:t>22/10/2019</a:t>
             </a:fld>
             <a:endParaRPr lang="pt-BR"/>
           </a:p>
@@ -1620,7 +1620,7 @@
           <a:p>
             <a:fld id="{CC58B075-67F8-4A8D-AE1C-3D3E4193EBCA}" type="datetimeFigureOut">
               <a:rPr lang="pt-BR" smtClean="0"/>
-              <a:t>21/10/2019</a:t>
+              <a:t>22/10/2019</a:t>
             </a:fld>
             <a:endParaRPr lang="pt-BR"/>
           </a:p>
@@ -1737,7 +1737,7 @@
           <a:p>
             <a:fld id="{CC58B075-67F8-4A8D-AE1C-3D3E4193EBCA}" type="datetimeFigureOut">
               <a:rPr lang="pt-BR" smtClean="0"/>
-              <a:t>21/10/2019</a:t>
+              <a:t>22/10/2019</a:t>
             </a:fld>
             <a:endParaRPr lang="pt-BR"/>
           </a:p>
@@ -1832,7 +1832,7 @@
           <a:p>
             <a:fld id="{CC58B075-67F8-4A8D-AE1C-3D3E4193EBCA}" type="datetimeFigureOut">
               <a:rPr lang="pt-BR" smtClean="0"/>
-              <a:t>21/10/2019</a:t>
+              <a:t>22/10/2019</a:t>
             </a:fld>
             <a:endParaRPr lang="pt-BR"/>
           </a:p>
@@ -2107,7 +2107,7 @@
           <a:p>
             <a:fld id="{CC58B075-67F8-4A8D-AE1C-3D3E4193EBCA}" type="datetimeFigureOut">
               <a:rPr lang="pt-BR" smtClean="0"/>
-              <a:t>21/10/2019</a:t>
+              <a:t>22/10/2019</a:t>
             </a:fld>
             <a:endParaRPr lang="pt-BR"/>
           </a:p>
@@ -2359,7 +2359,7 @@
           <a:p>
             <a:fld id="{CC58B075-67F8-4A8D-AE1C-3D3E4193EBCA}" type="datetimeFigureOut">
               <a:rPr lang="pt-BR" smtClean="0"/>
-              <a:t>21/10/2019</a:t>
+              <a:t>22/10/2019</a:t>
             </a:fld>
             <a:endParaRPr lang="pt-BR"/>
           </a:p>
@@ -2570,7 +2570,7 @@
           <a:p>
             <a:fld id="{CC58B075-67F8-4A8D-AE1C-3D3E4193EBCA}" type="datetimeFigureOut">
               <a:rPr lang="pt-BR" smtClean="0"/>
-              <a:t>21/10/2019</a:t>
+              <a:t>22/10/2019</a:t>
             </a:fld>
             <a:endParaRPr lang="pt-BR"/>
           </a:p>
@@ -8029,15 +8029,7 @@
                   <a:schemeClr val="accent6"/>
                 </a:solidFill>
               </a:rPr>
-              <a:t>Você </a:t>
-            </a:r>
-            <a:r>
-              <a:rPr lang="pt-BR" sz="2400" dirty="0" smtClean="0">
-                <a:solidFill>
-                  <a:schemeClr val="accent6"/>
-                </a:solidFill>
-              </a:rPr>
-              <a:t>conseguirá executar o código em http://localhost:8080</a:t>
+              <a:t>Você conseguirá executar o código em http://localhost:8080</a:t>
             </a:r>
           </a:p>
           <a:p>
@@ -8750,7 +8742,23 @@
               <a:rPr lang="pt-BR" sz="2000" b="1" i="1" dirty="0" err="1" smtClean="0"/>
               <a:t>Dockerfile</a:t>
             </a:r>
-            <a:endParaRPr lang="pt-BR" sz="2000" b="1" i="1" dirty="0" smtClean="0"/>
+            <a:r>
+              <a:rPr lang="pt-BR" sz="2000" b="1" i="1" dirty="0" smtClean="0"/>
+              <a:t> – </a:t>
+            </a:r>
+            <a:r>
+              <a:rPr lang="pt-BR" sz="1800" dirty="0" smtClean="0"/>
+              <a:t>O </a:t>
+            </a:r>
+            <a:r>
+              <a:rPr lang="pt-BR" sz="1800" dirty="0" err="1" smtClean="0"/>
+              <a:t>Dockerfile</a:t>
+            </a:r>
+            <a:r>
+              <a:rPr lang="pt-BR" sz="1800" dirty="0" smtClean="0"/>
+              <a:t> define comandos para executar instalações complexas e com características específicas.</a:t>
+            </a:r>
+            <a:endParaRPr lang="pt-BR" sz="1800" dirty="0" smtClean="0"/>
           </a:p>
           <a:p>
             <a:pPr algn="just"/>
@@ -9067,53 +9075,68 @@
             <a:endParaRPr lang="pt-BR" sz="1400" u="sng" dirty="0" smtClean="0"/>
           </a:p>
           <a:p>
-            <a:pPr marL="228600" lvl="1" algn="just">
-              <a:spcBef>
-                <a:spcPts val="1000"/>
-              </a:spcBef>
-            </a:pPr>
-            <a:r>
-              <a:rPr lang="pt-BR" sz="2000" b="1" i="1" dirty="0" smtClean="0"/>
-              <a:t>Build do arquivo</a:t>
-            </a:r>
-          </a:p>
-          <a:p>
-            <a:pPr marL="685800" lvl="2" algn="just">
-              <a:spcBef>
-                <a:spcPts val="1000"/>
-              </a:spcBef>
-            </a:pPr>
-            <a:r>
-              <a:rPr lang="pt-BR" sz="1600" b="1" i="1" dirty="0" err="1" smtClean="0"/>
+            <a:pPr algn="just"/>
+            <a:r>
+              <a:rPr lang="pt-BR" sz="1800" u="sng" dirty="0" smtClean="0"/>
+              <a:t>Lembrando: </a:t>
+            </a:r>
+          </a:p>
+          <a:p>
+            <a:pPr lvl="1" algn="just"/>
+            <a:r>
+              <a:rPr lang="pt-BR" sz="1800" i="1" dirty="0" smtClean="0"/>
+              <a:t>As imagens são sempre </a:t>
+            </a:r>
+            <a:r>
+              <a:rPr lang="pt-BR" sz="1800" i="1" dirty="0" err="1" smtClean="0"/>
+              <a:t>read-only</a:t>
+            </a:r>
+            <a:endParaRPr lang="pt-BR" sz="1800" i="1" dirty="0" smtClean="0"/>
+          </a:p>
+          <a:p>
+            <a:pPr lvl="1" algn="just"/>
+            <a:r>
+              <a:rPr lang="pt-BR" sz="1800" i="1" dirty="0" smtClean="0"/>
+              <a:t>Um container é uma instância de uma imagem</a:t>
+            </a:r>
+          </a:p>
+          <a:p>
+            <a:pPr lvl="1" algn="just"/>
+            <a:r>
+              <a:rPr lang="pt-BR" sz="1800" i="1" dirty="0" smtClean="0"/>
+              <a:t>Para guardar as alterações a </a:t>
+            </a:r>
+            <a:r>
+              <a:rPr lang="pt-BR" sz="1800" i="1" dirty="0" err="1" smtClean="0"/>
               <a:t>docker</a:t>
             </a:r>
             <a:r>
-              <a:rPr lang="pt-BR" sz="1600" b="1" i="1" dirty="0" smtClean="0"/>
+              <a:rPr lang="pt-BR" sz="1800" i="1" dirty="0" smtClean="0"/>
               <a:t> </a:t>
             </a:r>
             <a:r>
-              <a:rPr lang="pt-BR" sz="1600" b="1" i="1" dirty="0"/>
-              <a:t>build -f </a:t>
-            </a:r>
-            <a:r>
-              <a:rPr lang="pt-BR" sz="1600" b="1" i="1" dirty="0" err="1" smtClean="0"/>
-              <a:t>Dockerfile</a:t>
-            </a:r>
-            <a:r>
-              <a:rPr lang="pt-BR" sz="1600" b="1" i="1" dirty="0" smtClean="0"/>
-              <a:t> </a:t>
-            </a:r>
-            <a:r>
-              <a:rPr lang="pt-BR" sz="1600" b="1" i="1" dirty="0"/>
-              <a:t>-t </a:t>
-            </a:r>
-            <a:r>
-              <a:rPr lang="pt-BR" sz="1600" b="1" i="1" dirty="0" err="1"/>
-              <a:t>lacsousa</a:t>
-            </a:r>
-            <a:r>
-              <a:rPr lang="pt-BR" sz="1600" b="1" i="1" dirty="0"/>
-              <a:t>/node .</a:t>
+              <a:rPr lang="pt-BR" sz="1800" i="1" dirty="0" err="1" smtClean="0"/>
+              <a:t>engine</a:t>
+            </a:r>
+            <a:r>
+              <a:rPr lang="pt-BR" sz="1800" i="1" dirty="0" smtClean="0"/>
+              <a:t> cria uma nova </a:t>
+            </a:r>
+            <a:r>
+              <a:rPr lang="pt-BR" sz="1800" i="1" dirty="0" err="1" smtClean="0"/>
+              <a:t>layter</a:t>
+            </a:r>
+            <a:r>
+              <a:rPr lang="pt-BR" sz="1800" i="1" dirty="0" smtClean="0"/>
+              <a:t> em cima da última </a:t>
+            </a:r>
+            <a:r>
+              <a:rPr lang="pt-BR" sz="1800" i="1" dirty="0" err="1" smtClean="0"/>
+              <a:t>layer</a:t>
+            </a:r>
+            <a:r>
+              <a:rPr lang="pt-BR" sz="1800" i="1" dirty="0" smtClean="0"/>
+              <a:t> da imagem</a:t>
             </a:r>
           </a:p>
         </p:txBody>
@@ -9150,7 +9173,7 @@
       </p:grpSpPr>
       <p:sp>
         <p:nvSpPr>
-          <p:cNvPr id="5" name="Título 1"/>
+          <p:cNvPr id="4" name="Título 1"/>
           <p:cNvSpPr>
             <a:spLocks noGrp="1"/>
           </p:cNvSpPr>
@@ -9160,8 +9183,8 @@
         </p:nvSpPr>
         <p:spPr>
           <a:xfrm>
-            <a:off x="115910" y="123288"/>
-            <a:ext cx="11951594" cy="422275"/>
+            <a:off x="826168" y="89733"/>
+            <a:ext cx="10515600" cy="422275"/>
           </a:xfrm>
         </p:spPr>
         <p:txBody>
@@ -9173,9 +9196,251 @@
             <a:pPr algn="ctr"/>
             <a:r>
               <a:rPr lang="pt-BR" sz="2800" b="1" dirty="0" smtClean="0"/>
-              <a:t>Construir as Próprias Imagens</a:t>
+              <a:t>Revisão </a:t>
+            </a:r>
+            <a:r>
+              <a:rPr lang="pt-BR" sz="2800" b="1" dirty="0" smtClean="0"/>
+              <a:t>Comandos sobre Criações de Imagens</a:t>
             </a:r>
             <a:endParaRPr lang="pt-BR" sz="2800" b="1" dirty="0"/>
+          </a:p>
+        </p:txBody>
+      </p:sp>
+      <p:sp>
+        <p:nvSpPr>
+          <p:cNvPr id="6" name="Espaço Reservado para Conteúdo 2"/>
+          <p:cNvSpPr>
+            <a:spLocks noGrp="1"/>
+          </p:cNvSpPr>
+          <p:nvPr>
+            <p:ph idx="1"/>
+          </p:nvPr>
+        </p:nvSpPr>
+        <p:spPr>
+          <a:xfrm>
+            <a:off x="166437" y="771180"/>
+            <a:ext cx="11492164" cy="3150825"/>
+          </a:xfrm>
+        </p:spPr>
+        <p:txBody>
+          <a:bodyPr>
+            <a:noAutofit/>
+          </a:bodyPr>
+          <a:lstStyle/>
+          <a:p>
+            <a:pPr lvl="1" algn="just">
+              <a:lnSpc>
+                <a:spcPct val="150000"/>
+              </a:lnSpc>
+            </a:pPr>
+            <a:r>
+              <a:rPr lang="pt-BR" sz="1800" b="1" dirty="0" err="1"/>
+              <a:t>docker</a:t>
+            </a:r>
+            <a:r>
+              <a:rPr lang="pt-BR" sz="1800" b="1" dirty="0"/>
+              <a:t> </a:t>
+            </a:r>
+            <a:r>
+              <a:rPr lang="pt-BR" sz="1800" b="1" dirty="0" smtClean="0"/>
+              <a:t>build –f </a:t>
+            </a:r>
+            <a:r>
+              <a:rPr lang="pt-BR" sz="1800" b="1" dirty="0" err="1" smtClean="0"/>
+              <a:t>Dockerfile</a:t>
+            </a:r>
+            <a:r>
+              <a:rPr lang="pt-BR" sz="1800" dirty="0" smtClean="0"/>
+              <a:t> – cria uma imagem a partir de um </a:t>
+            </a:r>
+            <a:r>
+              <a:rPr lang="pt-BR" sz="1800" dirty="0" err="1" smtClean="0"/>
+              <a:t>Dockerfile</a:t>
+            </a:r>
+            <a:r>
+              <a:rPr lang="pt-BR" sz="1800" dirty="0" smtClean="0"/>
+              <a:t>.</a:t>
+            </a:r>
+            <a:endParaRPr lang="pt-BR" sz="1800" dirty="0"/>
+          </a:p>
+          <a:p>
+            <a:pPr lvl="1" algn="just">
+              <a:lnSpc>
+                <a:spcPct val="150000"/>
+              </a:lnSpc>
+            </a:pPr>
+            <a:r>
+              <a:rPr lang="pt-BR" sz="1800" b="1" dirty="0" err="1"/>
+              <a:t>docker</a:t>
+            </a:r>
+            <a:r>
+              <a:rPr lang="pt-BR" sz="1800" b="1" dirty="0"/>
+              <a:t> </a:t>
+            </a:r>
+            <a:r>
+              <a:rPr lang="pt-BR" sz="1800" b="1" dirty="0" smtClean="0"/>
+              <a:t>build –f CAMINHO_DOCKERFILE/</a:t>
+            </a:r>
+            <a:r>
+              <a:rPr lang="pt-BR" sz="1800" b="1" dirty="0" err="1" smtClean="0"/>
+              <a:t>Dockerfile</a:t>
+            </a:r>
+            <a:r>
+              <a:rPr lang="pt-BR" sz="1800" b="1" dirty="0" smtClean="0"/>
+              <a:t> –t NOME_USUARIO/NOME_IMAGEM</a:t>
+            </a:r>
+            <a:r>
+              <a:rPr lang="pt-BR" sz="1800" dirty="0" smtClean="0"/>
+              <a:t> – </a:t>
+            </a:r>
+            <a:r>
+              <a:rPr lang="pt-BR" sz="1800" dirty="0" err="1" smtClean="0"/>
+              <a:t>cons´trói</a:t>
+            </a:r>
+            <a:r>
+              <a:rPr lang="pt-BR" sz="1800" dirty="0" smtClean="0"/>
+              <a:t> e nomeia uma imagem não –oficial informando o caminho para o </a:t>
+            </a:r>
+            <a:r>
+              <a:rPr lang="pt-BR" sz="1800" dirty="0" err="1" smtClean="0"/>
+              <a:t>Dockerfile</a:t>
+            </a:r>
+            <a:r>
+              <a:rPr lang="pt-BR" sz="1800" dirty="0" smtClean="0"/>
+              <a:t>.</a:t>
+            </a:r>
+            <a:endParaRPr lang="pt-BR" sz="1800" dirty="0"/>
+          </a:p>
+          <a:p>
+            <a:pPr lvl="1" algn="just">
+              <a:lnSpc>
+                <a:spcPct val="150000"/>
+              </a:lnSpc>
+            </a:pPr>
+            <a:r>
+              <a:rPr lang="pt-BR" sz="1800" b="1" dirty="0" err="1"/>
+              <a:t>docker</a:t>
+            </a:r>
+            <a:r>
+              <a:rPr lang="pt-BR" sz="1800" b="1" dirty="0"/>
+              <a:t> </a:t>
+            </a:r>
+            <a:r>
+              <a:rPr lang="pt-BR" sz="1800" b="1" dirty="0" err="1" smtClean="0"/>
+              <a:t>login</a:t>
+            </a:r>
+            <a:r>
+              <a:rPr lang="pt-BR" sz="1800" dirty="0" smtClean="0"/>
+              <a:t> – inicia o processo de </a:t>
+            </a:r>
+            <a:r>
+              <a:rPr lang="pt-BR" sz="1800" dirty="0" err="1" smtClean="0"/>
+              <a:t>login</a:t>
+            </a:r>
+            <a:r>
+              <a:rPr lang="pt-BR" sz="1800" dirty="0" smtClean="0"/>
+              <a:t> no </a:t>
+            </a:r>
+            <a:r>
+              <a:rPr lang="pt-BR" sz="1800" dirty="0" err="1" smtClean="0"/>
+              <a:t>Docker</a:t>
+            </a:r>
+            <a:r>
+              <a:rPr lang="pt-BR" sz="1800" dirty="0" smtClean="0"/>
+              <a:t> Hub.</a:t>
+            </a:r>
+            <a:endParaRPr lang="pt-BR" sz="1800" dirty="0"/>
+          </a:p>
+          <a:p>
+            <a:pPr lvl="1" algn="just">
+              <a:lnSpc>
+                <a:spcPct val="150000"/>
+              </a:lnSpc>
+            </a:pPr>
+            <a:r>
+              <a:rPr lang="pt-BR" sz="1800" b="1" dirty="0" err="1"/>
+              <a:t>docker</a:t>
+            </a:r>
+            <a:r>
+              <a:rPr lang="pt-BR" sz="1800" b="1" dirty="0"/>
+              <a:t> </a:t>
+            </a:r>
+            <a:r>
+              <a:rPr lang="pt-BR" sz="1800" b="1" dirty="0" err="1" smtClean="0"/>
+              <a:t>push</a:t>
+            </a:r>
+            <a:r>
+              <a:rPr lang="pt-BR" sz="1800" b="1" dirty="0" smtClean="0"/>
+              <a:t> NOME_USUARIO/NOME_IMAGEM </a:t>
+            </a:r>
+            <a:r>
+              <a:rPr lang="pt-BR" sz="1800" dirty="0" smtClean="0"/>
+              <a:t>– envia a imagem criada para o </a:t>
+            </a:r>
+            <a:r>
+              <a:rPr lang="pt-BR" sz="1800" dirty="0" err="1" smtClean="0"/>
+              <a:t>Docker</a:t>
+            </a:r>
+            <a:r>
+              <a:rPr lang="pt-BR" sz="1800" dirty="0" smtClean="0"/>
+              <a:t> Hub.</a:t>
+            </a:r>
+          </a:p>
+          <a:p>
+            <a:pPr lvl="1" algn="just">
+              <a:lnSpc>
+                <a:spcPct val="150000"/>
+              </a:lnSpc>
+            </a:pPr>
+            <a:r>
+              <a:rPr lang="pt-BR" sz="1800" b="1" dirty="0" err="1"/>
+              <a:t>docker</a:t>
+            </a:r>
+            <a:r>
+              <a:rPr lang="pt-BR" sz="1800" b="1" dirty="0"/>
+              <a:t> </a:t>
+            </a:r>
+            <a:r>
+              <a:rPr lang="pt-BR" sz="1800" b="1" dirty="0" err="1" smtClean="0"/>
+              <a:t>pull</a:t>
+            </a:r>
+            <a:r>
+              <a:rPr lang="pt-BR" sz="1800" b="1" dirty="0" smtClean="0"/>
+              <a:t> </a:t>
+            </a:r>
+            <a:r>
+              <a:rPr lang="pt-BR" sz="1800" b="1" dirty="0"/>
+              <a:t>NOME_USUARIO/NOME_IMAGEM </a:t>
+            </a:r>
+            <a:r>
+              <a:rPr lang="pt-BR" sz="1800" dirty="0"/>
+              <a:t>– </a:t>
+            </a:r>
+            <a:r>
+              <a:rPr lang="pt-BR" sz="1800" dirty="0" smtClean="0"/>
+              <a:t>baixa </a:t>
+            </a:r>
+            <a:r>
+              <a:rPr lang="pt-BR" sz="1800" dirty="0"/>
+              <a:t>a imagem criada </a:t>
+            </a:r>
+            <a:r>
+              <a:rPr lang="pt-BR" sz="1800" dirty="0" smtClean="0"/>
+              <a:t>do </a:t>
+            </a:r>
+            <a:r>
+              <a:rPr lang="pt-BR" sz="1800" dirty="0" err="1"/>
+              <a:t>Docker</a:t>
+            </a:r>
+            <a:r>
+              <a:rPr lang="pt-BR" sz="1800" dirty="0"/>
+              <a:t> Hub</a:t>
+            </a:r>
+            <a:r>
+              <a:rPr lang="pt-BR" sz="1800" dirty="0" smtClean="0"/>
+              <a:t>.</a:t>
+            </a:r>
+            <a:endParaRPr lang="pt-BR" sz="1800" dirty="0"/>
           </a:p>
         </p:txBody>
       </p:sp>

</xml_diff>

<commit_message>
Criando suas próprias redes no Docker
</commit_message>
<xml_diff>
--- a/docs/docker-resumo.pptx
+++ b/docs/docker-resumo.pptx
@@ -27,12 +27,14 @@
     <p:sldId id="281" r:id="rId21"/>
     <p:sldId id="306" r:id="rId22"/>
     <p:sldId id="304" r:id="rId23"/>
-    <p:sldId id="307" r:id="rId24"/>
-    <p:sldId id="305" r:id="rId25"/>
-    <p:sldId id="308" r:id="rId26"/>
-    <p:sldId id="280" r:id="rId27"/>
-    <p:sldId id="284" r:id="rId28"/>
-    <p:sldId id="285" r:id="rId29"/>
+    <p:sldId id="309" r:id="rId24"/>
+    <p:sldId id="310" r:id="rId25"/>
+    <p:sldId id="307" r:id="rId26"/>
+    <p:sldId id="305" r:id="rId27"/>
+    <p:sldId id="308" r:id="rId28"/>
+    <p:sldId id="280" r:id="rId29"/>
+    <p:sldId id="284" r:id="rId30"/>
+    <p:sldId id="285" r:id="rId31"/>
   </p:sldIdLst>
   <p:sldSz cx="12192000" cy="6858000"/>
   <p:notesSz cx="6858000" cy="9144000"/>
@@ -268,7 +270,7 @@
           <a:p>
             <a:fld id="{CC58B075-67F8-4A8D-AE1C-3D3E4193EBCA}" type="datetimeFigureOut">
               <a:rPr lang="pt-BR" smtClean="0"/>
-              <a:t>22/10/2019</a:t>
+              <a:t>24/10/2019</a:t>
             </a:fld>
             <a:endParaRPr lang="pt-BR"/>
           </a:p>
@@ -436,7 +438,7 @@
           <a:p>
             <a:fld id="{CC58B075-67F8-4A8D-AE1C-3D3E4193EBCA}" type="datetimeFigureOut">
               <a:rPr lang="pt-BR" smtClean="0"/>
-              <a:t>22/10/2019</a:t>
+              <a:t>24/10/2019</a:t>
             </a:fld>
             <a:endParaRPr lang="pt-BR"/>
           </a:p>
@@ -614,7 +616,7 @@
           <a:p>
             <a:fld id="{CC58B075-67F8-4A8D-AE1C-3D3E4193EBCA}" type="datetimeFigureOut">
               <a:rPr lang="pt-BR" smtClean="0"/>
-              <a:t>22/10/2019</a:t>
+              <a:t>24/10/2019</a:t>
             </a:fld>
             <a:endParaRPr lang="pt-BR"/>
           </a:p>
@@ -782,7 +784,7 @@
           <a:p>
             <a:fld id="{CC58B075-67F8-4A8D-AE1C-3D3E4193EBCA}" type="datetimeFigureOut">
               <a:rPr lang="pt-BR" smtClean="0"/>
-              <a:t>22/10/2019</a:t>
+              <a:t>24/10/2019</a:t>
             </a:fld>
             <a:endParaRPr lang="pt-BR"/>
           </a:p>
@@ -1027,7 +1029,7 @@
           <a:p>
             <a:fld id="{CC58B075-67F8-4A8D-AE1C-3D3E4193EBCA}" type="datetimeFigureOut">
               <a:rPr lang="pt-BR" smtClean="0"/>
-              <a:t>22/10/2019</a:t>
+              <a:t>24/10/2019</a:t>
             </a:fld>
             <a:endParaRPr lang="pt-BR"/>
           </a:p>
@@ -1256,7 +1258,7 @@
           <a:p>
             <a:fld id="{CC58B075-67F8-4A8D-AE1C-3D3E4193EBCA}" type="datetimeFigureOut">
               <a:rPr lang="pt-BR" smtClean="0"/>
-              <a:t>22/10/2019</a:t>
+              <a:t>24/10/2019</a:t>
             </a:fld>
             <a:endParaRPr lang="pt-BR"/>
           </a:p>
@@ -1620,7 +1622,7 @@
           <a:p>
             <a:fld id="{CC58B075-67F8-4A8D-AE1C-3D3E4193EBCA}" type="datetimeFigureOut">
               <a:rPr lang="pt-BR" smtClean="0"/>
-              <a:t>22/10/2019</a:t>
+              <a:t>24/10/2019</a:t>
             </a:fld>
             <a:endParaRPr lang="pt-BR"/>
           </a:p>
@@ -1737,7 +1739,7 @@
           <a:p>
             <a:fld id="{CC58B075-67F8-4A8D-AE1C-3D3E4193EBCA}" type="datetimeFigureOut">
               <a:rPr lang="pt-BR" smtClean="0"/>
-              <a:t>22/10/2019</a:t>
+              <a:t>24/10/2019</a:t>
             </a:fld>
             <a:endParaRPr lang="pt-BR"/>
           </a:p>
@@ -1832,7 +1834,7 @@
           <a:p>
             <a:fld id="{CC58B075-67F8-4A8D-AE1C-3D3E4193EBCA}" type="datetimeFigureOut">
               <a:rPr lang="pt-BR" smtClean="0"/>
-              <a:t>22/10/2019</a:t>
+              <a:t>24/10/2019</a:t>
             </a:fld>
             <a:endParaRPr lang="pt-BR"/>
           </a:p>
@@ -2107,7 +2109,7 @@
           <a:p>
             <a:fld id="{CC58B075-67F8-4A8D-AE1C-3D3E4193EBCA}" type="datetimeFigureOut">
               <a:rPr lang="pt-BR" smtClean="0"/>
-              <a:t>22/10/2019</a:t>
+              <a:t>24/10/2019</a:t>
             </a:fld>
             <a:endParaRPr lang="pt-BR"/>
           </a:p>
@@ -2359,7 +2361,7 @@
           <a:p>
             <a:fld id="{CC58B075-67F8-4A8D-AE1C-3D3E4193EBCA}" type="datetimeFigureOut">
               <a:rPr lang="pt-BR" smtClean="0"/>
-              <a:t>22/10/2019</a:t>
+              <a:t>24/10/2019</a:t>
             </a:fld>
             <a:endParaRPr lang="pt-BR"/>
           </a:p>
@@ -2570,7 +2572,7 @@
           <a:p>
             <a:fld id="{CC58B075-67F8-4A8D-AE1C-3D3E4193EBCA}" type="datetimeFigureOut">
               <a:rPr lang="pt-BR" smtClean="0"/>
-              <a:t>22/10/2019</a:t>
+              <a:t>24/10/2019</a:t>
             </a:fld>
             <a:endParaRPr lang="pt-BR"/>
           </a:p>
@@ -6033,15 +6035,19 @@
             </a:r>
             <a:r>
               <a:rPr lang="pt-BR" sz="1600" b="1" dirty="0"/>
-              <a:t> container </a:t>
-            </a:r>
-            <a:r>
-              <a:rPr lang="pt-BR" sz="1600" b="1" dirty="0" err="1"/>
+              <a:t> </a:t>
+            </a:r>
+            <a:r>
+              <a:rPr lang="pt-BR" sz="1600" b="1" dirty="0" err="1" smtClean="0"/>
               <a:t>prune</a:t>
             </a:r>
             <a:r>
+              <a:rPr lang="pt-BR" sz="1600" dirty="0" smtClean="0"/>
+              <a:t> </a:t>
+            </a:r>
+            <a:r>
               <a:rPr lang="pt-BR" sz="1600" dirty="0"/>
-              <a:t> - remove todos os containers que estão parados.</a:t>
+              <a:t>- remove todos os containers que estão parados.</a:t>
             </a:r>
           </a:p>
           <a:p>
@@ -8758,7 +8764,6 @@
               <a:rPr lang="pt-BR" sz="1800" dirty="0" smtClean="0"/>
               <a:t> define comandos para executar instalações complexas e com características específicas.</a:t>
             </a:r>
-            <a:endParaRPr lang="pt-BR" sz="1800" dirty="0" smtClean="0"/>
           </a:p>
           <a:p>
             <a:pPr algn="just"/>
@@ -9196,11 +9201,7 @@
             <a:pPr algn="ctr"/>
             <a:r>
               <a:rPr lang="pt-BR" sz="2800" b="1" dirty="0" smtClean="0"/>
-              <a:t>Revisão </a:t>
-            </a:r>
-            <a:r>
-              <a:rPr lang="pt-BR" sz="2800" b="1" dirty="0" smtClean="0"/>
-              <a:t>Comandos sobre Criações de Imagens</a:t>
+              <a:t>Revisão Comandos sobre Criações de Imagens</a:t>
             </a:r>
             <a:endParaRPr lang="pt-BR" sz="2800" b="1" dirty="0"/>
           </a:p>
@@ -9499,9 +9500,334 @@
             <a:pPr algn="ctr"/>
             <a:r>
               <a:rPr lang="pt-BR" sz="2800" b="1" dirty="0" smtClean="0"/>
-              <a:t>Comunicação entre Containers</a:t>
+              <a:t>Redes com </a:t>
+            </a:r>
+            <a:r>
+              <a:rPr lang="pt-BR" sz="2800" b="1" dirty="0" err="1" smtClean="0"/>
+              <a:t>Docker</a:t>
             </a:r>
             <a:endParaRPr lang="pt-BR" sz="2800" b="1" dirty="0"/>
+          </a:p>
+        </p:txBody>
+      </p:sp>
+      <p:pic>
+        <p:nvPicPr>
+          <p:cNvPr id="2" name="Imagem 1"/>
+          <p:cNvPicPr>
+            <a:picLocks noChangeAspect="1"/>
+          </p:cNvPicPr>
+          <p:nvPr/>
+        </p:nvPicPr>
+        <p:blipFill>
+          <a:blip r:embed="rId2"/>
+          <a:stretch>
+            <a:fillRect/>
+          </a:stretch>
+        </p:blipFill>
+        <p:spPr>
+          <a:xfrm>
+            <a:off x="205257" y="2975243"/>
+            <a:ext cx="5886450" cy="3771900"/>
+          </a:xfrm>
+          <a:prstGeom prst="rect">
+            <a:avLst/>
+          </a:prstGeom>
+        </p:spPr>
+      </p:pic>
+      <p:sp>
+        <p:nvSpPr>
+          <p:cNvPr id="4" name="Espaço Reservado para Conteúdo 4"/>
+          <p:cNvSpPr>
+            <a:spLocks noGrp="1"/>
+          </p:cNvSpPr>
+          <p:nvPr>
+            <p:ph idx="1"/>
+          </p:nvPr>
+        </p:nvSpPr>
+        <p:spPr>
+          <a:xfrm>
+            <a:off x="383250" y="720937"/>
+            <a:ext cx="9980054" cy="1017432"/>
+          </a:xfrm>
+        </p:spPr>
+        <p:txBody>
+          <a:bodyPr>
+            <a:normAutofit/>
+          </a:bodyPr>
+          <a:lstStyle/>
+          <a:p>
+            <a:r>
+              <a:rPr lang="pt-BR" sz="2000" dirty="0" smtClean="0"/>
+              <a:t>Por padrão o </a:t>
+            </a:r>
+            <a:r>
+              <a:rPr lang="pt-BR" sz="2000" dirty="0" err="1" smtClean="0"/>
+              <a:t>Docker</a:t>
+            </a:r>
+            <a:r>
+              <a:rPr lang="pt-BR" sz="2000" dirty="0" smtClean="0"/>
+              <a:t> já cria uma </a:t>
+            </a:r>
+            <a:r>
+              <a:rPr lang="pt-BR" sz="2000" b="1" dirty="0" smtClean="0"/>
+              <a:t>default network</a:t>
+            </a:r>
+            <a:r>
+              <a:rPr lang="pt-BR" sz="2000" dirty="0" smtClean="0"/>
+              <a:t>.</a:t>
+            </a:r>
+            <a:endParaRPr lang="pt-BR" sz="2000" dirty="0"/>
+          </a:p>
+        </p:txBody>
+      </p:sp>
+      <p:sp>
+        <p:nvSpPr>
+          <p:cNvPr id="3" name="Retângulo 2"/>
+          <p:cNvSpPr/>
+          <p:nvPr/>
+        </p:nvSpPr>
+        <p:spPr>
+          <a:xfrm>
+            <a:off x="3483032" y="1229653"/>
+            <a:ext cx="8282982" cy="2862322"/>
+          </a:xfrm>
+          <a:prstGeom prst="rect">
+            <a:avLst/>
+          </a:prstGeom>
+        </p:spPr>
+        <p:txBody>
+          <a:bodyPr wrap="square">
+            <a:spAutoFit/>
+          </a:bodyPr>
+          <a:lstStyle/>
+          <a:p>
+            <a:pPr marL="742950" lvl="1" indent="-285750">
+              <a:buFont typeface="Wingdings" panose="05000000000000000000" pitchFamily="2" charset="2"/>
+              <a:buChar char="Ø"/>
+            </a:pPr>
+            <a:r>
+              <a:rPr lang="pt-BR" sz="1600" dirty="0" err="1">
+                <a:solidFill>
+                  <a:schemeClr val="accent5"/>
+                </a:solidFill>
+              </a:rPr>
+              <a:t>docker</a:t>
+            </a:r>
+            <a:r>
+              <a:rPr lang="pt-BR" sz="1600" dirty="0">
+                <a:solidFill>
+                  <a:schemeClr val="accent5"/>
+                </a:solidFill>
+              </a:rPr>
+              <a:t> </a:t>
+            </a:r>
+            <a:r>
+              <a:rPr lang="pt-BR" sz="1600" dirty="0" err="1">
+                <a:solidFill>
+                  <a:schemeClr val="accent5"/>
+                </a:solidFill>
+              </a:rPr>
+              <a:t>run</a:t>
+            </a:r>
+            <a:r>
+              <a:rPr lang="pt-BR" sz="1600" dirty="0">
+                <a:solidFill>
+                  <a:schemeClr val="accent5"/>
+                </a:solidFill>
+              </a:rPr>
+              <a:t> -it </a:t>
+            </a:r>
+            <a:r>
+              <a:rPr lang="pt-BR" sz="1600" dirty="0" err="1">
+                <a:solidFill>
+                  <a:schemeClr val="accent5"/>
+                </a:solidFill>
+              </a:rPr>
+              <a:t>ubuntu</a:t>
+            </a:r>
+            <a:endParaRPr lang="pt-BR" sz="1600" dirty="0">
+              <a:solidFill>
+                <a:schemeClr val="accent5"/>
+              </a:solidFill>
+            </a:endParaRPr>
+          </a:p>
+          <a:p>
+            <a:pPr marL="285750" indent="-285750">
+              <a:buFont typeface="Wingdings" panose="05000000000000000000" pitchFamily="2" charset="2"/>
+              <a:buChar char="Ø"/>
+            </a:pPr>
+            <a:endParaRPr lang="pt-BR" sz="2000" dirty="0">
+              <a:solidFill>
+                <a:schemeClr val="accent5"/>
+              </a:solidFill>
+            </a:endParaRPr>
+          </a:p>
+          <a:p>
+            <a:pPr marL="742950" lvl="1" indent="-285750">
+              <a:buFont typeface="Wingdings" panose="05000000000000000000" pitchFamily="2" charset="2"/>
+              <a:buChar char="Ø"/>
+            </a:pPr>
+            <a:r>
+              <a:rPr lang="pt-BR" sz="1600" dirty="0">
+                <a:solidFill>
+                  <a:schemeClr val="accent5"/>
+                </a:solidFill>
+              </a:rPr>
+              <a:t>root@d11e0d244c29:/# </a:t>
+            </a:r>
+            <a:r>
+              <a:rPr lang="pt-BR" sz="1600" dirty="0" err="1">
+                <a:solidFill>
+                  <a:schemeClr val="accent5"/>
+                </a:solidFill>
+              </a:rPr>
+              <a:t>hostname</a:t>
+            </a:r>
+            <a:r>
+              <a:rPr lang="pt-BR" sz="1600" dirty="0">
+                <a:solidFill>
+                  <a:schemeClr val="accent5"/>
+                </a:solidFill>
+              </a:rPr>
+              <a:t> -i</a:t>
+            </a:r>
+          </a:p>
+          <a:p>
+            <a:pPr lvl="1"/>
+            <a:r>
+              <a:rPr lang="pt-BR" sz="1600" dirty="0">
+                <a:solidFill>
+                  <a:schemeClr val="accent5"/>
+                </a:solidFill>
+              </a:rPr>
+              <a:t>172.17.0.3</a:t>
+            </a:r>
+          </a:p>
+          <a:p>
+            <a:pPr lvl="1"/>
+            <a:endParaRPr lang="pt-BR" sz="1600" dirty="0">
+              <a:solidFill>
+                <a:schemeClr val="accent5"/>
+              </a:solidFill>
+            </a:endParaRPr>
+          </a:p>
+          <a:p>
+            <a:pPr marL="742950" lvl="1" indent="-285750">
+              <a:buFont typeface="Wingdings" panose="05000000000000000000" pitchFamily="2" charset="2"/>
+              <a:buChar char="Ø"/>
+            </a:pPr>
+            <a:r>
+              <a:rPr lang="en-US" sz="1600" dirty="0">
+                <a:solidFill>
+                  <a:schemeClr val="accent5"/>
+                </a:solidFill>
+              </a:rPr>
+              <a:t>root@e6b45f6e15d1:/# apt-get update &amp;&amp; apt-get install </a:t>
+            </a:r>
+            <a:r>
+              <a:rPr lang="en-US" sz="1600" dirty="0" err="1">
+                <a:solidFill>
+                  <a:schemeClr val="accent5"/>
+                </a:solidFill>
+              </a:rPr>
+              <a:t>iputils</a:t>
+            </a:r>
+            <a:r>
+              <a:rPr lang="en-US" sz="1600" dirty="0">
+                <a:solidFill>
+                  <a:schemeClr val="accent5"/>
+                </a:solidFill>
+              </a:rPr>
+              <a:t>-ping</a:t>
+            </a:r>
+          </a:p>
+          <a:p>
+            <a:pPr marL="742950" lvl="1" indent="-285750">
+              <a:buFont typeface="Wingdings" panose="05000000000000000000" pitchFamily="2" charset="2"/>
+              <a:buChar char="Ø"/>
+            </a:pPr>
+            <a:endParaRPr lang="en-US" sz="1600" dirty="0">
+              <a:solidFill>
+                <a:schemeClr val="accent5"/>
+              </a:solidFill>
+            </a:endParaRPr>
+          </a:p>
+          <a:p>
+            <a:pPr marL="742950" lvl="1" indent="-285750">
+              <a:buFont typeface="Wingdings" panose="05000000000000000000" pitchFamily="2" charset="2"/>
+              <a:buChar char="Ø"/>
+            </a:pPr>
+            <a:endParaRPr lang="en-US" sz="1600" dirty="0">
+              <a:solidFill>
+                <a:schemeClr val="accent5"/>
+              </a:solidFill>
+            </a:endParaRPr>
+          </a:p>
+          <a:p>
+            <a:pPr lvl="1" algn="ctr"/>
+            <a:r>
+              <a:rPr lang="en-US" sz="1600" dirty="0"/>
+              <a:t>(</a:t>
+            </a:r>
+            <a:r>
+              <a:rPr lang="en-US" sz="1600" dirty="0" err="1"/>
+              <a:t>em</a:t>
+            </a:r>
+            <a:r>
+              <a:rPr lang="en-US" sz="1600" dirty="0"/>
+              <a:t> outro terminal </a:t>
+            </a:r>
+            <a:r>
+              <a:rPr lang="en-US" sz="1600" dirty="0" err="1"/>
+              <a:t>posso</a:t>
+            </a:r>
+            <a:r>
+              <a:rPr lang="en-US" sz="1600" dirty="0"/>
+              <a:t> </a:t>
+            </a:r>
+            <a:r>
+              <a:rPr lang="en-US" sz="1600" dirty="0" err="1"/>
+              <a:t>dar</a:t>
+            </a:r>
+            <a:r>
+              <a:rPr lang="en-US" sz="1600" dirty="0"/>
+              <a:t> um ping para um IP </a:t>
+            </a:r>
+            <a:r>
+              <a:rPr lang="en-US" sz="1600" dirty="0" err="1"/>
+              <a:t>específico</a:t>
+            </a:r>
+            <a:endParaRPr lang="en-US" sz="1600" dirty="0"/>
+          </a:p>
+          <a:p>
+            <a:pPr marL="742950" lvl="1" indent="-285750">
+              <a:buFont typeface="Wingdings" panose="05000000000000000000" pitchFamily="2" charset="2"/>
+              <a:buChar char="Ø"/>
+            </a:pPr>
+            <a:endParaRPr lang="en-US" sz="1600" dirty="0">
+              <a:solidFill>
+                <a:schemeClr val="accent5"/>
+              </a:solidFill>
+            </a:endParaRPr>
+          </a:p>
+          <a:p>
+            <a:pPr marL="742950" lvl="1" indent="-285750">
+              <a:buFont typeface="Wingdings" panose="05000000000000000000" pitchFamily="2" charset="2"/>
+              <a:buChar char="Ø"/>
+            </a:pPr>
+            <a:r>
+              <a:rPr lang="en-US" sz="1600" dirty="0">
+                <a:solidFill>
+                  <a:schemeClr val="accent5"/>
+                </a:solidFill>
+              </a:rPr>
+              <a:t>ping 172.17.0.3</a:t>
+            </a:r>
+            <a:endParaRPr lang="pt-BR" sz="1600" dirty="0">
+              <a:solidFill>
+                <a:schemeClr val="accent5"/>
+              </a:solidFill>
+            </a:endParaRPr>
           </a:p>
         </p:txBody>
       </p:sp>
@@ -9560,16 +9886,571 @@
             <a:pPr algn="ctr"/>
             <a:r>
               <a:rPr lang="pt-BR" sz="2800" b="1" dirty="0" smtClean="0"/>
-              <a:t>Comunicação entre Containers</a:t>
+              <a:t>Redes com </a:t>
+            </a:r>
+            <a:r>
+              <a:rPr lang="pt-BR" sz="2800" b="1" dirty="0" err="1" smtClean="0"/>
+              <a:t>Docker</a:t>
             </a:r>
             <a:endParaRPr lang="pt-BR" sz="2800" b="1" dirty="0"/>
+          </a:p>
+        </p:txBody>
+      </p:sp>
+      <p:sp>
+        <p:nvSpPr>
+          <p:cNvPr id="4" name="Espaço Reservado para Conteúdo 4"/>
+          <p:cNvSpPr>
+            <a:spLocks noGrp="1"/>
+          </p:cNvSpPr>
+          <p:nvPr>
+            <p:ph idx="1"/>
+          </p:nvPr>
+        </p:nvSpPr>
+        <p:spPr>
+          <a:xfrm>
+            <a:off x="383250" y="545563"/>
+            <a:ext cx="11581068" cy="809512"/>
+          </a:xfrm>
+        </p:spPr>
+        <p:txBody>
+          <a:bodyPr>
+            <a:normAutofit fontScale="92500" lnSpcReduction="10000"/>
+          </a:bodyPr>
+          <a:lstStyle/>
+          <a:p>
+            <a:r>
+              <a:rPr lang="pt-BR" sz="2000" dirty="0" smtClean="0"/>
+              <a:t>O problema é que o </a:t>
+            </a:r>
+            <a:r>
+              <a:rPr lang="pt-BR" sz="2000" dirty="0" err="1" smtClean="0"/>
+              <a:t>Docker</a:t>
+            </a:r>
+            <a:r>
+              <a:rPr lang="pt-BR" sz="2000" dirty="0" smtClean="0"/>
+              <a:t> cria um IP dinâmico todas as vezes que você “subir” um container. É Interessante “nomear” sua rede e criar sua própria rede</a:t>
+            </a:r>
+            <a:r>
+              <a:rPr lang="pt-BR" sz="2000" dirty="0" smtClean="0"/>
+              <a:t>.</a:t>
+            </a:r>
+          </a:p>
+          <a:p>
+            <a:pPr lvl="1"/>
+            <a:r>
+              <a:rPr lang="pt-BR" sz="1600" dirty="0" smtClean="0"/>
+              <a:t>P.S. – Só posso efetuar </a:t>
+            </a:r>
+            <a:r>
+              <a:rPr lang="pt-BR" sz="1600" dirty="0" err="1" smtClean="0"/>
+              <a:t>ping</a:t>
+            </a:r>
+            <a:r>
+              <a:rPr lang="pt-BR" sz="1600" dirty="0" smtClean="0"/>
+              <a:t> entre containers em redes criadas por mim</a:t>
+            </a:r>
+            <a:endParaRPr lang="pt-BR" sz="1600" dirty="0" smtClean="0"/>
+          </a:p>
+          <a:p>
+            <a:endParaRPr lang="pt-BR" sz="2000" dirty="0"/>
+          </a:p>
+        </p:txBody>
+      </p:sp>
+      <p:pic>
+        <p:nvPicPr>
+          <p:cNvPr id="6" name="Imagem 5"/>
+          <p:cNvPicPr>
+            <a:picLocks noChangeAspect="1"/>
+          </p:cNvPicPr>
+          <p:nvPr/>
+        </p:nvPicPr>
+        <p:blipFill>
+          <a:blip r:embed="rId2"/>
+          <a:stretch>
+            <a:fillRect/>
+          </a:stretch>
+        </p:blipFill>
+        <p:spPr>
+          <a:xfrm>
+            <a:off x="267215" y="2203372"/>
+            <a:ext cx="3753941" cy="2427171"/>
+          </a:xfrm>
+          <a:prstGeom prst="rect">
+            <a:avLst/>
+          </a:prstGeom>
+        </p:spPr>
+      </p:pic>
+      <p:sp>
+        <p:nvSpPr>
+          <p:cNvPr id="2" name="Retângulo 1"/>
+          <p:cNvSpPr/>
+          <p:nvPr/>
+        </p:nvSpPr>
+        <p:spPr>
+          <a:xfrm>
+            <a:off x="4105618" y="1545995"/>
+            <a:ext cx="7572261" cy="4278094"/>
+          </a:xfrm>
+          <a:prstGeom prst="rect">
+            <a:avLst/>
+          </a:prstGeom>
+        </p:spPr>
+        <p:txBody>
+          <a:bodyPr wrap="square">
+            <a:spAutoFit/>
+          </a:bodyPr>
+          <a:lstStyle/>
+          <a:p>
+            <a:pPr marL="742950" lvl="1" indent="-285750">
+              <a:buFont typeface="Wingdings" panose="05000000000000000000" pitchFamily="2" charset="2"/>
+              <a:buChar char="Ø"/>
+            </a:pPr>
+            <a:r>
+              <a:rPr lang="pt-BR" sz="1600" dirty="0" smtClean="0">
+                <a:solidFill>
+                  <a:schemeClr val="accent5"/>
+                </a:solidFill>
+              </a:rPr>
+              <a:t>C</a:t>
+            </a:r>
+            <a:r>
+              <a:rPr lang="pt-BR" sz="1600" dirty="0">
+                <a:solidFill>
+                  <a:schemeClr val="accent5"/>
+                </a:solidFill>
+              </a:rPr>
+              <a:t>:\&gt;docker network </a:t>
+            </a:r>
+            <a:r>
+              <a:rPr lang="pt-BR" sz="1600" dirty="0" err="1">
+                <a:solidFill>
+                  <a:schemeClr val="accent5"/>
+                </a:solidFill>
+              </a:rPr>
+              <a:t>ls</a:t>
+            </a:r>
+            <a:endParaRPr lang="pt-BR" sz="1600" dirty="0">
+              <a:solidFill>
+                <a:schemeClr val="accent5"/>
+              </a:solidFill>
+            </a:endParaRPr>
+          </a:p>
+          <a:p>
+            <a:pPr lvl="1"/>
+            <a:r>
+              <a:rPr lang="pt-BR" sz="1600" dirty="0">
+                <a:solidFill>
+                  <a:schemeClr val="accent5"/>
+                </a:solidFill>
+              </a:rPr>
+              <a:t>NETWORK ID          NAME                DRIVER              SCOPE</a:t>
+            </a:r>
+          </a:p>
+          <a:p>
+            <a:pPr lvl="1"/>
+            <a:r>
+              <a:rPr lang="pt-BR" sz="1600" dirty="0">
+                <a:solidFill>
+                  <a:schemeClr val="accent5"/>
+                </a:solidFill>
+              </a:rPr>
+              <a:t>65d5d9207ba6        bridge              </a:t>
+            </a:r>
+            <a:r>
+              <a:rPr lang="pt-BR" sz="1600" dirty="0" err="1">
+                <a:solidFill>
+                  <a:schemeClr val="accent5"/>
+                </a:solidFill>
+              </a:rPr>
+              <a:t>bridge</a:t>
+            </a:r>
+            <a:r>
+              <a:rPr lang="pt-BR" sz="1600" dirty="0">
+                <a:solidFill>
+                  <a:schemeClr val="accent5"/>
+                </a:solidFill>
+              </a:rPr>
+              <a:t>              local</a:t>
+            </a:r>
+          </a:p>
+          <a:p>
+            <a:pPr lvl="1"/>
+            <a:r>
+              <a:rPr lang="pt-BR" sz="1600" dirty="0">
+                <a:solidFill>
+                  <a:schemeClr val="accent5"/>
+                </a:solidFill>
+              </a:rPr>
+              <a:t>da7810516736        host                </a:t>
+            </a:r>
+            <a:r>
+              <a:rPr lang="pt-BR" sz="1600" dirty="0" err="1">
+                <a:solidFill>
+                  <a:schemeClr val="accent5"/>
+                </a:solidFill>
+              </a:rPr>
+              <a:t>host</a:t>
+            </a:r>
+            <a:r>
+              <a:rPr lang="pt-BR" sz="1600" dirty="0">
+                <a:solidFill>
+                  <a:schemeClr val="accent5"/>
+                </a:solidFill>
+              </a:rPr>
+              <a:t>                local</a:t>
+            </a:r>
+          </a:p>
+          <a:p>
+            <a:pPr lvl="1"/>
+            <a:r>
+              <a:rPr lang="pt-BR" sz="1600" dirty="0">
+                <a:solidFill>
+                  <a:schemeClr val="accent5"/>
+                </a:solidFill>
+              </a:rPr>
+              <a:t>d09a467d9ef4        </a:t>
+            </a:r>
+            <a:r>
+              <a:rPr lang="pt-BR" sz="1600" dirty="0" err="1">
+                <a:solidFill>
+                  <a:schemeClr val="accent5"/>
+                </a:solidFill>
+              </a:rPr>
+              <a:t>none</a:t>
+            </a:r>
+            <a:r>
+              <a:rPr lang="pt-BR" sz="1600" dirty="0">
+                <a:solidFill>
+                  <a:schemeClr val="accent5"/>
+                </a:solidFill>
+              </a:rPr>
+              <a:t>                </a:t>
+            </a:r>
+            <a:r>
+              <a:rPr lang="pt-BR" sz="1600" dirty="0" err="1">
+                <a:solidFill>
+                  <a:schemeClr val="accent5"/>
+                </a:solidFill>
+              </a:rPr>
+              <a:t>null</a:t>
+            </a:r>
+            <a:r>
+              <a:rPr lang="pt-BR" sz="1600" dirty="0">
+                <a:solidFill>
+                  <a:schemeClr val="accent5"/>
+                </a:solidFill>
+              </a:rPr>
+              <a:t>                local</a:t>
+            </a:r>
+          </a:p>
+          <a:p>
+            <a:pPr lvl="1"/>
+            <a:endParaRPr lang="pt-BR" sz="1600" dirty="0">
+              <a:solidFill>
+                <a:schemeClr val="accent5"/>
+              </a:solidFill>
+            </a:endParaRPr>
+          </a:p>
+          <a:p>
+            <a:pPr marL="742950" lvl="1" indent="-285750">
+              <a:buFont typeface="Wingdings" panose="05000000000000000000" pitchFamily="2" charset="2"/>
+              <a:buChar char="Ø"/>
+            </a:pPr>
+            <a:r>
+              <a:rPr lang="pt-BR" sz="1600" dirty="0">
+                <a:solidFill>
+                  <a:schemeClr val="accent5"/>
+                </a:solidFill>
+              </a:rPr>
+              <a:t>C:\&gt;docker network </a:t>
+            </a:r>
+            <a:r>
+              <a:rPr lang="pt-BR" sz="1600" dirty="0" err="1">
+                <a:solidFill>
+                  <a:schemeClr val="accent5"/>
+                </a:solidFill>
+              </a:rPr>
+              <a:t>create</a:t>
+            </a:r>
+            <a:r>
+              <a:rPr lang="pt-BR" sz="1600" dirty="0">
+                <a:solidFill>
+                  <a:schemeClr val="accent5"/>
+                </a:solidFill>
+              </a:rPr>
+              <a:t> --driver bridge minha-rede</a:t>
+            </a:r>
+          </a:p>
+          <a:p>
+            <a:pPr marL="742950" lvl="1" indent="-285750">
+              <a:buFont typeface="Wingdings" panose="05000000000000000000" pitchFamily="2" charset="2"/>
+              <a:buChar char="Ø"/>
+            </a:pPr>
+            <a:r>
+              <a:rPr lang="pt-BR" sz="1600" dirty="0">
+                <a:solidFill>
+                  <a:schemeClr val="accent5"/>
+                </a:solidFill>
+              </a:rPr>
+              <a:t>64e168dcaade06f06e53db5f4e32693fa0cebcdac01a0075e9f5747b404a5594</a:t>
+            </a:r>
+          </a:p>
+          <a:p>
+            <a:pPr marL="742950" lvl="1" indent="-285750">
+              <a:buFont typeface="Wingdings" panose="05000000000000000000" pitchFamily="2" charset="2"/>
+              <a:buChar char="Ø"/>
+            </a:pPr>
+            <a:endParaRPr lang="pt-BR" sz="1600" dirty="0">
+              <a:solidFill>
+                <a:schemeClr val="accent5"/>
+              </a:solidFill>
+            </a:endParaRPr>
+          </a:p>
+          <a:p>
+            <a:pPr marL="742950" lvl="1" indent="-285750">
+              <a:buFont typeface="Wingdings" panose="05000000000000000000" pitchFamily="2" charset="2"/>
+              <a:buChar char="Ø"/>
+            </a:pPr>
+            <a:r>
+              <a:rPr lang="pt-BR" sz="1600" dirty="0">
+                <a:solidFill>
+                  <a:schemeClr val="accent5"/>
+                </a:solidFill>
+              </a:rPr>
+              <a:t>C:\&gt;docker network </a:t>
+            </a:r>
+            <a:r>
+              <a:rPr lang="pt-BR" sz="1600" dirty="0" err="1">
+                <a:solidFill>
+                  <a:schemeClr val="accent5"/>
+                </a:solidFill>
+              </a:rPr>
+              <a:t>ls</a:t>
+            </a:r>
+            <a:endParaRPr lang="pt-BR" sz="1600" dirty="0">
+              <a:solidFill>
+                <a:schemeClr val="accent5"/>
+              </a:solidFill>
+            </a:endParaRPr>
+          </a:p>
+          <a:p>
+            <a:pPr marL="742950" lvl="1" indent="-285750">
+              <a:buFont typeface="Wingdings" panose="05000000000000000000" pitchFamily="2" charset="2"/>
+              <a:buChar char="Ø"/>
+            </a:pPr>
+            <a:r>
+              <a:rPr lang="pt-BR" sz="1600" dirty="0">
+                <a:solidFill>
+                  <a:schemeClr val="accent5"/>
+                </a:solidFill>
+              </a:rPr>
+              <a:t>NETWORK ID          NAME                DRIVER              SCOPE</a:t>
+            </a:r>
+          </a:p>
+          <a:p>
+            <a:pPr marL="742950" lvl="1" indent="-285750">
+              <a:buFont typeface="Wingdings" panose="05000000000000000000" pitchFamily="2" charset="2"/>
+              <a:buChar char="Ø"/>
+            </a:pPr>
+            <a:r>
+              <a:rPr lang="pt-BR" sz="1600" dirty="0">
+                <a:solidFill>
+                  <a:schemeClr val="accent5"/>
+                </a:solidFill>
+              </a:rPr>
+              <a:t>65d5d9207ba6        bridge              </a:t>
+            </a:r>
+            <a:r>
+              <a:rPr lang="pt-BR" sz="1600" dirty="0" smtClean="0">
+                <a:solidFill>
+                  <a:schemeClr val="accent5"/>
+                </a:solidFill>
+              </a:rPr>
+              <a:t> </a:t>
+            </a:r>
+            <a:r>
+              <a:rPr lang="pt-BR" sz="1600" dirty="0" err="1" smtClean="0">
+                <a:solidFill>
+                  <a:schemeClr val="accent5"/>
+                </a:solidFill>
+              </a:rPr>
+              <a:t>bridge</a:t>
+            </a:r>
+            <a:r>
+              <a:rPr lang="pt-BR" sz="1600" dirty="0" smtClean="0">
+                <a:solidFill>
+                  <a:schemeClr val="accent5"/>
+                </a:solidFill>
+              </a:rPr>
+              <a:t>              </a:t>
+            </a:r>
+            <a:r>
+              <a:rPr lang="pt-BR" sz="1600" dirty="0">
+                <a:solidFill>
+                  <a:schemeClr val="accent5"/>
+                </a:solidFill>
+              </a:rPr>
+              <a:t>local</a:t>
+            </a:r>
+          </a:p>
+          <a:p>
+            <a:pPr marL="742950" lvl="1" indent="-285750">
+              <a:buFont typeface="Wingdings" panose="05000000000000000000" pitchFamily="2" charset="2"/>
+              <a:buChar char="Ø"/>
+            </a:pPr>
+            <a:r>
+              <a:rPr lang="pt-BR" sz="1600" dirty="0">
+                <a:solidFill>
+                  <a:schemeClr val="accent5"/>
+                </a:solidFill>
+              </a:rPr>
+              <a:t>da7810516736        host               </a:t>
+            </a:r>
+            <a:r>
+              <a:rPr lang="pt-BR" sz="1600" dirty="0" smtClean="0">
+                <a:solidFill>
+                  <a:schemeClr val="accent5"/>
+                </a:solidFill>
+              </a:rPr>
+              <a:t>    </a:t>
+            </a:r>
+            <a:r>
+              <a:rPr lang="pt-BR" sz="1600" dirty="0" err="1" smtClean="0">
+                <a:solidFill>
+                  <a:schemeClr val="accent5"/>
+                </a:solidFill>
+              </a:rPr>
+              <a:t>host</a:t>
+            </a:r>
+            <a:r>
+              <a:rPr lang="pt-BR" sz="1600" dirty="0" smtClean="0">
+                <a:solidFill>
+                  <a:schemeClr val="accent5"/>
+                </a:solidFill>
+              </a:rPr>
+              <a:t>                </a:t>
+            </a:r>
+            <a:r>
+              <a:rPr lang="pt-BR" sz="1600" dirty="0">
+                <a:solidFill>
+                  <a:schemeClr val="accent5"/>
+                </a:solidFill>
+              </a:rPr>
+              <a:t>local</a:t>
+            </a:r>
+          </a:p>
+          <a:p>
+            <a:pPr marL="742950" lvl="1" indent="-285750">
+              <a:buFont typeface="Wingdings" panose="05000000000000000000" pitchFamily="2" charset="2"/>
+              <a:buChar char="Ø"/>
+            </a:pPr>
+            <a:r>
+              <a:rPr lang="pt-BR" sz="1600" dirty="0"/>
+              <a:t>64e168dcaade        minha-rede      </a:t>
+            </a:r>
+            <a:r>
+              <a:rPr lang="pt-BR" sz="1600" dirty="0" smtClean="0"/>
+              <a:t> bridge              </a:t>
+            </a:r>
+            <a:r>
+              <a:rPr lang="pt-BR" sz="1600" dirty="0"/>
+              <a:t>local</a:t>
+            </a:r>
+          </a:p>
+          <a:p>
+            <a:pPr marL="742950" lvl="1" indent="-285750">
+              <a:buFont typeface="Wingdings" panose="05000000000000000000" pitchFamily="2" charset="2"/>
+              <a:buChar char="Ø"/>
+            </a:pPr>
+            <a:r>
+              <a:rPr lang="pt-BR" sz="1600" dirty="0">
+                <a:solidFill>
+                  <a:schemeClr val="accent5"/>
+                </a:solidFill>
+              </a:rPr>
+              <a:t>d09a467d9ef4        </a:t>
+            </a:r>
+            <a:r>
+              <a:rPr lang="pt-BR" sz="1600" dirty="0" err="1">
+                <a:solidFill>
+                  <a:schemeClr val="accent5"/>
+                </a:solidFill>
+              </a:rPr>
+              <a:t>none</a:t>
+            </a:r>
+            <a:r>
+              <a:rPr lang="pt-BR" sz="1600" dirty="0">
+                <a:solidFill>
+                  <a:schemeClr val="accent5"/>
+                </a:solidFill>
+              </a:rPr>
+              <a:t>                </a:t>
+            </a:r>
+            <a:r>
+              <a:rPr lang="pt-BR" sz="1600" dirty="0" smtClean="0">
+                <a:solidFill>
+                  <a:schemeClr val="accent5"/>
+                </a:solidFill>
+              </a:rPr>
+              <a:t>    </a:t>
+            </a:r>
+            <a:r>
+              <a:rPr lang="pt-BR" sz="1600" dirty="0" err="1" smtClean="0">
+                <a:solidFill>
+                  <a:schemeClr val="accent5"/>
+                </a:solidFill>
+              </a:rPr>
+              <a:t>null</a:t>
+            </a:r>
+            <a:r>
+              <a:rPr lang="pt-BR" sz="1600" dirty="0" smtClean="0">
+                <a:solidFill>
+                  <a:schemeClr val="accent5"/>
+                </a:solidFill>
+              </a:rPr>
+              <a:t>                </a:t>
+            </a:r>
+            <a:r>
+              <a:rPr lang="pt-BR" sz="1600" dirty="0">
+                <a:solidFill>
+                  <a:schemeClr val="accent5"/>
+                </a:solidFill>
+              </a:rPr>
+              <a:t>local</a:t>
+            </a:r>
+          </a:p>
+          <a:p>
+            <a:pPr marL="742950" lvl="1" indent="-285750">
+              <a:buFont typeface="Wingdings" panose="05000000000000000000" pitchFamily="2" charset="2"/>
+              <a:buChar char="Ø"/>
+            </a:pPr>
+            <a:endParaRPr lang="pt-BR" sz="1600" dirty="0">
+              <a:solidFill>
+                <a:schemeClr val="accent5"/>
+              </a:solidFill>
+            </a:endParaRPr>
+          </a:p>
+          <a:p>
+            <a:pPr marL="742950" lvl="1" indent="-285750">
+              <a:buFont typeface="Wingdings" panose="05000000000000000000" pitchFamily="2" charset="2"/>
+              <a:buChar char="Ø"/>
+            </a:pPr>
+            <a:r>
+              <a:rPr lang="pt-BR" sz="1600" dirty="0">
+                <a:solidFill>
+                  <a:schemeClr val="accent5"/>
+                </a:solidFill>
+              </a:rPr>
+              <a:t>C:\Users\cyft&gt;</a:t>
+            </a:r>
+            <a:endParaRPr lang="pt-BR" sz="2000" dirty="0"/>
           </a:p>
         </p:txBody>
       </p:sp>
     </p:spTree>
     <p:extLst>
       <p:ext uri="{BB962C8B-B14F-4D97-AF65-F5344CB8AC3E}">
-        <p14:creationId xmlns:p14="http://schemas.microsoft.com/office/powerpoint/2010/main" val="3506319487"/>
+        <p14:creationId xmlns:p14="http://schemas.microsoft.com/office/powerpoint/2010/main" val="1003111895"/>
       </p:ext>
     </p:extLst>
   </p:cSld>
@@ -9621,28 +10502,541 @@
             <a:pPr algn="ctr"/>
             <a:r>
               <a:rPr lang="pt-BR" sz="2800" b="1" dirty="0" smtClean="0"/>
-              <a:t>Trabalhando com o </a:t>
+              <a:t>Redes com </a:t>
             </a:r>
             <a:r>
               <a:rPr lang="pt-BR" sz="2800" b="1" dirty="0" err="1" smtClean="0"/>
               <a:t>Docker</a:t>
             </a:r>
-            <a:r>
-              <a:rPr lang="pt-BR" sz="2800" b="1" dirty="0" smtClean="0"/>
+            <a:endParaRPr lang="pt-BR" sz="2800" b="1" dirty="0"/>
+          </a:p>
+        </p:txBody>
+      </p:sp>
+      <p:sp>
+        <p:nvSpPr>
+          <p:cNvPr id="4" name="Espaço Reservado para Conteúdo 4"/>
+          <p:cNvSpPr>
+            <a:spLocks noGrp="1"/>
+          </p:cNvSpPr>
+          <p:nvPr>
+            <p:ph idx="1"/>
+          </p:nvPr>
+        </p:nvSpPr>
+        <p:spPr>
+          <a:xfrm>
+            <a:off x="480472" y="644715"/>
+            <a:ext cx="11222470" cy="5943371"/>
+          </a:xfrm>
+        </p:spPr>
+        <p:txBody>
+          <a:bodyPr>
+            <a:normAutofit fontScale="92500" lnSpcReduction="10000"/>
+          </a:bodyPr>
+          <a:lstStyle/>
+          <a:p>
+            <a:r>
+              <a:rPr lang="pt-BR" sz="1600" dirty="0" smtClean="0"/>
+              <a:t>Quando você disponibilizar uma aplicação pelo </a:t>
+            </a:r>
+            <a:r>
+              <a:rPr lang="pt-BR" sz="1600" dirty="0" err="1" smtClean="0"/>
+              <a:t>Docker</a:t>
+            </a:r>
+            <a:r>
+              <a:rPr lang="pt-BR" sz="1600" dirty="0" smtClean="0"/>
+              <a:t> é interessante que você coloque os containers na mesma </a:t>
+            </a:r>
+            <a:r>
+              <a:rPr lang="pt-BR" sz="1600" dirty="0" smtClean="0"/>
+              <a:t>rede, através </a:t>
+            </a:r>
+            <a:r>
+              <a:rPr lang="pt-BR" sz="1600" dirty="0"/>
+              <a:t>da </a:t>
+            </a:r>
+            <a:r>
+              <a:rPr lang="pt-BR" sz="1600" dirty="0" err="1"/>
+              <a:t>flag</a:t>
+            </a:r>
+            <a:r>
+              <a:rPr lang="pt-BR" sz="1600" dirty="0"/>
               <a:t> </a:t>
             </a:r>
             <a:r>
-              <a:rPr lang="pt-BR" sz="2800" b="1" dirty="0" err="1" smtClean="0"/>
-              <a:t>Compose</a:t>
-            </a:r>
-            <a:endParaRPr lang="pt-BR" sz="2800" b="1" dirty="0"/>
+              <a:rPr lang="pt-BR" sz="1600" b="1" dirty="0" smtClean="0"/>
+              <a:t>--network</a:t>
+            </a:r>
+            <a:r>
+              <a:rPr lang="pt-BR" sz="1600" dirty="0"/>
+              <a:t>. </a:t>
+            </a:r>
+          </a:p>
+          <a:p>
+            <a:pPr marL="0" indent="0">
+              <a:buNone/>
+            </a:pPr>
+            <a:r>
+              <a:rPr lang="pt-BR" sz="1600" dirty="0" err="1"/>
+              <a:t>docker</a:t>
+            </a:r>
+            <a:r>
+              <a:rPr lang="pt-BR" sz="1600" dirty="0"/>
+              <a:t> </a:t>
+            </a:r>
+            <a:r>
+              <a:rPr lang="pt-BR" sz="1600" dirty="0" err="1"/>
+              <a:t>run</a:t>
+            </a:r>
+            <a:r>
+              <a:rPr lang="pt-BR" sz="1600" dirty="0"/>
+              <a:t> -it --</a:t>
+            </a:r>
+            <a:r>
+              <a:rPr lang="pt-BR" sz="1600" dirty="0" err="1"/>
+              <a:t>name</a:t>
+            </a:r>
+            <a:r>
+              <a:rPr lang="pt-BR" sz="1600" dirty="0"/>
+              <a:t> meu-container-de-</a:t>
+            </a:r>
+            <a:r>
+              <a:rPr lang="pt-BR" sz="1600" dirty="0" err="1"/>
+              <a:t>ubuntu</a:t>
+            </a:r>
+            <a:r>
+              <a:rPr lang="pt-BR" sz="1600" dirty="0"/>
+              <a:t> --network minha-rede </a:t>
+            </a:r>
+            <a:r>
+              <a:rPr lang="pt-BR" sz="1600" dirty="0" err="1"/>
+              <a:t>ubuntu</a:t>
+            </a:r>
+            <a:endParaRPr lang="pt-BR" sz="1600" dirty="0"/>
+          </a:p>
+          <a:p>
+            <a:endParaRPr lang="pt-BR" sz="1600" dirty="0" smtClean="0"/>
+          </a:p>
+          <a:p>
+            <a:r>
+              <a:rPr lang="pt-BR" sz="1600" dirty="0" smtClean="0"/>
+              <a:t>Agora</a:t>
+            </a:r>
+            <a:r>
+              <a:rPr lang="pt-BR" sz="1600" dirty="0"/>
+              <a:t>, se executarmos o </a:t>
+            </a:r>
+            <a:r>
+              <a:rPr lang="pt-BR" sz="1600" dirty="0" smtClean="0"/>
+              <a:t>comando </a:t>
+            </a:r>
+            <a:r>
+              <a:rPr lang="pt-BR" sz="1600" b="1" dirty="0" err="1" smtClean="0"/>
+              <a:t>docker</a:t>
+            </a:r>
+            <a:r>
+              <a:rPr lang="pt-BR" sz="1600" b="1" dirty="0" smtClean="0"/>
+              <a:t> </a:t>
+            </a:r>
+            <a:r>
+              <a:rPr lang="pt-BR" sz="1600" b="1" dirty="0" err="1" smtClean="0"/>
+              <a:t>inspect</a:t>
+            </a:r>
+            <a:r>
+              <a:rPr lang="pt-BR" sz="1600" b="1" dirty="0" smtClean="0"/>
+              <a:t> meu-container-de-</a:t>
+            </a:r>
+            <a:r>
+              <a:rPr lang="pt-BR" sz="1600" b="1" dirty="0" err="1" smtClean="0"/>
+              <a:t>ubuntu</a:t>
+            </a:r>
+            <a:r>
+              <a:rPr lang="pt-BR" sz="1600" dirty="0"/>
+              <a:t>, podemos ver em </a:t>
+            </a:r>
+            <a:r>
+              <a:rPr lang="pt-BR" sz="1600" b="1" dirty="0" err="1"/>
+              <a:t>NetworkSettings</a:t>
+            </a:r>
+            <a:r>
+              <a:rPr lang="pt-BR" sz="1600" dirty="0"/>
+              <a:t> o container está na rede minha-rede. E para testar a comunicação entre os containers na nossa rede, vamos abrir outro terminal e criar um segundo container:</a:t>
+            </a:r>
+          </a:p>
+          <a:p>
+            <a:endParaRPr lang="pt-BR" sz="1600" dirty="0"/>
+          </a:p>
+          <a:p>
+            <a:r>
+              <a:rPr lang="pt-BR" sz="1600" dirty="0" err="1"/>
+              <a:t>docker</a:t>
+            </a:r>
+            <a:r>
+              <a:rPr lang="pt-BR" sz="1600" dirty="0"/>
+              <a:t> </a:t>
+            </a:r>
+            <a:r>
+              <a:rPr lang="pt-BR" sz="1600" dirty="0" err="1"/>
+              <a:t>run</a:t>
+            </a:r>
+            <a:r>
+              <a:rPr lang="pt-BR" sz="1600" dirty="0"/>
+              <a:t> -it --</a:t>
+            </a:r>
+            <a:r>
+              <a:rPr lang="pt-BR" sz="1600" dirty="0" err="1"/>
+              <a:t>name</a:t>
+            </a:r>
+            <a:r>
+              <a:rPr lang="pt-BR" sz="1600" dirty="0"/>
+              <a:t> segundo-</a:t>
+            </a:r>
+            <a:r>
+              <a:rPr lang="pt-BR" sz="1600" dirty="0" err="1"/>
+              <a:t>ubuntu</a:t>
+            </a:r>
+            <a:r>
+              <a:rPr lang="pt-BR" sz="1600" dirty="0"/>
+              <a:t> --network minha-rede </a:t>
+            </a:r>
+            <a:r>
+              <a:rPr lang="pt-BR" sz="1600" dirty="0" err="1"/>
+              <a:t>ubuntu</a:t>
+            </a:r>
+            <a:endParaRPr lang="pt-BR" sz="1600" dirty="0"/>
+          </a:p>
+          <a:p>
+            <a:r>
+              <a:rPr lang="pt-BR" sz="1600" dirty="0"/>
+              <a:t>Agora, no segundo-</a:t>
+            </a:r>
+            <a:r>
+              <a:rPr lang="pt-BR" sz="1600" dirty="0" err="1"/>
+              <a:t>ubuntu</a:t>
+            </a:r>
+            <a:r>
+              <a:rPr lang="pt-BR" sz="1600" dirty="0"/>
+              <a:t>, instalamos o </a:t>
+            </a:r>
+            <a:r>
+              <a:rPr lang="pt-BR" sz="1600" dirty="0" err="1"/>
+              <a:t>ping</a:t>
+            </a:r>
+            <a:r>
+              <a:rPr lang="pt-BR" sz="1600" dirty="0"/>
+              <a:t> e testamos a comunicação com o meu-container-de-</a:t>
+            </a:r>
+            <a:r>
+              <a:rPr lang="pt-BR" sz="1600" dirty="0" err="1"/>
+              <a:t>ubuntu</a:t>
+            </a:r>
+            <a:r>
+              <a:rPr lang="pt-BR" sz="1600" dirty="0"/>
+              <a:t>:</a:t>
+            </a:r>
+          </a:p>
+          <a:p>
+            <a:endParaRPr lang="pt-BR" sz="1600" dirty="0"/>
+          </a:p>
+          <a:p>
+            <a:r>
+              <a:rPr lang="pt-BR" sz="1600" dirty="0"/>
+              <a:t>root@00f93075d079:/# </a:t>
+            </a:r>
+            <a:r>
+              <a:rPr lang="pt-BR" sz="1600" dirty="0" err="1"/>
+              <a:t>ping</a:t>
+            </a:r>
+            <a:r>
+              <a:rPr lang="pt-BR" sz="1600" dirty="0"/>
+              <a:t> meu-container-de-</a:t>
+            </a:r>
+            <a:r>
+              <a:rPr lang="pt-BR" sz="1600" dirty="0" err="1"/>
+              <a:t>ubuntu</a:t>
+            </a:r>
+            <a:endParaRPr lang="pt-BR" sz="1600" dirty="0"/>
+          </a:p>
+          <a:p>
+            <a:r>
+              <a:rPr lang="pt-BR" sz="1600" dirty="0"/>
+              <a:t>PING meu-container-de-</a:t>
+            </a:r>
+            <a:r>
+              <a:rPr lang="pt-BR" sz="1600" dirty="0" err="1"/>
+              <a:t>ubuntu</a:t>
+            </a:r>
+            <a:r>
+              <a:rPr lang="pt-BR" sz="1600" dirty="0"/>
+              <a:t> (172.18.0.2) 56(84) bytes </a:t>
+            </a:r>
+            <a:r>
+              <a:rPr lang="pt-BR" sz="1600" dirty="0" err="1"/>
+              <a:t>of</a:t>
+            </a:r>
+            <a:r>
+              <a:rPr lang="pt-BR" sz="1600" dirty="0"/>
+              <a:t> data.</a:t>
+            </a:r>
+          </a:p>
+          <a:p>
+            <a:r>
+              <a:rPr lang="pt-BR" sz="1600" dirty="0"/>
+              <a:t>64 bytes </a:t>
+            </a:r>
+            <a:r>
+              <a:rPr lang="pt-BR" sz="1600" dirty="0" err="1"/>
+              <a:t>from</a:t>
+            </a:r>
+            <a:r>
+              <a:rPr lang="pt-BR" sz="1600" dirty="0"/>
+              <a:t> meu-container-de-</a:t>
+            </a:r>
+            <a:r>
+              <a:rPr lang="pt-BR" sz="1600" dirty="0" err="1"/>
+              <a:t>ubuntu.minha</a:t>
+            </a:r>
+            <a:r>
+              <a:rPr lang="pt-BR" sz="1600" dirty="0"/>
+              <a:t>-rede (172.18.0.2): </a:t>
+            </a:r>
+            <a:r>
+              <a:rPr lang="pt-BR" sz="1600" dirty="0" err="1"/>
+              <a:t>icmp_seq</a:t>
+            </a:r>
+            <a:r>
+              <a:rPr lang="pt-BR" sz="1600" dirty="0"/>
+              <a:t>=1 </a:t>
+            </a:r>
+            <a:r>
+              <a:rPr lang="pt-BR" sz="1600" dirty="0" err="1"/>
+              <a:t>ttl</a:t>
+            </a:r>
+            <a:r>
+              <a:rPr lang="pt-BR" sz="1600" dirty="0"/>
+              <a:t>=64 time=0.210 </a:t>
+            </a:r>
+            <a:r>
+              <a:rPr lang="pt-BR" sz="1600" dirty="0" err="1"/>
+              <a:t>ms</a:t>
+            </a:r>
+            <a:endParaRPr lang="pt-BR" sz="1600" dirty="0"/>
+          </a:p>
+          <a:p>
+            <a:r>
+              <a:rPr lang="pt-BR" sz="1600" dirty="0"/>
+              <a:t>64 bytes </a:t>
+            </a:r>
+            <a:r>
+              <a:rPr lang="pt-BR" sz="1600" dirty="0" err="1"/>
+              <a:t>from</a:t>
+            </a:r>
+            <a:r>
+              <a:rPr lang="pt-BR" sz="1600" dirty="0"/>
+              <a:t> meu-container-de-</a:t>
+            </a:r>
+            <a:r>
+              <a:rPr lang="pt-BR" sz="1600" dirty="0" err="1"/>
+              <a:t>ubuntu.minha</a:t>
+            </a:r>
+            <a:r>
+              <a:rPr lang="pt-BR" sz="1600" dirty="0"/>
+              <a:t>-rede (172.18.0.2): </a:t>
+            </a:r>
+            <a:r>
+              <a:rPr lang="pt-BR" sz="1600" dirty="0" err="1"/>
+              <a:t>icmp_seq</a:t>
+            </a:r>
+            <a:r>
+              <a:rPr lang="pt-BR" sz="1600" dirty="0"/>
+              <a:t>=2 </a:t>
+            </a:r>
+            <a:r>
+              <a:rPr lang="pt-BR" sz="1600" dirty="0" err="1"/>
+              <a:t>ttl</a:t>
+            </a:r>
+            <a:r>
+              <a:rPr lang="pt-BR" sz="1600" dirty="0"/>
+              <a:t>=64 time=0.148 </a:t>
+            </a:r>
+            <a:r>
+              <a:rPr lang="pt-BR" sz="1600" dirty="0" err="1"/>
+              <a:t>ms</a:t>
+            </a:r>
+            <a:endParaRPr lang="pt-BR" sz="1600" dirty="0"/>
+          </a:p>
+          <a:p>
+            <a:r>
+              <a:rPr lang="pt-BR" sz="1600" dirty="0"/>
+              <a:t>64 bytes </a:t>
+            </a:r>
+            <a:r>
+              <a:rPr lang="pt-BR" sz="1600" dirty="0" err="1"/>
+              <a:t>from</a:t>
+            </a:r>
+            <a:r>
+              <a:rPr lang="pt-BR" sz="1600" dirty="0"/>
+              <a:t> meu-container-de-</a:t>
+            </a:r>
+            <a:r>
+              <a:rPr lang="pt-BR" sz="1600" dirty="0" err="1"/>
+              <a:t>ubuntu.minha</a:t>
+            </a:r>
+            <a:r>
+              <a:rPr lang="pt-BR" sz="1600" dirty="0"/>
+              <a:t>-rede (172.18.0.2): </a:t>
+            </a:r>
+            <a:r>
+              <a:rPr lang="pt-BR" sz="1600" dirty="0" err="1"/>
+              <a:t>icmp_seq</a:t>
+            </a:r>
+            <a:r>
+              <a:rPr lang="pt-BR" sz="1600" dirty="0"/>
+              <a:t>=3 </a:t>
+            </a:r>
+            <a:r>
+              <a:rPr lang="pt-BR" sz="1600" dirty="0" err="1"/>
+              <a:t>ttl</a:t>
+            </a:r>
+            <a:r>
+              <a:rPr lang="pt-BR" sz="1600" dirty="0"/>
+              <a:t>=64 time=0.138 </a:t>
+            </a:r>
+            <a:r>
+              <a:rPr lang="pt-BR" sz="1600" dirty="0" err="1"/>
+              <a:t>ms</a:t>
+            </a:r>
+            <a:endParaRPr lang="pt-BR" sz="1600" dirty="0"/>
+          </a:p>
+          <a:p>
+            <a:r>
+              <a:rPr lang="pt-BR" sz="1600" dirty="0"/>
+              <a:t>^C</a:t>
+            </a:r>
+          </a:p>
+          <a:p>
+            <a:r>
+              <a:rPr lang="pt-BR" sz="1600" dirty="0"/>
+              <a:t>--- meu-container-de-</a:t>
+            </a:r>
+            <a:r>
+              <a:rPr lang="pt-BR" sz="1600" dirty="0" err="1"/>
+              <a:t>ubuntu</a:t>
+            </a:r>
+            <a:r>
+              <a:rPr lang="pt-BR" sz="1600" dirty="0"/>
+              <a:t> </a:t>
+            </a:r>
+            <a:r>
+              <a:rPr lang="pt-BR" sz="1600" dirty="0" err="1"/>
+              <a:t>ping</a:t>
+            </a:r>
+            <a:r>
+              <a:rPr lang="pt-BR" sz="1600" dirty="0"/>
+              <a:t> </a:t>
+            </a:r>
+            <a:r>
+              <a:rPr lang="pt-BR" sz="1600" dirty="0" err="1"/>
+              <a:t>statistics</a:t>
+            </a:r>
+            <a:r>
+              <a:rPr lang="pt-BR" sz="1600" dirty="0"/>
+              <a:t> ---</a:t>
+            </a:r>
+          </a:p>
+          <a:p>
+            <a:r>
+              <a:rPr lang="pt-BR" sz="1600" dirty="0"/>
+              <a:t>3 </a:t>
+            </a:r>
+            <a:r>
+              <a:rPr lang="pt-BR" sz="1600" dirty="0" err="1"/>
+              <a:t>packets</a:t>
+            </a:r>
+            <a:r>
+              <a:rPr lang="pt-BR" sz="1600" dirty="0"/>
+              <a:t> </a:t>
+            </a:r>
+            <a:r>
+              <a:rPr lang="pt-BR" sz="1600" dirty="0" err="1"/>
+              <a:t>transmitted</a:t>
+            </a:r>
+            <a:r>
+              <a:rPr lang="pt-BR" sz="1600" dirty="0"/>
+              <a:t>, 3 </a:t>
+            </a:r>
+            <a:r>
+              <a:rPr lang="pt-BR" sz="1600" dirty="0" err="1"/>
+              <a:t>received</a:t>
+            </a:r>
+            <a:r>
+              <a:rPr lang="pt-BR" sz="1600" dirty="0"/>
+              <a:t>, 0% </a:t>
+            </a:r>
+            <a:r>
+              <a:rPr lang="pt-BR" sz="1600" dirty="0" err="1"/>
+              <a:t>packet</a:t>
+            </a:r>
+            <a:r>
+              <a:rPr lang="pt-BR" sz="1600" dirty="0"/>
+              <a:t> </a:t>
+            </a:r>
+            <a:r>
+              <a:rPr lang="pt-BR" sz="1600" dirty="0" err="1"/>
+              <a:t>loss</a:t>
+            </a:r>
+            <a:r>
+              <a:rPr lang="pt-BR" sz="1600" dirty="0"/>
+              <a:t>, time 2000ms</a:t>
+            </a:r>
+          </a:p>
+          <a:p>
+            <a:r>
+              <a:rPr lang="pt-BR" sz="1600" dirty="0" err="1"/>
+              <a:t>rtt</a:t>
+            </a:r>
+            <a:r>
+              <a:rPr lang="pt-BR" sz="1600" dirty="0"/>
+              <a:t> min/</a:t>
+            </a:r>
+            <a:r>
+              <a:rPr lang="pt-BR" sz="1600" dirty="0" err="1"/>
+              <a:t>avg</a:t>
+            </a:r>
+            <a:r>
+              <a:rPr lang="pt-BR" sz="1600" dirty="0"/>
+              <a:t>/</a:t>
+            </a:r>
+            <a:r>
+              <a:rPr lang="pt-BR" sz="1600" dirty="0" err="1"/>
+              <a:t>max</a:t>
+            </a:r>
+            <a:r>
+              <a:rPr lang="pt-BR" sz="1600" dirty="0"/>
+              <a:t>/</a:t>
+            </a:r>
+            <a:r>
+              <a:rPr lang="pt-BR" sz="1600" dirty="0" err="1"/>
+              <a:t>mdev</a:t>
+            </a:r>
+            <a:r>
+              <a:rPr lang="pt-BR" sz="1600" dirty="0"/>
+              <a:t> = 0.138/0.165/0.210/0.033 </a:t>
+            </a:r>
+            <a:r>
+              <a:rPr lang="pt-BR" sz="1600" dirty="0" err="1"/>
+              <a:t>ms</a:t>
+            </a:r>
+            <a:endParaRPr lang="pt-BR" sz="1600" dirty="0" smtClean="0"/>
+          </a:p>
+          <a:p>
+            <a:endParaRPr lang="pt-BR" sz="1600" dirty="0"/>
           </a:p>
         </p:txBody>
       </p:sp>
     </p:spTree>
     <p:extLst>
       <p:ext uri="{BB962C8B-B14F-4D97-AF65-F5344CB8AC3E}">
-        <p14:creationId xmlns:p14="http://schemas.microsoft.com/office/powerpoint/2010/main" val="2618223457"/>
+        <p14:creationId xmlns:p14="http://schemas.microsoft.com/office/powerpoint/2010/main" val="4236748709"/>
       </p:ext>
     </p:extLst>
   </p:cSld>
@@ -9694,19 +11088,7 @@
             <a:pPr algn="ctr"/>
             <a:r>
               <a:rPr lang="pt-BR" sz="2800" b="1" dirty="0" smtClean="0"/>
-              <a:t>Trabalhando com o </a:t>
-            </a:r>
-            <a:r>
-              <a:rPr lang="pt-BR" sz="2800" b="1" dirty="0" err="1" smtClean="0"/>
-              <a:t>Docker</a:t>
-            </a:r>
-            <a:r>
-              <a:rPr lang="pt-BR" sz="2800" b="1" dirty="0" smtClean="0"/>
-              <a:t> </a:t>
-            </a:r>
-            <a:r>
-              <a:rPr lang="pt-BR" sz="2800" b="1" dirty="0" err="1" smtClean="0"/>
-              <a:t>Compose</a:t>
+              <a:t>Comunicação entre Containers</a:t>
             </a:r>
             <a:endParaRPr lang="pt-BR" sz="2800" b="1" dirty="0"/>
           </a:p>
@@ -9715,7 +11097,7 @@
     </p:spTree>
     <p:extLst>
       <p:ext uri="{BB962C8B-B14F-4D97-AF65-F5344CB8AC3E}">
-        <p14:creationId xmlns:p14="http://schemas.microsoft.com/office/powerpoint/2010/main" val="1819436064"/>
+        <p14:creationId xmlns:p14="http://schemas.microsoft.com/office/powerpoint/2010/main" val="3506319487"/>
       </p:ext>
     </p:extLst>
   </p:cSld>
@@ -9744,7 +11126,7 @@
       </p:grpSpPr>
       <p:sp>
         <p:nvSpPr>
-          <p:cNvPr id="2" name="Título 1"/>
+          <p:cNvPr id="5" name="Título 1"/>
           <p:cNvSpPr>
             <a:spLocks noGrp="1"/>
           </p:cNvSpPr>
@@ -9752,38 +11134,43 @@
             <p:ph type="title"/>
           </p:nvPr>
         </p:nvSpPr>
-        <p:spPr/>
+        <p:spPr>
+          <a:xfrm>
+            <a:off x="115910" y="123288"/>
+            <a:ext cx="11951594" cy="422275"/>
+          </a:xfrm>
+        </p:spPr>
         <p:txBody>
-          <a:bodyPr/>
+          <a:bodyPr vert="horz" lIns="91440" tIns="45720" rIns="91440" bIns="45720" rtlCol="0" anchor="ctr">
+            <a:normAutofit fontScale="90000"/>
+          </a:bodyPr>
           <a:lstStyle/>
           <a:p>
-            <a:endParaRPr lang="pt-BR"/>
-          </a:p>
-        </p:txBody>
-      </p:sp>
-      <p:sp>
-        <p:nvSpPr>
-          <p:cNvPr id="3" name="Espaço Reservado para Conteúdo 2"/>
-          <p:cNvSpPr>
-            <a:spLocks noGrp="1"/>
-          </p:cNvSpPr>
-          <p:nvPr>
-            <p:ph idx="1"/>
-          </p:nvPr>
-        </p:nvSpPr>
-        <p:spPr/>
-        <p:txBody>
-          <a:bodyPr/>
-          <a:lstStyle/>
-          <a:p>
-            <a:endParaRPr lang="pt-BR"/>
+            <a:pPr algn="ctr"/>
+            <a:r>
+              <a:rPr lang="pt-BR" sz="2800" b="1" dirty="0" smtClean="0"/>
+              <a:t>Trabalhando com o </a:t>
+            </a:r>
+            <a:r>
+              <a:rPr lang="pt-BR" sz="2800" b="1" dirty="0" err="1" smtClean="0"/>
+              <a:t>Docker</a:t>
+            </a:r>
+            <a:r>
+              <a:rPr lang="pt-BR" sz="2800" b="1" dirty="0" smtClean="0"/>
+              <a:t> </a:t>
+            </a:r>
+            <a:r>
+              <a:rPr lang="pt-BR" sz="2800" b="1" dirty="0" err="1" smtClean="0"/>
+              <a:t>Compose</a:t>
+            </a:r>
+            <a:endParaRPr lang="pt-BR" sz="2800" b="1" dirty="0"/>
           </a:p>
         </p:txBody>
       </p:sp>
     </p:spTree>
     <p:extLst>
       <p:ext uri="{BB962C8B-B14F-4D97-AF65-F5344CB8AC3E}">
-        <p14:creationId xmlns:p14="http://schemas.microsoft.com/office/powerpoint/2010/main" val="2333415383"/>
+        <p14:creationId xmlns:p14="http://schemas.microsoft.com/office/powerpoint/2010/main" val="2618223457"/>
       </p:ext>
     </p:extLst>
   </p:cSld>
@@ -9812,7 +11199,7 @@
       </p:grpSpPr>
       <p:sp>
         <p:nvSpPr>
-          <p:cNvPr id="2" name="Título 1"/>
+          <p:cNvPr id="5" name="Título 1"/>
           <p:cNvSpPr>
             <a:spLocks noGrp="1"/>
           </p:cNvSpPr>
@@ -9820,38 +11207,43 @@
             <p:ph type="title"/>
           </p:nvPr>
         </p:nvSpPr>
-        <p:spPr/>
+        <p:spPr>
+          <a:xfrm>
+            <a:off x="115910" y="123288"/>
+            <a:ext cx="11951594" cy="422275"/>
+          </a:xfrm>
+        </p:spPr>
         <p:txBody>
-          <a:bodyPr/>
+          <a:bodyPr vert="horz" lIns="91440" tIns="45720" rIns="91440" bIns="45720" rtlCol="0" anchor="ctr">
+            <a:normAutofit fontScale="90000"/>
+          </a:bodyPr>
           <a:lstStyle/>
           <a:p>
-            <a:endParaRPr lang="pt-BR"/>
-          </a:p>
-        </p:txBody>
-      </p:sp>
-      <p:sp>
-        <p:nvSpPr>
-          <p:cNvPr id="3" name="Espaço Reservado para Conteúdo 2"/>
-          <p:cNvSpPr>
-            <a:spLocks noGrp="1"/>
-          </p:cNvSpPr>
-          <p:nvPr>
-            <p:ph idx="1"/>
-          </p:nvPr>
-        </p:nvSpPr>
-        <p:spPr/>
-        <p:txBody>
-          <a:bodyPr/>
-          <a:lstStyle/>
-          <a:p>
-            <a:endParaRPr lang="pt-BR"/>
+            <a:pPr algn="ctr"/>
+            <a:r>
+              <a:rPr lang="pt-BR" sz="2800" b="1" dirty="0" smtClean="0"/>
+              <a:t>Trabalhando com o </a:t>
+            </a:r>
+            <a:r>
+              <a:rPr lang="pt-BR" sz="2800" b="1" dirty="0" err="1" smtClean="0"/>
+              <a:t>Docker</a:t>
+            </a:r>
+            <a:r>
+              <a:rPr lang="pt-BR" sz="2800" b="1" dirty="0" smtClean="0"/>
+              <a:t> </a:t>
+            </a:r>
+            <a:r>
+              <a:rPr lang="pt-BR" sz="2800" b="1" dirty="0" err="1" smtClean="0"/>
+              <a:t>Compose</a:t>
+            </a:r>
+            <a:endParaRPr lang="pt-BR" sz="2800" b="1" dirty="0"/>
           </a:p>
         </p:txBody>
       </p:sp>
     </p:spTree>
     <p:extLst>
       <p:ext uri="{BB962C8B-B14F-4D97-AF65-F5344CB8AC3E}">
-        <p14:creationId xmlns:p14="http://schemas.microsoft.com/office/powerpoint/2010/main" val="3094957484"/>
+        <p14:creationId xmlns:p14="http://schemas.microsoft.com/office/powerpoint/2010/main" val="1819436064"/>
       </p:ext>
     </p:extLst>
   </p:cSld>
@@ -9893,11 +11285,7 @@
           <a:bodyPr/>
           <a:lstStyle/>
           <a:p>
-            <a:r>
-              <a:rPr lang="pt-BR" dirty="0" smtClean="0"/>
-              <a:t>Referências Bibliográficas</a:t>
-            </a:r>
-            <a:endParaRPr lang="pt-BR" dirty="0"/>
+            <a:endParaRPr lang="pt-BR"/>
           </a:p>
         </p:txBody>
       </p:sp>
@@ -9916,26 +11304,82 @@
           <a:bodyPr/>
           <a:lstStyle/>
           <a:p>
-            <a:r>
-              <a:rPr lang="pt-BR" dirty="0" smtClean="0"/>
-              <a:t>Curso </a:t>
-            </a:r>
-            <a:r>
-              <a:rPr lang="pt-BR" dirty="0" err="1" smtClean="0"/>
-              <a:t>Alura</a:t>
-            </a:r>
-            <a:r>
-              <a:rPr lang="pt-BR" dirty="0" smtClean="0"/>
-              <a:t> Docker</a:t>
-            </a:r>
-            <a:endParaRPr lang="pt-BR" dirty="0"/>
+            <a:endParaRPr lang="pt-BR"/>
           </a:p>
         </p:txBody>
       </p:sp>
     </p:spTree>
     <p:extLst>
       <p:ext uri="{BB962C8B-B14F-4D97-AF65-F5344CB8AC3E}">
-        <p14:creationId xmlns:p14="http://schemas.microsoft.com/office/powerpoint/2010/main" val="893777767"/>
+        <p14:creationId xmlns:p14="http://schemas.microsoft.com/office/powerpoint/2010/main" val="2333415383"/>
+      </p:ext>
+    </p:extLst>
+  </p:cSld>
+  <p:clrMapOvr>
+    <a:masterClrMapping/>
+  </p:clrMapOvr>
+</p:sld>
+</file>
+
+<file path=ppt/slides/slide29.xml><?xml version="1.0" encoding="utf-8"?>
+<p:sld xmlns:a="http://schemas.openxmlformats.org/drawingml/2006/main" xmlns:r="http://schemas.openxmlformats.org/officeDocument/2006/relationships" xmlns:p="http://schemas.openxmlformats.org/presentationml/2006/main">
+  <p:cSld>
+    <p:spTree>
+      <p:nvGrpSpPr>
+        <p:cNvPr id="1" name=""/>
+        <p:cNvGrpSpPr/>
+        <p:nvPr/>
+      </p:nvGrpSpPr>
+      <p:grpSpPr>
+        <a:xfrm>
+          <a:off x="0" y="0"/>
+          <a:ext cx="0" cy="0"/>
+          <a:chOff x="0" y="0"/>
+          <a:chExt cx="0" cy="0"/>
+        </a:xfrm>
+      </p:grpSpPr>
+      <p:sp>
+        <p:nvSpPr>
+          <p:cNvPr id="2" name="Título 1"/>
+          <p:cNvSpPr>
+            <a:spLocks noGrp="1"/>
+          </p:cNvSpPr>
+          <p:nvPr>
+            <p:ph type="title"/>
+          </p:nvPr>
+        </p:nvSpPr>
+        <p:spPr/>
+        <p:txBody>
+          <a:bodyPr/>
+          <a:lstStyle/>
+          <a:p>
+            <a:endParaRPr lang="pt-BR"/>
+          </a:p>
+        </p:txBody>
+      </p:sp>
+      <p:sp>
+        <p:nvSpPr>
+          <p:cNvPr id="3" name="Espaço Reservado para Conteúdo 2"/>
+          <p:cNvSpPr>
+            <a:spLocks noGrp="1"/>
+          </p:cNvSpPr>
+          <p:nvPr>
+            <p:ph idx="1"/>
+          </p:nvPr>
+        </p:nvSpPr>
+        <p:spPr/>
+        <p:txBody>
+          <a:bodyPr/>
+          <a:lstStyle/>
+          <a:p>
+            <a:endParaRPr lang="pt-BR"/>
+          </a:p>
+        </p:txBody>
+      </p:sp>
+    </p:spTree>
+    <p:extLst>
+      <p:ext uri="{BB962C8B-B14F-4D97-AF65-F5344CB8AC3E}">
+        <p14:creationId xmlns:p14="http://schemas.microsoft.com/office/powerpoint/2010/main" val="3094957484"/>
       </p:ext>
     </p:extLst>
   </p:cSld>
@@ -10286,6 +11730,90 @@
     <p:extLst>
       <p:ext uri="{BB962C8B-B14F-4D97-AF65-F5344CB8AC3E}">
         <p14:creationId xmlns:p14="http://schemas.microsoft.com/office/powerpoint/2010/main" val="2702824203"/>
+      </p:ext>
+    </p:extLst>
+  </p:cSld>
+  <p:clrMapOvr>
+    <a:masterClrMapping/>
+  </p:clrMapOvr>
+</p:sld>
+</file>
+
+<file path=ppt/slides/slide30.xml><?xml version="1.0" encoding="utf-8"?>
+<p:sld xmlns:a="http://schemas.openxmlformats.org/drawingml/2006/main" xmlns:r="http://schemas.openxmlformats.org/officeDocument/2006/relationships" xmlns:p="http://schemas.openxmlformats.org/presentationml/2006/main">
+  <p:cSld>
+    <p:spTree>
+      <p:nvGrpSpPr>
+        <p:cNvPr id="1" name=""/>
+        <p:cNvGrpSpPr/>
+        <p:nvPr/>
+      </p:nvGrpSpPr>
+      <p:grpSpPr>
+        <a:xfrm>
+          <a:off x="0" y="0"/>
+          <a:ext cx="0" cy="0"/>
+          <a:chOff x="0" y="0"/>
+          <a:chExt cx="0" cy="0"/>
+        </a:xfrm>
+      </p:grpSpPr>
+      <p:sp>
+        <p:nvSpPr>
+          <p:cNvPr id="2" name="Título 1"/>
+          <p:cNvSpPr>
+            <a:spLocks noGrp="1"/>
+          </p:cNvSpPr>
+          <p:nvPr>
+            <p:ph type="title"/>
+          </p:nvPr>
+        </p:nvSpPr>
+        <p:spPr/>
+        <p:txBody>
+          <a:bodyPr/>
+          <a:lstStyle/>
+          <a:p>
+            <a:r>
+              <a:rPr lang="pt-BR" dirty="0" smtClean="0"/>
+              <a:t>Referências Bibliográficas</a:t>
+            </a:r>
+            <a:endParaRPr lang="pt-BR" dirty="0"/>
+          </a:p>
+        </p:txBody>
+      </p:sp>
+      <p:sp>
+        <p:nvSpPr>
+          <p:cNvPr id="3" name="Espaço Reservado para Conteúdo 2"/>
+          <p:cNvSpPr>
+            <a:spLocks noGrp="1"/>
+          </p:cNvSpPr>
+          <p:nvPr>
+            <p:ph idx="1"/>
+          </p:nvPr>
+        </p:nvSpPr>
+        <p:spPr/>
+        <p:txBody>
+          <a:bodyPr/>
+          <a:lstStyle/>
+          <a:p>
+            <a:r>
+              <a:rPr lang="pt-BR" dirty="0" smtClean="0"/>
+              <a:t>Curso </a:t>
+            </a:r>
+            <a:r>
+              <a:rPr lang="pt-BR" dirty="0" err="1" smtClean="0"/>
+              <a:t>Alura</a:t>
+            </a:r>
+            <a:r>
+              <a:rPr lang="pt-BR" dirty="0" smtClean="0"/>
+              <a:t> Docker</a:t>
+            </a:r>
+            <a:endParaRPr lang="pt-BR" dirty="0"/>
+          </a:p>
+        </p:txBody>
+      </p:sp>
+    </p:spTree>
+    <p:extLst>
+      <p:ext uri="{BB962C8B-B14F-4D97-AF65-F5344CB8AC3E}">
+        <p14:creationId xmlns:p14="http://schemas.microsoft.com/office/powerpoint/2010/main" val="893777767"/>
       </p:ext>
     </p:extLst>
   </p:cSld>
@@ -13427,7 +14955,7 @@
         </p:blipFill>
         <p:spPr>
           <a:xfrm>
-            <a:off x="6387853" y="1930777"/>
+            <a:off x="6387853" y="1941794"/>
             <a:ext cx="5317752" cy="2277756"/>
           </a:xfrm>
           <a:prstGeom prst="rect">

</xml_diff>

<commit_message>
Ajustes apresentação para volumes no Docker Toolbox
</commit_message>
<xml_diff>
--- a/docs/docker-resumo.pptx
+++ b/docs/docker-resumo.pptx
@@ -23,18 +23,19 @@
     <p:sldId id="294" r:id="rId17"/>
     <p:sldId id="301" r:id="rId18"/>
     <p:sldId id="302" r:id="rId19"/>
-    <p:sldId id="303" r:id="rId20"/>
-    <p:sldId id="281" r:id="rId21"/>
-    <p:sldId id="306" r:id="rId22"/>
-    <p:sldId id="304" r:id="rId23"/>
-    <p:sldId id="309" r:id="rId24"/>
-    <p:sldId id="310" r:id="rId25"/>
-    <p:sldId id="307" r:id="rId26"/>
-    <p:sldId id="305" r:id="rId27"/>
-    <p:sldId id="312" r:id="rId28"/>
-    <p:sldId id="311" r:id="rId29"/>
-    <p:sldId id="308" r:id="rId30"/>
-    <p:sldId id="285" r:id="rId31"/>
+    <p:sldId id="313" r:id="rId20"/>
+    <p:sldId id="303" r:id="rId21"/>
+    <p:sldId id="281" r:id="rId22"/>
+    <p:sldId id="306" r:id="rId23"/>
+    <p:sldId id="304" r:id="rId24"/>
+    <p:sldId id="309" r:id="rId25"/>
+    <p:sldId id="310" r:id="rId26"/>
+    <p:sldId id="307" r:id="rId27"/>
+    <p:sldId id="305" r:id="rId28"/>
+    <p:sldId id="312" r:id="rId29"/>
+    <p:sldId id="311" r:id="rId30"/>
+    <p:sldId id="308" r:id="rId31"/>
+    <p:sldId id="285" r:id="rId32"/>
   </p:sldIdLst>
   <p:sldSz cx="12192000" cy="6858000"/>
   <p:notesSz cx="6858000" cy="9144000"/>
@@ -270,7 +271,7 @@
           <a:p>
             <a:fld id="{CC58B075-67F8-4A8D-AE1C-3D3E4193EBCA}" type="datetimeFigureOut">
               <a:rPr lang="pt-BR" smtClean="0"/>
-              <a:t>27/10/2019</a:t>
+              <a:t>06/11/2019</a:t>
             </a:fld>
             <a:endParaRPr lang="pt-BR"/>
           </a:p>
@@ -438,7 +439,7 @@
           <a:p>
             <a:fld id="{CC58B075-67F8-4A8D-AE1C-3D3E4193EBCA}" type="datetimeFigureOut">
               <a:rPr lang="pt-BR" smtClean="0"/>
-              <a:t>27/10/2019</a:t>
+              <a:t>06/11/2019</a:t>
             </a:fld>
             <a:endParaRPr lang="pt-BR"/>
           </a:p>
@@ -616,7 +617,7 @@
           <a:p>
             <a:fld id="{CC58B075-67F8-4A8D-AE1C-3D3E4193EBCA}" type="datetimeFigureOut">
               <a:rPr lang="pt-BR" smtClean="0"/>
-              <a:t>27/10/2019</a:t>
+              <a:t>06/11/2019</a:t>
             </a:fld>
             <a:endParaRPr lang="pt-BR"/>
           </a:p>
@@ -784,7 +785,7 @@
           <a:p>
             <a:fld id="{CC58B075-67F8-4A8D-AE1C-3D3E4193EBCA}" type="datetimeFigureOut">
               <a:rPr lang="pt-BR" smtClean="0"/>
-              <a:t>27/10/2019</a:t>
+              <a:t>06/11/2019</a:t>
             </a:fld>
             <a:endParaRPr lang="pt-BR"/>
           </a:p>
@@ -1029,7 +1030,7 @@
           <a:p>
             <a:fld id="{CC58B075-67F8-4A8D-AE1C-3D3E4193EBCA}" type="datetimeFigureOut">
               <a:rPr lang="pt-BR" smtClean="0"/>
-              <a:t>27/10/2019</a:t>
+              <a:t>06/11/2019</a:t>
             </a:fld>
             <a:endParaRPr lang="pt-BR"/>
           </a:p>
@@ -1258,7 +1259,7 @@
           <a:p>
             <a:fld id="{CC58B075-67F8-4A8D-AE1C-3D3E4193EBCA}" type="datetimeFigureOut">
               <a:rPr lang="pt-BR" smtClean="0"/>
-              <a:t>27/10/2019</a:t>
+              <a:t>06/11/2019</a:t>
             </a:fld>
             <a:endParaRPr lang="pt-BR"/>
           </a:p>
@@ -1622,7 +1623,7 @@
           <a:p>
             <a:fld id="{CC58B075-67F8-4A8D-AE1C-3D3E4193EBCA}" type="datetimeFigureOut">
               <a:rPr lang="pt-BR" smtClean="0"/>
-              <a:t>27/10/2019</a:t>
+              <a:t>06/11/2019</a:t>
             </a:fld>
             <a:endParaRPr lang="pt-BR"/>
           </a:p>
@@ -1739,7 +1740,7 @@
           <a:p>
             <a:fld id="{CC58B075-67F8-4A8D-AE1C-3D3E4193EBCA}" type="datetimeFigureOut">
               <a:rPr lang="pt-BR" smtClean="0"/>
-              <a:t>27/10/2019</a:t>
+              <a:t>06/11/2019</a:t>
             </a:fld>
             <a:endParaRPr lang="pt-BR"/>
           </a:p>
@@ -1834,7 +1835,7 @@
           <a:p>
             <a:fld id="{CC58B075-67F8-4A8D-AE1C-3D3E4193EBCA}" type="datetimeFigureOut">
               <a:rPr lang="pt-BR" smtClean="0"/>
-              <a:t>27/10/2019</a:t>
+              <a:t>06/11/2019</a:t>
             </a:fld>
             <a:endParaRPr lang="pt-BR"/>
           </a:p>
@@ -2109,7 +2110,7 @@
           <a:p>
             <a:fld id="{CC58B075-67F8-4A8D-AE1C-3D3E4193EBCA}" type="datetimeFigureOut">
               <a:rPr lang="pt-BR" smtClean="0"/>
-              <a:t>27/10/2019</a:t>
+              <a:t>06/11/2019</a:t>
             </a:fld>
             <a:endParaRPr lang="pt-BR"/>
           </a:p>
@@ -2361,7 +2362,7 @@
           <a:p>
             <a:fld id="{CC58B075-67F8-4A8D-AE1C-3D3E4193EBCA}" type="datetimeFigureOut">
               <a:rPr lang="pt-BR" smtClean="0"/>
-              <a:t>27/10/2019</a:t>
+              <a:t>06/11/2019</a:t>
             </a:fld>
             <a:endParaRPr lang="pt-BR"/>
           </a:p>
@@ -2572,7 +2573,7 @@
           <a:p>
             <a:fld id="{CC58B075-67F8-4A8D-AE1C-3D3E4193EBCA}" type="datetimeFigureOut">
               <a:rPr lang="pt-BR" smtClean="0"/>
-              <a:t>27/10/2019</a:t>
+              <a:t>06/11/2019</a:t>
             </a:fld>
             <a:endParaRPr lang="pt-BR"/>
           </a:p>
@@ -4559,7 +4560,7 @@
         </p:nvSpPr>
         <p:spPr>
           <a:xfrm>
-            <a:off x="3401096" y="1372539"/>
+            <a:off x="560974" y="103809"/>
             <a:ext cx="10515600" cy="422275"/>
           </a:xfrm>
         </p:spPr>
@@ -4594,7 +4595,7 @@
         </p:nvSpPr>
         <p:spPr>
           <a:xfrm>
-            <a:off x="286752" y="751474"/>
+            <a:off x="286751" y="680698"/>
             <a:ext cx="11618495" cy="2344016"/>
           </a:xfrm>
         </p:spPr>
@@ -7210,141 +7211,6 @@
             </a:endParaRPr>
           </a:p>
           <a:p>
-            <a:pPr marL="228600" lvl="1">
-              <a:spcBef>
-                <a:spcPts val="1000"/>
-              </a:spcBef>
-            </a:pPr>
-            <a:r>
-              <a:rPr lang="pt-BR" sz="2000" dirty="0"/>
-              <a:t>Detalhe Importante: Se você estiver rodando no </a:t>
-            </a:r>
-            <a:r>
-              <a:rPr lang="pt-BR" sz="2000" dirty="0" err="1"/>
-              <a:t>Docker</a:t>
-            </a:r>
-            <a:r>
-              <a:rPr lang="pt-BR" sz="2000" dirty="0"/>
-              <a:t> Toolbox</a:t>
-            </a:r>
-          </a:p>
-          <a:p>
-            <a:pPr marL="685800" lvl="2">
-              <a:spcBef>
-                <a:spcPts val="1000"/>
-              </a:spcBef>
-            </a:pPr>
-            <a:endParaRPr lang="pt-BR" sz="1600" dirty="0"/>
-          </a:p>
-          <a:p>
-            <a:pPr lvl="1">
-              <a:buFont typeface="Wingdings" panose="05000000000000000000" pitchFamily="2" charset="2"/>
-              <a:buChar char="Ø"/>
-            </a:pPr>
-            <a:r>
-              <a:rPr lang="pt-BR" sz="2000" dirty="0">
-                <a:solidFill>
-                  <a:schemeClr val="accent5"/>
-                </a:solidFill>
-              </a:rPr>
-              <a:t> </a:t>
-            </a:r>
-            <a:r>
-              <a:rPr lang="pt-BR" sz="2000" dirty="0" err="1">
-                <a:solidFill>
-                  <a:schemeClr val="accent5"/>
-                </a:solidFill>
-              </a:rPr>
-              <a:t>docker</a:t>
-            </a:r>
-            <a:r>
-              <a:rPr lang="pt-BR" sz="2000" dirty="0">
-                <a:solidFill>
-                  <a:schemeClr val="accent5"/>
-                </a:solidFill>
-              </a:rPr>
-              <a:t> </a:t>
-            </a:r>
-            <a:r>
-              <a:rPr lang="pt-BR" sz="2000" dirty="0" err="1">
-                <a:solidFill>
-                  <a:schemeClr val="accent5"/>
-                </a:solidFill>
-              </a:rPr>
-              <a:t>run</a:t>
-            </a:r>
-            <a:r>
-              <a:rPr lang="pt-BR" sz="2000" dirty="0">
-                <a:solidFill>
-                  <a:schemeClr val="accent5"/>
-                </a:solidFill>
-              </a:rPr>
-              <a:t> -it -v "//c/</a:t>
-            </a:r>
-            <a:r>
-              <a:rPr lang="pt-BR" sz="2000" dirty="0" err="1">
-                <a:solidFill>
-                  <a:schemeClr val="accent5"/>
-                </a:solidFill>
-              </a:rPr>
-              <a:t>Users</a:t>
-            </a:r>
-            <a:r>
-              <a:rPr lang="pt-BR" sz="2000" dirty="0">
-                <a:solidFill>
-                  <a:schemeClr val="accent5"/>
-                </a:solidFill>
-              </a:rPr>
-              <a:t>/Luciano/Desktop:/var/</a:t>
-            </a:r>
-            <a:r>
-              <a:rPr lang="pt-BR" sz="2000" dirty="0" err="1">
-                <a:solidFill>
-                  <a:schemeClr val="accent5"/>
-                </a:solidFill>
-              </a:rPr>
-              <a:t>www</a:t>
-            </a:r>
-            <a:r>
-              <a:rPr lang="pt-BR" sz="2000" dirty="0">
-                <a:solidFill>
-                  <a:schemeClr val="accent5"/>
-                </a:solidFill>
-              </a:rPr>
-              <a:t>" </a:t>
-            </a:r>
-            <a:r>
-              <a:rPr lang="pt-BR" sz="2000" dirty="0" err="1">
-                <a:solidFill>
-                  <a:schemeClr val="accent5"/>
-                </a:solidFill>
-              </a:rPr>
-              <a:t>ubuntu</a:t>
-            </a:r>
-            <a:endParaRPr lang="pt-BR" sz="2000" dirty="0">
-              <a:solidFill>
-                <a:schemeClr val="accent5"/>
-              </a:solidFill>
-            </a:endParaRPr>
-          </a:p>
-          <a:p>
-            <a:pPr lvl="2"/>
-            <a:r>
-              <a:rPr lang="pt-BR" sz="1600" dirty="0"/>
-              <a:t>(</a:t>
-            </a:r>
-            <a:r>
-              <a:rPr lang="pt-BR" sz="1600" dirty="0">
-                <a:hlinkClick r:id="rId2"/>
-              </a:rPr>
-              <a:t>https://medium.com/@Charles_Stover/fixing-volumes-in-docker-toolbox-4ad5ace0e572</a:t>
-            </a:r>
-            <a:r>
-              <a:rPr lang="pt-BR" sz="1600" dirty="0"/>
-              <a:t> ) </a:t>
-            </a:r>
-          </a:p>
-          <a:p>
             <a:pPr lvl="2">
               <a:buFont typeface="Wingdings" panose="05000000000000000000" pitchFamily="2" charset="2"/>
               <a:buChar char="Ø"/>
@@ -7410,7 +7276,7 @@
         </p:nvSpPr>
         <p:spPr>
           <a:xfrm>
-            <a:off x="115910" y="112271"/>
+            <a:off x="115910" y="123288"/>
             <a:ext cx="11951594" cy="422275"/>
           </a:xfrm>
         </p:spPr>
@@ -7422,9 +7288,18 @@
           <a:p>
             <a:pPr algn="ctr"/>
             <a:r>
-              <a:rPr lang="pt-BR" sz="2800" b="1" dirty="0"/>
-              <a:t>Rodando código em um Container</a:t>
-            </a:r>
+              <a:rPr lang="pt-BR" sz="2800" b="1" dirty="0" smtClean="0"/>
+              <a:t>Volumes no </a:t>
+            </a:r>
+            <a:r>
+              <a:rPr lang="pt-BR" sz="2800" b="1" dirty="0" err="1" smtClean="0"/>
+              <a:t>Docker</a:t>
+            </a:r>
+            <a:r>
+              <a:rPr lang="pt-BR" sz="2800" b="1" dirty="0" smtClean="0"/>
+              <a:t> Toolbox</a:t>
+            </a:r>
+            <a:endParaRPr lang="pt-BR" sz="2800" b="1" dirty="0"/>
           </a:p>
         </p:txBody>
       </p:sp>
@@ -7440,8 +7315,8 @@
         </p:nvSpPr>
         <p:spPr>
           <a:xfrm>
-            <a:off x="194791" y="629823"/>
-            <a:ext cx="11259355" cy="2895575"/>
+            <a:off x="241478" y="545563"/>
+            <a:ext cx="11259355" cy="2398360"/>
           </a:xfrm>
         </p:spPr>
         <p:txBody>
@@ -7450,120 +7325,157 @@
           </a:bodyPr>
           <a:lstStyle/>
           <a:p>
+            <a:pPr marL="228600" lvl="1">
+              <a:spcBef>
+                <a:spcPts val="1000"/>
+              </a:spcBef>
+            </a:pPr>
+            <a:r>
+              <a:rPr lang="pt-BR" sz="2000" dirty="0" smtClean="0"/>
+              <a:t>Detalhe </a:t>
+            </a:r>
             <a:r>
               <a:rPr lang="pt-BR" sz="2000" dirty="0"/>
-              <a:t>Um exemplo que roda em </a:t>
-            </a:r>
-            <a:r>
-              <a:rPr lang="pt-BR" sz="2000" b="1" dirty="0"/>
-              <a:t>Node.js </a:t>
+              <a:t>Importante: Se você estiver rodando no </a:t>
+            </a:r>
+            <a:r>
+              <a:rPr lang="pt-BR" sz="2000" dirty="0" err="1"/>
+              <a:t>Docker</a:t>
             </a:r>
             <a:r>
               <a:rPr lang="pt-BR" sz="2000" dirty="0"/>
-              <a:t>e não possuímos o Node na máquina.</a:t>
-            </a:r>
-          </a:p>
-          <a:p>
-            <a:pPr lvl="2">
+              <a:t> Toolbox</a:t>
+            </a:r>
+          </a:p>
+          <a:p>
+            <a:pPr marL="685800" lvl="2">
+              <a:spcBef>
+                <a:spcPts val="1000"/>
+              </a:spcBef>
+            </a:pPr>
+            <a:endParaRPr lang="pt-BR" sz="1600" dirty="0"/>
+          </a:p>
+          <a:p>
+            <a:pPr lvl="1">
               <a:buFont typeface="Wingdings" panose="05000000000000000000" pitchFamily="2" charset="2"/>
               <a:buChar char="Ø"/>
             </a:pPr>
             <a:r>
-              <a:rPr lang="pt-BR" sz="1600" dirty="0" err="1">
+              <a:rPr lang="pt-BR" sz="2000" dirty="0">
                 <a:solidFill>
                   <a:schemeClr val="accent5"/>
                 </a:solidFill>
               </a:rPr>
+              <a:t> </a:t>
+            </a:r>
+            <a:r>
+              <a:rPr lang="pt-BR" sz="2000" dirty="0" err="1">
+                <a:solidFill>
+                  <a:schemeClr val="accent5"/>
+                </a:solidFill>
+              </a:rPr>
               <a:t>docker</a:t>
             </a:r>
             <a:r>
+              <a:rPr lang="pt-BR" sz="2000" dirty="0">
+                <a:solidFill>
+                  <a:schemeClr val="accent5"/>
+                </a:solidFill>
+              </a:rPr>
+              <a:t> </a:t>
+            </a:r>
+            <a:r>
+              <a:rPr lang="pt-BR" sz="2000" dirty="0" err="1">
+                <a:solidFill>
+                  <a:schemeClr val="accent5"/>
+                </a:solidFill>
+              </a:rPr>
+              <a:t>run</a:t>
+            </a:r>
+            <a:r>
+              <a:rPr lang="pt-BR" sz="2000" dirty="0">
+                <a:solidFill>
+                  <a:schemeClr val="accent5"/>
+                </a:solidFill>
+              </a:rPr>
+              <a:t> -it -v "//c/</a:t>
+            </a:r>
+            <a:r>
+              <a:rPr lang="pt-BR" sz="2000" dirty="0" err="1">
+                <a:solidFill>
+                  <a:schemeClr val="accent5"/>
+                </a:solidFill>
+              </a:rPr>
+              <a:t>Users</a:t>
+            </a:r>
+            <a:r>
+              <a:rPr lang="pt-BR" sz="2000" dirty="0">
+                <a:solidFill>
+                  <a:schemeClr val="accent5"/>
+                </a:solidFill>
+              </a:rPr>
+              <a:t>/Luciano/Desktop:/var/</a:t>
+            </a:r>
+            <a:r>
+              <a:rPr lang="pt-BR" sz="2000" dirty="0" err="1">
+                <a:solidFill>
+                  <a:schemeClr val="accent5"/>
+                </a:solidFill>
+              </a:rPr>
+              <a:t>www</a:t>
+            </a:r>
+            <a:r>
+              <a:rPr lang="pt-BR" sz="2000" dirty="0">
+                <a:solidFill>
+                  <a:schemeClr val="accent5"/>
+                </a:solidFill>
+              </a:rPr>
+              <a:t>" </a:t>
+            </a:r>
+            <a:r>
+              <a:rPr lang="pt-BR" sz="2000" dirty="0" err="1">
+                <a:solidFill>
+                  <a:schemeClr val="accent5"/>
+                </a:solidFill>
+              </a:rPr>
+              <a:t>ubuntu</a:t>
+            </a:r>
+            <a:endParaRPr lang="pt-BR" sz="2000" dirty="0">
+              <a:solidFill>
+                <a:schemeClr val="accent5"/>
+              </a:solidFill>
+            </a:endParaRPr>
+          </a:p>
+          <a:p>
+            <a:pPr lvl="2"/>
+            <a:r>
+              <a:rPr lang="pt-BR" sz="1600" dirty="0"/>
+              <a:t>(</a:t>
+            </a:r>
+            <a:r>
               <a:rPr lang="pt-BR" sz="1600" dirty="0">
-                <a:solidFill>
-                  <a:schemeClr val="accent5"/>
-                </a:solidFill>
-              </a:rPr>
-              <a:t> </a:t>
-            </a:r>
-            <a:r>
-              <a:rPr lang="pt-BR" sz="1600" dirty="0" err="1">
-                <a:solidFill>
-                  <a:schemeClr val="accent5"/>
-                </a:solidFill>
-              </a:rPr>
-              <a:t>run</a:t>
-            </a:r>
-            <a:r>
-              <a:rPr lang="pt-BR" sz="1600" dirty="0">
-                <a:solidFill>
-                  <a:schemeClr val="accent5"/>
-                </a:solidFill>
-              </a:rPr>
-              <a:t> -d -p 8080:3000 -v "//c/</a:t>
-            </a:r>
-            <a:r>
-              <a:rPr lang="pt-BR" sz="1600" dirty="0" err="1">
-                <a:solidFill>
-                  <a:schemeClr val="accent5"/>
-                </a:solidFill>
-              </a:rPr>
-              <a:t>Users</a:t>
-            </a:r>
-            <a:r>
-              <a:rPr lang="pt-BR" sz="1600" dirty="0">
-                <a:solidFill>
-                  <a:schemeClr val="accent5"/>
-                </a:solidFill>
-              </a:rPr>
-              <a:t>/&lt;&lt;Seu caminho local&gt;&gt;/volume-exemplo:/var/</a:t>
-            </a:r>
-            <a:r>
-              <a:rPr lang="pt-BR" sz="1600" dirty="0" err="1">
-                <a:solidFill>
-                  <a:schemeClr val="accent5"/>
-                </a:solidFill>
-              </a:rPr>
-              <a:t>www</a:t>
-            </a:r>
-            <a:r>
-              <a:rPr lang="pt-BR" sz="1600" dirty="0">
-                <a:solidFill>
-                  <a:schemeClr val="accent5"/>
-                </a:solidFill>
-              </a:rPr>
-              <a:t>" -w "/var/</a:t>
-            </a:r>
-            <a:r>
-              <a:rPr lang="pt-BR" sz="1600" dirty="0" err="1">
-                <a:solidFill>
-                  <a:schemeClr val="accent5"/>
-                </a:solidFill>
-              </a:rPr>
-              <a:t>www</a:t>
-            </a:r>
-            <a:r>
-              <a:rPr lang="pt-BR" sz="1600" dirty="0">
-                <a:solidFill>
-                  <a:schemeClr val="accent5"/>
-                </a:solidFill>
-              </a:rPr>
-              <a:t>" node </a:t>
-            </a:r>
-            <a:r>
-              <a:rPr lang="pt-BR" sz="1600" dirty="0" err="1">
-                <a:solidFill>
-                  <a:schemeClr val="accent5"/>
-                </a:solidFill>
-              </a:rPr>
-              <a:t>npm</a:t>
-            </a:r>
-            <a:r>
-              <a:rPr lang="pt-BR" sz="1600" dirty="0">
-                <a:solidFill>
-                  <a:schemeClr val="accent5"/>
-                </a:solidFill>
-              </a:rPr>
-              <a:t> start</a:t>
-            </a:r>
+                <a:hlinkClick r:id="rId2"/>
+              </a:rPr>
+              <a:t>https://medium.com/@Charles_Stover/fixing-volumes-in-docker-toolbox-4ad5ace0e572</a:t>
+            </a:r>
+            <a:r>
+              <a:rPr lang="pt-BR" sz="1600" dirty="0"/>
+              <a:t> ) </a:t>
+            </a:r>
+            <a:endParaRPr lang="pt-BR" sz="1600" dirty="0" smtClean="0"/>
+          </a:p>
+          <a:p>
+            <a:pPr marL="914400" lvl="2" indent="0">
+              <a:buNone/>
+            </a:pPr>
+            <a:endParaRPr lang="pt-BR" sz="1600" dirty="0" smtClean="0"/>
+          </a:p>
+          <a:p>
+            <a:r>
+              <a:rPr lang="pt-BR" sz="2400" dirty="0" smtClean="0"/>
+              <a:t>Além disso é necessário mapear na sua Virtual Box a pasta que será compartilhada com o volume do Container</a:t>
+            </a:r>
+            <a:endParaRPr lang="pt-BR" sz="2400" dirty="0"/>
           </a:p>
           <a:p>
             <a:pPr lvl="2">
@@ -7577,154 +7489,6 @@
             </a:endParaRPr>
           </a:p>
           <a:p>
-            <a:pPr marL="3200400" lvl="7" indent="0">
-              <a:buNone/>
-            </a:pPr>
-            <a:r>
-              <a:rPr lang="pt-BR" sz="1400" b="1" dirty="0">
-                <a:solidFill>
-                  <a:schemeClr val="accent5"/>
-                </a:solidFill>
-              </a:rPr>
-              <a:t>Ou </a:t>
-            </a:r>
-          </a:p>
-          <a:p>
-            <a:pPr marL="3200400" lvl="7" indent="0">
-              <a:buNone/>
-            </a:pPr>
-            <a:endParaRPr lang="pt-BR" sz="1400" b="1" dirty="0">
-              <a:solidFill>
-                <a:schemeClr val="accent5"/>
-              </a:solidFill>
-            </a:endParaRPr>
-          </a:p>
-          <a:p>
-            <a:pPr lvl="2">
-              <a:buFont typeface="Wingdings" panose="05000000000000000000" pitchFamily="2" charset="2"/>
-              <a:buChar char="Ø"/>
-            </a:pPr>
-            <a:r>
-              <a:rPr lang="pt-BR" sz="1600" dirty="0" err="1">
-                <a:solidFill>
-                  <a:schemeClr val="accent5"/>
-                </a:solidFill>
-              </a:rPr>
-              <a:t>docker</a:t>
-            </a:r>
-            <a:r>
-              <a:rPr lang="pt-BR" sz="1600" dirty="0">
-                <a:solidFill>
-                  <a:schemeClr val="accent5"/>
-                </a:solidFill>
-              </a:rPr>
-              <a:t> </a:t>
-            </a:r>
-            <a:r>
-              <a:rPr lang="pt-BR" sz="1600" dirty="0" err="1">
-                <a:solidFill>
-                  <a:schemeClr val="accent5"/>
-                </a:solidFill>
-              </a:rPr>
-              <a:t>run</a:t>
-            </a:r>
-            <a:r>
-              <a:rPr lang="pt-BR" sz="1600" dirty="0">
-                <a:solidFill>
-                  <a:schemeClr val="accent5"/>
-                </a:solidFill>
-              </a:rPr>
-              <a:t> -d -p 8080:3000 -v “$(</a:t>
-            </a:r>
-            <a:r>
-              <a:rPr lang="pt-BR" sz="1600" dirty="0" err="1">
-                <a:solidFill>
-                  <a:schemeClr val="accent5"/>
-                </a:solidFill>
-              </a:rPr>
-              <a:t>pwd</a:t>
-            </a:r>
-            <a:r>
-              <a:rPr lang="pt-BR" sz="1600" dirty="0">
-                <a:solidFill>
-                  <a:schemeClr val="accent5"/>
-                </a:solidFill>
-              </a:rPr>
-              <a:t>):/var/</a:t>
-            </a:r>
-            <a:r>
-              <a:rPr lang="pt-BR" sz="1600" dirty="0" err="1">
-                <a:solidFill>
-                  <a:schemeClr val="accent5"/>
-                </a:solidFill>
-              </a:rPr>
-              <a:t>www</a:t>
-            </a:r>
-            <a:r>
-              <a:rPr lang="pt-BR" sz="1600" dirty="0">
-                <a:solidFill>
-                  <a:schemeClr val="accent5"/>
-                </a:solidFill>
-              </a:rPr>
-              <a:t>" -w "/var/</a:t>
-            </a:r>
-            <a:r>
-              <a:rPr lang="pt-BR" sz="1600" dirty="0" err="1">
-                <a:solidFill>
-                  <a:schemeClr val="accent5"/>
-                </a:solidFill>
-              </a:rPr>
-              <a:t>www</a:t>
-            </a:r>
-            <a:r>
-              <a:rPr lang="pt-BR" sz="1600" dirty="0">
-                <a:solidFill>
-                  <a:schemeClr val="accent5"/>
-                </a:solidFill>
-              </a:rPr>
-              <a:t>" node </a:t>
-            </a:r>
-            <a:r>
-              <a:rPr lang="pt-BR" sz="1600" dirty="0" err="1">
-                <a:solidFill>
-                  <a:schemeClr val="accent5"/>
-                </a:solidFill>
-              </a:rPr>
-              <a:t>npm</a:t>
-            </a:r>
-            <a:r>
-              <a:rPr lang="pt-BR" sz="1600" dirty="0">
-                <a:solidFill>
-                  <a:schemeClr val="accent5"/>
-                </a:solidFill>
-              </a:rPr>
-              <a:t> start</a:t>
-            </a:r>
-          </a:p>
-          <a:p>
-            <a:pPr marL="3200400" lvl="7" indent="0">
-              <a:buNone/>
-            </a:pPr>
-            <a:endParaRPr lang="pt-BR" sz="1400" b="1" dirty="0">
-              <a:solidFill>
-                <a:schemeClr val="accent5"/>
-              </a:solidFill>
-            </a:endParaRPr>
-          </a:p>
-          <a:p>
-            <a:pPr marL="0" indent="0" algn="ctr">
-              <a:buNone/>
-            </a:pPr>
-            <a:r>
-              <a:rPr lang="pt-BR" sz="2400" dirty="0">
-                <a:solidFill>
-                  <a:schemeClr val="accent6"/>
-                </a:solidFill>
-              </a:rPr>
-              <a:t>Você conseguirá executar o código em http://localhost:8080</a:t>
-            </a:r>
-          </a:p>
-          <a:p>
             <a:pPr>
               <a:buFont typeface="Wingdings" panose="05000000000000000000" pitchFamily="2" charset="2"/>
               <a:buChar char="Ø"/>
@@ -7737,412 +7501,34 @@
           </a:p>
         </p:txBody>
       </p:sp>
-      <p:sp>
-        <p:nvSpPr>
-          <p:cNvPr id="4" name="Espaço Reservado para Conteúdo 2"/>
-          <p:cNvSpPr txBox="1">
-            <a:spLocks/>
-          </p:cNvSpPr>
+      <p:pic>
+        <p:nvPicPr>
+          <p:cNvPr id="3" name="Imagem 2"/>
+          <p:cNvPicPr>
+            <a:picLocks noChangeAspect="1"/>
+          </p:cNvPicPr>
           <p:nvPr/>
-        </p:nvSpPr>
+        </p:nvPicPr>
+        <p:blipFill>
+          <a:blip r:embed="rId3"/>
+          <a:stretch>
+            <a:fillRect/>
+          </a:stretch>
+        </p:blipFill>
         <p:spPr>
           <a:xfrm>
-            <a:off x="288164" y="3448280"/>
-            <a:ext cx="11165982" cy="3261612"/>
+            <a:off x="3519604" y="2726589"/>
+            <a:ext cx="5512884" cy="3933463"/>
           </a:xfrm>
           <a:prstGeom prst="rect">
             <a:avLst/>
           </a:prstGeom>
         </p:spPr>
-        <p:txBody>
-          <a:bodyPr vert="horz" lIns="91440" tIns="45720" rIns="91440" bIns="45720" rtlCol="0">
-            <a:noAutofit/>
-          </a:bodyPr>
-          <a:lstStyle>
-            <a:lvl1pPr marL="228600" indent="-228600" algn="l" defTabSz="914400" rtl="0" eaLnBrk="1" latinLnBrk="0" hangingPunct="1">
-              <a:lnSpc>
-                <a:spcPct val="90000"/>
-              </a:lnSpc>
-              <a:spcBef>
-                <a:spcPts val="1000"/>
-              </a:spcBef>
-              <a:buFont typeface="Arial" panose="020B0604020202020204" pitchFamily="34" charset="0"/>
-              <a:buChar char="•"/>
-              <a:defRPr sz="2800" kern="1200">
-                <a:solidFill>
-                  <a:schemeClr val="tx1"/>
-                </a:solidFill>
-                <a:latin typeface="+mn-lt"/>
-                <a:ea typeface="+mn-ea"/>
-                <a:cs typeface="+mn-cs"/>
-              </a:defRPr>
-            </a:lvl1pPr>
-            <a:lvl2pPr marL="685800" indent="-228600" algn="l" defTabSz="914400" rtl="0" eaLnBrk="1" latinLnBrk="0" hangingPunct="1">
-              <a:lnSpc>
-                <a:spcPct val="90000"/>
-              </a:lnSpc>
-              <a:spcBef>
-                <a:spcPts val="500"/>
-              </a:spcBef>
-              <a:buFont typeface="Arial" panose="020B0604020202020204" pitchFamily="34" charset="0"/>
-              <a:buChar char="•"/>
-              <a:defRPr sz="2400" kern="1200">
-                <a:solidFill>
-                  <a:schemeClr val="tx1"/>
-                </a:solidFill>
-                <a:latin typeface="+mn-lt"/>
-                <a:ea typeface="+mn-ea"/>
-                <a:cs typeface="+mn-cs"/>
-              </a:defRPr>
-            </a:lvl2pPr>
-            <a:lvl3pPr marL="1143000" indent="-228600" algn="l" defTabSz="914400" rtl="0" eaLnBrk="1" latinLnBrk="0" hangingPunct="1">
-              <a:lnSpc>
-                <a:spcPct val="90000"/>
-              </a:lnSpc>
-              <a:spcBef>
-                <a:spcPts val="500"/>
-              </a:spcBef>
-              <a:buFont typeface="Arial" panose="020B0604020202020204" pitchFamily="34" charset="0"/>
-              <a:buChar char="•"/>
-              <a:defRPr sz="2000" kern="1200">
-                <a:solidFill>
-                  <a:schemeClr val="tx1"/>
-                </a:solidFill>
-                <a:latin typeface="+mn-lt"/>
-                <a:ea typeface="+mn-ea"/>
-                <a:cs typeface="+mn-cs"/>
-              </a:defRPr>
-            </a:lvl3pPr>
-            <a:lvl4pPr marL="1600200" indent="-228600" algn="l" defTabSz="914400" rtl="0" eaLnBrk="1" latinLnBrk="0" hangingPunct="1">
-              <a:lnSpc>
-                <a:spcPct val="90000"/>
-              </a:lnSpc>
-              <a:spcBef>
-                <a:spcPts val="500"/>
-              </a:spcBef>
-              <a:buFont typeface="Arial" panose="020B0604020202020204" pitchFamily="34" charset="0"/>
-              <a:buChar char="•"/>
-              <a:defRPr sz="1800" kern="1200">
-                <a:solidFill>
-                  <a:schemeClr val="tx1"/>
-                </a:solidFill>
-                <a:latin typeface="+mn-lt"/>
-                <a:ea typeface="+mn-ea"/>
-                <a:cs typeface="+mn-cs"/>
-              </a:defRPr>
-            </a:lvl4pPr>
-            <a:lvl5pPr marL="2057400" indent="-228600" algn="l" defTabSz="914400" rtl="0" eaLnBrk="1" latinLnBrk="0" hangingPunct="1">
-              <a:lnSpc>
-                <a:spcPct val="90000"/>
-              </a:lnSpc>
-              <a:spcBef>
-                <a:spcPts val="500"/>
-              </a:spcBef>
-              <a:buFont typeface="Arial" panose="020B0604020202020204" pitchFamily="34" charset="0"/>
-              <a:buChar char="•"/>
-              <a:defRPr sz="1800" kern="1200">
-                <a:solidFill>
-                  <a:schemeClr val="tx1"/>
-                </a:solidFill>
-                <a:latin typeface="+mn-lt"/>
-                <a:ea typeface="+mn-ea"/>
-                <a:cs typeface="+mn-cs"/>
-              </a:defRPr>
-            </a:lvl5pPr>
-            <a:lvl6pPr marL="2514600" indent="-228600" algn="l" defTabSz="914400" rtl="0" eaLnBrk="1" latinLnBrk="0" hangingPunct="1">
-              <a:lnSpc>
-                <a:spcPct val="90000"/>
-              </a:lnSpc>
-              <a:spcBef>
-                <a:spcPts val="500"/>
-              </a:spcBef>
-              <a:buFont typeface="Arial" panose="020B0604020202020204" pitchFamily="34" charset="0"/>
-              <a:buChar char="•"/>
-              <a:defRPr sz="1800" kern="1200">
-                <a:solidFill>
-                  <a:schemeClr val="tx1"/>
-                </a:solidFill>
-                <a:latin typeface="+mn-lt"/>
-                <a:ea typeface="+mn-ea"/>
-                <a:cs typeface="+mn-cs"/>
-              </a:defRPr>
-            </a:lvl6pPr>
-            <a:lvl7pPr marL="2971800" indent="-228600" algn="l" defTabSz="914400" rtl="0" eaLnBrk="1" latinLnBrk="0" hangingPunct="1">
-              <a:lnSpc>
-                <a:spcPct val="90000"/>
-              </a:lnSpc>
-              <a:spcBef>
-                <a:spcPts val="500"/>
-              </a:spcBef>
-              <a:buFont typeface="Arial" panose="020B0604020202020204" pitchFamily="34" charset="0"/>
-              <a:buChar char="•"/>
-              <a:defRPr sz="1800" kern="1200">
-                <a:solidFill>
-                  <a:schemeClr val="tx1"/>
-                </a:solidFill>
-                <a:latin typeface="+mn-lt"/>
-                <a:ea typeface="+mn-ea"/>
-                <a:cs typeface="+mn-cs"/>
-              </a:defRPr>
-            </a:lvl7pPr>
-            <a:lvl8pPr marL="3429000" indent="-228600" algn="l" defTabSz="914400" rtl="0" eaLnBrk="1" latinLnBrk="0" hangingPunct="1">
-              <a:lnSpc>
-                <a:spcPct val="90000"/>
-              </a:lnSpc>
-              <a:spcBef>
-                <a:spcPts val="500"/>
-              </a:spcBef>
-              <a:buFont typeface="Arial" panose="020B0604020202020204" pitchFamily="34" charset="0"/>
-              <a:buChar char="•"/>
-              <a:defRPr sz="1800" kern="1200">
-                <a:solidFill>
-                  <a:schemeClr val="tx1"/>
-                </a:solidFill>
-                <a:latin typeface="+mn-lt"/>
-                <a:ea typeface="+mn-ea"/>
-                <a:cs typeface="+mn-cs"/>
-              </a:defRPr>
-            </a:lvl8pPr>
-            <a:lvl9pPr marL="3886200" indent="-228600" algn="l" defTabSz="914400" rtl="0" eaLnBrk="1" latinLnBrk="0" hangingPunct="1">
-              <a:lnSpc>
-                <a:spcPct val="90000"/>
-              </a:lnSpc>
-              <a:spcBef>
-                <a:spcPts val="500"/>
-              </a:spcBef>
-              <a:buFont typeface="Arial" panose="020B0604020202020204" pitchFamily="34" charset="0"/>
-              <a:buChar char="•"/>
-              <a:defRPr sz="1800" kern="1200">
-                <a:solidFill>
-                  <a:schemeClr val="tx1"/>
-                </a:solidFill>
-                <a:latin typeface="+mn-lt"/>
-                <a:ea typeface="+mn-ea"/>
-                <a:cs typeface="+mn-cs"/>
-              </a:defRPr>
-            </a:lvl9pPr>
-          </a:lstStyle>
-          <a:p>
-            <a:pPr lvl="1" algn="just">
-              <a:lnSpc>
-                <a:spcPct val="150000"/>
-              </a:lnSpc>
-            </a:pPr>
-            <a:r>
-              <a:rPr lang="pt-BR" sz="1800" dirty="0"/>
-              <a:t>Nessa pasta volume-exemplo existe um pequeno projeto</a:t>
-            </a:r>
-            <a:r>
-              <a:rPr lang="pt-BR" sz="1800" b="1" dirty="0"/>
-              <a:t> Node.js</a:t>
-            </a:r>
-          </a:p>
-          <a:p>
-            <a:pPr lvl="1" algn="just">
-              <a:lnSpc>
-                <a:spcPct val="150000"/>
-              </a:lnSpc>
-            </a:pPr>
-            <a:r>
-              <a:rPr lang="pt-BR" sz="1800" b="1" dirty="0"/>
-              <a:t>“-d”</a:t>
-            </a:r>
-            <a:r>
-              <a:rPr lang="pt-BR" sz="1800" dirty="0"/>
-              <a:t> – executa em modo </a:t>
-            </a:r>
-            <a:r>
-              <a:rPr lang="pt-BR" sz="1800" dirty="0" err="1"/>
-              <a:t>dettached</a:t>
-            </a:r>
-            <a:r>
-              <a:rPr lang="pt-BR" sz="1800" dirty="0"/>
-              <a:t> e libera o terminal </a:t>
-            </a:r>
-          </a:p>
-          <a:p>
-            <a:pPr lvl="1" algn="just">
-              <a:lnSpc>
-                <a:spcPct val="150000"/>
-              </a:lnSpc>
-            </a:pPr>
-            <a:r>
-              <a:rPr lang="pt-BR" sz="1800" b="1" dirty="0"/>
-              <a:t>“-w”</a:t>
-            </a:r>
-            <a:r>
-              <a:rPr lang="pt-BR" sz="1800" dirty="0"/>
-              <a:t> – “</a:t>
-            </a:r>
-            <a:r>
-              <a:rPr lang="pt-BR" sz="1800" dirty="0" err="1"/>
-              <a:t>Working</a:t>
-            </a:r>
-            <a:r>
-              <a:rPr lang="pt-BR" sz="1800" dirty="0"/>
-              <a:t> </a:t>
-            </a:r>
-            <a:r>
-              <a:rPr lang="pt-BR" sz="1800" dirty="0" err="1"/>
-              <a:t>Directory</a:t>
-            </a:r>
-            <a:r>
-              <a:rPr lang="pt-BR" sz="1800" dirty="0"/>
-              <a:t>” informa em qual pasta o comando deve ser executado dentro do container</a:t>
-            </a:r>
-          </a:p>
-          <a:p>
-            <a:pPr lvl="1" algn="just">
-              <a:lnSpc>
-                <a:spcPct val="150000"/>
-              </a:lnSpc>
-            </a:pPr>
-            <a:endParaRPr lang="pt-BR" sz="1800" dirty="0"/>
-          </a:p>
-          <a:p>
-            <a:pPr marL="457200" lvl="1" indent="0" algn="just">
-              <a:lnSpc>
-                <a:spcPct val="100000"/>
-              </a:lnSpc>
-              <a:spcBef>
-                <a:spcPts val="0"/>
-              </a:spcBef>
-              <a:buNone/>
-            </a:pPr>
-            <a:r>
-              <a:rPr lang="pt-BR" sz="1800" dirty="0"/>
-              <a:t>	Lembrando que se você estiver rodando num Windows com uma máquina virtual e rodando o </a:t>
-            </a:r>
-            <a:r>
-              <a:rPr lang="pt-BR" sz="1800" dirty="0" err="1"/>
-              <a:t>Docker</a:t>
-            </a:r>
-            <a:r>
-              <a:rPr lang="pt-BR" sz="1800" dirty="0"/>
-              <a:t> Toolbox, o </a:t>
-            </a:r>
-            <a:r>
-              <a:rPr lang="pt-BR" sz="1800" dirty="0" err="1"/>
-              <a:t>ip</a:t>
-            </a:r>
-            <a:r>
-              <a:rPr lang="pt-BR" sz="1800" dirty="0"/>
-              <a:t> será descoberto pelo “</a:t>
-            </a:r>
-            <a:r>
-              <a:rPr lang="pt-BR" sz="1800" b="1" dirty="0" err="1">
-                <a:solidFill>
-                  <a:prstClr val="black"/>
-                </a:solidFill>
-              </a:rPr>
-              <a:t>docker-machine</a:t>
-            </a:r>
-            <a:r>
-              <a:rPr lang="pt-BR" sz="1800" b="1" dirty="0">
-                <a:solidFill>
-                  <a:prstClr val="black"/>
-                </a:solidFill>
-              </a:rPr>
-              <a:t> </a:t>
-            </a:r>
-            <a:r>
-              <a:rPr lang="pt-BR" sz="1800" b="1" dirty="0" err="1">
-                <a:solidFill>
-                  <a:prstClr val="black"/>
-                </a:solidFill>
-              </a:rPr>
-              <a:t>ip</a:t>
-            </a:r>
-            <a:r>
-              <a:rPr lang="pt-BR" sz="1800" b="1" dirty="0">
-                <a:solidFill>
-                  <a:prstClr val="black"/>
-                </a:solidFill>
-              </a:rPr>
-              <a:t>” e você executará o código com o endereço </a:t>
-            </a:r>
-            <a:r>
-              <a:rPr lang="pt-BR" sz="1800" b="1" dirty="0" err="1">
-                <a:solidFill>
-                  <a:prstClr val="black"/>
-                </a:solidFill>
-              </a:rPr>
-              <a:t>ip</a:t>
-            </a:r>
-            <a:r>
-              <a:rPr lang="pt-BR" sz="1800" b="1" dirty="0">
-                <a:solidFill>
-                  <a:prstClr val="black"/>
-                </a:solidFill>
-              </a:rPr>
-              <a:t> encontrado e a porta configurada, nesse caso a 8080.</a:t>
-            </a:r>
-          </a:p>
-          <a:p>
-            <a:pPr marL="457200" lvl="1" indent="0" algn="just">
-              <a:lnSpc>
-                <a:spcPct val="100000"/>
-              </a:lnSpc>
-              <a:spcBef>
-                <a:spcPts val="0"/>
-              </a:spcBef>
-              <a:buNone/>
-            </a:pPr>
-            <a:endParaRPr lang="pt-BR" sz="1800" b="1" dirty="0">
-              <a:solidFill>
-                <a:prstClr val="black"/>
-              </a:solidFill>
-            </a:endParaRPr>
-          </a:p>
-          <a:p>
-            <a:pPr marL="457200" lvl="1" indent="0" algn="just">
-              <a:lnSpc>
-                <a:spcPct val="100000"/>
-              </a:lnSpc>
-              <a:spcBef>
-                <a:spcPts val="0"/>
-              </a:spcBef>
-              <a:buNone/>
-            </a:pPr>
-            <a:r>
-              <a:rPr lang="pt-BR" sz="1800" b="1" dirty="0">
-                <a:solidFill>
-                  <a:prstClr val="black"/>
-                </a:solidFill>
-              </a:rPr>
-              <a:t>				</a:t>
-            </a:r>
-            <a:r>
-              <a:rPr lang="pt-BR" sz="1800" b="1" dirty="0">
-                <a:solidFill>
-                  <a:schemeClr val="accent5"/>
-                </a:solidFill>
-              </a:rPr>
-              <a:t>http://192.168.99.123:8080/</a:t>
-            </a:r>
-          </a:p>
-          <a:p>
-            <a:pPr marL="457200" lvl="1" indent="0" algn="just">
-              <a:lnSpc>
-                <a:spcPct val="100000"/>
-              </a:lnSpc>
-              <a:spcBef>
-                <a:spcPts val="0"/>
-              </a:spcBef>
-              <a:buNone/>
-            </a:pPr>
-            <a:endParaRPr lang="pt-BR" sz="1800" b="1" dirty="0">
-              <a:solidFill>
-                <a:prstClr val="black"/>
-              </a:solidFill>
-            </a:endParaRPr>
-          </a:p>
-        </p:txBody>
-      </p:sp>
+      </p:pic>
     </p:spTree>
     <p:extLst>
       <p:ext uri="{BB962C8B-B14F-4D97-AF65-F5344CB8AC3E}">
-        <p14:creationId xmlns:p14="http://schemas.microsoft.com/office/powerpoint/2010/main" val="1371646598"/>
+        <p14:creationId xmlns:p14="http://schemas.microsoft.com/office/powerpoint/2010/main" val="3214905604"/>
       </p:ext>
     </p:extLst>
   </p:cSld>
@@ -8328,6 +7714,777 @@
       </p:grpSpPr>
       <p:sp>
         <p:nvSpPr>
+          <p:cNvPr id="2" name="Título 1"/>
+          <p:cNvSpPr>
+            <a:spLocks noGrp="1"/>
+          </p:cNvSpPr>
+          <p:nvPr>
+            <p:ph type="title"/>
+          </p:nvPr>
+        </p:nvSpPr>
+        <p:spPr>
+          <a:xfrm>
+            <a:off x="115910" y="112271"/>
+            <a:ext cx="11951594" cy="422275"/>
+          </a:xfrm>
+        </p:spPr>
+        <p:txBody>
+          <a:bodyPr vert="horz" lIns="91440" tIns="45720" rIns="91440" bIns="45720" rtlCol="0" anchor="ctr">
+            <a:normAutofit fontScale="90000"/>
+          </a:bodyPr>
+          <a:lstStyle/>
+          <a:p>
+            <a:pPr algn="ctr"/>
+            <a:r>
+              <a:rPr lang="pt-BR" sz="2800" b="1" dirty="0"/>
+              <a:t>Rodando código em um Container</a:t>
+            </a:r>
+          </a:p>
+        </p:txBody>
+      </p:sp>
+      <p:sp>
+        <p:nvSpPr>
+          <p:cNvPr id="5" name="Espaço Reservado para Conteúdo 4"/>
+          <p:cNvSpPr>
+            <a:spLocks noGrp="1"/>
+          </p:cNvSpPr>
+          <p:nvPr>
+            <p:ph idx="1"/>
+          </p:nvPr>
+        </p:nvSpPr>
+        <p:spPr>
+          <a:xfrm>
+            <a:off x="194791" y="629823"/>
+            <a:ext cx="11259355" cy="2895575"/>
+          </a:xfrm>
+        </p:spPr>
+        <p:txBody>
+          <a:bodyPr>
+            <a:noAutofit/>
+          </a:bodyPr>
+          <a:lstStyle/>
+          <a:p>
+            <a:r>
+              <a:rPr lang="pt-BR" sz="2000" dirty="0"/>
+              <a:t>Um exemplo que roda em </a:t>
+            </a:r>
+            <a:r>
+              <a:rPr lang="pt-BR" sz="2000" b="1" dirty="0"/>
+              <a:t>Node.js </a:t>
+            </a:r>
+            <a:r>
+              <a:rPr lang="pt-BR" sz="2000" dirty="0"/>
+              <a:t>e não possuímos o Node na máquina.</a:t>
+            </a:r>
+          </a:p>
+          <a:p>
+            <a:pPr lvl="2">
+              <a:buFont typeface="Wingdings" panose="05000000000000000000" pitchFamily="2" charset="2"/>
+              <a:buChar char="Ø"/>
+            </a:pPr>
+            <a:r>
+              <a:rPr lang="pt-BR" sz="1600" dirty="0" err="1">
+                <a:solidFill>
+                  <a:schemeClr val="accent5"/>
+                </a:solidFill>
+              </a:rPr>
+              <a:t>docker</a:t>
+            </a:r>
+            <a:r>
+              <a:rPr lang="pt-BR" sz="1600" dirty="0">
+                <a:solidFill>
+                  <a:schemeClr val="accent5"/>
+                </a:solidFill>
+              </a:rPr>
+              <a:t> </a:t>
+            </a:r>
+            <a:r>
+              <a:rPr lang="pt-BR" sz="1600" dirty="0" err="1">
+                <a:solidFill>
+                  <a:schemeClr val="accent5"/>
+                </a:solidFill>
+              </a:rPr>
+              <a:t>run</a:t>
+            </a:r>
+            <a:r>
+              <a:rPr lang="pt-BR" sz="1600" dirty="0">
+                <a:solidFill>
+                  <a:schemeClr val="accent5"/>
+                </a:solidFill>
+              </a:rPr>
+              <a:t> -d -p 8080:3000 -v "//c/</a:t>
+            </a:r>
+            <a:r>
+              <a:rPr lang="pt-BR" sz="1600" dirty="0" err="1">
+                <a:solidFill>
+                  <a:schemeClr val="accent5"/>
+                </a:solidFill>
+              </a:rPr>
+              <a:t>Users</a:t>
+            </a:r>
+            <a:r>
+              <a:rPr lang="pt-BR" sz="1600" dirty="0">
+                <a:solidFill>
+                  <a:schemeClr val="accent5"/>
+                </a:solidFill>
+              </a:rPr>
+              <a:t>/&lt;&lt;Seu caminho local&gt;&gt;/volume-exemplo:/var/</a:t>
+            </a:r>
+            <a:r>
+              <a:rPr lang="pt-BR" sz="1600" dirty="0" err="1">
+                <a:solidFill>
+                  <a:schemeClr val="accent5"/>
+                </a:solidFill>
+              </a:rPr>
+              <a:t>www</a:t>
+            </a:r>
+            <a:r>
+              <a:rPr lang="pt-BR" sz="1600" dirty="0">
+                <a:solidFill>
+                  <a:schemeClr val="accent5"/>
+                </a:solidFill>
+              </a:rPr>
+              <a:t>" -w "/var/</a:t>
+            </a:r>
+            <a:r>
+              <a:rPr lang="pt-BR" sz="1600" dirty="0" err="1">
+                <a:solidFill>
+                  <a:schemeClr val="accent5"/>
+                </a:solidFill>
+              </a:rPr>
+              <a:t>www</a:t>
+            </a:r>
+            <a:r>
+              <a:rPr lang="pt-BR" sz="1600" dirty="0">
+                <a:solidFill>
+                  <a:schemeClr val="accent5"/>
+                </a:solidFill>
+              </a:rPr>
+              <a:t>" node </a:t>
+            </a:r>
+            <a:r>
+              <a:rPr lang="pt-BR" sz="1600" dirty="0" err="1">
+                <a:solidFill>
+                  <a:schemeClr val="accent5"/>
+                </a:solidFill>
+              </a:rPr>
+              <a:t>npm</a:t>
+            </a:r>
+            <a:r>
+              <a:rPr lang="pt-BR" sz="1600" dirty="0">
+                <a:solidFill>
+                  <a:schemeClr val="accent5"/>
+                </a:solidFill>
+              </a:rPr>
+              <a:t> start</a:t>
+            </a:r>
+          </a:p>
+          <a:p>
+            <a:pPr lvl="2">
+              <a:buFont typeface="Wingdings" panose="05000000000000000000" pitchFamily="2" charset="2"/>
+              <a:buChar char="Ø"/>
+            </a:pPr>
+            <a:endParaRPr lang="pt-BR" sz="1600" dirty="0">
+              <a:solidFill>
+                <a:schemeClr val="accent5"/>
+              </a:solidFill>
+            </a:endParaRPr>
+          </a:p>
+          <a:p>
+            <a:pPr marL="3200400" lvl="7" indent="0">
+              <a:buNone/>
+            </a:pPr>
+            <a:r>
+              <a:rPr lang="pt-BR" sz="1400" b="1" dirty="0">
+                <a:solidFill>
+                  <a:schemeClr val="accent5"/>
+                </a:solidFill>
+              </a:rPr>
+              <a:t>Ou </a:t>
+            </a:r>
+          </a:p>
+          <a:p>
+            <a:pPr marL="3200400" lvl="7" indent="0">
+              <a:buNone/>
+            </a:pPr>
+            <a:endParaRPr lang="pt-BR" sz="1400" b="1" dirty="0">
+              <a:solidFill>
+                <a:schemeClr val="accent5"/>
+              </a:solidFill>
+            </a:endParaRPr>
+          </a:p>
+          <a:p>
+            <a:pPr lvl="2">
+              <a:buFont typeface="Wingdings" panose="05000000000000000000" pitchFamily="2" charset="2"/>
+              <a:buChar char="Ø"/>
+            </a:pPr>
+            <a:r>
+              <a:rPr lang="pt-BR" sz="1600" dirty="0" err="1">
+                <a:solidFill>
+                  <a:schemeClr val="accent5"/>
+                </a:solidFill>
+              </a:rPr>
+              <a:t>docker</a:t>
+            </a:r>
+            <a:r>
+              <a:rPr lang="pt-BR" sz="1600" dirty="0">
+                <a:solidFill>
+                  <a:schemeClr val="accent5"/>
+                </a:solidFill>
+              </a:rPr>
+              <a:t> </a:t>
+            </a:r>
+            <a:r>
+              <a:rPr lang="pt-BR" sz="1600" dirty="0" err="1">
+                <a:solidFill>
+                  <a:schemeClr val="accent5"/>
+                </a:solidFill>
+              </a:rPr>
+              <a:t>run</a:t>
+            </a:r>
+            <a:r>
+              <a:rPr lang="pt-BR" sz="1600" dirty="0">
+                <a:solidFill>
+                  <a:schemeClr val="accent5"/>
+                </a:solidFill>
+              </a:rPr>
+              <a:t> -d -p 8080:3000 -v “$(</a:t>
+            </a:r>
+            <a:r>
+              <a:rPr lang="pt-BR" sz="1600" dirty="0" err="1">
+                <a:solidFill>
+                  <a:schemeClr val="accent5"/>
+                </a:solidFill>
+              </a:rPr>
+              <a:t>pwd</a:t>
+            </a:r>
+            <a:r>
+              <a:rPr lang="pt-BR" sz="1600" dirty="0">
+                <a:solidFill>
+                  <a:schemeClr val="accent5"/>
+                </a:solidFill>
+              </a:rPr>
+              <a:t>):/var/</a:t>
+            </a:r>
+            <a:r>
+              <a:rPr lang="pt-BR" sz="1600" dirty="0" err="1">
+                <a:solidFill>
+                  <a:schemeClr val="accent5"/>
+                </a:solidFill>
+              </a:rPr>
+              <a:t>www</a:t>
+            </a:r>
+            <a:r>
+              <a:rPr lang="pt-BR" sz="1600" dirty="0">
+                <a:solidFill>
+                  <a:schemeClr val="accent5"/>
+                </a:solidFill>
+              </a:rPr>
+              <a:t>" -w "/var/</a:t>
+            </a:r>
+            <a:r>
+              <a:rPr lang="pt-BR" sz="1600" dirty="0" err="1">
+                <a:solidFill>
+                  <a:schemeClr val="accent5"/>
+                </a:solidFill>
+              </a:rPr>
+              <a:t>www</a:t>
+            </a:r>
+            <a:r>
+              <a:rPr lang="pt-BR" sz="1600" dirty="0">
+                <a:solidFill>
+                  <a:schemeClr val="accent5"/>
+                </a:solidFill>
+              </a:rPr>
+              <a:t>" node </a:t>
+            </a:r>
+            <a:r>
+              <a:rPr lang="pt-BR" sz="1600" dirty="0" err="1">
+                <a:solidFill>
+                  <a:schemeClr val="accent5"/>
+                </a:solidFill>
+              </a:rPr>
+              <a:t>npm</a:t>
+            </a:r>
+            <a:r>
+              <a:rPr lang="pt-BR" sz="1600" dirty="0">
+                <a:solidFill>
+                  <a:schemeClr val="accent5"/>
+                </a:solidFill>
+              </a:rPr>
+              <a:t> start</a:t>
+            </a:r>
+          </a:p>
+          <a:p>
+            <a:pPr marL="3200400" lvl="7" indent="0">
+              <a:buNone/>
+            </a:pPr>
+            <a:endParaRPr lang="pt-BR" sz="1400" b="1" dirty="0">
+              <a:solidFill>
+                <a:schemeClr val="accent5"/>
+              </a:solidFill>
+            </a:endParaRPr>
+          </a:p>
+          <a:p>
+            <a:pPr marL="0" indent="0" algn="ctr">
+              <a:buNone/>
+            </a:pPr>
+            <a:r>
+              <a:rPr lang="pt-BR" sz="2400" dirty="0">
+                <a:solidFill>
+                  <a:schemeClr val="accent6"/>
+                </a:solidFill>
+              </a:rPr>
+              <a:t>Você conseguirá executar o código em http://localhost:8080</a:t>
+            </a:r>
+          </a:p>
+          <a:p>
+            <a:pPr>
+              <a:buFont typeface="Wingdings" panose="05000000000000000000" pitchFamily="2" charset="2"/>
+              <a:buChar char="Ø"/>
+            </a:pPr>
+            <a:endParaRPr lang="pt-BR" sz="2400" dirty="0">
+              <a:solidFill>
+                <a:schemeClr val="accent5"/>
+              </a:solidFill>
+            </a:endParaRPr>
+          </a:p>
+        </p:txBody>
+      </p:sp>
+      <p:sp>
+        <p:nvSpPr>
+          <p:cNvPr id="4" name="Espaço Reservado para Conteúdo 2"/>
+          <p:cNvSpPr txBox="1">
+            <a:spLocks/>
+          </p:cNvSpPr>
+          <p:nvPr/>
+        </p:nvSpPr>
+        <p:spPr>
+          <a:xfrm>
+            <a:off x="288164" y="3448280"/>
+            <a:ext cx="11165982" cy="3261612"/>
+          </a:xfrm>
+          <a:prstGeom prst="rect">
+            <a:avLst/>
+          </a:prstGeom>
+        </p:spPr>
+        <p:txBody>
+          <a:bodyPr vert="horz" lIns="91440" tIns="45720" rIns="91440" bIns="45720" rtlCol="0">
+            <a:noAutofit/>
+          </a:bodyPr>
+          <a:lstStyle>
+            <a:lvl1pPr marL="228600" indent="-228600" algn="l" defTabSz="914400" rtl="0" eaLnBrk="1" latinLnBrk="0" hangingPunct="1">
+              <a:lnSpc>
+                <a:spcPct val="90000"/>
+              </a:lnSpc>
+              <a:spcBef>
+                <a:spcPts val="1000"/>
+              </a:spcBef>
+              <a:buFont typeface="Arial" panose="020B0604020202020204" pitchFamily="34" charset="0"/>
+              <a:buChar char="•"/>
+              <a:defRPr sz="2800" kern="1200">
+                <a:solidFill>
+                  <a:schemeClr val="tx1"/>
+                </a:solidFill>
+                <a:latin typeface="+mn-lt"/>
+                <a:ea typeface="+mn-ea"/>
+                <a:cs typeface="+mn-cs"/>
+              </a:defRPr>
+            </a:lvl1pPr>
+            <a:lvl2pPr marL="685800" indent="-228600" algn="l" defTabSz="914400" rtl="0" eaLnBrk="1" latinLnBrk="0" hangingPunct="1">
+              <a:lnSpc>
+                <a:spcPct val="90000"/>
+              </a:lnSpc>
+              <a:spcBef>
+                <a:spcPts val="500"/>
+              </a:spcBef>
+              <a:buFont typeface="Arial" panose="020B0604020202020204" pitchFamily="34" charset="0"/>
+              <a:buChar char="•"/>
+              <a:defRPr sz="2400" kern="1200">
+                <a:solidFill>
+                  <a:schemeClr val="tx1"/>
+                </a:solidFill>
+                <a:latin typeface="+mn-lt"/>
+                <a:ea typeface="+mn-ea"/>
+                <a:cs typeface="+mn-cs"/>
+              </a:defRPr>
+            </a:lvl2pPr>
+            <a:lvl3pPr marL="1143000" indent="-228600" algn="l" defTabSz="914400" rtl="0" eaLnBrk="1" latinLnBrk="0" hangingPunct="1">
+              <a:lnSpc>
+                <a:spcPct val="90000"/>
+              </a:lnSpc>
+              <a:spcBef>
+                <a:spcPts val="500"/>
+              </a:spcBef>
+              <a:buFont typeface="Arial" panose="020B0604020202020204" pitchFamily="34" charset="0"/>
+              <a:buChar char="•"/>
+              <a:defRPr sz="2000" kern="1200">
+                <a:solidFill>
+                  <a:schemeClr val="tx1"/>
+                </a:solidFill>
+                <a:latin typeface="+mn-lt"/>
+                <a:ea typeface="+mn-ea"/>
+                <a:cs typeface="+mn-cs"/>
+              </a:defRPr>
+            </a:lvl3pPr>
+            <a:lvl4pPr marL="1600200" indent="-228600" algn="l" defTabSz="914400" rtl="0" eaLnBrk="1" latinLnBrk="0" hangingPunct="1">
+              <a:lnSpc>
+                <a:spcPct val="90000"/>
+              </a:lnSpc>
+              <a:spcBef>
+                <a:spcPts val="500"/>
+              </a:spcBef>
+              <a:buFont typeface="Arial" panose="020B0604020202020204" pitchFamily="34" charset="0"/>
+              <a:buChar char="•"/>
+              <a:defRPr sz="1800" kern="1200">
+                <a:solidFill>
+                  <a:schemeClr val="tx1"/>
+                </a:solidFill>
+                <a:latin typeface="+mn-lt"/>
+                <a:ea typeface="+mn-ea"/>
+                <a:cs typeface="+mn-cs"/>
+              </a:defRPr>
+            </a:lvl4pPr>
+            <a:lvl5pPr marL="2057400" indent="-228600" algn="l" defTabSz="914400" rtl="0" eaLnBrk="1" latinLnBrk="0" hangingPunct="1">
+              <a:lnSpc>
+                <a:spcPct val="90000"/>
+              </a:lnSpc>
+              <a:spcBef>
+                <a:spcPts val="500"/>
+              </a:spcBef>
+              <a:buFont typeface="Arial" panose="020B0604020202020204" pitchFamily="34" charset="0"/>
+              <a:buChar char="•"/>
+              <a:defRPr sz="1800" kern="1200">
+                <a:solidFill>
+                  <a:schemeClr val="tx1"/>
+                </a:solidFill>
+                <a:latin typeface="+mn-lt"/>
+                <a:ea typeface="+mn-ea"/>
+                <a:cs typeface="+mn-cs"/>
+              </a:defRPr>
+            </a:lvl5pPr>
+            <a:lvl6pPr marL="2514600" indent="-228600" algn="l" defTabSz="914400" rtl="0" eaLnBrk="1" latinLnBrk="0" hangingPunct="1">
+              <a:lnSpc>
+                <a:spcPct val="90000"/>
+              </a:lnSpc>
+              <a:spcBef>
+                <a:spcPts val="500"/>
+              </a:spcBef>
+              <a:buFont typeface="Arial" panose="020B0604020202020204" pitchFamily="34" charset="0"/>
+              <a:buChar char="•"/>
+              <a:defRPr sz="1800" kern="1200">
+                <a:solidFill>
+                  <a:schemeClr val="tx1"/>
+                </a:solidFill>
+                <a:latin typeface="+mn-lt"/>
+                <a:ea typeface="+mn-ea"/>
+                <a:cs typeface="+mn-cs"/>
+              </a:defRPr>
+            </a:lvl6pPr>
+            <a:lvl7pPr marL="2971800" indent="-228600" algn="l" defTabSz="914400" rtl="0" eaLnBrk="1" latinLnBrk="0" hangingPunct="1">
+              <a:lnSpc>
+                <a:spcPct val="90000"/>
+              </a:lnSpc>
+              <a:spcBef>
+                <a:spcPts val="500"/>
+              </a:spcBef>
+              <a:buFont typeface="Arial" panose="020B0604020202020204" pitchFamily="34" charset="0"/>
+              <a:buChar char="•"/>
+              <a:defRPr sz="1800" kern="1200">
+                <a:solidFill>
+                  <a:schemeClr val="tx1"/>
+                </a:solidFill>
+                <a:latin typeface="+mn-lt"/>
+                <a:ea typeface="+mn-ea"/>
+                <a:cs typeface="+mn-cs"/>
+              </a:defRPr>
+            </a:lvl7pPr>
+            <a:lvl8pPr marL="3429000" indent="-228600" algn="l" defTabSz="914400" rtl="0" eaLnBrk="1" latinLnBrk="0" hangingPunct="1">
+              <a:lnSpc>
+                <a:spcPct val="90000"/>
+              </a:lnSpc>
+              <a:spcBef>
+                <a:spcPts val="500"/>
+              </a:spcBef>
+              <a:buFont typeface="Arial" panose="020B0604020202020204" pitchFamily="34" charset="0"/>
+              <a:buChar char="•"/>
+              <a:defRPr sz="1800" kern="1200">
+                <a:solidFill>
+                  <a:schemeClr val="tx1"/>
+                </a:solidFill>
+                <a:latin typeface="+mn-lt"/>
+                <a:ea typeface="+mn-ea"/>
+                <a:cs typeface="+mn-cs"/>
+              </a:defRPr>
+            </a:lvl8pPr>
+            <a:lvl9pPr marL="3886200" indent="-228600" algn="l" defTabSz="914400" rtl="0" eaLnBrk="1" latinLnBrk="0" hangingPunct="1">
+              <a:lnSpc>
+                <a:spcPct val="90000"/>
+              </a:lnSpc>
+              <a:spcBef>
+                <a:spcPts val="500"/>
+              </a:spcBef>
+              <a:buFont typeface="Arial" panose="020B0604020202020204" pitchFamily="34" charset="0"/>
+              <a:buChar char="•"/>
+              <a:defRPr sz="1800" kern="1200">
+                <a:solidFill>
+                  <a:schemeClr val="tx1"/>
+                </a:solidFill>
+                <a:latin typeface="+mn-lt"/>
+                <a:ea typeface="+mn-ea"/>
+                <a:cs typeface="+mn-cs"/>
+              </a:defRPr>
+            </a:lvl9pPr>
+          </a:lstStyle>
+          <a:p>
+            <a:pPr lvl="1" algn="just">
+              <a:lnSpc>
+                <a:spcPct val="150000"/>
+              </a:lnSpc>
+            </a:pPr>
+            <a:r>
+              <a:rPr lang="pt-BR" sz="1800" dirty="0"/>
+              <a:t>Nessa pasta volume-exemplo existe um pequeno projeto</a:t>
+            </a:r>
+            <a:r>
+              <a:rPr lang="pt-BR" sz="1800" b="1" dirty="0"/>
+              <a:t> Node.js</a:t>
+            </a:r>
+          </a:p>
+          <a:p>
+            <a:pPr lvl="1" algn="just">
+              <a:lnSpc>
+                <a:spcPct val="150000"/>
+              </a:lnSpc>
+            </a:pPr>
+            <a:r>
+              <a:rPr lang="pt-BR" sz="1800" b="1" dirty="0"/>
+              <a:t>“-d”</a:t>
+            </a:r>
+            <a:r>
+              <a:rPr lang="pt-BR" sz="1800" dirty="0"/>
+              <a:t> – executa em modo </a:t>
+            </a:r>
+            <a:r>
+              <a:rPr lang="pt-BR" sz="1800" dirty="0" err="1"/>
+              <a:t>dettached</a:t>
+            </a:r>
+            <a:r>
+              <a:rPr lang="pt-BR" sz="1800" dirty="0"/>
+              <a:t> e libera o terminal </a:t>
+            </a:r>
+          </a:p>
+          <a:p>
+            <a:pPr lvl="1" algn="just">
+              <a:lnSpc>
+                <a:spcPct val="150000"/>
+              </a:lnSpc>
+            </a:pPr>
+            <a:r>
+              <a:rPr lang="pt-BR" sz="1800" b="1" dirty="0"/>
+              <a:t>“-w”</a:t>
+            </a:r>
+            <a:r>
+              <a:rPr lang="pt-BR" sz="1800" dirty="0"/>
+              <a:t> – “</a:t>
+            </a:r>
+            <a:r>
+              <a:rPr lang="pt-BR" sz="1800" dirty="0" err="1"/>
+              <a:t>Working</a:t>
+            </a:r>
+            <a:r>
+              <a:rPr lang="pt-BR" sz="1800" dirty="0"/>
+              <a:t> </a:t>
+            </a:r>
+            <a:r>
+              <a:rPr lang="pt-BR" sz="1800" dirty="0" err="1"/>
+              <a:t>Directory</a:t>
+            </a:r>
+            <a:r>
+              <a:rPr lang="pt-BR" sz="1800" dirty="0"/>
+              <a:t>” informa em qual pasta o comando deve ser executado dentro do container</a:t>
+            </a:r>
+          </a:p>
+          <a:p>
+            <a:pPr lvl="1" algn="just">
+              <a:lnSpc>
+                <a:spcPct val="150000"/>
+              </a:lnSpc>
+            </a:pPr>
+            <a:endParaRPr lang="pt-BR" sz="1800" dirty="0"/>
+          </a:p>
+          <a:p>
+            <a:pPr marL="457200" lvl="1" indent="0" algn="just">
+              <a:lnSpc>
+                <a:spcPct val="100000"/>
+              </a:lnSpc>
+              <a:spcBef>
+                <a:spcPts val="0"/>
+              </a:spcBef>
+              <a:buNone/>
+            </a:pPr>
+            <a:r>
+              <a:rPr lang="pt-BR" sz="1800" dirty="0"/>
+              <a:t>	Lembrando que se você estiver rodando num Windows com uma máquina virtual e rodando o </a:t>
+            </a:r>
+            <a:r>
+              <a:rPr lang="pt-BR" sz="1800" dirty="0" err="1"/>
+              <a:t>Docker</a:t>
+            </a:r>
+            <a:r>
+              <a:rPr lang="pt-BR" sz="1800" dirty="0"/>
+              <a:t> Toolbox, o </a:t>
+            </a:r>
+            <a:r>
+              <a:rPr lang="pt-BR" sz="1800" dirty="0" err="1"/>
+              <a:t>ip</a:t>
+            </a:r>
+            <a:r>
+              <a:rPr lang="pt-BR" sz="1800" dirty="0"/>
+              <a:t> será descoberto pelo “</a:t>
+            </a:r>
+            <a:r>
+              <a:rPr lang="pt-BR" sz="1800" b="1" dirty="0" err="1">
+                <a:solidFill>
+                  <a:prstClr val="black"/>
+                </a:solidFill>
+              </a:rPr>
+              <a:t>docker-machine</a:t>
+            </a:r>
+            <a:r>
+              <a:rPr lang="pt-BR" sz="1800" b="1" dirty="0">
+                <a:solidFill>
+                  <a:prstClr val="black"/>
+                </a:solidFill>
+              </a:rPr>
+              <a:t> </a:t>
+            </a:r>
+            <a:r>
+              <a:rPr lang="pt-BR" sz="1800" b="1" dirty="0" err="1">
+                <a:solidFill>
+                  <a:prstClr val="black"/>
+                </a:solidFill>
+              </a:rPr>
+              <a:t>ip</a:t>
+            </a:r>
+            <a:r>
+              <a:rPr lang="pt-BR" sz="1800" b="1" dirty="0">
+                <a:solidFill>
+                  <a:prstClr val="black"/>
+                </a:solidFill>
+              </a:rPr>
+              <a:t>” e você executará o código com o endereço </a:t>
+            </a:r>
+            <a:r>
+              <a:rPr lang="pt-BR" sz="1800" b="1" dirty="0" err="1">
+                <a:solidFill>
+                  <a:prstClr val="black"/>
+                </a:solidFill>
+              </a:rPr>
+              <a:t>ip</a:t>
+            </a:r>
+            <a:r>
+              <a:rPr lang="pt-BR" sz="1800" b="1" dirty="0">
+                <a:solidFill>
+                  <a:prstClr val="black"/>
+                </a:solidFill>
+              </a:rPr>
+              <a:t> encontrado e a porta configurada, nesse caso a 8080.</a:t>
+            </a:r>
+          </a:p>
+          <a:p>
+            <a:pPr marL="457200" lvl="1" indent="0" algn="just">
+              <a:lnSpc>
+                <a:spcPct val="100000"/>
+              </a:lnSpc>
+              <a:spcBef>
+                <a:spcPts val="0"/>
+              </a:spcBef>
+              <a:buNone/>
+            </a:pPr>
+            <a:endParaRPr lang="pt-BR" sz="1800" b="1" dirty="0">
+              <a:solidFill>
+                <a:prstClr val="black"/>
+              </a:solidFill>
+            </a:endParaRPr>
+          </a:p>
+          <a:p>
+            <a:pPr marL="457200" lvl="1" indent="0" algn="just">
+              <a:lnSpc>
+                <a:spcPct val="100000"/>
+              </a:lnSpc>
+              <a:spcBef>
+                <a:spcPts val="0"/>
+              </a:spcBef>
+              <a:buNone/>
+            </a:pPr>
+            <a:r>
+              <a:rPr lang="pt-BR" sz="1800" b="1" dirty="0">
+                <a:solidFill>
+                  <a:prstClr val="black"/>
+                </a:solidFill>
+              </a:rPr>
+              <a:t>				</a:t>
+            </a:r>
+            <a:r>
+              <a:rPr lang="pt-BR" sz="1800" b="1" dirty="0">
+                <a:solidFill>
+                  <a:schemeClr val="accent5"/>
+                </a:solidFill>
+              </a:rPr>
+              <a:t>http://192.168.99.123:8080/</a:t>
+            </a:r>
+          </a:p>
+          <a:p>
+            <a:pPr marL="457200" lvl="1" indent="0" algn="just">
+              <a:lnSpc>
+                <a:spcPct val="100000"/>
+              </a:lnSpc>
+              <a:spcBef>
+                <a:spcPts val="0"/>
+              </a:spcBef>
+              <a:buNone/>
+            </a:pPr>
+            <a:endParaRPr lang="pt-BR" sz="1800" b="1" dirty="0">
+              <a:solidFill>
+                <a:prstClr val="black"/>
+              </a:solidFill>
+            </a:endParaRPr>
+          </a:p>
+        </p:txBody>
+      </p:sp>
+    </p:spTree>
+    <p:extLst>
+      <p:ext uri="{BB962C8B-B14F-4D97-AF65-F5344CB8AC3E}">
+        <p14:creationId xmlns:p14="http://schemas.microsoft.com/office/powerpoint/2010/main" val="1371646598"/>
+      </p:ext>
+    </p:extLst>
+  </p:cSld>
+  <p:clrMapOvr>
+    <a:masterClrMapping/>
+  </p:clrMapOvr>
+</p:sld>
+</file>
+
+<file path=ppt/slides/slide21.xml><?xml version="1.0" encoding="utf-8"?>
+<p:sld xmlns:a="http://schemas.openxmlformats.org/drawingml/2006/main" xmlns:r="http://schemas.openxmlformats.org/officeDocument/2006/relationships" xmlns:p="http://schemas.openxmlformats.org/presentationml/2006/main">
+  <p:cSld>
+    <p:spTree>
+      <p:nvGrpSpPr>
+        <p:cNvPr id="1" name=""/>
+        <p:cNvGrpSpPr/>
+        <p:nvPr/>
+      </p:nvGrpSpPr>
+      <p:grpSpPr>
+        <a:xfrm>
+          <a:off x="0" y="0"/>
+          <a:ext cx="0" cy="0"/>
+          <a:chOff x="0" y="0"/>
+          <a:chExt cx="0" cy="0"/>
+        </a:xfrm>
+      </p:grpSpPr>
+      <p:sp>
+        <p:nvSpPr>
           <p:cNvPr id="5" name="Título 1"/>
           <p:cNvSpPr>
             <a:spLocks noGrp="1"/>
@@ -8798,7 +8955,7 @@
 </p:sld>
 </file>
 
-<file path=ppt/slides/slide21.xml><?xml version="1.0" encoding="utf-8"?>
+<file path=ppt/slides/slide22.xml><?xml version="1.0" encoding="utf-8"?>
 <p:sld xmlns:a="http://schemas.openxmlformats.org/drawingml/2006/main" xmlns:r="http://schemas.openxmlformats.org/officeDocument/2006/relationships" xmlns:p="http://schemas.openxmlformats.org/presentationml/2006/main">
   <p:cSld>
     <p:spTree>
@@ -9218,7 +9375,7 @@
 </p:sld>
 </file>
 
-<file path=ppt/slides/slide22.xml><?xml version="1.0" encoding="utf-8"?>
+<file path=ppt/slides/slide23.xml><?xml version="1.0" encoding="utf-8"?>
 <p:sld xmlns:a="http://schemas.openxmlformats.org/drawingml/2006/main" xmlns:r="http://schemas.openxmlformats.org/officeDocument/2006/relationships" xmlns:p="http://schemas.openxmlformats.org/presentationml/2006/main">
   <p:cSld>
     <p:spTree>
@@ -9603,7 +9760,7 @@
 </p:sld>
 </file>
 
-<file path=ppt/slides/slide23.xml><?xml version="1.0" encoding="utf-8"?>
+<file path=ppt/slides/slide24.xml><?xml version="1.0" encoding="utf-8"?>
 <p:sld xmlns:a="http://schemas.openxmlformats.org/drawingml/2006/main" xmlns:r="http://schemas.openxmlformats.org/officeDocument/2006/relationships" xmlns:p="http://schemas.openxmlformats.org/presentationml/2006/main">
   <p:cSld>
     <p:spTree>
@@ -10023,719 +10180,6 @@
     <p:extLst>
       <p:ext uri="{BB962C8B-B14F-4D97-AF65-F5344CB8AC3E}">
         <p14:creationId xmlns:p14="http://schemas.microsoft.com/office/powerpoint/2010/main" val="1003111895"/>
-      </p:ext>
-    </p:extLst>
-  </p:cSld>
-  <p:clrMapOvr>
-    <a:masterClrMapping/>
-  </p:clrMapOvr>
-</p:sld>
-</file>
-
-<file path=ppt/slides/slide24.xml><?xml version="1.0" encoding="utf-8"?>
-<p:sld xmlns:a="http://schemas.openxmlformats.org/drawingml/2006/main" xmlns:r="http://schemas.openxmlformats.org/officeDocument/2006/relationships" xmlns:p="http://schemas.openxmlformats.org/presentationml/2006/main">
-  <p:cSld>
-    <p:spTree>
-      <p:nvGrpSpPr>
-        <p:cNvPr id="1" name=""/>
-        <p:cNvGrpSpPr/>
-        <p:nvPr/>
-      </p:nvGrpSpPr>
-      <p:grpSpPr>
-        <a:xfrm>
-          <a:off x="0" y="0"/>
-          <a:ext cx="0" cy="0"/>
-          <a:chOff x="0" y="0"/>
-          <a:chExt cx="0" cy="0"/>
-        </a:xfrm>
-      </p:grpSpPr>
-      <p:sp>
-        <p:nvSpPr>
-          <p:cNvPr id="5" name="Título 1"/>
-          <p:cNvSpPr>
-            <a:spLocks noGrp="1"/>
-          </p:cNvSpPr>
-          <p:nvPr>
-            <p:ph type="title"/>
-          </p:nvPr>
-        </p:nvSpPr>
-        <p:spPr>
-          <a:xfrm>
-            <a:off x="115910" y="123288"/>
-            <a:ext cx="11951594" cy="422275"/>
-          </a:xfrm>
-        </p:spPr>
-        <p:txBody>
-          <a:bodyPr vert="horz" lIns="91440" tIns="45720" rIns="91440" bIns="45720" rtlCol="0" anchor="ctr">
-            <a:normAutofit fontScale="90000"/>
-          </a:bodyPr>
-          <a:lstStyle/>
-          <a:p>
-            <a:pPr algn="ctr"/>
-            <a:r>
-              <a:rPr lang="pt-BR" sz="2800" b="1" dirty="0"/>
-              <a:t>Redes com </a:t>
-            </a:r>
-            <a:r>
-              <a:rPr lang="pt-BR" sz="2800" b="1" dirty="0" err="1"/>
-              <a:t>Docker</a:t>
-            </a:r>
-            <a:endParaRPr lang="pt-BR" sz="2800" b="1" dirty="0"/>
-          </a:p>
-        </p:txBody>
-      </p:sp>
-      <p:sp>
-        <p:nvSpPr>
-          <p:cNvPr id="4" name="Espaço Reservado para Conteúdo 4"/>
-          <p:cNvSpPr>
-            <a:spLocks noGrp="1"/>
-          </p:cNvSpPr>
-          <p:nvPr>
-            <p:ph idx="1"/>
-          </p:nvPr>
-        </p:nvSpPr>
-        <p:spPr>
-          <a:xfrm>
-            <a:off x="325677" y="545563"/>
-            <a:ext cx="11252005" cy="5943371"/>
-          </a:xfrm>
-        </p:spPr>
-        <p:txBody>
-          <a:bodyPr>
-            <a:normAutofit/>
-          </a:bodyPr>
-          <a:lstStyle/>
-          <a:p>
-            <a:r>
-              <a:rPr lang="pt-BR" sz="1700" dirty="0"/>
-              <a:t>Quando você disponibilizar uma aplicação pelo </a:t>
-            </a:r>
-            <a:r>
-              <a:rPr lang="pt-BR" sz="1700" dirty="0" err="1"/>
-              <a:t>Docker</a:t>
-            </a:r>
-            <a:r>
-              <a:rPr lang="pt-BR" sz="1700" dirty="0"/>
-              <a:t> é interessante que você coloque os containers na mesma rede, através da </a:t>
-            </a:r>
-            <a:r>
-              <a:rPr lang="pt-BR" sz="1700" dirty="0" err="1"/>
-              <a:t>flag</a:t>
-            </a:r>
-            <a:r>
-              <a:rPr lang="pt-BR" sz="1700" dirty="0"/>
-              <a:t> </a:t>
-            </a:r>
-            <a:r>
-              <a:rPr lang="pt-BR" sz="1700" b="1" dirty="0"/>
-              <a:t>--network</a:t>
-            </a:r>
-            <a:r>
-              <a:rPr lang="pt-BR" sz="1700" dirty="0"/>
-              <a:t>. </a:t>
-            </a:r>
-          </a:p>
-          <a:p>
-            <a:endParaRPr lang="pt-BR" sz="1700" dirty="0"/>
-          </a:p>
-          <a:p>
-            <a:pPr marL="742950" lvl="1" indent="-285750">
-              <a:buFont typeface="Wingdings" panose="05000000000000000000" pitchFamily="2" charset="2"/>
-              <a:buChar char="Ø"/>
-            </a:pPr>
-            <a:r>
-              <a:rPr lang="pt-BR" sz="1700" dirty="0" err="1">
-                <a:solidFill>
-                  <a:schemeClr val="accent5"/>
-                </a:solidFill>
-              </a:rPr>
-              <a:t>docker</a:t>
-            </a:r>
-            <a:r>
-              <a:rPr lang="pt-BR" sz="1700" dirty="0">
-                <a:solidFill>
-                  <a:schemeClr val="accent5"/>
-                </a:solidFill>
-              </a:rPr>
-              <a:t> </a:t>
-            </a:r>
-            <a:r>
-              <a:rPr lang="pt-BR" sz="1700" dirty="0" err="1">
-                <a:solidFill>
-                  <a:schemeClr val="accent5"/>
-                </a:solidFill>
-              </a:rPr>
-              <a:t>run</a:t>
-            </a:r>
-            <a:r>
-              <a:rPr lang="pt-BR" sz="1700" dirty="0">
-                <a:solidFill>
-                  <a:schemeClr val="accent5"/>
-                </a:solidFill>
-              </a:rPr>
-              <a:t> -it --</a:t>
-            </a:r>
-            <a:r>
-              <a:rPr lang="pt-BR" sz="1700" dirty="0" err="1">
-                <a:solidFill>
-                  <a:schemeClr val="accent5"/>
-                </a:solidFill>
-              </a:rPr>
-              <a:t>name</a:t>
-            </a:r>
-            <a:r>
-              <a:rPr lang="pt-BR" sz="1700" dirty="0">
-                <a:solidFill>
-                  <a:schemeClr val="accent5"/>
-                </a:solidFill>
-              </a:rPr>
-              <a:t> meu-container-de-</a:t>
-            </a:r>
-            <a:r>
-              <a:rPr lang="pt-BR" sz="1700" dirty="0" err="1">
-                <a:solidFill>
-                  <a:schemeClr val="accent5"/>
-                </a:solidFill>
-              </a:rPr>
-              <a:t>ubuntu</a:t>
-            </a:r>
-            <a:r>
-              <a:rPr lang="pt-BR" sz="1700" dirty="0">
-                <a:solidFill>
-                  <a:schemeClr val="accent5"/>
-                </a:solidFill>
-              </a:rPr>
-              <a:t> --network minha-rede </a:t>
-            </a:r>
-            <a:r>
-              <a:rPr lang="pt-BR" sz="1700" dirty="0" err="1">
-                <a:solidFill>
-                  <a:schemeClr val="accent5"/>
-                </a:solidFill>
-              </a:rPr>
-              <a:t>ubuntu</a:t>
-            </a:r>
-            <a:endParaRPr lang="pt-BR" sz="1700" dirty="0">
-              <a:solidFill>
-                <a:schemeClr val="accent5"/>
-              </a:solidFill>
-            </a:endParaRPr>
-          </a:p>
-          <a:p>
-            <a:pPr marL="742950" lvl="1" indent="-285750">
-              <a:buFont typeface="Wingdings" panose="05000000000000000000" pitchFamily="2" charset="2"/>
-              <a:buChar char="Ø"/>
-            </a:pPr>
-            <a:endParaRPr lang="pt-BR" sz="1700" dirty="0">
-              <a:solidFill>
-                <a:schemeClr val="accent5"/>
-              </a:solidFill>
-            </a:endParaRPr>
-          </a:p>
-          <a:p>
-            <a:r>
-              <a:rPr lang="pt-BR" sz="1700" dirty="0"/>
-              <a:t>Agora, se executarmos o comando </a:t>
-            </a:r>
-            <a:r>
-              <a:rPr lang="pt-BR" sz="1700" b="1" dirty="0" err="1"/>
-              <a:t>docker</a:t>
-            </a:r>
-            <a:r>
-              <a:rPr lang="pt-BR" sz="1700" b="1" dirty="0"/>
-              <a:t> </a:t>
-            </a:r>
-            <a:r>
-              <a:rPr lang="pt-BR" sz="1700" b="1" dirty="0" err="1"/>
-              <a:t>inspect</a:t>
-            </a:r>
-            <a:r>
-              <a:rPr lang="pt-BR" sz="1700" b="1" dirty="0"/>
-              <a:t> meu-container-de-</a:t>
-            </a:r>
-            <a:r>
-              <a:rPr lang="pt-BR" sz="1700" b="1" dirty="0" err="1"/>
-              <a:t>ubuntu</a:t>
-            </a:r>
-            <a:r>
-              <a:rPr lang="pt-BR" sz="1700" dirty="0"/>
-              <a:t>, podemos ver em </a:t>
-            </a:r>
-            <a:r>
-              <a:rPr lang="pt-BR" sz="1700" b="1" dirty="0" err="1"/>
-              <a:t>NetworkSettings</a:t>
-            </a:r>
-            <a:r>
-              <a:rPr lang="pt-BR" sz="1700" dirty="0"/>
-              <a:t> o container está na rede </a:t>
-            </a:r>
-            <a:r>
-              <a:rPr lang="pt-BR" sz="1700" b="1" dirty="0"/>
-              <a:t>minha-rede</a:t>
-            </a:r>
-            <a:r>
-              <a:rPr lang="pt-BR" sz="1700" dirty="0"/>
-              <a:t>. E para testar a comunicação entre os containers na nossa rede, vamos abrir outro terminal e criar um segundo container:</a:t>
-            </a:r>
-          </a:p>
-          <a:p>
-            <a:endParaRPr lang="pt-BR" sz="1700" dirty="0"/>
-          </a:p>
-          <a:p>
-            <a:pPr marL="742950" lvl="1" indent="-285750">
-              <a:buFont typeface="Wingdings" panose="05000000000000000000" pitchFamily="2" charset="2"/>
-              <a:buChar char="Ø"/>
-            </a:pPr>
-            <a:r>
-              <a:rPr lang="pt-BR" sz="1700" dirty="0" err="1">
-                <a:solidFill>
-                  <a:schemeClr val="accent5"/>
-                </a:solidFill>
-              </a:rPr>
-              <a:t>docker</a:t>
-            </a:r>
-            <a:r>
-              <a:rPr lang="pt-BR" sz="1700" dirty="0">
-                <a:solidFill>
-                  <a:schemeClr val="accent5"/>
-                </a:solidFill>
-              </a:rPr>
-              <a:t> </a:t>
-            </a:r>
-            <a:r>
-              <a:rPr lang="pt-BR" sz="1700" dirty="0" err="1">
-                <a:solidFill>
-                  <a:schemeClr val="accent5"/>
-                </a:solidFill>
-              </a:rPr>
-              <a:t>run</a:t>
-            </a:r>
-            <a:r>
-              <a:rPr lang="pt-BR" sz="1700" dirty="0">
-                <a:solidFill>
-                  <a:schemeClr val="accent5"/>
-                </a:solidFill>
-              </a:rPr>
-              <a:t> -it --</a:t>
-            </a:r>
-            <a:r>
-              <a:rPr lang="pt-BR" sz="1700" dirty="0" err="1">
-                <a:solidFill>
-                  <a:schemeClr val="accent5"/>
-                </a:solidFill>
-              </a:rPr>
-              <a:t>name</a:t>
-            </a:r>
-            <a:r>
-              <a:rPr lang="pt-BR" sz="1700" dirty="0">
-                <a:solidFill>
-                  <a:schemeClr val="accent5"/>
-                </a:solidFill>
-              </a:rPr>
-              <a:t> segundo-</a:t>
-            </a:r>
-            <a:r>
-              <a:rPr lang="pt-BR" sz="1700" dirty="0" err="1">
-                <a:solidFill>
-                  <a:schemeClr val="accent5"/>
-                </a:solidFill>
-              </a:rPr>
-              <a:t>ubuntu</a:t>
-            </a:r>
-            <a:r>
-              <a:rPr lang="pt-BR" sz="1700" dirty="0">
-                <a:solidFill>
-                  <a:schemeClr val="accent5"/>
-                </a:solidFill>
-              </a:rPr>
-              <a:t> --network minha-rede </a:t>
-            </a:r>
-            <a:r>
-              <a:rPr lang="pt-BR" sz="1700" dirty="0" err="1">
-                <a:solidFill>
-                  <a:schemeClr val="accent5"/>
-                </a:solidFill>
-              </a:rPr>
-              <a:t>ubuntu</a:t>
-            </a:r>
-            <a:endParaRPr lang="pt-BR" sz="1700" dirty="0">
-              <a:solidFill>
-                <a:schemeClr val="accent5"/>
-              </a:solidFill>
-            </a:endParaRPr>
-          </a:p>
-          <a:p>
-            <a:r>
-              <a:rPr lang="pt-BR" sz="1700" dirty="0"/>
-              <a:t>Agora, no segundo-</a:t>
-            </a:r>
-            <a:r>
-              <a:rPr lang="pt-BR" sz="1700" dirty="0" err="1"/>
-              <a:t>ubuntu</a:t>
-            </a:r>
-            <a:r>
-              <a:rPr lang="pt-BR" sz="1700" dirty="0"/>
-              <a:t>, instalamos o </a:t>
-            </a:r>
-            <a:r>
-              <a:rPr lang="pt-BR" sz="1700" dirty="0" err="1"/>
-              <a:t>ping</a:t>
-            </a:r>
-            <a:r>
-              <a:rPr lang="pt-BR" sz="1700" dirty="0"/>
-              <a:t> e testamos a comunicação com o meu-container-de-</a:t>
-            </a:r>
-            <a:r>
-              <a:rPr lang="pt-BR" sz="1700" dirty="0" err="1"/>
-              <a:t>ubuntu</a:t>
-            </a:r>
-            <a:r>
-              <a:rPr lang="pt-BR" sz="1700" dirty="0"/>
-              <a:t>:</a:t>
-            </a:r>
-          </a:p>
-          <a:p>
-            <a:endParaRPr lang="pt-BR" sz="1600" dirty="0"/>
-          </a:p>
-          <a:p>
-            <a:pPr marL="742950" lvl="1" indent="-285750">
-              <a:buFont typeface="Wingdings" panose="05000000000000000000" pitchFamily="2" charset="2"/>
-              <a:buChar char="Ø"/>
-            </a:pPr>
-            <a:r>
-              <a:rPr lang="pt-BR" sz="1700" dirty="0">
-                <a:solidFill>
-                  <a:schemeClr val="accent5"/>
-                </a:solidFill>
-              </a:rPr>
-              <a:t>root@00f93075d079:/# </a:t>
-            </a:r>
-            <a:r>
-              <a:rPr lang="pt-BR" sz="1700" dirty="0" err="1">
-                <a:solidFill>
-                  <a:schemeClr val="accent5"/>
-                </a:solidFill>
-              </a:rPr>
-              <a:t>ping</a:t>
-            </a:r>
-            <a:r>
-              <a:rPr lang="pt-BR" sz="1700" dirty="0">
-                <a:solidFill>
-                  <a:schemeClr val="accent5"/>
-                </a:solidFill>
-              </a:rPr>
-              <a:t> meu-container-de-</a:t>
-            </a:r>
-            <a:r>
-              <a:rPr lang="pt-BR" sz="1700" dirty="0" err="1">
-                <a:solidFill>
-                  <a:schemeClr val="accent5"/>
-                </a:solidFill>
-              </a:rPr>
-              <a:t>ubuntu</a:t>
-            </a:r>
-            <a:endParaRPr lang="pt-BR" sz="1700" dirty="0">
-              <a:solidFill>
-                <a:schemeClr val="accent5"/>
-              </a:solidFill>
-            </a:endParaRPr>
-          </a:p>
-          <a:p>
-            <a:pPr marL="457200" lvl="1" indent="0">
-              <a:buNone/>
-            </a:pPr>
-            <a:r>
-              <a:rPr lang="pt-BR" sz="1400" dirty="0"/>
-              <a:t>PING meu-container-de-</a:t>
-            </a:r>
-            <a:r>
-              <a:rPr lang="pt-BR" sz="1400" dirty="0" err="1"/>
-              <a:t>ubuntu</a:t>
-            </a:r>
-            <a:r>
-              <a:rPr lang="pt-BR" sz="1400" dirty="0"/>
-              <a:t> (172.18.0.2) 56(84) bytes </a:t>
-            </a:r>
-            <a:r>
-              <a:rPr lang="pt-BR" sz="1400" dirty="0" err="1"/>
-              <a:t>of</a:t>
-            </a:r>
-            <a:r>
-              <a:rPr lang="pt-BR" sz="1400" dirty="0"/>
-              <a:t> data.</a:t>
-            </a:r>
-          </a:p>
-          <a:p>
-            <a:pPr marL="457200" lvl="1" indent="0">
-              <a:buNone/>
-            </a:pPr>
-            <a:r>
-              <a:rPr lang="pt-BR" sz="1400" dirty="0"/>
-              <a:t>64 bytes </a:t>
-            </a:r>
-            <a:r>
-              <a:rPr lang="pt-BR" sz="1400" dirty="0" err="1"/>
-              <a:t>from</a:t>
-            </a:r>
-            <a:r>
-              <a:rPr lang="pt-BR" sz="1400" dirty="0"/>
-              <a:t> meu-container-de-</a:t>
-            </a:r>
-            <a:r>
-              <a:rPr lang="pt-BR" sz="1400" dirty="0" err="1"/>
-              <a:t>ubuntu.minha</a:t>
-            </a:r>
-            <a:r>
-              <a:rPr lang="pt-BR" sz="1400" dirty="0"/>
-              <a:t>-rede (172.18.0.2): </a:t>
-            </a:r>
-            <a:r>
-              <a:rPr lang="pt-BR" sz="1400" dirty="0" err="1"/>
-              <a:t>icmp_seq</a:t>
-            </a:r>
-            <a:r>
-              <a:rPr lang="pt-BR" sz="1400" dirty="0"/>
-              <a:t>=1 </a:t>
-            </a:r>
-            <a:r>
-              <a:rPr lang="pt-BR" sz="1400" dirty="0" err="1"/>
-              <a:t>ttl</a:t>
-            </a:r>
-            <a:r>
-              <a:rPr lang="pt-BR" sz="1400" dirty="0"/>
-              <a:t>=64 time=0.210 </a:t>
-            </a:r>
-            <a:r>
-              <a:rPr lang="pt-BR" sz="1400" dirty="0" err="1"/>
-              <a:t>ms</a:t>
-            </a:r>
-            <a:endParaRPr lang="pt-BR" sz="1400" dirty="0"/>
-          </a:p>
-          <a:p>
-            <a:pPr marL="457200" lvl="1" indent="0">
-              <a:buNone/>
-            </a:pPr>
-            <a:r>
-              <a:rPr lang="pt-BR" sz="1400" dirty="0"/>
-              <a:t>64 bytes </a:t>
-            </a:r>
-            <a:r>
-              <a:rPr lang="pt-BR" sz="1400" dirty="0" err="1"/>
-              <a:t>from</a:t>
-            </a:r>
-            <a:r>
-              <a:rPr lang="pt-BR" sz="1400" dirty="0"/>
-              <a:t> meu-container-de-</a:t>
-            </a:r>
-            <a:r>
-              <a:rPr lang="pt-BR" sz="1400" dirty="0" err="1"/>
-              <a:t>ubuntu.minha</a:t>
-            </a:r>
-            <a:r>
-              <a:rPr lang="pt-BR" sz="1400" dirty="0"/>
-              <a:t>-rede (172.18.0.2): </a:t>
-            </a:r>
-            <a:r>
-              <a:rPr lang="pt-BR" sz="1400" dirty="0" err="1"/>
-              <a:t>icmp_seq</a:t>
-            </a:r>
-            <a:r>
-              <a:rPr lang="pt-BR" sz="1400" dirty="0"/>
-              <a:t>=2 </a:t>
-            </a:r>
-            <a:r>
-              <a:rPr lang="pt-BR" sz="1400" dirty="0" err="1"/>
-              <a:t>ttl</a:t>
-            </a:r>
-            <a:r>
-              <a:rPr lang="pt-BR" sz="1400" dirty="0"/>
-              <a:t>=64 time=0.148 </a:t>
-            </a:r>
-            <a:r>
-              <a:rPr lang="pt-BR" sz="1400" dirty="0" err="1"/>
-              <a:t>ms</a:t>
-            </a:r>
-            <a:endParaRPr lang="pt-BR" sz="1400" dirty="0"/>
-          </a:p>
-          <a:p>
-            <a:pPr marL="457200" lvl="1" indent="0">
-              <a:buNone/>
-            </a:pPr>
-            <a:r>
-              <a:rPr lang="pt-BR" sz="1400" dirty="0"/>
-              <a:t>64 bytes </a:t>
-            </a:r>
-            <a:r>
-              <a:rPr lang="pt-BR" sz="1400" dirty="0" err="1"/>
-              <a:t>from</a:t>
-            </a:r>
-            <a:r>
-              <a:rPr lang="pt-BR" sz="1400" dirty="0"/>
-              <a:t> meu-container-de-</a:t>
-            </a:r>
-            <a:r>
-              <a:rPr lang="pt-BR" sz="1400" dirty="0" err="1"/>
-              <a:t>ubuntu.minha</a:t>
-            </a:r>
-            <a:r>
-              <a:rPr lang="pt-BR" sz="1400" dirty="0"/>
-              <a:t>-rede (172.18.0.2): </a:t>
-            </a:r>
-            <a:r>
-              <a:rPr lang="pt-BR" sz="1400" dirty="0" err="1"/>
-              <a:t>icmp_seq</a:t>
-            </a:r>
-            <a:r>
-              <a:rPr lang="pt-BR" sz="1400" dirty="0"/>
-              <a:t>=3 </a:t>
-            </a:r>
-            <a:r>
-              <a:rPr lang="pt-BR" sz="1400" dirty="0" err="1"/>
-              <a:t>ttl</a:t>
-            </a:r>
-            <a:r>
-              <a:rPr lang="pt-BR" sz="1400" dirty="0"/>
-              <a:t>=64 time=0.138 </a:t>
-            </a:r>
-            <a:r>
-              <a:rPr lang="pt-BR" sz="1400" dirty="0" err="1"/>
-              <a:t>ms</a:t>
-            </a:r>
-            <a:endParaRPr lang="pt-BR" sz="1400" dirty="0"/>
-          </a:p>
-          <a:p>
-            <a:pPr marL="457200" lvl="1" indent="0">
-              <a:buNone/>
-            </a:pPr>
-            <a:r>
-              <a:rPr lang="pt-BR" sz="1400" dirty="0"/>
-              <a:t>--- meu-container-de-</a:t>
-            </a:r>
-            <a:r>
-              <a:rPr lang="pt-BR" sz="1400" dirty="0" err="1"/>
-              <a:t>ubuntu</a:t>
-            </a:r>
-            <a:r>
-              <a:rPr lang="pt-BR" sz="1400" dirty="0"/>
-              <a:t> </a:t>
-            </a:r>
-            <a:r>
-              <a:rPr lang="pt-BR" sz="1400" dirty="0" err="1"/>
-              <a:t>ping</a:t>
-            </a:r>
-            <a:r>
-              <a:rPr lang="pt-BR" sz="1400" dirty="0"/>
-              <a:t> </a:t>
-            </a:r>
-            <a:r>
-              <a:rPr lang="pt-BR" sz="1400" dirty="0" err="1"/>
-              <a:t>statistics</a:t>
-            </a:r>
-            <a:r>
-              <a:rPr lang="pt-BR" sz="1400" dirty="0"/>
-              <a:t> ---</a:t>
-            </a:r>
-          </a:p>
-          <a:p>
-            <a:pPr marL="457200" lvl="1" indent="0">
-              <a:buNone/>
-            </a:pPr>
-            <a:r>
-              <a:rPr lang="pt-BR" sz="1400" dirty="0"/>
-              <a:t>3 </a:t>
-            </a:r>
-            <a:r>
-              <a:rPr lang="pt-BR" sz="1400" dirty="0" err="1"/>
-              <a:t>packets</a:t>
-            </a:r>
-            <a:r>
-              <a:rPr lang="pt-BR" sz="1400" dirty="0"/>
-              <a:t> </a:t>
-            </a:r>
-            <a:r>
-              <a:rPr lang="pt-BR" sz="1400" dirty="0" err="1"/>
-              <a:t>transmitted</a:t>
-            </a:r>
-            <a:r>
-              <a:rPr lang="pt-BR" sz="1400" dirty="0"/>
-              <a:t>, 3 </a:t>
-            </a:r>
-            <a:r>
-              <a:rPr lang="pt-BR" sz="1400" dirty="0" err="1"/>
-              <a:t>received</a:t>
-            </a:r>
-            <a:r>
-              <a:rPr lang="pt-BR" sz="1400" dirty="0"/>
-              <a:t>, 0% </a:t>
-            </a:r>
-            <a:r>
-              <a:rPr lang="pt-BR" sz="1400" dirty="0" err="1"/>
-              <a:t>packet</a:t>
-            </a:r>
-            <a:r>
-              <a:rPr lang="pt-BR" sz="1400" dirty="0"/>
-              <a:t> </a:t>
-            </a:r>
-            <a:r>
-              <a:rPr lang="pt-BR" sz="1400" dirty="0" err="1"/>
-              <a:t>loss</a:t>
-            </a:r>
-            <a:r>
-              <a:rPr lang="pt-BR" sz="1400" dirty="0"/>
-              <a:t>, time 2000ms</a:t>
-            </a:r>
-          </a:p>
-          <a:p>
-            <a:pPr marL="457200" lvl="1" indent="0">
-              <a:buNone/>
-            </a:pPr>
-            <a:r>
-              <a:rPr lang="pt-BR" sz="1400" dirty="0" err="1"/>
-              <a:t>rtt</a:t>
-            </a:r>
-            <a:r>
-              <a:rPr lang="pt-BR" sz="1400" dirty="0"/>
-              <a:t> min/</a:t>
-            </a:r>
-            <a:r>
-              <a:rPr lang="pt-BR" sz="1400" dirty="0" err="1"/>
-              <a:t>avg</a:t>
-            </a:r>
-            <a:r>
-              <a:rPr lang="pt-BR" sz="1400" dirty="0"/>
-              <a:t>/</a:t>
-            </a:r>
-            <a:r>
-              <a:rPr lang="pt-BR" sz="1400" dirty="0" err="1"/>
-              <a:t>max</a:t>
-            </a:r>
-            <a:r>
-              <a:rPr lang="pt-BR" sz="1400" dirty="0"/>
-              <a:t>/</a:t>
-            </a:r>
-            <a:r>
-              <a:rPr lang="pt-BR" sz="1400" dirty="0" err="1"/>
-              <a:t>mdev</a:t>
-            </a:r>
-            <a:r>
-              <a:rPr lang="pt-BR" sz="1400" dirty="0"/>
-              <a:t> = 0.138/0.165/0.210/0.033 </a:t>
-            </a:r>
-            <a:r>
-              <a:rPr lang="pt-BR" sz="1400" dirty="0" err="1"/>
-              <a:t>ms</a:t>
-            </a:r>
-            <a:endParaRPr lang="pt-BR" sz="1400" dirty="0"/>
-          </a:p>
-          <a:p>
-            <a:endParaRPr lang="pt-BR" sz="1600" dirty="0"/>
-          </a:p>
-        </p:txBody>
-      </p:sp>
-    </p:spTree>
-    <p:extLst>
-      <p:ext uri="{BB962C8B-B14F-4D97-AF65-F5344CB8AC3E}">
-        <p14:creationId xmlns:p14="http://schemas.microsoft.com/office/powerpoint/2010/main" val="4236748709"/>
       </p:ext>
     </p:extLst>
   </p:cSld>
@@ -10787,6 +10231,719 @@
             <a:pPr algn="ctr"/>
             <a:r>
               <a:rPr lang="pt-BR" sz="2800" b="1" dirty="0"/>
+              <a:t>Redes com </a:t>
+            </a:r>
+            <a:r>
+              <a:rPr lang="pt-BR" sz="2800" b="1" dirty="0" err="1"/>
+              <a:t>Docker</a:t>
+            </a:r>
+            <a:endParaRPr lang="pt-BR" sz="2800" b="1" dirty="0"/>
+          </a:p>
+        </p:txBody>
+      </p:sp>
+      <p:sp>
+        <p:nvSpPr>
+          <p:cNvPr id="4" name="Espaço Reservado para Conteúdo 4"/>
+          <p:cNvSpPr>
+            <a:spLocks noGrp="1"/>
+          </p:cNvSpPr>
+          <p:nvPr>
+            <p:ph idx="1"/>
+          </p:nvPr>
+        </p:nvSpPr>
+        <p:spPr>
+          <a:xfrm>
+            <a:off x="325677" y="545563"/>
+            <a:ext cx="11252005" cy="5943371"/>
+          </a:xfrm>
+        </p:spPr>
+        <p:txBody>
+          <a:bodyPr>
+            <a:normAutofit/>
+          </a:bodyPr>
+          <a:lstStyle/>
+          <a:p>
+            <a:r>
+              <a:rPr lang="pt-BR" sz="1700" dirty="0"/>
+              <a:t>Quando você disponibilizar uma aplicação pelo </a:t>
+            </a:r>
+            <a:r>
+              <a:rPr lang="pt-BR" sz="1700" dirty="0" err="1"/>
+              <a:t>Docker</a:t>
+            </a:r>
+            <a:r>
+              <a:rPr lang="pt-BR" sz="1700" dirty="0"/>
+              <a:t> é interessante que você coloque os containers na mesma rede, através da </a:t>
+            </a:r>
+            <a:r>
+              <a:rPr lang="pt-BR" sz="1700" dirty="0" err="1"/>
+              <a:t>flag</a:t>
+            </a:r>
+            <a:r>
+              <a:rPr lang="pt-BR" sz="1700" dirty="0"/>
+              <a:t> </a:t>
+            </a:r>
+            <a:r>
+              <a:rPr lang="pt-BR" sz="1700" b="1" dirty="0"/>
+              <a:t>--network</a:t>
+            </a:r>
+            <a:r>
+              <a:rPr lang="pt-BR" sz="1700" dirty="0"/>
+              <a:t>. </a:t>
+            </a:r>
+          </a:p>
+          <a:p>
+            <a:endParaRPr lang="pt-BR" sz="1700" dirty="0"/>
+          </a:p>
+          <a:p>
+            <a:pPr marL="742950" lvl="1" indent="-285750">
+              <a:buFont typeface="Wingdings" panose="05000000000000000000" pitchFamily="2" charset="2"/>
+              <a:buChar char="Ø"/>
+            </a:pPr>
+            <a:r>
+              <a:rPr lang="pt-BR" sz="1700" dirty="0" err="1">
+                <a:solidFill>
+                  <a:schemeClr val="accent5"/>
+                </a:solidFill>
+              </a:rPr>
+              <a:t>docker</a:t>
+            </a:r>
+            <a:r>
+              <a:rPr lang="pt-BR" sz="1700" dirty="0">
+                <a:solidFill>
+                  <a:schemeClr val="accent5"/>
+                </a:solidFill>
+              </a:rPr>
+              <a:t> </a:t>
+            </a:r>
+            <a:r>
+              <a:rPr lang="pt-BR" sz="1700" dirty="0" err="1">
+                <a:solidFill>
+                  <a:schemeClr val="accent5"/>
+                </a:solidFill>
+              </a:rPr>
+              <a:t>run</a:t>
+            </a:r>
+            <a:r>
+              <a:rPr lang="pt-BR" sz="1700" dirty="0">
+                <a:solidFill>
+                  <a:schemeClr val="accent5"/>
+                </a:solidFill>
+              </a:rPr>
+              <a:t> -it --</a:t>
+            </a:r>
+            <a:r>
+              <a:rPr lang="pt-BR" sz="1700" dirty="0" err="1">
+                <a:solidFill>
+                  <a:schemeClr val="accent5"/>
+                </a:solidFill>
+              </a:rPr>
+              <a:t>name</a:t>
+            </a:r>
+            <a:r>
+              <a:rPr lang="pt-BR" sz="1700" dirty="0">
+                <a:solidFill>
+                  <a:schemeClr val="accent5"/>
+                </a:solidFill>
+              </a:rPr>
+              <a:t> meu-container-de-</a:t>
+            </a:r>
+            <a:r>
+              <a:rPr lang="pt-BR" sz="1700" dirty="0" err="1">
+                <a:solidFill>
+                  <a:schemeClr val="accent5"/>
+                </a:solidFill>
+              </a:rPr>
+              <a:t>ubuntu</a:t>
+            </a:r>
+            <a:r>
+              <a:rPr lang="pt-BR" sz="1700" dirty="0">
+                <a:solidFill>
+                  <a:schemeClr val="accent5"/>
+                </a:solidFill>
+              </a:rPr>
+              <a:t> --network minha-rede </a:t>
+            </a:r>
+            <a:r>
+              <a:rPr lang="pt-BR" sz="1700" dirty="0" err="1">
+                <a:solidFill>
+                  <a:schemeClr val="accent5"/>
+                </a:solidFill>
+              </a:rPr>
+              <a:t>ubuntu</a:t>
+            </a:r>
+            <a:endParaRPr lang="pt-BR" sz="1700" dirty="0">
+              <a:solidFill>
+                <a:schemeClr val="accent5"/>
+              </a:solidFill>
+            </a:endParaRPr>
+          </a:p>
+          <a:p>
+            <a:pPr marL="742950" lvl="1" indent="-285750">
+              <a:buFont typeface="Wingdings" panose="05000000000000000000" pitchFamily="2" charset="2"/>
+              <a:buChar char="Ø"/>
+            </a:pPr>
+            <a:endParaRPr lang="pt-BR" sz="1700" dirty="0">
+              <a:solidFill>
+                <a:schemeClr val="accent5"/>
+              </a:solidFill>
+            </a:endParaRPr>
+          </a:p>
+          <a:p>
+            <a:r>
+              <a:rPr lang="pt-BR" sz="1700" dirty="0"/>
+              <a:t>Agora, se executarmos o comando </a:t>
+            </a:r>
+            <a:r>
+              <a:rPr lang="pt-BR" sz="1700" b="1" dirty="0" err="1"/>
+              <a:t>docker</a:t>
+            </a:r>
+            <a:r>
+              <a:rPr lang="pt-BR" sz="1700" b="1" dirty="0"/>
+              <a:t> </a:t>
+            </a:r>
+            <a:r>
+              <a:rPr lang="pt-BR" sz="1700" b="1" dirty="0" err="1"/>
+              <a:t>inspect</a:t>
+            </a:r>
+            <a:r>
+              <a:rPr lang="pt-BR" sz="1700" b="1" dirty="0"/>
+              <a:t> meu-container-de-</a:t>
+            </a:r>
+            <a:r>
+              <a:rPr lang="pt-BR" sz="1700" b="1" dirty="0" err="1"/>
+              <a:t>ubuntu</a:t>
+            </a:r>
+            <a:r>
+              <a:rPr lang="pt-BR" sz="1700" dirty="0"/>
+              <a:t>, podemos ver em </a:t>
+            </a:r>
+            <a:r>
+              <a:rPr lang="pt-BR" sz="1700" b="1" dirty="0" err="1"/>
+              <a:t>NetworkSettings</a:t>
+            </a:r>
+            <a:r>
+              <a:rPr lang="pt-BR" sz="1700" dirty="0"/>
+              <a:t> o container está na rede </a:t>
+            </a:r>
+            <a:r>
+              <a:rPr lang="pt-BR" sz="1700" b="1" dirty="0"/>
+              <a:t>minha-rede</a:t>
+            </a:r>
+            <a:r>
+              <a:rPr lang="pt-BR" sz="1700" dirty="0"/>
+              <a:t>. E para testar a comunicação entre os containers na nossa rede, vamos abrir outro terminal e criar um segundo container:</a:t>
+            </a:r>
+          </a:p>
+          <a:p>
+            <a:endParaRPr lang="pt-BR" sz="1700" dirty="0"/>
+          </a:p>
+          <a:p>
+            <a:pPr marL="742950" lvl="1" indent="-285750">
+              <a:buFont typeface="Wingdings" panose="05000000000000000000" pitchFamily="2" charset="2"/>
+              <a:buChar char="Ø"/>
+            </a:pPr>
+            <a:r>
+              <a:rPr lang="pt-BR" sz="1700" dirty="0" err="1">
+                <a:solidFill>
+                  <a:schemeClr val="accent5"/>
+                </a:solidFill>
+              </a:rPr>
+              <a:t>docker</a:t>
+            </a:r>
+            <a:r>
+              <a:rPr lang="pt-BR" sz="1700" dirty="0">
+                <a:solidFill>
+                  <a:schemeClr val="accent5"/>
+                </a:solidFill>
+              </a:rPr>
+              <a:t> </a:t>
+            </a:r>
+            <a:r>
+              <a:rPr lang="pt-BR" sz="1700" dirty="0" err="1">
+                <a:solidFill>
+                  <a:schemeClr val="accent5"/>
+                </a:solidFill>
+              </a:rPr>
+              <a:t>run</a:t>
+            </a:r>
+            <a:r>
+              <a:rPr lang="pt-BR" sz="1700" dirty="0">
+                <a:solidFill>
+                  <a:schemeClr val="accent5"/>
+                </a:solidFill>
+              </a:rPr>
+              <a:t> -it --</a:t>
+            </a:r>
+            <a:r>
+              <a:rPr lang="pt-BR" sz="1700" dirty="0" err="1">
+                <a:solidFill>
+                  <a:schemeClr val="accent5"/>
+                </a:solidFill>
+              </a:rPr>
+              <a:t>name</a:t>
+            </a:r>
+            <a:r>
+              <a:rPr lang="pt-BR" sz="1700" dirty="0">
+                <a:solidFill>
+                  <a:schemeClr val="accent5"/>
+                </a:solidFill>
+              </a:rPr>
+              <a:t> segundo-</a:t>
+            </a:r>
+            <a:r>
+              <a:rPr lang="pt-BR" sz="1700" dirty="0" err="1">
+                <a:solidFill>
+                  <a:schemeClr val="accent5"/>
+                </a:solidFill>
+              </a:rPr>
+              <a:t>ubuntu</a:t>
+            </a:r>
+            <a:r>
+              <a:rPr lang="pt-BR" sz="1700" dirty="0">
+                <a:solidFill>
+                  <a:schemeClr val="accent5"/>
+                </a:solidFill>
+              </a:rPr>
+              <a:t> --network minha-rede </a:t>
+            </a:r>
+            <a:r>
+              <a:rPr lang="pt-BR" sz="1700" dirty="0" err="1">
+                <a:solidFill>
+                  <a:schemeClr val="accent5"/>
+                </a:solidFill>
+              </a:rPr>
+              <a:t>ubuntu</a:t>
+            </a:r>
+            <a:endParaRPr lang="pt-BR" sz="1700" dirty="0">
+              <a:solidFill>
+                <a:schemeClr val="accent5"/>
+              </a:solidFill>
+            </a:endParaRPr>
+          </a:p>
+          <a:p>
+            <a:r>
+              <a:rPr lang="pt-BR" sz="1700" dirty="0"/>
+              <a:t>Agora, no segundo-</a:t>
+            </a:r>
+            <a:r>
+              <a:rPr lang="pt-BR" sz="1700" dirty="0" err="1"/>
+              <a:t>ubuntu</a:t>
+            </a:r>
+            <a:r>
+              <a:rPr lang="pt-BR" sz="1700" dirty="0"/>
+              <a:t>, instalamos o </a:t>
+            </a:r>
+            <a:r>
+              <a:rPr lang="pt-BR" sz="1700" dirty="0" err="1"/>
+              <a:t>ping</a:t>
+            </a:r>
+            <a:r>
+              <a:rPr lang="pt-BR" sz="1700" dirty="0"/>
+              <a:t> e testamos a comunicação com o meu-container-de-</a:t>
+            </a:r>
+            <a:r>
+              <a:rPr lang="pt-BR" sz="1700" dirty="0" err="1"/>
+              <a:t>ubuntu</a:t>
+            </a:r>
+            <a:r>
+              <a:rPr lang="pt-BR" sz="1700" dirty="0"/>
+              <a:t>:</a:t>
+            </a:r>
+          </a:p>
+          <a:p>
+            <a:endParaRPr lang="pt-BR" sz="1600" dirty="0"/>
+          </a:p>
+          <a:p>
+            <a:pPr marL="742950" lvl="1" indent="-285750">
+              <a:buFont typeface="Wingdings" panose="05000000000000000000" pitchFamily="2" charset="2"/>
+              <a:buChar char="Ø"/>
+            </a:pPr>
+            <a:r>
+              <a:rPr lang="pt-BR" sz="1700" dirty="0">
+                <a:solidFill>
+                  <a:schemeClr val="accent5"/>
+                </a:solidFill>
+              </a:rPr>
+              <a:t>root@00f93075d079:/# </a:t>
+            </a:r>
+            <a:r>
+              <a:rPr lang="pt-BR" sz="1700" dirty="0" err="1">
+                <a:solidFill>
+                  <a:schemeClr val="accent5"/>
+                </a:solidFill>
+              </a:rPr>
+              <a:t>ping</a:t>
+            </a:r>
+            <a:r>
+              <a:rPr lang="pt-BR" sz="1700" dirty="0">
+                <a:solidFill>
+                  <a:schemeClr val="accent5"/>
+                </a:solidFill>
+              </a:rPr>
+              <a:t> meu-container-de-</a:t>
+            </a:r>
+            <a:r>
+              <a:rPr lang="pt-BR" sz="1700" dirty="0" err="1">
+                <a:solidFill>
+                  <a:schemeClr val="accent5"/>
+                </a:solidFill>
+              </a:rPr>
+              <a:t>ubuntu</a:t>
+            </a:r>
+            <a:endParaRPr lang="pt-BR" sz="1700" dirty="0">
+              <a:solidFill>
+                <a:schemeClr val="accent5"/>
+              </a:solidFill>
+            </a:endParaRPr>
+          </a:p>
+          <a:p>
+            <a:pPr marL="457200" lvl="1" indent="0">
+              <a:buNone/>
+            </a:pPr>
+            <a:r>
+              <a:rPr lang="pt-BR" sz="1400" dirty="0"/>
+              <a:t>PING meu-container-de-</a:t>
+            </a:r>
+            <a:r>
+              <a:rPr lang="pt-BR" sz="1400" dirty="0" err="1"/>
+              <a:t>ubuntu</a:t>
+            </a:r>
+            <a:r>
+              <a:rPr lang="pt-BR" sz="1400" dirty="0"/>
+              <a:t> (172.18.0.2) 56(84) bytes </a:t>
+            </a:r>
+            <a:r>
+              <a:rPr lang="pt-BR" sz="1400" dirty="0" err="1"/>
+              <a:t>of</a:t>
+            </a:r>
+            <a:r>
+              <a:rPr lang="pt-BR" sz="1400" dirty="0"/>
+              <a:t> data.</a:t>
+            </a:r>
+          </a:p>
+          <a:p>
+            <a:pPr marL="457200" lvl="1" indent="0">
+              <a:buNone/>
+            </a:pPr>
+            <a:r>
+              <a:rPr lang="pt-BR" sz="1400" dirty="0"/>
+              <a:t>64 bytes </a:t>
+            </a:r>
+            <a:r>
+              <a:rPr lang="pt-BR" sz="1400" dirty="0" err="1"/>
+              <a:t>from</a:t>
+            </a:r>
+            <a:r>
+              <a:rPr lang="pt-BR" sz="1400" dirty="0"/>
+              <a:t> meu-container-de-</a:t>
+            </a:r>
+            <a:r>
+              <a:rPr lang="pt-BR" sz="1400" dirty="0" err="1"/>
+              <a:t>ubuntu.minha</a:t>
+            </a:r>
+            <a:r>
+              <a:rPr lang="pt-BR" sz="1400" dirty="0"/>
+              <a:t>-rede (172.18.0.2): </a:t>
+            </a:r>
+            <a:r>
+              <a:rPr lang="pt-BR" sz="1400" dirty="0" err="1"/>
+              <a:t>icmp_seq</a:t>
+            </a:r>
+            <a:r>
+              <a:rPr lang="pt-BR" sz="1400" dirty="0"/>
+              <a:t>=1 </a:t>
+            </a:r>
+            <a:r>
+              <a:rPr lang="pt-BR" sz="1400" dirty="0" err="1"/>
+              <a:t>ttl</a:t>
+            </a:r>
+            <a:r>
+              <a:rPr lang="pt-BR" sz="1400" dirty="0"/>
+              <a:t>=64 time=0.210 </a:t>
+            </a:r>
+            <a:r>
+              <a:rPr lang="pt-BR" sz="1400" dirty="0" err="1"/>
+              <a:t>ms</a:t>
+            </a:r>
+            <a:endParaRPr lang="pt-BR" sz="1400" dirty="0"/>
+          </a:p>
+          <a:p>
+            <a:pPr marL="457200" lvl="1" indent="0">
+              <a:buNone/>
+            </a:pPr>
+            <a:r>
+              <a:rPr lang="pt-BR" sz="1400" dirty="0"/>
+              <a:t>64 bytes </a:t>
+            </a:r>
+            <a:r>
+              <a:rPr lang="pt-BR" sz="1400" dirty="0" err="1"/>
+              <a:t>from</a:t>
+            </a:r>
+            <a:r>
+              <a:rPr lang="pt-BR" sz="1400" dirty="0"/>
+              <a:t> meu-container-de-</a:t>
+            </a:r>
+            <a:r>
+              <a:rPr lang="pt-BR" sz="1400" dirty="0" err="1"/>
+              <a:t>ubuntu.minha</a:t>
+            </a:r>
+            <a:r>
+              <a:rPr lang="pt-BR" sz="1400" dirty="0"/>
+              <a:t>-rede (172.18.0.2): </a:t>
+            </a:r>
+            <a:r>
+              <a:rPr lang="pt-BR" sz="1400" dirty="0" err="1"/>
+              <a:t>icmp_seq</a:t>
+            </a:r>
+            <a:r>
+              <a:rPr lang="pt-BR" sz="1400" dirty="0"/>
+              <a:t>=2 </a:t>
+            </a:r>
+            <a:r>
+              <a:rPr lang="pt-BR" sz="1400" dirty="0" err="1"/>
+              <a:t>ttl</a:t>
+            </a:r>
+            <a:r>
+              <a:rPr lang="pt-BR" sz="1400" dirty="0"/>
+              <a:t>=64 time=0.148 </a:t>
+            </a:r>
+            <a:r>
+              <a:rPr lang="pt-BR" sz="1400" dirty="0" err="1"/>
+              <a:t>ms</a:t>
+            </a:r>
+            <a:endParaRPr lang="pt-BR" sz="1400" dirty="0"/>
+          </a:p>
+          <a:p>
+            <a:pPr marL="457200" lvl="1" indent="0">
+              <a:buNone/>
+            </a:pPr>
+            <a:r>
+              <a:rPr lang="pt-BR" sz="1400" dirty="0"/>
+              <a:t>64 bytes </a:t>
+            </a:r>
+            <a:r>
+              <a:rPr lang="pt-BR" sz="1400" dirty="0" err="1"/>
+              <a:t>from</a:t>
+            </a:r>
+            <a:r>
+              <a:rPr lang="pt-BR" sz="1400" dirty="0"/>
+              <a:t> meu-container-de-</a:t>
+            </a:r>
+            <a:r>
+              <a:rPr lang="pt-BR" sz="1400" dirty="0" err="1"/>
+              <a:t>ubuntu.minha</a:t>
+            </a:r>
+            <a:r>
+              <a:rPr lang="pt-BR" sz="1400" dirty="0"/>
+              <a:t>-rede (172.18.0.2): </a:t>
+            </a:r>
+            <a:r>
+              <a:rPr lang="pt-BR" sz="1400" dirty="0" err="1"/>
+              <a:t>icmp_seq</a:t>
+            </a:r>
+            <a:r>
+              <a:rPr lang="pt-BR" sz="1400" dirty="0"/>
+              <a:t>=3 </a:t>
+            </a:r>
+            <a:r>
+              <a:rPr lang="pt-BR" sz="1400" dirty="0" err="1"/>
+              <a:t>ttl</a:t>
+            </a:r>
+            <a:r>
+              <a:rPr lang="pt-BR" sz="1400" dirty="0"/>
+              <a:t>=64 time=0.138 </a:t>
+            </a:r>
+            <a:r>
+              <a:rPr lang="pt-BR" sz="1400" dirty="0" err="1"/>
+              <a:t>ms</a:t>
+            </a:r>
+            <a:endParaRPr lang="pt-BR" sz="1400" dirty="0"/>
+          </a:p>
+          <a:p>
+            <a:pPr marL="457200" lvl="1" indent="0">
+              <a:buNone/>
+            </a:pPr>
+            <a:r>
+              <a:rPr lang="pt-BR" sz="1400" dirty="0"/>
+              <a:t>--- meu-container-de-</a:t>
+            </a:r>
+            <a:r>
+              <a:rPr lang="pt-BR" sz="1400" dirty="0" err="1"/>
+              <a:t>ubuntu</a:t>
+            </a:r>
+            <a:r>
+              <a:rPr lang="pt-BR" sz="1400" dirty="0"/>
+              <a:t> </a:t>
+            </a:r>
+            <a:r>
+              <a:rPr lang="pt-BR" sz="1400" dirty="0" err="1"/>
+              <a:t>ping</a:t>
+            </a:r>
+            <a:r>
+              <a:rPr lang="pt-BR" sz="1400" dirty="0"/>
+              <a:t> </a:t>
+            </a:r>
+            <a:r>
+              <a:rPr lang="pt-BR" sz="1400" dirty="0" err="1"/>
+              <a:t>statistics</a:t>
+            </a:r>
+            <a:r>
+              <a:rPr lang="pt-BR" sz="1400" dirty="0"/>
+              <a:t> ---</a:t>
+            </a:r>
+          </a:p>
+          <a:p>
+            <a:pPr marL="457200" lvl="1" indent="0">
+              <a:buNone/>
+            </a:pPr>
+            <a:r>
+              <a:rPr lang="pt-BR" sz="1400" dirty="0"/>
+              <a:t>3 </a:t>
+            </a:r>
+            <a:r>
+              <a:rPr lang="pt-BR" sz="1400" dirty="0" err="1"/>
+              <a:t>packets</a:t>
+            </a:r>
+            <a:r>
+              <a:rPr lang="pt-BR" sz="1400" dirty="0"/>
+              <a:t> </a:t>
+            </a:r>
+            <a:r>
+              <a:rPr lang="pt-BR" sz="1400" dirty="0" err="1"/>
+              <a:t>transmitted</a:t>
+            </a:r>
+            <a:r>
+              <a:rPr lang="pt-BR" sz="1400" dirty="0"/>
+              <a:t>, 3 </a:t>
+            </a:r>
+            <a:r>
+              <a:rPr lang="pt-BR" sz="1400" dirty="0" err="1"/>
+              <a:t>received</a:t>
+            </a:r>
+            <a:r>
+              <a:rPr lang="pt-BR" sz="1400" dirty="0"/>
+              <a:t>, 0% </a:t>
+            </a:r>
+            <a:r>
+              <a:rPr lang="pt-BR" sz="1400" dirty="0" err="1"/>
+              <a:t>packet</a:t>
+            </a:r>
+            <a:r>
+              <a:rPr lang="pt-BR" sz="1400" dirty="0"/>
+              <a:t> </a:t>
+            </a:r>
+            <a:r>
+              <a:rPr lang="pt-BR" sz="1400" dirty="0" err="1"/>
+              <a:t>loss</a:t>
+            </a:r>
+            <a:r>
+              <a:rPr lang="pt-BR" sz="1400" dirty="0"/>
+              <a:t>, time 2000ms</a:t>
+            </a:r>
+          </a:p>
+          <a:p>
+            <a:pPr marL="457200" lvl="1" indent="0">
+              <a:buNone/>
+            </a:pPr>
+            <a:r>
+              <a:rPr lang="pt-BR" sz="1400" dirty="0" err="1"/>
+              <a:t>rtt</a:t>
+            </a:r>
+            <a:r>
+              <a:rPr lang="pt-BR" sz="1400" dirty="0"/>
+              <a:t> min/</a:t>
+            </a:r>
+            <a:r>
+              <a:rPr lang="pt-BR" sz="1400" dirty="0" err="1"/>
+              <a:t>avg</a:t>
+            </a:r>
+            <a:r>
+              <a:rPr lang="pt-BR" sz="1400" dirty="0"/>
+              <a:t>/</a:t>
+            </a:r>
+            <a:r>
+              <a:rPr lang="pt-BR" sz="1400" dirty="0" err="1"/>
+              <a:t>max</a:t>
+            </a:r>
+            <a:r>
+              <a:rPr lang="pt-BR" sz="1400" dirty="0"/>
+              <a:t>/</a:t>
+            </a:r>
+            <a:r>
+              <a:rPr lang="pt-BR" sz="1400" dirty="0" err="1"/>
+              <a:t>mdev</a:t>
+            </a:r>
+            <a:r>
+              <a:rPr lang="pt-BR" sz="1400" dirty="0"/>
+              <a:t> = 0.138/0.165/0.210/0.033 </a:t>
+            </a:r>
+            <a:r>
+              <a:rPr lang="pt-BR" sz="1400" dirty="0" err="1"/>
+              <a:t>ms</a:t>
+            </a:r>
+            <a:endParaRPr lang="pt-BR" sz="1400" dirty="0"/>
+          </a:p>
+          <a:p>
+            <a:endParaRPr lang="pt-BR" sz="1600" dirty="0"/>
+          </a:p>
+        </p:txBody>
+      </p:sp>
+    </p:spTree>
+    <p:extLst>
+      <p:ext uri="{BB962C8B-B14F-4D97-AF65-F5344CB8AC3E}">
+        <p14:creationId xmlns:p14="http://schemas.microsoft.com/office/powerpoint/2010/main" val="4236748709"/>
+      </p:ext>
+    </p:extLst>
+  </p:cSld>
+  <p:clrMapOvr>
+    <a:masterClrMapping/>
+  </p:clrMapOvr>
+</p:sld>
+</file>
+
+<file path=ppt/slides/slide26.xml><?xml version="1.0" encoding="utf-8"?>
+<p:sld xmlns:a="http://schemas.openxmlformats.org/drawingml/2006/main" xmlns:r="http://schemas.openxmlformats.org/officeDocument/2006/relationships" xmlns:p="http://schemas.openxmlformats.org/presentationml/2006/main">
+  <p:cSld>
+    <p:spTree>
+      <p:nvGrpSpPr>
+        <p:cNvPr id="1" name=""/>
+        <p:cNvGrpSpPr/>
+        <p:nvPr/>
+      </p:nvGrpSpPr>
+      <p:grpSpPr>
+        <a:xfrm>
+          <a:off x="0" y="0"/>
+          <a:ext cx="0" cy="0"/>
+          <a:chOff x="0" y="0"/>
+          <a:chExt cx="0" cy="0"/>
+        </a:xfrm>
+      </p:grpSpPr>
+      <p:sp>
+        <p:nvSpPr>
+          <p:cNvPr id="5" name="Título 1"/>
+          <p:cNvSpPr>
+            <a:spLocks noGrp="1"/>
+          </p:cNvSpPr>
+          <p:nvPr>
+            <p:ph type="title"/>
+          </p:nvPr>
+        </p:nvSpPr>
+        <p:spPr>
+          <a:xfrm>
+            <a:off x="115910" y="123288"/>
+            <a:ext cx="11951594" cy="422275"/>
+          </a:xfrm>
+        </p:spPr>
+        <p:txBody>
+          <a:bodyPr vert="horz" lIns="91440" tIns="45720" rIns="91440" bIns="45720" rtlCol="0" anchor="ctr">
+            <a:normAutofit fontScale="90000"/>
+          </a:bodyPr>
+          <a:lstStyle/>
+          <a:p>
+            <a:pPr algn="ctr"/>
+            <a:r>
+              <a:rPr lang="pt-BR" sz="2800" b="1" dirty="0"/>
               <a:t>Comunicação entre Containers – Recuperando dados de um Banco de Dados</a:t>
             </a:r>
           </a:p>
@@ -11289,7 +11446,7 @@
 </p:sld>
 </file>
 
-<file path=ppt/slides/slide26.xml><?xml version="1.0" encoding="utf-8"?>
+<file path=ppt/slides/slide27.xml><?xml version="1.0" encoding="utf-8"?>
 <p:sld xmlns:a="http://schemas.openxmlformats.org/drawingml/2006/main" xmlns:r="http://schemas.openxmlformats.org/officeDocument/2006/relationships" xmlns:p="http://schemas.openxmlformats.org/presentationml/2006/main">
   <p:cSld>
     <p:spTree>
@@ -11883,7 +12040,7 @@
 </p:sld>
 </file>
 
-<file path=ppt/slides/slide27.xml><?xml version="1.0" encoding="utf-8"?>
+<file path=ppt/slides/slide28.xml><?xml version="1.0" encoding="utf-8"?>
 <p:sld xmlns:a="http://schemas.openxmlformats.org/drawingml/2006/main" xmlns:r="http://schemas.openxmlformats.org/officeDocument/2006/relationships" xmlns:p="http://schemas.openxmlformats.org/presentationml/2006/main">
   <p:cSld>
     <p:spTree>
@@ -12032,7 +12189,7 @@
 </p:sld>
 </file>
 
-<file path=ppt/slides/slide28.xml><?xml version="1.0" encoding="utf-8"?>
+<file path=ppt/slides/slide29.xml><?xml version="1.0" encoding="utf-8"?>
 <p:sld xmlns:a="http://schemas.openxmlformats.org/drawingml/2006/main" xmlns:r="http://schemas.openxmlformats.org/officeDocument/2006/relationships" xmlns:p="http://schemas.openxmlformats.org/presentationml/2006/main">
   <p:cSld>
     <p:spTree>
@@ -12165,286 +12322,6 @@
 </p:sld>
 </file>
 
-<file path=ppt/slides/slide29.xml><?xml version="1.0" encoding="utf-8"?>
-<p:sld xmlns:a="http://schemas.openxmlformats.org/drawingml/2006/main" xmlns:r="http://schemas.openxmlformats.org/officeDocument/2006/relationships" xmlns:p="http://schemas.openxmlformats.org/presentationml/2006/main">
-  <p:cSld>
-    <p:spTree>
-      <p:nvGrpSpPr>
-        <p:cNvPr id="1" name=""/>
-        <p:cNvGrpSpPr/>
-        <p:nvPr/>
-      </p:nvGrpSpPr>
-      <p:grpSpPr>
-        <a:xfrm>
-          <a:off x="0" y="0"/>
-          <a:ext cx="0" cy="0"/>
-          <a:chOff x="0" y="0"/>
-          <a:chExt cx="0" cy="0"/>
-        </a:xfrm>
-      </p:grpSpPr>
-      <p:sp>
-        <p:nvSpPr>
-          <p:cNvPr id="5" name="Título 1"/>
-          <p:cNvSpPr>
-            <a:spLocks noGrp="1"/>
-          </p:cNvSpPr>
-          <p:nvPr>
-            <p:ph type="title"/>
-          </p:nvPr>
-        </p:nvSpPr>
-        <p:spPr>
-          <a:xfrm>
-            <a:off x="115910" y="123288"/>
-            <a:ext cx="11951594" cy="422275"/>
-          </a:xfrm>
-        </p:spPr>
-        <p:txBody>
-          <a:bodyPr vert="horz" lIns="91440" tIns="45720" rIns="91440" bIns="45720" rtlCol="0" anchor="ctr">
-            <a:normAutofit fontScale="90000"/>
-          </a:bodyPr>
-          <a:lstStyle/>
-          <a:p>
-            <a:pPr algn="ctr"/>
-            <a:r>
-              <a:rPr lang="pt-BR" sz="2800" b="1" dirty="0"/>
-              <a:t>Trabalhando com o </a:t>
-            </a:r>
-            <a:r>
-              <a:rPr lang="pt-BR" sz="2800" b="1" dirty="0" err="1"/>
-              <a:t>Docker</a:t>
-            </a:r>
-            <a:r>
-              <a:rPr lang="pt-BR" sz="2800" b="1" dirty="0"/>
-              <a:t> </a:t>
-            </a:r>
-            <a:r>
-              <a:rPr lang="pt-BR" sz="2800" b="1" dirty="0" err="1"/>
-              <a:t>Compose</a:t>
-            </a:r>
-            <a:endParaRPr lang="pt-BR" sz="2800" b="1" dirty="0"/>
-          </a:p>
-        </p:txBody>
-      </p:sp>
-      <p:sp>
-        <p:nvSpPr>
-          <p:cNvPr id="4" name="Espaço Reservado para Conteúdo 2">
-            <a:extLst>
-              <a:ext uri="{FF2B5EF4-FFF2-40B4-BE49-F238E27FC236}">
-                <a16:creationId xmlns:a16="http://schemas.microsoft.com/office/drawing/2014/main" id="{15E972C6-5240-824A-8B79-94A49A406279}"/>
-              </a:ext>
-            </a:extLst>
-          </p:cNvPr>
-          <p:cNvSpPr>
-            <a:spLocks noGrp="1"/>
-          </p:cNvSpPr>
-          <p:nvPr>
-            <p:ph idx="1"/>
-          </p:nvPr>
-        </p:nvSpPr>
-        <p:spPr>
-          <a:xfrm>
-            <a:off x="371061" y="781878"/>
-            <a:ext cx="11357113" cy="5738192"/>
-          </a:xfrm>
-        </p:spPr>
-        <p:txBody>
-          <a:bodyPr>
-            <a:noAutofit/>
-          </a:bodyPr>
-          <a:lstStyle/>
-          <a:p>
-            <a:r>
-              <a:rPr lang="pt-BR" sz="2000" dirty="0"/>
-              <a:t>A necessidade de usar o </a:t>
-            </a:r>
-            <a:r>
-              <a:rPr lang="pt-BR" sz="2000" b="1" i="1" dirty="0" err="1"/>
-              <a:t>Docker</a:t>
-            </a:r>
-            <a:r>
-              <a:rPr lang="pt-BR" sz="2000" b="1" i="1" dirty="0"/>
-              <a:t> </a:t>
-            </a:r>
-            <a:r>
-              <a:rPr lang="pt-BR" sz="2000" b="1" i="1" dirty="0" err="1"/>
-              <a:t>Compose</a:t>
-            </a:r>
-            <a:endParaRPr lang="pt-BR" sz="2000" b="1" i="1" dirty="0"/>
-          </a:p>
-          <a:p>
-            <a:pPr marL="0" indent="0">
-              <a:buNone/>
-            </a:pPr>
-            <a:endParaRPr lang="pt-BR" sz="2000" b="1" dirty="0"/>
-          </a:p>
-          <a:p>
-            <a:r>
-              <a:rPr lang="pt-BR" sz="2000" dirty="0"/>
-              <a:t>Configurar o build de vários containers através do </a:t>
-            </a:r>
-            <a:r>
-              <a:rPr lang="pt-BR" sz="2000" b="1" dirty="0" err="1"/>
-              <a:t>docker-compose.yml</a:t>
-            </a:r>
-            <a:endParaRPr lang="pt-BR" sz="2000" b="1" dirty="0"/>
-          </a:p>
-          <a:p>
-            <a:endParaRPr lang="pt-BR" sz="2000" dirty="0"/>
-          </a:p>
-          <a:p>
-            <a:r>
-              <a:rPr lang="pt-BR" sz="2000" dirty="0"/>
-              <a:t>Subir e parar os containers de maneira coordenada com </a:t>
-            </a:r>
-            <a:r>
-              <a:rPr lang="pt-BR" sz="2000" i="1" dirty="0" err="1"/>
-              <a:t>Docker</a:t>
-            </a:r>
-            <a:r>
-              <a:rPr lang="pt-BR" sz="2000" i="1" dirty="0"/>
-              <a:t> </a:t>
-            </a:r>
-            <a:r>
-              <a:rPr lang="pt-BR" sz="2000" i="1" dirty="0" err="1"/>
-              <a:t>Compose</a:t>
-            </a:r>
-            <a:endParaRPr lang="pt-BR" sz="2000" i="1" dirty="0"/>
-          </a:p>
-          <a:p>
-            <a:endParaRPr lang="pt-BR" sz="2000" dirty="0"/>
-          </a:p>
-          <a:p>
-            <a:r>
-              <a:rPr lang="pt-BR" sz="2000" b="1" i="1" dirty="0" err="1"/>
-              <a:t>docker-compose</a:t>
-            </a:r>
-            <a:r>
-              <a:rPr lang="pt-BR" sz="2000" b="1" i="1" dirty="0"/>
-              <a:t> </a:t>
-            </a:r>
-            <a:r>
-              <a:rPr lang="pt-BR" sz="2000" b="1" i="1" dirty="0" err="1"/>
-              <a:t>up</a:t>
-            </a:r>
-            <a:r>
-              <a:rPr lang="pt-BR" sz="2000" dirty="0"/>
-              <a:t> - sobe os serviços criados</a:t>
-            </a:r>
-          </a:p>
-          <a:p>
-            <a:endParaRPr lang="pt-BR" sz="2000" dirty="0"/>
-          </a:p>
-          <a:p>
-            <a:r>
-              <a:rPr lang="pt-BR" sz="2000" b="1" i="1" dirty="0" err="1"/>
-              <a:t>docker-compose</a:t>
-            </a:r>
-            <a:r>
-              <a:rPr lang="pt-BR" sz="2000" b="1" i="1" dirty="0"/>
-              <a:t> </a:t>
-            </a:r>
-            <a:r>
-              <a:rPr lang="pt-BR" sz="2000" b="1" i="1" dirty="0" err="1"/>
-              <a:t>down</a:t>
-            </a:r>
-            <a:r>
-              <a:rPr lang="pt-BR" sz="2000" dirty="0"/>
-              <a:t> - para os serviços criados.</a:t>
-            </a:r>
-          </a:p>
-          <a:p>
-            <a:endParaRPr lang="pt-BR" sz="2000" dirty="0"/>
-          </a:p>
-          <a:p>
-            <a:r>
-              <a:rPr lang="pt-BR" sz="2000" b="1" i="1" dirty="0" err="1"/>
-              <a:t>docker-compose</a:t>
-            </a:r>
-            <a:r>
-              <a:rPr lang="pt-BR" sz="2000" b="1" i="1" dirty="0"/>
-              <a:t> </a:t>
-            </a:r>
-            <a:r>
-              <a:rPr lang="pt-BR" sz="2000" b="1" i="1" dirty="0" err="1"/>
-              <a:t>ps</a:t>
-            </a:r>
-            <a:r>
-              <a:rPr lang="pt-BR" sz="2000" dirty="0"/>
-              <a:t> - lista os serviços que estão rodando.</a:t>
-            </a:r>
-          </a:p>
-          <a:p>
-            <a:endParaRPr lang="pt-BR" sz="2000" dirty="0"/>
-          </a:p>
-          <a:p>
-            <a:r>
-              <a:rPr lang="pt-BR" sz="2000" b="1" i="1" dirty="0" err="1"/>
-              <a:t>docker</a:t>
-            </a:r>
-            <a:r>
-              <a:rPr lang="pt-BR" sz="2000" b="1" i="1" dirty="0"/>
-              <a:t> </a:t>
-            </a:r>
-            <a:r>
-              <a:rPr lang="pt-BR" sz="2000" b="1" i="1" dirty="0" err="1"/>
-              <a:t>exec</a:t>
-            </a:r>
-            <a:r>
-              <a:rPr lang="pt-BR" sz="2000" b="1" i="1" dirty="0"/>
-              <a:t> </a:t>
-            </a:r>
-            <a:r>
-              <a:rPr lang="pt-BR" sz="2000" dirty="0"/>
-              <a:t>-it alura-books-1 </a:t>
-            </a:r>
-            <a:r>
-              <a:rPr lang="pt-BR" sz="2000" dirty="0" err="1"/>
-              <a:t>ping</a:t>
-            </a:r>
-            <a:r>
-              <a:rPr lang="pt-BR" sz="2000" dirty="0"/>
-              <a:t> node2- executa o comando </a:t>
-            </a:r>
-            <a:r>
-              <a:rPr lang="pt-BR" sz="2000" dirty="0" err="1"/>
-              <a:t>ping</a:t>
-            </a:r>
-            <a:r>
-              <a:rPr lang="pt-BR" sz="2000" dirty="0"/>
-              <a:t> node2 dentro do container alura-books-1</a:t>
-            </a:r>
-          </a:p>
-          <a:p>
-            <a:pPr lvl="1" algn="just">
-              <a:lnSpc>
-                <a:spcPct val="150000"/>
-              </a:lnSpc>
-            </a:pPr>
-            <a:endParaRPr lang="pt-BR" sz="1800" dirty="0"/>
-          </a:p>
-          <a:p>
-            <a:pPr lvl="1" algn="just">
-              <a:lnSpc>
-                <a:spcPct val="150000"/>
-              </a:lnSpc>
-            </a:pPr>
-            <a:endParaRPr lang="pt-BR" sz="1800" dirty="0"/>
-          </a:p>
-        </p:txBody>
-      </p:sp>
-    </p:spTree>
-    <p:extLst>
-      <p:ext uri="{BB962C8B-B14F-4D97-AF65-F5344CB8AC3E}">
-        <p14:creationId xmlns:p14="http://schemas.microsoft.com/office/powerpoint/2010/main" val="1819436064"/>
-      </p:ext>
-    </p:extLst>
-  </p:cSld>
-  <p:clrMapOvr>
-    <a:masterClrMapping/>
-  </p:clrMapOvr>
-</p:sld>
-</file>
-
 <file path=ppt/slides/slide3.xml><?xml version="1.0" encoding="utf-8"?>
 <p:sld xmlns:a="http://schemas.openxmlformats.org/drawingml/2006/main" xmlns:r="http://schemas.openxmlformats.org/officeDocument/2006/relationships" xmlns:p="http://schemas.openxmlformats.org/presentationml/2006/main">
   <p:cSld>
@@ -12793,6 +12670,286 @@
 </file>
 
 <file path=ppt/slides/slide30.xml><?xml version="1.0" encoding="utf-8"?>
+<p:sld xmlns:a="http://schemas.openxmlformats.org/drawingml/2006/main" xmlns:r="http://schemas.openxmlformats.org/officeDocument/2006/relationships" xmlns:p="http://schemas.openxmlformats.org/presentationml/2006/main">
+  <p:cSld>
+    <p:spTree>
+      <p:nvGrpSpPr>
+        <p:cNvPr id="1" name=""/>
+        <p:cNvGrpSpPr/>
+        <p:nvPr/>
+      </p:nvGrpSpPr>
+      <p:grpSpPr>
+        <a:xfrm>
+          <a:off x="0" y="0"/>
+          <a:ext cx="0" cy="0"/>
+          <a:chOff x="0" y="0"/>
+          <a:chExt cx="0" cy="0"/>
+        </a:xfrm>
+      </p:grpSpPr>
+      <p:sp>
+        <p:nvSpPr>
+          <p:cNvPr id="5" name="Título 1"/>
+          <p:cNvSpPr>
+            <a:spLocks noGrp="1"/>
+          </p:cNvSpPr>
+          <p:nvPr>
+            <p:ph type="title"/>
+          </p:nvPr>
+        </p:nvSpPr>
+        <p:spPr>
+          <a:xfrm>
+            <a:off x="115910" y="123288"/>
+            <a:ext cx="11951594" cy="422275"/>
+          </a:xfrm>
+        </p:spPr>
+        <p:txBody>
+          <a:bodyPr vert="horz" lIns="91440" tIns="45720" rIns="91440" bIns="45720" rtlCol="0" anchor="ctr">
+            <a:normAutofit fontScale="90000"/>
+          </a:bodyPr>
+          <a:lstStyle/>
+          <a:p>
+            <a:pPr algn="ctr"/>
+            <a:r>
+              <a:rPr lang="pt-BR" sz="2800" b="1" dirty="0"/>
+              <a:t>Trabalhando com o </a:t>
+            </a:r>
+            <a:r>
+              <a:rPr lang="pt-BR" sz="2800" b="1" dirty="0" err="1"/>
+              <a:t>Docker</a:t>
+            </a:r>
+            <a:r>
+              <a:rPr lang="pt-BR" sz="2800" b="1" dirty="0"/>
+              <a:t> </a:t>
+            </a:r>
+            <a:r>
+              <a:rPr lang="pt-BR" sz="2800" b="1" dirty="0" err="1"/>
+              <a:t>Compose</a:t>
+            </a:r>
+            <a:endParaRPr lang="pt-BR" sz="2800" b="1" dirty="0"/>
+          </a:p>
+        </p:txBody>
+      </p:sp>
+      <p:sp>
+        <p:nvSpPr>
+          <p:cNvPr id="4" name="Espaço Reservado para Conteúdo 2">
+            <a:extLst>
+              <a:ext uri="{FF2B5EF4-FFF2-40B4-BE49-F238E27FC236}">
+                <a16:creationId xmlns:a16="http://schemas.microsoft.com/office/drawing/2014/main" id="{15E972C6-5240-824A-8B79-94A49A406279}"/>
+              </a:ext>
+            </a:extLst>
+          </p:cNvPr>
+          <p:cNvSpPr>
+            <a:spLocks noGrp="1"/>
+          </p:cNvSpPr>
+          <p:nvPr>
+            <p:ph idx="1"/>
+          </p:nvPr>
+        </p:nvSpPr>
+        <p:spPr>
+          <a:xfrm>
+            <a:off x="371061" y="781878"/>
+            <a:ext cx="11357113" cy="5738192"/>
+          </a:xfrm>
+        </p:spPr>
+        <p:txBody>
+          <a:bodyPr>
+            <a:noAutofit/>
+          </a:bodyPr>
+          <a:lstStyle/>
+          <a:p>
+            <a:r>
+              <a:rPr lang="pt-BR" sz="2000" dirty="0"/>
+              <a:t>A necessidade de usar o </a:t>
+            </a:r>
+            <a:r>
+              <a:rPr lang="pt-BR" sz="2000" b="1" i="1" dirty="0" err="1"/>
+              <a:t>Docker</a:t>
+            </a:r>
+            <a:r>
+              <a:rPr lang="pt-BR" sz="2000" b="1" i="1" dirty="0"/>
+              <a:t> </a:t>
+            </a:r>
+            <a:r>
+              <a:rPr lang="pt-BR" sz="2000" b="1" i="1" dirty="0" err="1"/>
+              <a:t>Compose</a:t>
+            </a:r>
+            <a:endParaRPr lang="pt-BR" sz="2000" b="1" i="1" dirty="0"/>
+          </a:p>
+          <a:p>
+            <a:pPr marL="0" indent="0">
+              <a:buNone/>
+            </a:pPr>
+            <a:endParaRPr lang="pt-BR" sz="2000" b="1" dirty="0"/>
+          </a:p>
+          <a:p>
+            <a:r>
+              <a:rPr lang="pt-BR" sz="2000" dirty="0"/>
+              <a:t>Configurar o build de vários containers através do </a:t>
+            </a:r>
+            <a:r>
+              <a:rPr lang="pt-BR" sz="2000" b="1" dirty="0" err="1"/>
+              <a:t>docker-compose.yml</a:t>
+            </a:r>
+            <a:endParaRPr lang="pt-BR" sz="2000" b="1" dirty="0"/>
+          </a:p>
+          <a:p>
+            <a:endParaRPr lang="pt-BR" sz="2000" dirty="0"/>
+          </a:p>
+          <a:p>
+            <a:r>
+              <a:rPr lang="pt-BR" sz="2000" dirty="0"/>
+              <a:t>Subir e parar os containers de maneira coordenada com </a:t>
+            </a:r>
+            <a:r>
+              <a:rPr lang="pt-BR" sz="2000" i="1" dirty="0" err="1"/>
+              <a:t>Docker</a:t>
+            </a:r>
+            <a:r>
+              <a:rPr lang="pt-BR" sz="2000" i="1" dirty="0"/>
+              <a:t> </a:t>
+            </a:r>
+            <a:r>
+              <a:rPr lang="pt-BR" sz="2000" i="1" dirty="0" err="1"/>
+              <a:t>Compose</a:t>
+            </a:r>
+            <a:endParaRPr lang="pt-BR" sz="2000" i="1" dirty="0"/>
+          </a:p>
+          <a:p>
+            <a:endParaRPr lang="pt-BR" sz="2000" dirty="0"/>
+          </a:p>
+          <a:p>
+            <a:r>
+              <a:rPr lang="pt-BR" sz="2000" b="1" i="1" dirty="0" err="1"/>
+              <a:t>docker-compose</a:t>
+            </a:r>
+            <a:r>
+              <a:rPr lang="pt-BR" sz="2000" b="1" i="1" dirty="0"/>
+              <a:t> </a:t>
+            </a:r>
+            <a:r>
+              <a:rPr lang="pt-BR" sz="2000" b="1" i="1" dirty="0" err="1"/>
+              <a:t>up</a:t>
+            </a:r>
+            <a:r>
+              <a:rPr lang="pt-BR" sz="2000" dirty="0"/>
+              <a:t> - sobe os serviços criados</a:t>
+            </a:r>
+          </a:p>
+          <a:p>
+            <a:endParaRPr lang="pt-BR" sz="2000" dirty="0"/>
+          </a:p>
+          <a:p>
+            <a:r>
+              <a:rPr lang="pt-BR" sz="2000" b="1" i="1" dirty="0" err="1"/>
+              <a:t>docker-compose</a:t>
+            </a:r>
+            <a:r>
+              <a:rPr lang="pt-BR" sz="2000" b="1" i="1" dirty="0"/>
+              <a:t> </a:t>
+            </a:r>
+            <a:r>
+              <a:rPr lang="pt-BR" sz="2000" b="1" i="1" dirty="0" err="1"/>
+              <a:t>down</a:t>
+            </a:r>
+            <a:r>
+              <a:rPr lang="pt-BR" sz="2000" dirty="0"/>
+              <a:t> - para os serviços criados.</a:t>
+            </a:r>
+          </a:p>
+          <a:p>
+            <a:endParaRPr lang="pt-BR" sz="2000" dirty="0"/>
+          </a:p>
+          <a:p>
+            <a:r>
+              <a:rPr lang="pt-BR" sz="2000" b="1" i="1" dirty="0" err="1"/>
+              <a:t>docker-compose</a:t>
+            </a:r>
+            <a:r>
+              <a:rPr lang="pt-BR" sz="2000" b="1" i="1" dirty="0"/>
+              <a:t> </a:t>
+            </a:r>
+            <a:r>
+              <a:rPr lang="pt-BR" sz="2000" b="1" i="1" dirty="0" err="1"/>
+              <a:t>ps</a:t>
+            </a:r>
+            <a:r>
+              <a:rPr lang="pt-BR" sz="2000" dirty="0"/>
+              <a:t> - lista os serviços que estão rodando.</a:t>
+            </a:r>
+          </a:p>
+          <a:p>
+            <a:endParaRPr lang="pt-BR" sz="2000" dirty="0"/>
+          </a:p>
+          <a:p>
+            <a:r>
+              <a:rPr lang="pt-BR" sz="2000" b="1" i="1" dirty="0" err="1"/>
+              <a:t>docker</a:t>
+            </a:r>
+            <a:r>
+              <a:rPr lang="pt-BR" sz="2000" b="1" i="1" dirty="0"/>
+              <a:t> </a:t>
+            </a:r>
+            <a:r>
+              <a:rPr lang="pt-BR" sz="2000" b="1" i="1" dirty="0" err="1"/>
+              <a:t>exec</a:t>
+            </a:r>
+            <a:r>
+              <a:rPr lang="pt-BR" sz="2000" b="1" i="1" dirty="0"/>
+              <a:t> </a:t>
+            </a:r>
+            <a:r>
+              <a:rPr lang="pt-BR" sz="2000" dirty="0"/>
+              <a:t>-it alura-books-1 </a:t>
+            </a:r>
+            <a:r>
+              <a:rPr lang="pt-BR" sz="2000" dirty="0" err="1"/>
+              <a:t>ping</a:t>
+            </a:r>
+            <a:r>
+              <a:rPr lang="pt-BR" sz="2000" dirty="0"/>
+              <a:t> node2- executa o comando </a:t>
+            </a:r>
+            <a:r>
+              <a:rPr lang="pt-BR" sz="2000" dirty="0" err="1"/>
+              <a:t>ping</a:t>
+            </a:r>
+            <a:r>
+              <a:rPr lang="pt-BR" sz="2000" dirty="0"/>
+              <a:t> node2 dentro do container alura-books-1</a:t>
+            </a:r>
+          </a:p>
+          <a:p>
+            <a:pPr lvl="1" algn="just">
+              <a:lnSpc>
+                <a:spcPct val="150000"/>
+              </a:lnSpc>
+            </a:pPr>
+            <a:endParaRPr lang="pt-BR" sz="1800" dirty="0"/>
+          </a:p>
+          <a:p>
+            <a:pPr lvl="1" algn="just">
+              <a:lnSpc>
+                <a:spcPct val="150000"/>
+              </a:lnSpc>
+            </a:pPr>
+            <a:endParaRPr lang="pt-BR" sz="1800" dirty="0"/>
+          </a:p>
+        </p:txBody>
+      </p:sp>
+    </p:spTree>
+    <p:extLst>
+      <p:ext uri="{BB962C8B-B14F-4D97-AF65-F5344CB8AC3E}">
+        <p14:creationId xmlns:p14="http://schemas.microsoft.com/office/powerpoint/2010/main" val="1819436064"/>
+      </p:ext>
+    </p:extLst>
+  </p:cSld>
+  <p:clrMapOvr>
+    <a:masterClrMapping/>
+  </p:clrMapOvr>
+</p:sld>
+</file>
+
+<file path=ppt/slides/slide31.xml><?xml version="1.0" encoding="utf-8"?>
 <p:sld xmlns:a="http://schemas.openxmlformats.org/drawingml/2006/main" xmlns:r="http://schemas.openxmlformats.org/officeDocument/2006/relationships" xmlns:p="http://schemas.openxmlformats.org/presentationml/2006/main">
   <p:cSld>
     <p:spTree>

</xml_diff>